<commit_message>
Address some comments on presentation from Deanne
</commit_message>
<xml_diff>
--- a/Techfest_ML.pptx
+++ b/Techfest_ML.pptx
@@ -5,10 +5,10 @@
     <p:sldMasterId id="2147483648" r:id="rId1"/>
   </p:sldMasterIdLst>
   <p:notesMasterIdLst>
-    <p:notesMasterId r:id="rId32"/>
+    <p:notesMasterId r:id="rId34"/>
   </p:notesMasterIdLst>
   <p:sldIdLst>
-    <p:sldId id="256" r:id="rId2"/>
+    <p:sldId id="293" r:id="rId2"/>
     <p:sldId id="284" r:id="rId3"/>
     <p:sldId id="277" r:id="rId4"/>
     <p:sldId id="278" r:id="rId5"/>
@@ -38,6 +38,8 @@
     <p:sldId id="283" r:id="rId29"/>
     <p:sldId id="292" r:id="rId30"/>
     <p:sldId id="291" r:id="rId31"/>
+    <p:sldId id="295" r:id="rId32"/>
+    <p:sldId id="294" r:id="rId33"/>
   </p:sldIdLst>
   <p:sldSz cx="9144000" cy="6858000" type="screen4x3"/>
   <p:notesSz cx="6858000" cy="9144000"/>
@@ -221,7 +223,7 @@
           <a:p>
             <a:fld id="{33E144C1-CEA6-4D4D-9670-300AA03EA9ED}" type="datetimeFigureOut">
               <a:rPr lang="en-US" smtClean="0"/>
-              <a:t>5/6/15</a:t>
+              <a:t>5/9/15</a:t>
             </a:fld>
             <a:endParaRPr lang="en-US"/>
           </a:p>
@@ -762,7 +764,7 @@
           <a:p>
             <a:fld id="{E31BDE11-21A5-024B-AC15-C770EC7EF040}" type="datetimeFigureOut">
               <a:rPr lang="en-US" smtClean="0"/>
-              <a:t>5/6/15</a:t>
+              <a:t>5/9/15</a:t>
             </a:fld>
             <a:endParaRPr lang="en-US"/>
           </a:p>
@@ -932,7 +934,7 @@
           <a:p>
             <a:fld id="{E31BDE11-21A5-024B-AC15-C770EC7EF040}" type="datetimeFigureOut">
               <a:rPr lang="en-US" smtClean="0"/>
-              <a:t>5/6/15</a:t>
+              <a:t>5/9/15</a:t>
             </a:fld>
             <a:endParaRPr lang="en-US"/>
           </a:p>
@@ -1112,7 +1114,7 @@
           <a:p>
             <a:fld id="{E31BDE11-21A5-024B-AC15-C770EC7EF040}" type="datetimeFigureOut">
               <a:rPr lang="en-US" smtClean="0"/>
-              <a:t>5/6/15</a:t>
+              <a:t>5/9/15</a:t>
             </a:fld>
             <a:endParaRPr lang="en-US"/>
           </a:p>
@@ -1170,6 +1172,54 @@
   <p:clrMapOvr>
     <a:masterClrMapping/>
   </p:clrMapOvr>
+</p:sldLayout>
+</file>
+
+<file path=ppt/slideLayouts/slideLayout12.xml><?xml version="1.0" encoding="utf-8"?>
+<p:sldLayout xmlns:a="http://schemas.openxmlformats.org/drawingml/2006/main" xmlns:r="http://schemas.openxmlformats.org/officeDocument/2006/relationships" xmlns:p="http://schemas.openxmlformats.org/presentationml/2006/main" userDrawn="1">
+  <p:cSld name="1_Title Slide">
+    <p:bg>
+      <p:bgPr>
+        <a:blipFill rotWithShape="1">
+          <a:blip r:embed="rId2"/>
+          <a:stretch>
+            <a:fillRect/>
+          </a:stretch>
+        </a:blipFill>
+        <a:effectLst/>
+      </p:bgPr>
+    </p:bg>
+    <p:spTree>
+      <p:nvGrpSpPr>
+        <p:cNvPr id="1" name=""/>
+        <p:cNvGrpSpPr/>
+        <p:nvPr/>
+      </p:nvGrpSpPr>
+      <p:grpSpPr>
+        <a:xfrm>
+          <a:off x="0" y="0"/>
+          <a:ext cx="0" cy="0"/>
+          <a:chOff x="0" y="0"/>
+          <a:chExt cx="0" cy="0"/>
+        </a:xfrm>
+      </p:grpSpPr>
+    </p:spTree>
+    <p:extLst>
+      <p:ext uri="{BB962C8B-B14F-4D97-AF65-F5344CB8AC3E}">
+        <p14:creationId xmlns:p14="http://schemas.microsoft.com/office/powerpoint/2010/main" val="606923993"/>
+      </p:ext>
+    </p:extLst>
+  </p:cSld>
+  <p:clrMapOvr>
+    <a:masterClrMapping/>
+  </p:clrMapOvr>
+  <p:timing>
+    <p:tnLst>
+      <p:par>
+        <p:cTn xmlns:p14="http://schemas.microsoft.com/office/powerpoint/2010/main" id="1" dur="indefinite" restart="never" nodeType="tmRoot"/>
+      </p:par>
+    </p:tnLst>
+  </p:timing>
 </p:sldLayout>
 </file>
 
@@ -1282,7 +1332,7 @@
           <a:p>
             <a:fld id="{E31BDE11-21A5-024B-AC15-C770EC7EF040}" type="datetimeFigureOut">
               <a:rPr lang="en-US" smtClean="0"/>
-              <a:t>5/6/15</a:t>
+              <a:t>5/9/15</a:t>
             </a:fld>
             <a:endParaRPr lang="en-US"/>
           </a:p>
@@ -1528,7 +1578,7 @@
           <a:p>
             <a:fld id="{E31BDE11-21A5-024B-AC15-C770EC7EF040}" type="datetimeFigureOut">
               <a:rPr lang="en-US" smtClean="0"/>
-              <a:t>5/6/15</a:t>
+              <a:t>5/9/15</a:t>
             </a:fld>
             <a:endParaRPr lang="en-US"/>
           </a:p>
@@ -1816,7 +1866,7 @@
           <a:p>
             <a:fld id="{E31BDE11-21A5-024B-AC15-C770EC7EF040}" type="datetimeFigureOut">
               <a:rPr lang="en-US" smtClean="0"/>
-              <a:t>5/6/15</a:t>
+              <a:t>5/9/15</a:t>
             </a:fld>
             <a:endParaRPr lang="en-US"/>
           </a:p>
@@ -2238,7 +2288,7 @@
           <a:p>
             <a:fld id="{E31BDE11-21A5-024B-AC15-C770EC7EF040}" type="datetimeFigureOut">
               <a:rPr lang="en-US" smtClean="0"/>
-              <a:t>5/6/15</a:t>
+              <a:t>5/9/15</a:t>
             </a:fld>
             <a:endParaRPr lang="en-US"/>
           </a:p>
@@ -2356,7 +2406,7 @@
           <a:p>
             <a:fld id="{E31BDE11-21A5-024B-AC15-C770EC7EF040}" type="datetimeFigureOut">
               <a:rPr lang="en-US" smtClean="0"/>
-              <a:t>5/6/15</a:t>
+              <a:t>5/9/15</a:t>
             </a:fld>
             <a:endParaRPr lang="en-US"/>
           </a:p>
@@ -2451,7 +2501,7 @@
           <a:p>
             <a:fld id="{E31BDE11-21A5-024B-AC15-C770EC7EF040}" type="datetimeFigureOut">
               <a:rPr lang="en-US" smtClean="0"/>
-              <a:t>5/6/15</a:t>
+              <a:t>5/9/15</a:t>
             </a:fld>
             <a:endParaRPr lang="en-US"/>
           </a:p>
@@ -2728,7 +2778,7 @@
           <a:p>
             <a:fld id="{E31BDE11-21A5-024B-AC15-C770EC7EF040}" type="datetimeFigureOut">
               <a:rPr lang="en-US" smtClean="0"/>
-              <a:t>5/6/15</a:t>
+              <a:t>5/9/15</a:t>
             </a:fld>
             <a:endParaRPr lang="en-US"/>
           </a:p>
@@ -2981,7 +3031,7 @@
           <a:p>
             <a:fld id="{E31BDE11-21A5-024B-AC15-C770EC7EF040}" type="datetimeFigureOut">
               <a:rPr lang="en-US" smtClean="0"/>
-              <a:t>5/6/15</a:t>
+              <a:t>5/9/15</a:t>
             </a:fld>
             <a:endParaRPr lang="en-US"/>
           </a:p>
@@ -3194,7 +3244,7 @@
           <a:p>
             <a:fld id="{E31BDE11-21A5-024B-AC15-C770EC7EF040}" type="datetimeFigureOut">
               <a:rPr lang="en-US" smtClean="0"/>
-              <a:t>5/6/15</a:t>
+              <a:t>5/9/15</a:t>
             </a:fld>
             <a:endParaRPr lang="en-US"/>
           </a:p>
@@ -3298,6 +3348,7 @@
     <p:sldLayoutId id="2147483657" r:id="rId9"/>
     <p:sldLayoutId id="2147483658" r:id="rId10"/>
     <p:sldLayoutId id="2147483659" r:id="rId11"/>
+    <p:sldLayoutId id="2147483660" r:id="rId12"/>
   </p:sldLayoutIdLst>
   <p:txStyles>
     <p:titleStyle>
@@ -3576,37 +3627,17 @@
             <a:spLocks noGrp="1"/>
           </p:cNvSpPr>
           <p:nvPr>
-            <p:ph type="ctrTitle"/>
+            <p:ph type="ctrTitle" idx="4294967295"/>
           </p:nvPr>
         </p:nvSpPr>
-        <p:spPr/>
-        <p:txBody>
-          <a:bodyPr/>
-          <a:lstStyle/>
-          <a:p>
-            <a:r>
-              <a:rPr lang="en-US" dirty="0" smtClean="0"/>
-              <a:t>Machine Learning Made Simple</a:t>
-            </a:r>
-            <a:endParaRPr lang="en-US" dirty="0"/>
-          </a:p>
-        </p:txBody>
-      </p:sp>
-      <p:sp>
-        <p:nvSpPr>
-          <p:cNvPr id="3" name="Subtitle 2"/>
-          <p:cNvSpPr>
-            <a:spLocks noGrp="1"/>
-          </p:cNvSpPr>
-          <p:nvPr>
-            <p:ph type="subTitle" idx="1"/>
-          </p:nvPr>
-        </p:nvSpPr>
-        <p:spPr>
-          <a:xfrm>
-            <a:off x="1260928" y="3907971"/>
-            <a:ext cx="6629400" cy="1752600"/>
-          </a:xfrm>
+        <p:spPr>
+          <a:xfrm>
+            <a:off x="337346" y="255421"/>
+            <a:ext cx="8433753" cy="1462823"/>
+          </a:xfrm>
+          <a:prstGeom prst="rect">
+            <a:avLst/>
+          </a:prstGeom>
         </p:spPr>
         <p:txBody>
           <a:bodyPr>
@@ -3614,70 +3645,190 @@
           </a:bodyPr>
           <a:lstStyle/>
           <a:p>
+            <a:pPr algn="l"/>
             <a:r>
-              <a:rPr lang="en-US" sz="2800" dirty="0" err="1" smtClean="0">
+              <a:rPr lang="en-US" dirty="0" smtClean="0">
                 <a:solidFill>
-                  <a:srgbClr val="000000"/>
+                  <a:schemeClr val="bg1"/>
                 </a:solidFill>
+                <a:latin typeface="GT Walsheim Regular"/>
+                <a:cs typeface="GT Walsheim Regular"/>
+              </a:rPr>
+              <a:t>Workshop: Machine Learning Made Ridiculously Simple</a:t>
+            </a:r>
+            <a:endParaRPr lang="en-US" sz="4400" dirty="0">
+              <a:solidFill>
+                <a:schemeClr val="bg1"/>
+              </a:solidFill>
+              <a:latin typeface="GT Walsheim Regular"/>
+              <a:cs typeface="GT Walsheim Regular"/>
+            </a:endParaRPr>
+          </a:p>
+        </p:txBody>
+      </p:sp>
+      <p:sp>
+        <p:nvSpPr>
+          <p:cNvPr id="3" name="Title 1"/>
+          <p:cNvSpPr txBox="1">
+            <a:spLocks/>
+          </p:cNvSpPr>
+          <p:nvPr/>
+        </p:nvSpPr>
+        <p:spPr>
+          <a:xfrm>
+            <a:off x="337344" y="1593867"/>
+            <a:ext cx="2077024" cy="832811"/>
+          </a:xfrm>
+          <a:prstGeom prst="rect">
+            <a:avLst/>
+          </a:prstGeom>
+        </p:spPr>
+        <p:txBody>
+          <a:bodyPr anchor="b" anchorCtr="0"/>
+          <a:lstStyle>
+            <a:lvl1pPr algn="ctr" defTabSz="457200" rtl="0" eaLnBrk="1" latinLnBrk="0" hangingPunct="1">
+              <a:spcBef>
+                <a:spcPct val="0"/>
+              </a:spcBef>
+              <a:buNone/>
+              <a:defRPr sz="3600" kern="1200" baseline="0">
+                <a:solidFill>
+                  <a:srgbClr val="333333"/>
+                </a:solidFill>
+                <a:latin typeface="Arial"/>
+                <a:ea typeface="+mj-ea"/>
+                <a:cs typeface="Arial"/>
+              </a:defRPr>
+            </a:lvl1pPr>
+          </a:lstStyle>
+          <a:p>
+            <a:pPr algn="l"/>
+            <a:r>
+              <a:rPr lang="en-US" sz="2400" dirty="0">
+                <a:solidFill>
+                  <a:schemeClr val="bg1"/>
+                </a:solidFill>
+                <a:latin typeface="GT Walsheim Regular"/>
+                <a:cs typeface="GT Walsheim Regular"/>
+              </a:rPr>
+              <a:t>Presented by:</a:t>
+            </a:r>
+          </a:p>
+        </p:txBody>
+      </p:sp>
+      <p:sp>
+        <p:nvSpPr>
+          <p:cNvPr id="6" name="Title 1"/>
+          <p:cNvSpPr txBox="1">
+            <a:spLocks/>
+          </p:cNvSpPr>
+          <p:nvPr/>
+        </p:nvSpPr>
+        <p:spPr>
+          <a:xfrm>
+            <a:off x="2379120" y="1763062"/>
+            <a:ext cx="6391976" cy="1165412"/>
+          </a:xfrm>
+          <a:prstGeom prst="rect">
+            <a:avLst/>
+          </a:prstGeom>
+        </p:spPr>
+        <p:txBody>
+          <a:bodyPr anchor="b" anchorCtr="0"/>
+          <a:lstStyle>
+            <a:lvl1pPr algn="ctr" defTabSz="457200" rtl="0" eaLnBrk="1" latinLnBrk="0" hangingPunct="1">
+              <a:spcBef>
+                <a:spcPct val="0"/>
+              </a:spcBef>
+              <a:buNone/>
+              <a:defRPr sz="3600" kern="1200" baseline="0">
+                <a:solidFill>
+                  <a:srgbClr val="333333"/>
+                </a:solidFill>
+                <a:latin typeface="Arial"/>
+                <a:ea typeface="+mj-ea"/>
+                <a:cs typeface="Arial"/>
+              </a:defRPr>
+            </a:lvl1pPr>
+          </a:lstStyle>
+          <a:p>
+            <a:pPr algn="l"/>
+            <a:r>
+              <a:rPr lang="en-US" sz="3200" dirty="0" err="1">
+                <a:solidFill>
+                  <a:schemeClr val="bg1"/>
+                </a:solidFill>
+                <a:latin typeface="GT Walsheim Regular"/>
+                <a:cs typeface="GT Walsheim Regular"/>
               </a:rPr>
               <a:t>Arsen</a:t>
             </a:r>
             <a:r>
-              <a:rPr lang="en-US" sz="2800" dirty="0" smtClean="0">
+              <a:rPr lang="en-US" sz="3200" dirty="0">
                 <a:solidFill>
-                  <a:srgbClr val="000000"/>
+                  <a:schemeClr val="bg1"/>
                 </a:solidFill>
+                <a:latin typeface="GT Walsheim Regular"/>
+                <a:cs typeface="GT Walsheim Regular"/>
               </a:rPr>
               <a:t> </a:t>
             </a:r>
             <a:r>
-              <a:rPr lang="en-US" sz="2800" dirty="0" err="1" smtClean="0">
+              <a:rPr lang="en-US" sz="3200" dirty="0" err="1" smtClean="0">
                 <a:solidFill>
-                  <a:srgbClr val="000000"/>
+                  <a:schemeClr val="bg1"/>
                 </a:solidFill>
+                <a:latin typeface="GT Walsheim Regular"/>
+                <a:cs typeface="GT Walsheim Regular"/>
               </a:rPr>
               <a:t>Mamikonyan</a:t>
             </a:r>
             <a:r>
-              <a:rPr lang="en-US" sz="2800" dirty="0" smtClean="0">
+              <a:rPr lang="en-US" sz="3200" dirty="0">
                 <a:solidFill>
-                  <a:srgbClr val="000000"/>
+                  <a:schemeClr val="bg1"/>
                 </a:solidFill>
+                <a:latin typeface="GT Walsheim Regular"/>
+                <a:cs typeface="GT Walsheim Regular"/>
               </a:rPr>
-              <a:t>, David Kellogg, Lydia Gu</a:t>
+              <a:t>,</a:t>
             </a:r>
-          </a:p>
-          <a:p>
-            <a:endParaRPr lang="en-US" sz="2800" dirty="0" smtClean="0">
+            <a:endParaRPr lang="en-US" sz="3200" dirty="0" smtClean="0">
               <a:solidFill>
-                <a:srgbClr val="000000"/>
+                <a:schemeClr val="bg1"/>
               </a:solidFill>
+              <a:latin typeface="GT Walsheim Regular"/>
+              <a:cs typeface="GT Walsheim Regular"/>
             </a:endParaRPr>
           </a:p>
           <a:p>
+            <a:pPr algn="l"/>
             <a:r>
-              <a:rPr lang="en-US" sz="2800" dirty="0" err="1" smtClean="0">
+              <a:rPr lang="en-US" sz="3200" dirty="0" smtClean="0">
                 <a:solidFill>
-                  <a:srgbClr val="000000"/>
+                  <a:schemeClr val="bg1"/>
                 </a:solidFill>
-                <a:effectLst/>
+                <a:latin typeface="GT Walsheim Regular"/>
+                <a:cs typeface="GT Walsheim Regular"/>
               </a:rPr>
-              <a:t>TechFest</a:t>
+              <a:t>David Kellogg, Lydia </a:t>
             </a:r>
             <a:r>
-              <a:rPr lang="en-US" sz="2800" dirty="0" smtClean="0">
+              <a:rPr lang="en-US" sz="3200" dirty="0">
                 <a:solidFill>
-                  <a:srgbClr val="000000"/>
+                  <a:schemeClr val="bg1"/>
                 </a:solidFill>
-                <a:effectLst/>
+                <a:latin typeface="GT Walsheim Regular"/>
+                <a:cs typeface="GT Walsheim Regular"/>
               </a:rPr>
-              <a:t> 2015</a:t>
+              <a:t>Gu</a:t>
             </a:r>
-            <a:endParaRPr lang="en-US" sz="2800" dirty="0">
+            <a:endParaRPr lang="en-US" sz="3200" dirty="0">
               <a:solidFill>
-                <a:srgbClr val="000000"/>
+                <a:schemeClr val="bg1"/>
               </a:solidFill>
-              <a:effectLst/>
+              <a:latin typeface="GT Walsheim Regular"/>
+              <a:cs typeface="GT Walsheim Regular"/>
             </a:endParaRPr>
           </a:p>
         </p:txBody>
@@ -3685,7 +3836,7 @@
     </p:spTree>
     <p:extLst>
       <p:ext uri="{BB962C8B-B14F-4D97-AF65-F5344CB8AC3E}">
-        <p14:creationId xmlns:p14="http://schemas.microsoft.com/office/powerpoint/2010/main" val="1299282158"/>
+        <p14:creationId xmlns:p14="http://schemas.microsoft.com/office/powerpoint/2010/main" val="2053067967"/>
       </p:ext>
     </p:extLst>
   </p:cSld>
@@ -28439,6 +28590,84 @@
           </a:fontRef>
         </p:style>
       </p:cxnSp>
+      <p:sp>
+        <p:nvSpPr>
+          <p:cNvPr id="5" name="TextBox 4"/>
+          <p:cNvSpPr txBox="1"/>
+          <p:nvPr/>
+        </p:nvSpPr>
+        <p:spPr>
+          <a:xfrm>
+            <a:off x="1042866" y="3423217"/>
+            <a:ext cx="1219480" cy="369332"/>
+          </a:xfrm>
+          <a:prstGeom prst="rect">
+            <a:avLst/>
+          </a:prstGeom>
+          <a:solidFill>
+            <a:schemeClr val="bg1"/>
+          </a:solidFill>
+        </p:spPr>
+        <p:txBody>
+          <a:bodyPr wrap="square" rtlCol="0">
+            <a:spAutoFit/>
+          </a:bodyPr>
+          <a:lstStyle/>
+          <a:p>
+            <a:pPr algn="ctr"/>
+            <a:r>
+              <a:rPr lang="en-US" dirty="0" smtClean="0">
+                <a:latin typeface="Times New Roman"/>
+                <a:cs typeface="Times New Roman"/>
+              </a:rPr>
+              <a:t>Regression</a:t>
+            </a:r>
+            <a:endParaRPr lang="en-US" dirty="0">
+              <a:latin typeface="Times New Roman"/>
+              <a:cs typeface="Times New Roman"/>
+            </a:endParaRPr>
+          </a:p>
+        </p:txBody>
+      </p:sp>
+      <p:sp>
+        <p:nvSpPr>
+          <p:cNvPr id="7" name="TextBox 6"/>
+          <p:cNvSpPr txBox="1"/>
+          <p:nvPr/>
+        </p:nvSpPr>
+        <p:spPr>
+          <a:xfrm>
+            <a:off x="2658642" y="3456861"/>
+            <a:ext cx="1336207" cy="338554"/>
+          </a:xfrm>
+          <a:prstGeom prst="rect">
+            <a:avLst/>
+          </a:prstGeom>
+          <a:solidFill>
+            <a:schemeClr val="bg1"/>
+          </a:solidFill>
+        </p:spPr>
+        <p:txBody>
+          <a:bodyPr wrap="square" rtlCol="0">
+            <a:spAutoFit/>
+          </a:bodyPr>
+          <a:lstStyle/>
+          <a:p>
+            <a:pPr algn="ctr"/>
+            <a:r>
+              <a:rPr lang="en-US" sz="1600" dirty="0" smtClean="0">
+                <a:latin typeface="Times New Roman"/>
+                <a:cs typeface="Times New Roman"/>
+              </a:rPr>
+              <a:t>Classification</a:t>
+            </a:r>
+            <a:endParaRPr lang="en-US" sz="1600" dirty="0">
+              <a:latin typeface="Times New Roman"/>
+              <a:cs typeface="Times New Roman"/>
+            </a:endParaRPr>
+          </a:p>
+        </p:txBody>
+      </p:sp>
     </p:spTree>
     <p:extLst>
       <p:ext uri="{BB962C8B-B14F-4D97-AF65-F5344CB8AC3E}">
@@ -28646,6 +28875,284 @@
 </p:sld>
 </file>
 
+<file path=ppt/slides/slide31.xml><?xml version="1.0" encoding="utf-8"?>
+<p:sld xmlns:a="http://schemas.openxmlformats.org/drawingml/2006/main" xmlns:r="http://schemas.openxmlformats.org/officeDocument/2006/relationships" xmlns:p="http://schemas.openxmlformats.org/presentationml/2006/main">
+  <p:cSld>
+    <p:spTree>
+      <p:nvGrpSpPr>
+        <p:cNvPr id="1" name=""/>
+        <p:cNvGrpSpPr/>
+        <p:nvPr/>
+      </p:nvGrpSpPr>
+      <p:grpSpPr>
+        <a:xfrm>
+          <a:off x="0" y="0"/>
+          <a:ext cx="0" cy="0"/>
+          <a:chOff x="0" y="0"/>
+          <a:chExt cx="0" cy="0"/>
+        </a:xfrm>
+      </p:grpSpPr>
+      <p:sp>
+        <p:nvSpPr>
+          <p:cNvPr id="2" name="Title 1"/>
+          <p:cNvSpPr>
+            <a:spLocks noGrp="1"/>
+          </p:cNvSpPr>
+          <p:nvPr>
+            <p:ph type="title"/>
+          </p:nvPr>
+        </p:nvSpPr>
+        <p:spPr/>
+        <p:txBody>
+          <a:bodyPr/>
+          <a:lstStyle/>
+          <a:p>
+            <a:r>
+              <a:rPr lang="en-US" dirty="0" smtClean="0"/>
+              <a:t>What We Didn’t Teach You</a:t>
+            </a:r>
+            <a:endParaRPr lang="en-US" dirty="0"/>
+          </a:p>
+        </p:txBody>
+      </p:sp>
+      <p:sp>
+        <p:nvSpPr>
+          <p:cNvPr id="3" name="Content Placeholder 2"/>
+          <p:cNvSpPr>
+            <a:spLocks noGrp="1"/>
+          </p:cNvSpPr>
+          <p:nvPr>
+            <p:ph idx="1"/>
+          </p:nvPr>
+        </p:nvSpPr>
+        <p:spPr/>
+        <p:txBody>
+          <a:bodyPr/>
+          <a:lstStyle/>
+          <a:p>
+            <a:r>
+              <a:rPr lang="en-US" dirty="0" smtClean="0"/>
+              <a:t>TODO</a:t>
+            </a:r>
+          </a:p>
+          <a:p>
+            <a:endParaRPr lang="en-US" dirty="0"/>
+          </a:p>
+          <a:p>
+            <a:r>
+              <a:rPr lang="en-US" dirty="0" smtClean="0"/>
+              <a:t>How a model actually works (The math behind how you train and use a model)</a:t>
+            </a:r>
+          </a:p>
+          <a:p>
+            <a:r>
+              <a:rPr lang="en-US" dirty="0" smtClean="0"/>
+              <a:t>There are lots of different models out there, and they all have flaws.</a:t>
+            </a:r>
+          </a:p>
+          <a:p>
+            <a:endParaRPr lang="en-US" dirty="0"/>
+          </a:p>
+          <a:p>
+            <a:endParaRPr lang="en-US" dirty="0"/>
+          </a:p>
+        </p:txBody>
+      </p:sp>
+    </p:spTree>
+    <p:extLst>
+      <p:ext uri="{BB962C8B-B14F-4D97-AF65-F5344CB8AC3E}">
+        <p14:creationId xmlns:p14="http://schemas.microsoft.com/office/powerpoint/2010/main" val="275283733"/>
+      </p:ext>
+    </p:extLst>
+  </p:cSld>
+  <p:clrMapOvr>
+    <a:masterClrMapping/>
+  </p:clrMapOvr>
+  <p:timing>
+    <p:tnLst>
+      <p:par>
+        <p:cTn xmlns:p14="http://schemas.microsoft.com/office/powerpoint/2010/main" id="1" dur="indefinite" restart="never" nodeType="tmRoot"/>
+      </p:par>
+    </p:tnLst>
+  </p:timing>
+</p:sld>
+</file>
+
+<file path=ppt/slides/slide32.xml><?xml version="1.0" encoding="utf-8"?>
+<p:sld xmlns:a="http://schemas.openxmlformats.org/drawingml/2006/main" xmlns:r="http://schemas.openxmlformats.org/officeDocument/2006/relationships" xmlns:p="http://schemas.openxmlformats.org/presentationml/2006/main">
+  <p:cSld>
+    <p:spTree>
+      <p:nvGrpSpPr>
+        <p:cNvPr id="1" name=""/>
+        <p:cNvGrpSpPr/>
+        <p:nvPr/>
+      </p:nvGrpSpPr>
+      <p:grpSpPr>
+        <a:xfrm>
+          <a:off x="0" y="0"/>
+          <a:ext cx="0" cy="0"/>
+          <a:chOff x="0" y="0"/>
+          <a:chExt cx="0" cy="0"/>
+        </a:xfrm>
+      </p:grpSpPr>
+      <p:sp>
+        <p:nvSpPr>
+          <p:cNvPr id="2" name="Title 1"/>
+          <p:cNvSpPr>
+            <a:spLocks noGrp="1"/>
+          </p:cNvSpPr>
+          <p:nvPr>
+            <p:ph type="title"/>
+          </p:nvPr>
+        </p:nvSpPr>
+        <p:spPr/>
+        <p:txBody>
+          <a:bodyPr/>
+          <a:lstStyle/>
+          <a:p>
+            <a:r>
+              <a:rPr lang="en-US" dirty="0" smtClean="0"/>
+              <a:t>Want to Learn More?</a:t>
+            </a:r>
+            <a:endParaRPr lang="en-US" dirty="0"/>
+          </a:p>
+        </p:txBody>
+      </p:sp>
+      <p:sp>
+        <p:nvSpPr>
+          <p:cNvPr id="3" name="Content Placeholder 2"/>
+          <p:cNvSpPr>
+            <a:spLocks noGrp="1"/>
+          </p:cNvSpPr>
+          <p:nvPr>
+            <p:ph idx="1"/>
+          </p:nvPr>
+        </p:nvSpPr>
+        <p:spPr/>
+        <p:txBody>
+          <a:bodyPr/>
+          <a:lstStyle/>
+          <a:p>
+            <a:pPr marL="0" indent="0">
+              <a:buNone/>
+            </a:pPr>
+            <a:r>
+              <a:rPr lang="en-US" dirty="0" smtClean="0"/>
+              <a:t>Go to </a:t>
+            </a:r>
+            <a:r>
+              <a:rPr lang="en-US" b="1" dirty="0" smtClean="0"/>
+              <a:t>“</a:t>
+            </a:r>
+            <a:r>
+              <a:rPr lang="en-US" b="1" dirty="0"/>
+              <a:t>Describe the Model Building </a:t>
+            </a:r>
+            <a:r>
+              <a:rPr lang="en-US" b="1" dirty="0" smtClean="0"/>
+              <a:t>Process”</a:t>
+            </a:r>
+          </a:p>
+          <a:p>
+            <a:pPr marL="0" indent="0">
+              <a:buNone/>
+            </a:pPr>
+            <a:r>
+              <a:rPr lang="en-US" dirty="0"/>
+              <a:t>B</a:t>
+            </a:r>
+            <a:r>
+              <a:rPr lang="en-US" dirty="0" smtClean="0"/>
+              <a:t>y Nathan Howell, </a:t>
+            </a:r>
+            <a:r>
+              <a:rPr lang="en-US" dirty="0" err="1"/>
+              <a:t>Zhixian</a:t>
+            </a:r>
+            <a:r>
+              <a:rPr lang="en-US" dirty="0"/>
+              <a:t> </a:t>
+            </a:r>
+            <a:r>
+              <a:rPr lang="en-US" dirty="0" smtClean="0"/>
+              <a:t>Yan, Jeffrey </a:t>
+            </a:r>
+            <a:r>
+              <a:rPr lang="en-US" dirty="0" err="1" smtClean="0"/>
+              <a:t>Mclellan</a:t>
+            </a:r>
+            <a:r>
+              <a:rPr lang="en-US" dirty="0" smtClean="0"/>
+              <a:t> and </a:t>
+            </a:r>
+            <a:r>
+              <a:rPr lang="en-US" dirty="0"/>
+              <a:t>Marc </a:t>
+            </a:r>
+            <a:r>
+              <a:rPr lang="en-US" dirty="0" err="1" smtClean="0"/>
+              <a:t>Piette</a:t>
+            </a:r>
+            <a:endParaRPr lang="en-US" dirty="0" smtClean="0"/>
+          </a:p>
+          <a:p>
+            <a:pPr marL="0" indent="0" algn="ctr">
+              <a:buNone/>
+            </a:pPr>
+            <a:r>
+              <a:rPr lang="en-US" dirty="0" smtClean="0"/>
+              <a:t>Personalization Track</a:t>
+            </a:r>
+          </a:p>
+          <a:p>
+            <a:pPr marL="0" indent="0" algn="ctr">
+              <a:buNone/>
+            </a:pPr>
+            <a:r>
+              <a:rPr lang="en-US" dirty="0" smtClean="0"/>
+              <a:t>Grand </a:t>
+            </a:r>
+            <a:r>
+              <a:rPr lang="en-US" dirty="0"/>
+              <a:t>Canyon 2</a:t>
+            </a:r>
+            <a:endParaRPr lang="en-US" dirty="0" smtClean="0"/>
+          </a:p>
+          <a:p>
+            <a:pPr marL="0" indent="0" algn="ctr">
+              <a:buNone/>
+            </a:pPr>
+            <a:r>
+              <a:rPr lang="en-US" dirty="0" smtClean="0"/>
+              <a:t>1:30pm – 2:15pm</a:t>
+            </a:r>
+            <a:endParaRPr lang="en-US" dirty="0"/>
+          </a:p>
+          <a:p>
+            <a:endParaRPr lang="en-US" dirty="0"/>
+          </a:p>
+        </p:txBody>
+      </p:sp>
+    </p:spTree>
+    <p:extLst>
+      <p:ext uri="{BB962C8B-B14F-4D97-AF65-F5344CB8AC3E}">
+        <p14:creationId xmlns:p14="http://schemas.microsoft.com/office/powerpoint/2010/main" val="3698710820"/>
+      </p:ext>
+    </p:extLst>
+  </p:cSld>
+  <p:clrMapOvr>
+    <a:masterClrMapping/>
+  </p:clrMapOvr>
+  <p:timing>
+    <p:tnLst>
+      <p:par>
+        <p:cTn xmlns:p14="http://schemas.microsoft.com/office/powerpoint/2010/main" id="1" dur="indefinite" restart="never" nodeType="tmRoot"/>
+      </p:par>
+    </p:tnLst>
+  </p:timing>
+</p:sld>
+</file>
+
 <file path=ppt/slides/slide4.xml><?xml version="1.0" encoding="utf-8"?>
 <p:sld xmlns:a="http://schemas.openxmlformats.org/drawingml/2006/main" xmlns:r="http://schemas.openxmlformats.org/officeDocument/2006/relationships" xmlns:p="http://schemas.openxmlformats.org/presentationml/2006/main">
   <p:cSld>
@@ -28918,6 +29425,84 @@
           </a:fontRef>
         </p:style>
       </p:cxnSp>
+      <p:sp>
+        <p:nvSpPr>
+          <p:cNvPr id="8" name="TextBox 7"/>
+          <p:cNvSpPr txBox="1"/>
+          <p:nvPr/>
+        </p:nvSpPr>
+        <p:spPr>
+          <a:xfrm>
+            <a:off x="1042866" y="3423217"/>
+            <a:ext cx="1219480" cy="369332"/>
+          </a:xfrm>
+          <a:prstGeom prst="rect">
+            <a:avLst/>
+          </a:prstGeom>
+          <a:solidFill>
+            <a:schemeClr val="bg1"/>
+          </a:solidFill>
+        </p:spPr>
+        <p:txBody>
+          <a:bodyPr wrap="square" rtlCol="0">
+            <a:spAutoFit/>
+          </a:bodyPr>
+          <a:lstStyle/>
+          <a:p>
+            <a:pPr algn="ctr"/>
+            <a:r>
+              <a:rPr lang="en-US" dirty="0" smtClean="0">
+                <a:latin typeface="Times New Roman"/>
+                <a:cs typeface="Times New Roman"/>
+              </a:rPr>
+              <a:t>Regression</a:t>
+            </a:r>
+            <a:endParaRPr lang="en-US" dirty="0">
+              <a:latin typeface="Times New Roman"/>
+              <a:cs typeface="Times New Roman"/>
+            </a:endParaRPr>
+          </a:p>
+        </p:txBody>
+      </p:sp>
+      <p:sp>
+        <p:nvSpPr>
+          <p:cNvPr id="9" name="TextBox 8"/>
+          <p:cNvSpPr txBox="1"/>
+          <p:nvPr/>
+        </p:nvSpPr>
+        <p:spPr>
+          <a:xfrm>
+            <a:off x="2658642" y="3456861"/>
+            <a:ext cx="1336207" cy="338554"/>
+          </a:xfrm>
+          <a:prstGeom prst="rect">
+            <a:avLst/>
+          </a:prstGeom>
+          <a:solidFill>
+            <a:schemeClr val="bg1"/>
+          </a:solidFill>
+        </p:spPr>
+        <p:txBody>
+          <a:bodyPr wrap="square" rtlCol="0">
+            <a:spAutoFit/>
+          </a:bodyPr>
+          <a:lstStyle/>
+          <a:p>
+            <a:pPr algn="ctr"/>
+            <a:r>
+              <a:rPr lang="en-US" sz="1600" dirty="0" smtClean="0">
+                <a:latin typeface="Times New Roman"/>
+                <a:cs typeface="Times New Roman"/>
+              </a:rPr>
+              <a:t>Classification</a:t>
+            </a:r>
+            <a:endParaRPr lang="en-US" sz="1600" dirty="0">
+              <a:latin typeface="Times New Roman"/>
+              <a:cs typeface="Times New Roman"/>
+            </a:endParaRPr>
+          </a:p>
+        </p:txBody>
+      </p:sp>
     </p:spTree>
     <p:extLst>
       <p:ext uri="{BB962C8B-B14F-4D97-AF65-F5344CB8AC3E}">

</xml_diff>

<commit_message>
Use GoDaddy template for last 2 slides in presentation
</commit_message>
<xml_diff>
--- a/Techfest_ML.pptx
+++ b/Techfest_ML.pptx
@@ -5,7 +5,7 @@
     <p:sldMasterId id="2147483648" r:id="rId1"/>
   </p:sldMasterIdLst>
   <p:notesMasterIdLst>
-    <p:notesMasterId r:id="rId34"/>
+    <p:notesMasterId r:id="rId36"/>
   </p:notesMasterIdLst>
   <p:sldIdLst>
     <p:sldId id="293" r:id="rId2"/>
@@ -38,8 +38,10 @@
     <p:sldId id="283" r:id="rId29"/>
     <p:sldId id="292" r:id="rId30"/>
     <p:sldId id="291" r:id="rId31"/>
-    <p:sldId id="295" r:id="rId32"/>
-    <p:sldId id="294" r:id="rId33"/>
+    <p:sldId id="296" r:id="rId32"/>
+    <p:sldId id="295" r:id="rId33"/>
+    <p:sldId id="294" r:id="rId34"/>
+    <p:sldId id="297" r:id="rId35"/>
   </p:sldIdLst>
   <p:sldSz cx="9144000" cy="6858000" type="screen4x3"/>
   <p:notesSz cx="6858000" cy="9144000"/>
@@ -1223,6 +1225,47 @@
 </p:sldLayout>
 </file>
 
+<file path=ppt/slideLayouts/slideLayout13.xml><?xml version="1.0" encoding="utf-8"?>
+<p:sldLayout xmlns:a="http://schemas.openxmlformats.org/drawingml/2006/main" xmlns:r="http://schemas.openxmlformats.org/officeDocument/2006/relationships" xmlns:p="http://schemas.openxmlformats.org/presentationml/2006/main" userDrawn="1">
+  <p:cSld name="1_Title and Content">
+    <p:bg>
+      <p:bgPr>
+        <a:blipFill rotWithShape="1">
+          <a:blip r:embed="rId2"/>
+          <a:stretch>
+            <a:fillRect/>
+          </a:stretch>
+        </a:blipFill>
+        <a:effectLst/>
+      </p:bgPr>
+    </p:bg>
+    <p:spTree>
+      <p:nvGrpSpPr>
+        <p:cNvPr id="1" name=""/>
+        <p:cNvGrpSpPr/>
+        <p:nvPr/>
+      </p:nvGrpSpPr>
+      <p:grpSpPr>
+        <a:xfrm>
+          <a:off x="0" y="0"/>
+          <a:ext cx="0" cy="0"/>
+          <a:chOff x="0" y="0"/>
+          <a:chExt cx="0" cy="0"/>
+        </a:xfrm>
+      </p:grpSpPr>
+    </p:spTree>
+    <p:extLst>
+      <p:ext uri="{BB962C8B-B14F-4D97-AF65-F5344CB8AC3E}">
+        <p14:creationId xmlns:p14="http://schemas.microsoft.com/office/powerpoint/2010/main" val="4247012474"/>
+      </p:ext>
+    </p:extLst>
+  </p:cSld>
+  <p:clrMapOvr>
+    <a:masterClrMapping/>
+  </p:clrMapOvr>
+</p:sldLayout>
+</file>
+
 <file path=ppt/slideLayouts/slideLayout2.xml><?xml version="1.0" encoding="utf-8"?>
 <p:sldLayout xmlns:a="http://schemas.openxmlformats.org/drawingml/2006/main" xmlns:r="http://schemas.openxmlformats.org/officeDocument/2006/relationships" xmlns:p="http://schemas.openxmlformats.org/presentationml/2006/main" type="obj" preserve="1">
   <p:cSld name="Title and Content">
@@ -3349,6 +3392,7 @@
     <p:sldLayoutId id="2147483658" r:id="rId10"/>
     <p:sldLayoutId id="2147483659" r:id="rId11"/>
     <p:sldLayoutId id="2147483660" r:id="rId12"/>
+    <p:sldLayoutId id="2147483661" r:id="rId13"/>
   </p:sldLayoutIdLst>
   <p:txStyles>
     <p:titleStyle>
@@ -3754,16 +3798,6 @@
           <a:p>
             <a:pPr algn="l"/>
             <a:r>
-              <a:rPr lang="en-US" sz="3200" dirty="0" err="1">
-                <a:solidFill>
-                  <a:schemeClr val="bg1"/>
-                </a:solidFill>
-                <a:latin typeface="GT Walsheim Regular"/>
-                <a:cs typeface="GT Walsheim Regular"/>
-              </a:rPr>
-              <a:t>Arsen</a:t>
-            </a:r>
-            <a:r>
               <a:rPr lang="en-US" sz="3200" dirty="0">
                 <a:solidFill>
                   <a:schemeClr val="bg1"/>
@@ -3771,10 +3805,10 @@
                 <a:latin typeface="GT Walsheim Regular"/>
                 <a:cs typeface="GT Walsheim Regular"/>
               </a:rPr>
-              <a:t> </a:t>
-            </a:r>
-            <a:r>
-              <a:rPr lang="en-US" sz="3200" dirty="0" err="1" smtClean="0">
+              <a:t>Arsen </a:t>
+            </a:r>
+            <a:r>
+              <a:rPr lang="en-US" sz="3200" dirty="0" smtClean="0">
                 <a:solidFill>
                   <a:schemeClr val="bg1"/>
                 </a:solidFill>
@@ -28757,7 +28791,7 @@
 </file>
 
 <file path=ppt/slides/slide30.xml><?xml version="1.0" encoding="utf-8"?>
-<p:sld xmlns:a="http://schemas.openxmlformats.org/drawingml/2006/main" xmlns:r="http://schemas.openxmlformats.org/officeDocument/2006/relationships" xmlns:p="http://schemas.openxmlformats.org/presentationml/2006/main">
+<p:sld xmlns:a="http://schemas.openxmlformats.org/drawingml/2006/main" xmlns:r="http://schemas.openxmlformats.org/officeDocument/2006/relationships" xmlns:p="http://schemas.openxmlformats.org/presentationml/2006/main" show="0">
   <p:cSld>
     <p:spTree>
       <p:nvGrpSpPr>
@@ -28865,6 +28899,14 @@
   <p:clrMapOvr>
     <a:masterClrMapping/>
   </p:clrMapOvr>
+  <mc:AlternateContent xmlns:mc="http://schemas.openxmlformats.org/markup-compatibility/2006">
+    <mc:Choice xmlns:p14="http://schemas.microsoft.com/office/powerpoint/2010/main" Requires="p14">
+      <p:transition spd="slow" p14:dur="2000"/>
+    </mc:Choice>
+    <mc:Fallback>
+      <p:transition xmlns:p14="http://schemas.microsoft.com/office/powerpoint/2010/main" spd="slow"/>
+    </mc:Fallback>
+  </mc:AlternateContent>
   <p:timing>
     <p:tnLst>
       <p:par>
@@ -28894,74 +28936,203 @@
       </p:grpSpPr>
       <p:sp>
         <p:nvSpPr>
-          <p:cNvPr id="2" name="Title 1"/>
+          <p:cNvPr id="8" name="Title 1"/>
           <p:cNvSpPr>
             <a:spLocks noGrp="1"/>
           </p:cNvSpPr>
           <p:nvPr>
-            <p:ph type="title"/>
+            <p:ph type="title" idx="4294967295"/>
           </p:nvPr>
         </p:nvSpPr>
-        <p:spPr/>
-        <p:txBody>
-          <a:bodyPr/>
-          <a:lstStyle/>
-          <a:p>
-            <a:r>
-              <a:rPr lang="en-US" dirty="0" smtClean="0"/>
-              <a:t>What We Didn’t Teach You</a:t>
-            </a:r>
-            <a:endParaRPr lang="en-US" dirty="0"/>
-          </a:p>
-        </p:txBody>
-      </p:sp>
-      <p:sp>
-        <p:nvSpPr>
-          <p:cNvPr id="3" name="Content Placeholder 2"/>
+        <p:spPr>
+          <a:xfrm>
+            <a:off x="912831" y="618567"/>
+            <a:ext cx="7276173" cy="880692"/>
+          </a:xfrm>
+          <a:prstGeom prst="rect">
+            <a:avLst/>
+          </a:prstGeom>
+        </p:spPr>
+        <p:txBody>
+          <a:bodyPr>
+            <a:normAutofit/>
+          </a:bodyPr>
+          <a:lstStyle/>
+          <a:p>
+            <a:pPr algn="l"/>
+            <a:r>
+              <a:rPr lang="en-US" dirty="0" smtClean="0">
+                <a:solidFill>
+                  <a:srgbClr val="000000"/>
+                </a:solidFill>
+                <a:latin typeface="GT Walsheim Regular"/>
+                <a:cs typeface="GT Walsheim Regular"/>
+              </a:rPr>
+              <a:t>Hands-on Examples</a:t>
+            </a:r>
+            <a:endParaRPr lang="en-US" dirty="0">
+              <a:solidFill>
+                <a:srgbClr val="000000"/>
+              </a:solidFill>
+              <a:latin typeface="GT Walsheim Regular"/>
+              <a:cs typeface="GT Walsheim Regular"/>
+            </a:endParaRPr>
+          </a:p>
+        </p:txBody>
+      </p:sp>
+      <p:sp>
+        <p:nvSpPr>
+          <p:cNvPr id="7" name="Content Placeholder 2"/>
           <p:cNvSpPr>
             <a:spLocks noGrp="1"/>
           </p:cNvSpPr>
           <p:nvPr>
-            <p:ph idx="1"/>
+            <p:ph idx="4294967295"/>
           </p:nvPr>
         </p:nvSpPr>
-        <p:spPr/>
-        <p:txBody>
-          <a:bodyPr/>
-          <a:lstStyle/>
-          <a:p>
-            <a:r>
-              <a:rPr lang="en-US" dirty="0" smtClean="0"/>
+        <p:spPr>
+          <a:xfrm>
+            <a:off x="912830" y="1952396"/>
+            <a:ext cx="6345181" cy="3339119"/>
+          </a:xfrm>
+          <a:prstGeom prst="rect">
+            <a:avLst/>
+          </a:prstGeom>
+        </p:spPr>
+        <p:txBody>
+          <a:bodyPr>
+            <a:noAutofit/>
+          </a:bodyPr>
+          <a:lstStyle/>
+          <a:p>
+            <a:pPr marL="0" indent="0">
+              <a:buNone/>
+            </a:pPr>
+            <a:r>
+              <a:rPr lang="en-US" sz="2800" b="1" dirty="0">
+                <a:solidFill>
+                  <a:srgbClr val="000000"/>
+                </a:solidFill>
+                <a:latin typeface="GT Walsheim Regular"/>
+                <a:cs typeface="GT Walsheim Regular"/>
+              </a:rPr>
+              <a:t>Medical Data </a:t>
+            </a:r>
+            <a:r>
+              <a:rPr lang="en-US" sz="2800" b="1" dirty="0" smtClean="0">
+                <a:solidFill>
+                  <a:srgbClr val="000000"/>
+                </a:solidFill>
+                <a:latin typeface="GT Walsheim Regular"/>
+                <a:cs typeface="GT Walsheim Regular"/>
+              </a:rPr>
+              <a:t>Classification</a:t>
+            </a:r>
+            <a:endParaRPr lang="en-US" sz="2800" b="1" dirty="0">
+              <a:solidFill>
+                <a:srgbClr val="000000"/>
+              </a:solidFill>
+              <a:latin typeface="GT Walsheim Regular"/>
+              <a:cs typeface="GT Walsheim Regular"/>
+            </a:endParaRPr>
+          </a:p>
+          <a:p>
+            <a:pPr marL="0" indent="0">
+              <a:buNone/>
+            </a:pPr>
+            <a:r>
+              <a:rPr lang="en-US" sz="2800" dirty="0">
+                <a:solidFill>
+                  <a:srgbClr val="000000"/>
+                </a:solidFill>
+                <a:latin typeface="GT Walsheim Regular"/>
+                <a:cs typeface="GT Walsheim Regular"/>
+              </a:rPr>
+              <a:t>TODO: include link</a:t>
+            </a:r>
+          </a:p>
+          <a:p>
+            <a:endParaRPr lang="en-US" sz="2800" dirty="0">
+              <a:solidFill>
+                <a:srgbClr val="000000"/>
+              </a:solidFill>
+              <a:latin typeface="GT Walsheim Regular"/>
+              <a:cs typeface="GT Walsheim Regular"/>
+            </a:endParaRPr>
+          </a:p>
+          <a:p>
+            <a:pPr marL="0" indent="0">
+              <a:buNone/>
+            </a:pPr>
+            <a:r>
+              <a:rPr lang="en-US" sz="2800" b="1" dirty="0" smtClean="0">
+                <a:solidFill>
+                  <a:srgbClr val="000000"/>
+                </a:solidFill>
+                <a:latin typeface="GT Walsheim Regular"/>
+                <a:cs typeface="GT Walsheim Regular"/>
+              </a:rPr>
+              <a:t>Boston </a:t>
+            </a:r>
+            <a:r>
+              <a:rPr lang="en-US" sz="2800" b="1" dirty="0">
+                <a:solidFill>
+                  <a:srgbClr val="000000"/>
+                </a:solidFill>
+                <a:latin typeface="GT Walsheim Regular"/>
+                <a:cs typeface="GT Walsheim Regular"/>
+              </a:rPr>
+              <a:t>Housing Data Regression</a:t>
+            </a:r>
+          </a:p>
+          <a:p>
+            <a:pPr marL="0" indent="0">
+              <a:buNone/>
+            </a:pPr>
+            <a:r>
+              <a:rPr lang="en-US" sz="2800" dirty="0" smtClean="0">
+                <a:solidFill>
+                  <a:srgbClr val="000000"/>
+                </a:solidFill>
+                <a:latin typeface="GT Walsheim Regular"/>
+                <a:cs typeface="GT Walsheim Regular"/>
+              </a:rPr>
               <a:t>TODO</a:t>
             </a:r>
-          </a:p>
-          <a:p>
-            <a:endParaRPr lang="en-US" dirty="0"/>
-          </a:p>
-          <a:p>
-            <a:r>
-              <a:rPr lang="en-US" dirty="0" smtClean="0"/>
-              <a:t>How a model actually works (The math behind how you train and use a model)</a:t>
-            </a:r>
-          </a:p>
-          <a:p>
-            <a:r>
-              <a:rPr lang="en-US" dirty="0" smtClean="0"/>
-              <a:t>There are lots of different models out there, and they all have flaws.</a:t>
-            </a:r>
-          </a:p>
-          <a:p>
-            <a:endParaRPr lang="en-US" dirty="0"/>
-          </a:p>
-          <a:p>
-            <a:endParaRPr lang="en-US" dirty="0"/>
+            <a:r>
+              <a:rPr lang="en-US" sz="2800" dirty="0">
+                <a:solidFill>
+                  <a:srgbClr val="000000"/>
+                </a:solidFill>
+                <a:latin typeface="GT Walsheim Regular"/>
+                <a:cs typeface="GT Walsheim Regular"/>
+              </a:rPr>
+              <a:t>: include </a:t>
+            </a:r>
+            <a:r>
+              <a:rPr lang="en-US" sz="2800" dirty="0" smtClean="0">
+                <a:solidFill>
+                  <a:srgbClr val="000000"/>
+                </a:solidFill>
+                <a:latin typeface="GT Walsheim Regular"/>
+                <a:cs typeface="GT Walsheim Regular"/>
+              </a:rPr>
+              <a:t>link</a:t>
+            </a:r>
+            <a:endParaRPr lang="en-US" sz="2800" dirty="0">
+              <a:solidFill>
+                <a:srgbClr val="000000"/>
+              </a:solidFill>
+              <a:latin typeface="GT Walsheim Regular"/>
+              <a:cs typeface="GT Walsheim Regular"/>
+            </a:endParaRPr>
           </a:p>
         </p:txBody>
       </p:sp>
     </p:spTree>
     <p:extLst>
       <p:ext uri="{BB962C8B-B14F-4D97-AF65-F5344CB8AC3E}">
-        <p14:creationId xmlns:p14="http://schemas.microsoft.com/office/powerpoint/2010/main" val="275283733"/>
+        <p14:creationId xmlns:p14="http://schemas.microsoft.com/office/powerpoint/2010/main" val="3721637256"/>
       </p:ext>
     </p:extLst>
   </p:cSld>
@@ -29012,7 +29183,7 @@
           <a:p>
             <a:r>
               <a:rPr lang="en-US" dirty="0" smtClean="0"/>
-              <a:t>Want to Learn More?</a:t>
+              <a:t>What We Didn’t Teach You</a:t>
             </a:r>
             <a:endParaRPr lang="en-US" dirty="0"/>
           </a:p>
@@ -29033,6 +29204,109 @@
           <a:bodyPr/>
           <a:lstStyle/>
           <a:p>
+            <a:r>
+              <a:rPr lang="en-US" dirty="0" smtClean="0"/>
+              <a:t>TODO</a:t>
+            </a:r>
+          </a:p>
+          <a:p>
+            <a:endParaRPr lang="en-US" dirty="0"/>
+          </a:p>
+          <a:p>
+            <a:r>
+              <a:rPr lang="en-US" dirty="0" smtClean="0"/>
+              <a:t>How a model actually works (The math behind how you train and use a model)</a:t>
+            </a:r>
+          </a:p>
+          <a:p>
+            <a:r>
+              <a:rPr lang="en-US" dirty="0" smtClean="0"/>
+              <a:t>There are lots of different models out there, and they all have flaws.</a:t>
+            </a:r>
+          </a:p>
+          <a:p>
+            <a:endParaRPr lang="en-US" dirty="0"/>
+          </a:p>
+          <a:p>
+            <a:endParaRPr lang="en-US" dirty="0"/>
+          </a:p>
+        </p:txBody>
+      </p:sp>
+    </p:spTree>
+    <p:extLst>
+      <p:ext uri="{BB962C8B-B14F-4D97-AF65-F5344CB8AC3E}">
+        <p14:creationId xmlns:p14="http://schemas.microsoft.com/office/powerpoint/2010/main" val="275283733"/>
+      </p:ext>
+    </p:extLst>
+  </p:cSld>
+  <p:clrMapOvr>
+    <a:masterClrMapping/>
+  </p:clrMapOvr>
+  <p:timing>
+    <p:tnLst>
+      <p:par>
+        <p:cTn xmlns:p14="http://schemas.microsoft.com/office/powerpoint/2010/main" id="1" dur="indefinite" restart="never" nodeType="tmRoot"/>
+      </p:par>
+    </p:tnLst>
+  </p:timing>
+</p:sld>
+</file>
+
+<file path=ppt/slides/slide33.xml><?xml version="1.0" encoding="utf-8"?>
+<p:sld xmlns:a="http://schemas.openxmlformats.org/drawingml/2006/main" xmlns:r="http://schemas.openxmlformats.org/officeDocument/2006/relationships" xmlns:p="http://schemas.openxmlformats.org/presentationml/2006/main" show="0">
+  <p:cSld>
+    <p:spTree>
+      <p:nvGrpSpPr>
+        <p:cNvPr id="1" name=""/>
+        <p:cNvGrpSpPr/>
+        <p:nvPr/>
+      </p:nvGrpSpPr>
+      <p:grpSpPr>
+        <a:xfrm>
+          <a:off x="0" y="0"/>
+          <a:ext cx="0" cy="0"/>
+          <a:chOff x="0" y="0"/>
+          <a:chExt cx="0" cy="0"/>
+        </a:xfrm>
+      </p:grpSpPr>
+      <p:sp>
+        <p:nvSpPr>
+          <p:cNvPr id="2" name="Title 1"/>
+          <p:cNvSpPr>
+            <a:spLocks noGrp="1"/>
+          </p:cNvSpPr>
+          <p:nvPr>
+            <p:ph type="title"/>
+          </p:nvPr>
+        </p:nvSpPr>
+        <p:spPr/>
+        <p:txBody>
+          <a:bodyPr/>
+          <a:lstStyle/>
+          <a:p>
+            <a:r>
+              <a:rPr lang="en-US" dirty="0" smtClean="0"/>
+              <a:t>Want to Learn More?</a:t>
+            </a:r>
+            <a:endParaRPr lang="en-US" dirty="0"/>
+          </a:p>
+        </p:txBody>
+      </p:sp>
+      <p:sp>
+        <p:nvSpPr>
+          <p:cNvPr id="3" name="Content Placeholder 2"/>
+          <p:cNvSpPr>
+            <a:spLocks noGrp="1"/>
+          </p:cNvSpPr>
+          <p:nvPr>
+            <p:ph idx="1"/>
+          </p:nvPr>
+        </p:nvSpPr>
+        <p:spPr/>
+        <p:txBody>
+          <a:bodyPr/>
+          <a:lstStyle/>
+          <a:p>
             <a:pPr marL="0" indent="0">
               <a:buNone/>
             </a:pPr>
@@ -29137,6 +29411,321 @@
     <p:extLst>
       <p:ext uri="{BB962C8B-B14F-4D97-AF65-F5344CB8AC3E}">
         <p14:creationId xmlns:p14="http://schemas.microsoft.com/office/powerpoint/2010/main" val="3698710820"/>
+      </p:ext>
+    </p:extLst>
+  </p:cSld>
+  <p:clrMapOvr>
+    <a:masterClrMapping/>
+  </p:clrMapOvr>
+  <mc:AlternateContent xmlns:mc="http://schemas.openxmlformats.org/markup-compatibility/2006">
+    <mc:Choice xmlns:p14="http://schemas.microsoft.com/office/powerpoint/2010/main" Requires="p14">
+      <p:transition spd="slow" p14:dur="2000"/>
+    </mc:Choice>
+    <mc:Fallback>
+      <p:transition xmlns:p14="http://schemas.microsoft.com/office/powerpoint/2010/main" spd="slow"/>
+    </mc:Fallback>
+  </mc:AlternateContent>
+  <p:timing>
+    <p:tnLst>
+      <p:par>
+        <p:cTn xmlns:p14="http://schemas.microsoft.com/office/powerpoint/2010/main" id="1" dur="indefinite" restart="never" nodeType="tmRoot"/>
+      </p:par>
+    </p:tnLst>
+  </p:timing>
+</p:sld>
+</file>
+
+<file path=ppt/slides/slide34.xml><?xml version="1.0" encoding="utf-8"?>
+<p:sld xmlns:a="http://schemas.openxmlformats.org/drawingml/2006/main" xmlns:r="http://schemas.openxmlformats.org/officeDocument/2006/relationships" xmlns:p="http://schemas.openxmlformats.org/presentationml/2006/main">
+  <p:cSld>
+    <p:spTree>
+      <p:nvGrpSpPr>
+        <p:cNvPr id="1" name=""/>
+        <p:cNvGrpSpPr/>
+        <p:nvPr/>
+      </p:nvGrpSpPr>
+      <p:grpSpPr>
+        <a:xfrm>
+          <a:off x="0" y="0"/>
+          <a:ext cx="0" cy="0"/>
+          <a:chOff x="0" y="0"/>
+          <a:chExt cx="0" cy="0"/>
+        </a:xfrm>
+      </p:grpSpPr>
+      <p:sp>
+        <p:nvSpPr>
+          <p:cNvPr id="8" name="Title 1"/>
+          <p:cNvSpPr>
+            <a:spLocks noGrp="1"/>
+          </p:cNvSpPr>
+          <p:nvPr>
+            <p:ph type="title" idx="4294967295"/>
+          </p:nvPr>
+        </p:nvSpPr>
+        <p:spPr>
+          <a:xfrm>
+            <a:off x="912831" y="618567"/>
+            <a:ext cx="7276173" cy="880692"/>
+          </a:xfrm>
+          <a:prstGeom prst="rect">
+            <a:avLst/>
+          </a:prstGeom>
+        </p:spPr>
+        <p:txBody>
+          <a:bodyPr>
+            <a:normAutofit/>
+          </a:bodyPr>
+          <a:lstStyle/>
+          <a:p>
+            <a:pPr algn="l"/>
+            <a:r>
+              <a:rPr lang="en-US" dirty="0" smtClean="0">
+                <a:solidFill>
+                  <a:srgbClr val="000000"/>
+                </a:solidFill>
+                <a:latin typeface="GT Walsheim Regular"/>
+                <a:cs typeface="GT Walsheim Regular"/>
+              </a:rPr>
+              <a:t>Want to Learn More?</a:t>
+            </a:r>
+            <a:endParaRPr lang="en-US" dirty="0">
+              <a:solidFill>
+                <a:srgbClr val="000000"/>
+              </a:solidFill>
+              <a:latin typeface="GT Walsheim Regular"/>
+              <a:cs typeface="GT Walsheim Regular"/>
+            </a:endParaRPr>
+          </a:p>
+        </p:txBody>
+      </p:sp>
+      <p:sp>
+        <p:nvSpPr>
+          <p:cNvPr id="7" name="Content Placeholder 2"/>
+          <p:cNvSpPr>
+            <a:spLocks noGrp="1"/>
+          </p:cNvSpPr>
+          <p:nvPr>
+            <p:ph idx="4294967295"/>
+          </p:nvPr>
+        </p:nvSpPr>
+        <p:spPr>
+          <a:xfrm>
+            <a:off x="912830" y="1952396"/>
+            <a:ext cx="6345181" cy="3339119"/>
+          </a:xfrm>
+          <a:prstGeom prst="rect">
+            <a:avLst/>
+          </a:prstGeom>
+        </p:spPr>
+        <p:txBody>
+          <a:bodyPr>
+            <a:noAutofit/>
+          </a:bodyPr>
+          <a:lstStyle/>
+          <a:p>
+            <a:pPr marL="0" indent="0">
+              <a:buNone/>
+            </a:pPr>
+            <a:r>
+              <a:rPr lang="en-US" sz="2800" dirty="0">
+                <a:solidFill>
+                  <a:srgbClr val="000000"/>
+                </a:solidFill>
+                <a:latin typeface="GT Walsheim Regular"/>
+                <a:cs typeface="GT Walsheim Regular"/>
+              </a:rPr>
+              <a:t>Go to </a:t>
+            </a:r>
+            <a:r>
+              <a:rPr lang="en-US" sz="2800" b="1" dirty="0">
+                <a:solidFill>
+                  <a:srgbClr val="000000"/>
+                </a:solidFill>
+                <a:latin typeface="GT Walsheim Regular"/>
+                <a:cs typeface="GT Walsheim Regular"/>
+              </a:rPr>
+              <a:t>“Describe the Model Building Process”</a:t>
+            </a:r>
+          </a:p>
+          <a:p>
+            <a:pPr marL="0" indent="0">
+              <a:buNone/>
+            </a:pPr>
+            <a:r>
+              <a:rPr lang="en-US" sz="2800" dirty="0" smtClean="0">
+                <a:solidFill>
+                  <a:srgbClr val="000000"/>
+                </a:solidFill>
+                <a:latin typeface="GT Walsheim Regular"/>
+                <a:cs typeface="GT Walsheim Regular"/>
+              </a:rPr>
+              <a:t>By </a:t>
+            </a:r>
+            <a:r>
+              <a:rPr lang="en-US" sz="2800" dirty="0">
+                <a:solidFill>
+                  <a:srgbClr val="000000"/>
+                </a:solidFill>
+                <a:latin typeface="GT Walsheim Regular"/>
+                <a:cs typeface="GT Walsheim Regular"/>
+              </a:rPr>
+              <a:t>Nathan Howell, </a:t>
+            </a:r>
+            <a:r>
+              <a:rPr lang="en-US" sz="2800" dirty="0" err="1">
+                <a:solidFill>
+                  <a:srgbClr val="000000"/>
+                </a:solidFill>
+                <a:latin typeface="GT Walsheim Regular"/>
+                <a:cs typeface="GT Walsheim Regular"/>
+              </a:rPr>
+              <a:t>Zhixian</a:t>
+            </a:r>
+            <a:r>
+              <a:rPr lang="en-US" sz="2800" dirty="0">
+                <a:solidFill>
+                  <a:srgbClr val="000000"/>
+                </a:solidFill>
+                <a:latin typeface="GT Walsheim Regular"/>
+                <a:cs typeface="GT Walsheim Regular"/>
+              </a:rPr>
+              <a:t> Yan, Jeffrey </a:t>
+            </a:r>
+            <a:r>
+              <a:rPr lang="en-US" sz="2800" dirty="0" err="1">
+                <a:solidFill>
+                  <a:srgbClr val="000000"/>
+                </a:solidFill>
+                <a:latin typeface="GT Walsheim Regular"/>
+                <a:cs typeface="GT Walsheim Regular"/>
+              </a:rPr>
+              <a:t>Mclellan</a:t>
+            </a:r>
+            <a:r>
+              <a:rPr lang="en-US" sz="2800" dirty="0">
+                <a:solidFill>
+                  <a:srgbClr val="000000"/>
+                </a:solidFill>
+                <a:latin typeface="GT Walsheim Regular"/>
+                <a:cs typeface="GT Walsheim Regular"/>
+              </a:rPr>
+              <a:t> and Marc </a:t>
+            </a:r>
+            <a:r>
+              <a:rPr lang="en-US" sz="2800" dirty="0" err="1" smtClean="0">
+                <a:solidFill>
+                  <a:srgbClr val="000000"/>
+                </a:solidFill>
+                <a:latin typeface="GT Walsheim Regular"/>
+                <a:cs typeface="GT Walsheim Regular"/>
+              </a:rPr>
+              <a:t>Piette</a:t>
+            </a:r>
+            <a:endParaRPr lang="en-US" sz="2800" dirty="0">
+              <a:solidFill>
+                <a:srgbClr val="000000"/>
+              </a:solidFill>
+              <a:latin typeface="GT Walsheim Regular"/>
+              <a:cs typeface="GT Walsheim Regular"/>
+            </a:endParaRPr>
+          </a:p>
+          <a:p>
+            <a:pPr marL="0" indent="0" algn="ctr">
+              <a:buNone/>
+            </a:pPr>
+            <a:r>
+              <a:rPr lang="en-US" sz="2800" dirty="0">
+                <a:solidFill>
+                  <a:srgbClr val="000000"/>
+                </a:solidFill>
+                <a:latin typeface="GT Walsheim Regular"/>
+                <a:cs typeface="GT Walsheim Regular"/>
+              </a:rPr>
+              <a:t>Personalization </a:t>
+            </a:r>
+            <a:r>
+              <a:rPr lang="en-US" sz="2800" dirty="0" smtClean="0">
+                <a:solidFill>
+                  <a:srgbClr val="000000"/>
+                </a:solidFill>
+                <a:latin typeface="GT Walsheim Regular"/>
+                <a:cs typeface="GT Walsheim Regular"/>
+              </a:rPr>
+              <a:t>Track</a:t>
+            </a:r>
+            <a:endParaRPr lang="en-US" sz="2800" dirty="0">
+              <a:solidFill>
+                <a:srgbClr val="000000"/>
+              </a:solidFill>
+              <a:latin typeface="GT Walsheim Regular"/>
+              <a:cs typeface="GT Walsheim Regular"/>
+            </a:endParaRPr>
+          </a:p>
+          <a:p>
+            <a:pPr marL="0" indent="0" algn="ctr">
+              <a:buNone/>
+            </a:pPr>
+            <a:r>
+              <a:rPr lang="en-US" sz="2800" dirty="0">
+                <a:solidFill>
+                  <a:srgbClr val="000000"/>
+                </a:solidFill>
+                <a:latin typeface="GT Walsheim Regular"/>
+                <a:cs typeface="GT Walsheim Regular"/>
+              </a:rPr>
+              <a:t>Grand Canyon </a:t>
+            </a:r>
+            <a:r>
+              <a:rPr lang="en-US" sz="2800" dirty="0" smtClean="0">
+                <a:solidFill>
+                  <a:srgbClr val="000000"/>
+                </a:solidFill>
+                <a:latin typeface="GT Walsheim Regular"/>
+                <a:cs typeface="GT Walsheim Regular"/>
+              </a:rPr>
+              <a:t>2</a:t>
+            </a:r>
+            <a:endParaRPr lang="en-US" sz="2800" dirty="0">
+              <a:solidFill>
+                <a:srgbClr val="000000"/>
+              </a:solidFill>
+              <a:latin typeface="GT Walsheim Regular"/>
+              <a:cs typeface="GT Walsheim Regular"/>
+            </a:endParaRPr>
+          </a:p>
+          <a:p>
+            <a:pPr marL="0" indent="0" algn="ctr">
+              <a:buNone/>
+            </a:pPr>
+            <a:r>
+              <a:rPr lang="en-US" sz="2800" dirty="0">
+                <a:solidFill>
+                  <a:srgbClr val="000000"/>
+                </a:solidFill>
+                <a:latin typeface="GT Walsheim Regular"/>
+                <a:cs typeface="GT Walsheim Regular"/>
+              </a:rPr>
+              <a:t>1:30pm – 2:15pm</a:t>
+            </a:r>
+          </a:p>
+          <a:p>
+            <a:pPr marL="0" indent="0">
+              <a:buNone/>
+            </a:pPr>
+            <a:endParaRPr lang="en-US" sz="2800" dirty="0">
+              <a:solidFill>
+                <a:srgbClr val="000000"/>
+              </a:solidFill>
+              <a:latin typeface="GT Walsheim Regular"/>
+              <a:cs typeface="GT Walsheim Regular"/>
+            </a:endParaRPr>
+          </a:p>
+        </p:txBody>
+      </p:sp>
+    </p:spTree>
+    <p:extLst>
+      <p:ext uri="{BB962C8B-B14F-4D97-AF65-F5344CB8AC3E}">
+        <p14:creationId xmlns:p14="http://schemas.microsoft.com/office/powerpoint/2010/main" val="2440176693"/>
       </p:ext>
     </p:extLst>
   </p:cSld>

</xml_diff>

<commit_message>
Minor edits to presentation
</commit_message>
<xml_diff>
--- a/Techfest_ML.pptx
+++ b/Techfest_ML.pptx
@@ -228,7 +228,7 @@
           <a:p>
             <a:fld id="{33E144C1-CEA6-4D4D-9670-300AA03EA9ED}" type="datetimeFigureOut">
               <a:rPr lang="en-US" smtClean="0"/>
-              <a:t>13/05/15</a:t>
+              <a:t>5/14/15</a:t>
             </a:fld>
             <a:endParaRPr lang="en-US"/>
           </a:p>
@@ -861,7 +861,7 @@
           <a:p>
             <a:fld id="{E31BDE11-21A5-024B-AC15-C770EC7EF040}" type="datetimeFigureOut">
               <a:rPr lang="en-US" smtClean="0"/>
-              <a:t>13/05/15</a:t>
+              <a:t>5/14/15</a:t>
             </a:fld>
             <a:endParaRPr lang="en-US"/>
           </a:p>
@@ -1031,7 +1031,7 @@
           <a:p>
             <a:fld id="{E31BDE11-21A5-024B-AC15-C770EC7EF040}" type="datetimeFigureOut">
               <a:rPr lang="en-US" smtClean="0"/>
-              <a:t>13/05/15</a:t>
+              <a:t>5/14/15</a:t>
             </a:fld>
             <a:endParaRPr lang="en-US"/>
           </a:p>
@@ -1211,7 +1211,7 @@
           <a:p>
             <a:fld id="{E31BDE11-21A5-024B-AC15-C770EC7EF040}" type="datetimeFigureOut">
               <a:rPr lang="en-US" smtClean="0"/>
-              <a:t>13/05/15</a:t>
+              <a:t>5/14/15</a:t>
             </a:fld>
             <a:endParaRPr lang="en-US"/>
           </a:p>
@@ -1470,7 +1470,7 @@
           <a:p>
             <a:fld id="{E31BDE11-21A5-024B-AC15-C770EC7EF040}" type="datetimeFigureOut">
               <a:rPr lang="en-US" smtClean="0"/>
-              <a:t>13/05/15</a:t>
+              <a:t>5/14/15</a:t>
             </a:fld>
             <a:endParaRPr lang="en-US"/>
           </a:p>
@@ -1716,7 +1716,7 @@
           <a:p>
             <a:fld id="{E31BDE11-21A5-024B-AC15-C770EC7EF040}" type="datetimeFigureOut">
               <a:rPr lang="en-US" smtClean="0"/>
-              <a:t>13/05/15</a:t>
+              <a:t>5/14/15</a:t>
             </a:fld>
             <a:endParaRPr lang="en-US"/>
           </a:p>
@@ -2004,7 +2004,7 @@
           <a:p>
             <a:fld id="{E31BDE11-21A5-024B-AC15-C770EC7EF040}" type="datetimeFigureOut">
               <a:rPr lang="en-US" smtClean="0"/>
-              <a:t>13/05/15</a:t>
+              <a:t>5/14/15</a:t>
             </a:fld>
             <a:endParaRPr lang="en-US"/>
           </a:p>
@@ -2426,7 +2426,7 @@
           <a:p>
             <a:fld id="{E31BDE11-21A5-024B-AC15-C770EC7EF040}" type="datetimeFigureOut">
               <a:rPr lang="en-US" smtClean="0"/>
-              <a:t>13/05/15</a:t>
+              <a:t>5/14/15</a:t>
             </a:fld>
             <a:endParaRPr lang="en-US"/>
           </a:p>
@@ -2544,7 +2544,7 @@
           <a:p>
             <a:fld id="{E31BDE11-21A5-024B-AC15-C770EC7EF040}" type="datetimeFigureOut">
               <a:rPr lang="en-US" smtClean="0"/>
-              <a:t>13/05/15</a:t>
+              <a:t>5/14/15</a:t>
             </a:fld>
             <a:endParaRPr lang="en-US"/>
           </a:p>
@@ -2639,7 +2639,7 @@
           <a:p>
             <a:fld id="{E31BDE11-21A5-024B-AC15-C770EC7EF040}" type="datetimeFigureOut">
               <a:rPr lang="en-US" smtClean="0"/>
-              <a:t>13/05/15</a:t>
+              <a:t>5/14/15</a:t>
             </a:fld>
             <a:endParaRPr lang="en-US"/>
           </a:p>
@@ -2916,7 +2916,7 @@
           <a:p>
             <a:fld id="{E31BDE11-21A5-024B-AC15-C770EC7EF040}" type="datetimeFigureOut">
               <a:rPr lang="en-US" smtClean="0"/>
-              <a:t>13/05/15</a:t>
+              <a:t>5/14/15</a:t>
             </a:fld>
             <a:endParaRPr lang="en-US"/>
           </a:p>
@@ -3169,7 +3169,7 @@
           <a:p>
             <a:fld id="{E31BDE11-21A5-024B-AC15-C770EC7EF040}" type="datetimeFigureOut">
               <a:rPr lang="en-US" smtClean="0"/>
-              <a:t>13/05/15</a:t>
+              <a:t>5/14/15</a:t>
             </a:fld>
             <a:endParaRPr lang="en-US"/>
           </a:p>
@@ -3382,7 +3382,7 @@
           <a:p>
             <a:fld id="{E31BDE11-21A5-024B-AC15-C770EC7EF040}" type="datetimeFigureOut">
               <a:rPr lang="en-US" smtClean="0"/>
-              <a:t>13/05/15</a:t>
+              <a:t>5/14/15</a:t>
             </a:fld>
             <a:endParaRPr lang="en-US"/>
           </a:p>
@@ -12682,14 +12682,7 @@
                 <a:latin typeface="Arial"/>
                 <a:cs typeface="Arial"/>
               </a:rPr>
-              <a:t>: </a:t>
-            </a:r>
-            <a:r>
-              <a:rPr lang="en-US" sz="2400" dirty="0" smtClean="0">
-                <a:latin typeface="Arial"/>
-                <a:cs typeface="Arial"/>
-              </a:rPr>
-              <a:t>of positive outcomes, how many did we get right?</a:t>
+              <a:t>: of positive outcomes, how many did we get right?</a:t>
             </a:r>
           </a:p>
           <a:p>
@@ -14119,14 +14112,7 @@
                 <a:latin typeface="Arial"/>
                 <a:cs typeface="Arial"/>
               </a:rPr>
-              <a:t>: </a:t>
-            </a:r>
-            <a:r>
-              <a:rPr lang="en-US" sz="2400" dirty="0" smtClean="0">
-                <a:latin typeface="Arial"/>
-                <a:cs typeface="Arial"/>
-              </a:rPr>
-              <a:t>of points we labeled as positive, how many did we get right?</a:t>
+              <a:t>: of points we labeled as positive, how many did we get right?</a:t>
             </a:r>
           </a:p>
           <a:p>
@@ -18401,14 +18387,7 @@
                 <a:latin typeface="Arial"/>
                 <a:cs typeface="Arial"/>
               </a:rPr>
-              <a:t> </a:t>
-            </a:r>
-            <a:r>
-              <a:rPr lang="en-US" sz="2400" dirty="0" smtClean="0">
-                <a:latin typeface="Arial"/>
-                <a:cs typeface="Arial"/>
-              </a:rPr>
-              <a:t>the result of all the individual trees</a:t>
+              <a:t> the result of all the individual trees</a:t>
             </a:r>
           </a:p>
         </p:txBody>
@@ -27570,7 +27549,6 @@
               <a:rPr lang="en-US" dirty="0" smtClean="0"/>
               <a:t>Square footage of the house</a:t>
             </a:r>
-            <a:endParaRPr lang="en-US" dirty="0" smtClean="0"/>
           </a:p>
           <a:p>
             <a:pPr lvl="1"/>
@@ -27580,11 +27558,10 @@
             </a:r>
           </a:p>
           <a:p>
-            <a:pPr lvl="1"/>
-            <a:r>
-              <a:rPr lang="en-US" dirty="0" smtClean="0"/>
-              <a:t>Proportion of blacks in town</a:t>
-            </a:r>
+            <a:pPr marL="457200" lvl="1" indent="0">
+              <a:buNone/>
+            </a:pPr>
+            <a:endParaRPr lang="en-US" b="1" dirty="0" smtClean="0"/>
           </a:p>
           <a:p>
             <a:pPr marL="457200" lvl="1" indent="0">
@@ -27592,31 +27569,29 @@
             </a:pPr>
             <a:r>
               <a:rPr lang="en-US" b="1" dirty="0" smtClean="0"/>
-              <a:t>Constructed features</a:t>
+              <a:t>Constructed </a:t>
+            </a:r>
+            <a:r>
+              <a:rPr lang="en-US" b="1" dirty="0" smtClean="0"/>
+              <a:t>features</a:t>
             </a:r>
           </a:p>
           <a:p>
             <a:pPr lvl="1"/>
             <a:r>
               <a:rPr lang="en-US" dirty="0" smtClean="0"/>
-              <a:t>Price squared over square footage</a:t>
-            </a:r>
-          </a:p>
-          <a:p>
-            <a:pPr lvl="1"/>
-            <a:r>
-              <a:rPr lang="en-US" dirty="0" smtClean="0"/>
-              <a:t>1000 * (</a:t>
-            </a:r>
-            <a:r>
-              <a:rPr lang="en-US" dirty="0" err="1" smtClean="0"/>
-              <a:t>black_proportion</a:t>
+              <a:t>Price </a:t>
             </a:r>
             <a:r>
               <a:rPr lang="en-US" dirty="0" smtClean="0"/>
-              <a:t> – 0.63) ^ 2</a:t>
+              <a:t>per square foot</a:t>
             </a:r>
-            <a:endParaRPr lang="en-US" dirty="0"/>
+          </a:p>
+          <a:p>
+            <a:pPr marL="457200" lvl="1" indent="0">
+              <a:buNone/>
+            </a:pPr>
+            <a:endParaRPr lang="en-US" dirty="0" smtClean="0"/>
           </a:p>
         </p:txBody>
       </p:sp>
@@ -27698,37 +27673,6 @@
                                           <p:spTgt spid="3">
                                             <p:txEl>
                                               <p:pRg st="6" end="6"/>
-                                            </p:txEl>
-                                          </p:spTgt>
-                                        </p:tgtEl>
-                                        <p:attrNameLst>
-                                          <p:attrName>style.visibility</p:attrName>
-                                        </p:attrNameLst>
-                                      </p:cBhvr>
-                                      <p:to>
-                                        <p:strVal val="visible"/>
-                                      </p:to>
-                                    </p:set>
-                                  </p:childTnLst>
-                                </p:cTn>
-                              </p:par>
-                              <p:par>
-                                <p:cTn id="9" presetID="1" presetClass="entr" presetSubtype="0" fill="hold" nodeType="withEffect">
-                                  <p:stCondLst>
-                                    <p:cond delay="0"/>
-                                  </p:stCondLst>
-                                  <p:childTnLst>
-                                    <p:set>
-                                      <p:cBhvr>
-                                        <p:cTn id="10" dur="1" fill="hold">
-                                          <p:stCondLst>
-                                            <p:cond delay="0"/>
-                                          </p:stCondLst>
-                                        </p:cTn>
-                                        <p:tgtEl>
-                                          <p:spTgt spid="3">
-                                            <p:txEl>
-                                              <p:pRg st="7" end="7"/>
                                             </p:txEl>
                                           </p:spTgt>
                                         </p:tgtEl>
@@ -28130,17 +28074,8 @@
             </a:pPr>
             <a:r>
               <a:rPr lang="en-US" sz="8000" dirty="0" smtClean="0"/>
-              <a:t>fit</a:t>
+              <a:t>fit(               ,       )</a:t>
             </a:r>
-            <a:r>
-              <a:rPr lang="en-US" sz="8000" dirty="0" smtClean="0"/>
-              <a:t>(             </a:t>
-            </a:r>
-            <a:r>
-              <a:rPr lang="en-US" sz="8000" dirty="0" smtClean="0"/>
-              <a:t>  ,       )</a:t>
-            </a:r>
-            <a:endParaRPr lang="en-US" sz="8000" dirty="0" smtClean="0"/>
           </a:p>
           <a:p>
             <a:endParaRPr lang="en-US" dirty="0"/>
@@ -28169,7 +28104,7 @@
           </p:nvSpPr>
           <p:spPr>
             <a:xfrm>
-              <a:off x="2403412" y="1663731"/>
+              <a:off x="2403412" y="1679030"/>
               <a:ext cx="1484926" cy="3539430"/>
             </a:xfrm>
             <a:prstGeom prst="rect">
@@ -28243,7 +28178,7 @@
           </p:nvSpPr>
           <p:spPr>
             <a:xfrm>
-              <a:off x="3988897" y="1719693"/>
+              <a:off x="3988897" y="1673796"/>
               <a:ext cx="1678214" cy="3539430"/>
             </a:xfrm>
             <a:prstGeom prst="rect">
@@ -28832,7 +28767,7 @@
           </p:nvSpPr>
           <p:spPr>
             <a:xfrm>
-              <a:off x="6410961" y="1691712"/>
+              <a:off x="6410961" y="1676413"/>
               <a:ext cx="1678214" cy="3539430"/>
             </a:xfrm>
             <a:prstGeom prst="rect">
@@ -28850,7 +28785,6 @@
                 <a:rPr lang="en-US" sz="3200" dirty="0" smtClean="0"/>
                 <a:t>1</a:t>
               </a:r>
-              <a:endParaRPr lang="en-US" sz="3200" dirty="0" smtClean="0"/>
             </a:p>
             <a:p>
               <a:r>
@@ -28864,28 +28798,24 @@
                 <a:rPr lang="en-US" sz="3200" dirty="0" smtClean="0"/>
                 <a:t>0</a:t>
               </a:r>
-              <a:endParaRPr lang="en-US" sz="3200" dirty="0" smtClean="0"/>
             </a:p>
             <a:p>
               <a:r>
                 <a:rPr lang="en-US" sz="3200" dirty="0" smtClean="0"/>
                 <a:t>0</a:t>
               </a:r>
-              <a:endParaRPr lang="en-US" sz="3200" dirty="0" smtClean="0"/>
             </a:p>
             <a:p>
               <a:r>
                 <a:rPr lang="en-US" sz="3200" dirty="0" smtClean="0"/>
                 <a:t>1</a:t>
               </a:r>
-              <a:endParaRPr lang="en-US" sz="3200" dirty="0" smtClean="0"/>
             </a:p>
             <a:p>
               <a:r>
                 <a:rPr lang="en-US" sz="3200" dirty="0" smtClean="0"/>
                 <a:t>1</a:t>
               </a:r>
-              <a:endParaRPr lang="en-US" sz="3200" dirty="0" smtClean="0"/>
             </a:p>
             <a:p>
               <a:r>
@@ -29103,11 +29033,7 @@
             </a:pPr>
             <a:r>
               <a:rPr lang="en-US" sz="8000" dirty="0" smtClean="0"/>
-              <a:t>predict(              </a:t>
-            </a:r>
-            <a:r>
-              <a:rPr lang="en-US" sz="8000" dirty="0" smtClean="0"/>
-              <a:t>)</a:t>
+              <a:t>predict(              )</a:t>
             </a:r>
           </a:p>
           <a:p>
@@ -29156,7 +29082,7 @@
         </p:nvSpPr>
         <p:spPr>
           <a:xfrm>
-            <a:off x="7304403" y="5462098"/>
+            <a:off x="7013684" y="5462098"/>
             <a:ext cx="2248693" cy="584776"/>
           </a:xfrm>
           <a:prstGeom prst="rect">
@@ -29213,7 +29139,7 @@
           </p:nvSpPr>
           <p:spPr>
             <a:xfrm>
-              <a:off x="5994139" y="5373106"/>
+              <a:off x="5550410" y="5373106"/>
               <a:ext cx="2905391" cy="584776"/>
             </a:xfrm>
             <a:prstGeom prst="rect">
@@ -29266,7 +29192,7 @@
           </p:nvSpPr>
           <p:spPr>
             <a:xfrm>
-              <a:off x="5635831" y="1715395"/>
+              <a:off x="5635831" y="1761292"/>
               <a:ext cx="1484926" cy="3539430"/>
             </a:xfrm>
             <a:prstGeom prst="rect">
@@ -29319,7 +29245,6 @@
                 <a:rPr lang="en-US" sz="3200" dirty="0" smtClean="0"/>
                 <a:t> </a:t>
               </a:r>
-              <a:endParaRPr lang="en-US" sz="3200" dirty="0" smtClean="0"/>
             </a:p>
             <a:p>
               <a:r>
@@ -29349,7 +29274,7 @@
           </p:nvSpPr>
           <p:spPr>
             <a:xfrm>
-              <a:off x="7221316" y="1771357"/>
+              <a:off x="7221316" y="1756058"/>
               <a:ext cx="1678214" cy="3539430"/>
             </a:xfrm>
             <a:prstGeom prst="rect">
@@ -29594,179 +29519,6 @@
           </p:cxnSp>
         </p:grpSp>
       </p:grpSp>
-      <p:sp>
-        <p:nvSpPr>
-          <p:cNvPr id="50" name="Content Placeholder 2"/>
-          <p:cNvSpPr txBox="1">
-            <a:spLocks/>
-          </p:cNvSpPr>
-          <p:nvPr/>
-        </p:nvSpPr>
-        <p:spPr>
-          <a:xfrm>
-            <a:off x="6880544" y="2861900"/>
-            <a:ext cx="847717" cy="1323052"/>
-          </a:xfrm>
-          <a:prstGeom prst="rect">
-            <a:avLst/>
-          </a:prstGeom>
-        </p:spPr>
-        <p:txBody>
-          <a:bodyPr vert="horz" lIns="91440" tIns="45720" rIns="91440" bIns="45720" rtlCol="0">
-            <a:normAutofit/>
-          </a:bodyPr>
-          <a:lstStyle>
-            <a:lvl1pPr marL="342900" indent="-342900" algn="l" defTabSz="457200" rtl="0" eaLnBrk="1" latinLnBrk="0" hangingPunct="1">
-              <a:spcBef>
-                <a:spcPct val="20000"/>
-              </a:spcBef>
-              <a:buFont typeface="Arial"/>
-              <a:buChar char="•"/>
-              <a:defRPr sz="3200" kern="1200">
-                <a:solidFill>
-                  <a:schemeClr val="tx1"/>
-                </a:solidFill>
-                <a:latin typeface="+mn-lt"/>
-                <a:ea typeface="+mn-ea"/>
-                <a:cs typeface="+mn-cs"/>
-              </a:defRPr>
-            </a:lvl1pPr>
-            <a:lvl2pPr marL="742950" indent="-285750" algn="l" defTabSz="457200" rtl="0" eaLnBrk="1" latinLnBrk="0" hangingPunct="1">
-              <a:spcBef>
-                <a:spcPct val="20000"/>
-              </a:spcBef>
-              <a:buFont typeface="Arial"/>
-              <a:buChar char="–"/>
-              <a:defRPr sz="2800" kern="1200">
-                <a:solidFill>
-                  <a:schemeClr val="tx1"/>
-                </a:solidFill>
-                <a:latin typeface="+mn-lt"/>
-                <a:ea typeface="+mn-ea"/>
-                <a:cs typeface="+mn-cs"/>
-              </a:defRPr>
-            </a:lvl2pPr>
-            <a:lvl3pPr marL="1143000" indent="-228600" algn="l" defTabSz="457200" rtl="0" eaLnBrk="1" latinLnBrk="0" hangingPunct="1">
-              <a:spcBef>
-                <a:spcPct val="20000"/>
-              </a:spcBef>
-              <a:buFont typeface="Arial"/>
-              <a:buChar char="•"/>
-              <a:defRPr sz="2400" kern="1200">
-                <a:solidFill>
-                  <a:schemeClr val="tx1"/>
-                </a:solidFill>
-                <a:latin typeface="+mn-lt"/>
-                <a:ea typeface="+mn-ea"/>
-                <a:cs typeface="+mn-cs"/>
-              </a:defRPr>
-            </a:lvl3pPr>
-            <a:lvl4pPr marL="1600200" indent="-228600" algn="l" defTabSz="457200" rtl="0" eaLnBrk="1" latinLnBrk="0" hangingPunct="1">
-              <a:spcBef>
-                <a:spcPct val="20000"/>
-              </a:spcBef>
-              <a:buFont typeface="Arial"/>
-              <a:buChar char="–"/>
-              <a:defRPr sz="2000" kern="1200">
-                <a:solidFill>
-                  <a:schemeClr val="tx1"/>
-                </a:solidFill>
-                <a:latin typeface="+mn-lt"/>
-                <a:ea typeface="+mn-ea"/>
-                <a:cs typeface="+mn-cs"/>
-              </a:defRPr>
-            </a:lvl4pPr>
-            <a:lvl5pPr marL="2057400" indent="-228600" algn="l" defTabSz="457200" rtl="0" eaLnBrk="1" latinLnBrk="0" hangingPunct="1">
-              <a:spcBef>
-                <a:spcPct val="20000"/>
-              </a:spcBef>
-              <a:buFont typeface="Arial"/>
-              <a:buChar char="»"/>
-              <a:defRPr sz="2000" kern="1200">
-                <a:solidFill>
-                  <a:schemeClr val="tx1"/>
-                </a:solidFill>
-                <a:latin typeface="+mn-lt"/>
-                <a:ea typeface="+mn-ea"/>
-                <a:cs typeface="+mn-cs"/>
-              </a:defRPr>
-            </a:lvl5pPr>
-            <a:lvl6pPr marL="2514600" indent="-228600" algn="l" defTabSz="457200" rtl="0" eaLnBrk="1" latinLnBrk="0" hangingPunct="1">
-              <a:spcBef>
-                <a:spcPct val="20000"/>
-              </a:spcBef>
-              <a:buFont typeface="Arial"/>
-              <a:buChar char="•"/>
-              <a:defRPr sz="2000" kern="1200">
-                <a:solidFill>
-                  <a:schemeClr val="tx1"/>
-                </a:solidFill>
-                <a:latin typeface="+mn-lt"/>
-                <a:ea typeface="+mn-ea"/>
-                <a:cs typeface="+mn-cs"/>
-              </a:defRPr>
-            </a:lvl6pPr>
-            <a:lvl7pPr marL="2971800" indent="-228600" algn="l" defTabSz="457200" rtl="0" eaLnBrk="1" latinLnBrk="0" hangingPunct="1">
-              <a:spcBef>
-                <a:spcPct val="20000"/>
-              </a:spcBef>
-              <a:buFont typeface="Arial"/>
-              <a:buChar char="•"/>
-              <a:defRPr sz="2000" kern="1200">
-                <a:solidFill>
-                  <a:schemeClr val="tx1"/>
-                </a:solidFill>
-                <a:latin typeface="+mn-lt"/>
-                <a:ea typeface="+mn-ea"/>
-                <a:cs typeface="+mn-cs"/>
-              </a:defRPr>
-            </a:lvl7pPr>
-            <a:lvl8pPr marL="3429000" indent="-228600" algn="l" defTabSz="457200" rtl="0" eaLnBrk="1" latinLnBrk="0" hangingPunct="1">
-              <a:spcBef>
-                <a:spcPct val="20000"/>
-              </a:spcBef>
-              <a:buFont typeface="Arial"/>
-              <a:buChar char="•"/>
-              <a:defRPr sz="2000" kern="1200">
-                <a:solidFill>
-                  <a:schemeClr val="tx1"/>
-                </a:solidFill>
-                <a:latin typeface="+mn-lt"/>
-                <a:ea typeface="+mn-ea"/>
-                <a:cs typeface="+mn-cs"/>
-              </a:defRPr>
-            </a:lvl8pPr>
-            <a:lvl9pPr marL="3886200" indent="-228600" algn="l" defTabSz="457200" rtl="0" eaLnBrk="1" latinLnBrk="0" hangingPunct="1">
-              <a:spcBef>
-                <a:spcPct val="20000"/>
-              </a:spcBef>
-              <a:buFont typeface="Arial"/>
-              <a:buChar char="•"/>
-              <a:defRPr sz="2000" kern="1200">
-                <a:solidFill>
-                  <a:schemeClr val="tx1"/>
-                </a:solidFill>
-                <a:latin typeface="+mn-lt"/>
-                <a:ea typeface="+mn-ea"/>
-                <a:cs typeface="+mn-cs"/>
-              </a:defRPr>
-            </a:lvl9pPr>
-          </a:lstStyle>
-          <a:p>
-            <a:pPr marL="0" indent="0">
-              <a:buNone/>
-            </a:pPr>
-            <a:r>
-              <a:rPr lang="en-US" sz="6000" dirty="0" smtClean="0">
-                <a:solidFill>
-                  <a:srgbClr val="0000FF"/>
-                </a:solidFill>
-              </a:rPr>
-              <a:t>-&gt;</a:t>
-            </a:r>
-          </a:p>
-        </p:txBody>
-      </p:sp>
       <p:grpSp>
         <p:nvGrpSpPr>
           <p:cNvPr id="51" name="Group 50"/>
@@ -29993,7 +29745,6 @@
                 <a:rPr lang="en-US" sz="3200" dirty="0" smtClean="0"/>
                 <a:t>1</a:t>
               </a:r>
-              <a:endParaRPr lang="en-US" sz="3200" dirty="0" smtClean="0"/>
             </a:p>
             <a:p>
               <a:r>
@@ -30007,28 +29758,24 @@
                 <a:rPr lang="en-US" sz="3200" dirty="0" smtClean="0"/>
                 <a:t>0</a:t>
               </a:r>
-              <a:endParaRPr lang="en-US" sz="3200" dirty="0" smtClean="0"/>
             </a:p>
             <a:p>
               <a:r>
                 <a:rPr lang="en-US" sz="3200" dirty="0" smtClean="0"/>
                 <a:t>0</a:t>
               </a:r>
-              <a:endParaRPr lang="en-US" sz="3200" dirty="0" smtClean="0"/>
             </a:p>
             <a:p>
               <a:r>
                 <a:rPr lang="en-US" sz="3200" dirty="0" smtClean="0"/>
                 <a:t>1</a:t>
               </a:r>
-              <a:endParaRPr lang="en-US" sz="3200" dirty="0" smtClean="0"/>
             </a:p>
             <a:p>
               <a:r>
                 <a:rPr lang="en-US" sz="3200" dirty="0" smtClean="0"/>
                 <a:t>1</a:t>
               </a:r>
-              <a:endParaRPr lang="en-US" sz="3200" dirty="0" smtClean="0"/>
             </a:p>
             <a:p>
               <a:r>
@@ -30040,6 +29787,43 @@
           </p:txBody>
         </p:sp>
       </p:grpSp>
+      <p:cxnSp>
+        <p:nvCxnSpPr>
+          <p:cNvPr id="28" name="Straight Arrow Connector 27"/>
+          <p:cNvCxnSpPr/>
+          <p:nvPr/>
+        </p:nvCxnSpPr>
+        <p:spPr>
+          <a:xfrm>
+            <a:off x="6874429" y="3442355"/>
+            <a:ext cx="690084" cy="0"/>
+          </a:xfrm>
+          <a:prstGeom prst="straightConnector1">
+            <a:avLst/>
+          </a:prstGeom>
+          <a:ln w="152400" cmpd="sng">
+            <a:solidFill>
+              <a:schemeClr val="tx1"/>
+            </a:solidFill>
+            <a:tailEnd type="triangle"/>
+          </a:ln>
+          <a:effectLst/>
+        </p:spPr>
+        <p:style>
+          <a:lnRef idx="2">
+            <a:schemeClr val="accent1"/>
+          </a:lnRef>
+          <a:fillRef idx="0">
+            <a:schemeClr val="accent1"/>
+          </a:fillRef>
+          <a:effectRef idx="1">
+            <a:schemeClr val="accent1"/>
+          </a:effectRef>
+          <a:fontRef idx="minor">
+            <a:schemeClr val="tx1"/>
+          </a:fontRef>
+        </p:style>
+      </p:cxnSp>
     </p:spTree>
     <p:extLst>
       <p:ext uri="{BB962C8B-B14F-4D97-AF65-F5344CB8AC3E}">
@@ -30111,7 +29895,7 @@
                                           </p:stCondLst>
                                         </p:cTn>
                                         <p:tgtEl>
-                                          <p:spTgt spid="50"/>
+                                          <p:spTgt spid="27"/>
                                         </p:tgtEl>
                                         <p:attrNameLst>
                                           <p:attrName>style.visibility</p:attrName>
@@ -30125,7 +29909,7 @@
                                 </p:cTn>
                               </p:par>
                               <p:par>
-                                <p:cTn id="9" presetID="1" presetClass="entr" presetSubtype="0" fill="hold" grpId="0" nodeType="withEffect">
+                                <p:cTn id="9" presetID="1" presetClass="entr" presetSubtype="0" fill="hold" nodeType="withEffect">
                                   <p:stCondLst>
                                     <p:cond delay="0"/>
                                   </p:stCondLst>
@@ -30138,7 +29922,7 @@
                                           </p:stCondLst>
                                         </p:cTn>
                                         <p:tgtEl>
-                                          <p:spTgt spid="27"/>
+                                          <p:spTgt spid="28"/>
                                         </p:tgtEl>
                                         <p:attrNameLst>
                                           <p:attrName>style.visibility</p:attrName>
@@ -30180,7 +29964,6 @@
     </p:tnLst>
     <p:bldLst>
       <p:bldP spid="27" grpId="0"/>
-      <p:bldP spid="50" grpId="0"/>
     </p:bldLst>
   </p:timing>
 </p:sld>
@@ -30276,13 +30059,8 @@
           <a:p>
             <a:r>
               <a:rPr lang="en-US" dirty="0" smtClean="0"/>
-              <a:t>Train, </a:t>
+              <a:t>Train, test sets</a:t>
             </a:r>
-            <a:r>
-              <a:rPr lang="en-US" dirty="0" smtClean="0"/>
-              <a:t>test sets</a:t>
-            </a:r>
-            <a:endParaRPr lang="en-US" dirty="0" smtClean="0"/>
           </a:p>
           <a:p>
             <a:r>

</xml_diff>

<commit_message>
Add notes to first half of presentation
</commit_message>
<xml_diff>
--- a/Techfest_ML.pptx
+++ b/Techfest_ML.pptx
@@ -5,7 +5,7 @@
     <p:sldMasterId id="2147483648" r:id="rId1"/>
   </p:sldMasterIdLst>
   <p:notesMasterIdLst>
-    <p:notesMasterId r:id="rId45"/>
+    <p:notesMasterId r:id="rId46"/>
   </p:notesMasterIdLst>
   <p:sldIdLst>
     <p:sldId id="293" r:id="rId2"/>
@@ -20,37 +20,38 @@
     <p:sldId id="258" r:id="rId11"/>
     <p:sldId id="260" r:id="rId12"/>
     <p:sldId id="259" r:id="rId13"/>
-    <p:sldId id="287" r:id="rId14"/>
-    <p:sldId id="261" r:id="rId15"/>
-    <p:sldId id="262" r:id="rId16"/>
-    <p:sldId id="265" r:id="rId17"/>
-    <p:sldId id="263" r:id="rId18"/>
-    <p:sldId id="264" r:id="rId19"/>
-    <p:sldId id="282" r:id="rId20"/>
-    <p:sldId id="301" r:id="rId21"/>
-    <p:sldId id="288" r:id="rId22"/>
-    <p:sldId id="289" r:id="rId23"/>
-    <p:sldId id="305" r:id="rId24"/>
-    <p:sldId id="306" r:id="rId25"/>
-    <p:sldId id="304" r:id="rId26"/>
-    <p:sldId id="268" r:id="rId27"/>
-    <p:sldId id="269" r:id="rId28"/>
-    <p:sldId id="270" r:id="rId29"/>
-    <p:sldId id="271" r:id="rId30"/>
-    <p:sldId id="290" r:id="rId31"/>
-    <p:sldId id="303" r:id="rId32"/>
-    <p:sldId id="299" r:id="rId33"/>
-    <p:sldId id="272" r:id="rId34"/>
-    <p:sldId id="280" r:id="rId35"/>
-    <p:sldId id="300" r:id="rId36"/>
-    <p:sldId id="267" r:id="rId37"/>
-    <p:sldId id="283" r:id="rId38"/>
-    <p:sldId id="292" r:id="rId39"/>
-    <p:sldId id="291" r:id="rId40"/>
-    <p:sldId id="296" r:id="rId41"/>
-    <p:sldId id="295" r:id="rId42"/>
-    <p:sldId id="294" r:id="rId43"/>
-    <p:sldId id="297" r:id="rId44"/>
+    <p:sldId id="308" r:id="rId14"/>
+    <p:sldId id="287" r:id="rId15"/>
+    <p:sldId id="261" r:id="rId16"/>
+    <p:sldId id="262" r:id="rId17"/>
+    <p:sldId id="265" r:id="rId18"/>
+    <p:sldId id="263" r:id="rId19"/>
+    <p:sldId id="264" r:id="rId20"/>
+    <p:sldId id="282" r:id="rId21"/>
+    <p:sldId id="301" r:id="rId22"/>
+    <p:sldId id="288" r:id="rId23"/>
+    <p:sldId id="289" r:id="rId24"/>
+    <p:sldId id="305" r:id="rId25"/>
+    <p:sldId id="306" r:id="rId26"/>
+    <p:sldId id="304" r:id="rId27"/>
+    <p:sldId id="268" r:id="rId28"/>
+    <p:sldId id="269" r:id="rId29"/>
+    <p:sldId id="270" r:id="rId30"/>
+    <p:sldId id="271" r:id="rId31"/>
+    <p:sldId id="290" r:id="rId32"/>
+    <p:sldId id="303" r:id="rId33"/>
+    <p:sldId id="299" r:id="rId34"/>
+    <p:sldId id="272" r:id="rId35"/>
+    <p:sldId id="280" r:id="rId36"/>
+    <p:sldId id="300" r:id="rId37"/>
+    <p:sldId id="267" r:id="rId38"/>
+    <p:sldId id="283" r:id="rId39"/>
+    <p:sldId id="292" r:id="rId40"/>
+    <p:sldId id="291" r:id="rId41"/>
+    <p:sldId id="296" r:id="rId42"/>
+    <p:sldId id="295" r:id="rId43"/>
+    <p:sldId id="294" r:id="rId44"/>
+    <p:sldId id="297" r:id="rId45"/>
   </p:sldIdLst>
   <p:sldSz cx="9144000" cy="6858000" type="screen4x3"/>
   <p:notesSz cx="6858000" cy="9144000"/>
@@ -638,7 +639,35 @@
           <a:bodyPr/>
           <a:lstStyle/>
           <a:p>
-            <a:endParaRPr lang="en-US"/>
+            <a:r>
+              <a:rPr lang="en-US" dirty="0" smtClean="0"/>
+              <a:t>Machine learning</a:t>
+            </a:r>
+            <a:r>
+              <a:rPr lang="en-US" baseline="0" dirty="0" smtClean="0"/>
+              <a:t> is used to decide what to show in our Facebook news feed</a:t>
+            </a:r>
+          </a:p>
+          <a:p>
+            <a:r>
+              <a:rPr lang="en-US" baseline="0" dirty="0" smtClean="0"/>
+              <a:t>It’s used to recommend movies on Netflix</a:t>
+            </a:r>
+          </a:p>
+          <a:p>
+            <a:r>
+              <a:rPr lang="en-US" baseline="0" dirty="0" smtClean="0"/>
+              <a:t>It’s used in </a:t>
+            </a:r>
+            <a:r>
+              <a:rPr lang="en-US" baseline="0" dirty="0" err="1" smtClean="0"/>
+              <a:t>Siri</a:t>
+            </a:r>
+            <a:r>
+              <a:rPr lang="en-US" baseline="0" dirty="0" smtClean="0"/>
+              <a:t> to recognize what we say and answer our questions.</a:t>
+            </a:r>
+            <a:endParaRPr lang="en-US" dirty="0"/>
           </a:p>
         </p:txBody>
       </p:sp>
@@ -659,7 +688,7 @@
           <a:p>
             <a:fld id="{8C25A203-B80B-7647-846D-203E4F34DEC8}" type="slidenum">
               <a:rPr lang="en-US" smtClean="0"/>
-              <a:t>4</a:t>
+              <a:t>3</a:t>
             </a:fld>
             <a:endParaRPr lang="en-US"/>
           </a:p>
@@ -668,7 +697,7 @@
     </p:spTree>
     <p:extLst>
       <p:ext uri="{BB962C8B-B14F-4D97-AF65-F5344CB8AC3E}">
-        <p14:creationId xmlns:p14="http://schemas.microsoft.com/office/powerpoint/2010/main" val="2015303103"/>
+        <p14:creationId xmlns:p14="http://schemas.microsoft.com/office/powerpoint/2010/main" val="3529009525"/>
       </p:ext>
     </p:extLst>
   </p:cSld>
@@ -722,15 +751,7 @@
           <a:bodyPr/>
           <a:lstStyle/>
           <a:p>
-            <a:r>
-              <a:rPr lang="en-US" dirty="0" smtClean="0"/>
-              <a:t>We don’t want our test data to leak into the</a:t>
-            </a:r>
-            <a:r>
-              <a:rPr lang="en-US" baseline="0" dirty="0" smtClean="0"/>
-              <a:t> model.</a:t>
-            </a:r>
-            <a:endParaRPr lang="en-US" dirty="0"/>
+            <a:endParaRPr lang="en-US"/>
           </a:p>
         </p:txBody>
       </p:sp>
@@ -751,7 +772,7 @@
           <a:p>
             <a:fld id="{8C25A203-B80B-7647-846D-203E4F34DEC8}" type="slidenum">
               <a:rPr lang="en-US" smtClean="0"/>
-              <a:t>30</a:t>
+              <a:t>4</a:t>
             </a:fld>
             <a:endParaRPr lang="en-US"/>
           </a:p>
@@ -760,7 +781,7 @@
     </p:spTree>
     <p:extLst>
       <p:ext uri="{BB962C8B-B14F-4D97-AF65-F5344CB8AC3E}">
-        <p14:creationId xmlns:p14="http://schemas.microsoft.com/office/powerpoint/2010/main" val="2268642343"/>
+        <p14:creationId xmlns:p14="http://schemas.microsoft.com/office/powerpoint/2010/main" val="2015303103"/>
       </p:ext>
     </p:extLst>
   </p:cSld>
@@ -816,11 +837,11 @@
           <a:p>
             <a:r>
               <a:rPr lang="en-US" dirty="0" smtClean="0"/>
-              <a:t>We don’t want our test data to leak into the</a:t>
+              <a:t>Many categories</a:t>
             </a:r>
             <a:r>
               <a:rPr lang="en-US" baseline="0" dirty="0" smtClean="0"/>
-              <a:t> model.</a:t>
+              <a:t> of machine learning. Depends on what the problem is.</a:t>
             </a:r>
             <a:endParaRPr lang="en-US" dirty="0"/>
           </a:p>
@@ -843,7 +864,283 @@
           <a:p>
             <a:fld id="{8C25A203-B80B-7647-846D-203E4F34DEC8}" type="slidenum">
               <a:rPr lang="en-US" smtClean="0"/>
-              <a:t>32</a:t>
+              <a:t>5</a:t>
+            </a:fld>
+            <a:endParaRPr lang="en-US"/>
+          </a:p>
+        </p:txBody>
+      </p:sp>
+    </p:spTree>
+    <p:extLst>
+      <p:ext uri="{BB962C8B-B14F-4D97-AF65-F5344CB8AC3E}">
+        <p14:creationId xmlns:p14="http://schemas.microsoft.com/office/powerpoint/2010/main" val="1715741455"/>
+      </p:ext>
+    </p:extLst>
+  </p:cSld>
+  <p:clrMapOvr>
+    <a:masterClrMapping/>
+  </p:clrMapOvr>
+</p:notes>
+</file>
+
+<file path=ppt/notesSlides/notesSlide5.xml><?xml version="1.0" encoding="utf-8"?>
+<p:notes xmlns:a="http://schemas.openxmlformats.org/drawingml/2006/main" xmlns:r="http://schemas.openxmlformats.org/officeDocument/2006/relationships" xmlns:p="http://schemas.openxmlformats.org/presentationml/2006/main">
+  <p:cSld>
+    <p:spTree>
+      <p:nvGrpSpPr>
+        <p:cNvPr id="1" name=""/>
+        <p:cNvGrpSpPr/>
+        <p:nvPr/>
+      </p:nvGrpSpPr>
+      <p:grpSpPr>
+        <a:xfrm>
+          <a:off x="0" y="0"/>
+          <a:ext cx="0" cy="0"/>
+          <a:chOff x="0" y="0"/>
+          <a:chExt cx="0" cy="0"/>
+        </a:xfrm>
+      </p:grpSpPr>
+      <p:sp>
+        <p:nvSpPr>
+          <p:cNvPr id="2" name="Slide Image Placeholder 1"/>
+          <p:cNvSpPr>
+            <a:spLocks noGrp="1" noRot="1" noChangeAspect="1"/>
+          </p:cNvSpPr>
+          <p:nvPr>
+            <p:ph type="sldImg"/>
+          </p:nvPr>
+        </p:nvSpPr>
+        <p:spPr/>
+      </p:sp>
+      <p:sp>
+        <p:nvSpPr>
+          <p:cNvPr id="3" name="Notes Placeholder 2"/>
+          <p:cNvSpPr>
+            <a:spLocks noGrp="1"/>
+          </p:cNvSpPr>
+          <p:nvPr>
+            <p:ph type="body" idx="1"/>
+          </p:nvPr>
+        </p:nvSpPr>
+        <p:spPr/>
+        <p:txBody>
+          <a:bodyPr/>
+          <a:lstStyle/>
+          <a:p>
+            <a:r>
+              <a:rPr lang="en-US" dirty="0" smtClean="0"/>
+              <a:t>Next slide: How do we measure</a:t>
+            </a:r>
+            <a:r>
+              <a:rPr lang="en-US" baseline="0" dirty="0" smtClean="0"/>
+              <a:t> how “good” a classifier is? There are many metrics, and which one you use often depends on the application.</a:t>
+            </a:r>
+            <a:endParaRPr lang="en-US" dirty="0"/>
+          </a:p>
+        </p:txBody>
+      </p:sp>
+      <p:sp>
+        <p:nvSpPr>
+          <p:cNvPr id="4" name="Slide Number Placeholder 3"/>
+          <p:cNvSpPr>
+            <a:spLocks noGrp="1"/>
+          </p:cNvSpPr>
+          <p:nvPr>
+            <p:ph type="sldNum" sz="quarter" idx="10"/>
+          </p:nvPr>
+        </p:nvSpPr>
+        <p:spPr/>
+        <p:txBody>
+          <a:bodyPr/>
+          <a:lstStyle/>
+          <a:p>
+            <a:fld id="{8C25A203-B80B-7647-846D-203E4F34DEC8}" type="slidenum">
+              <a:rPr lang="en-US" smtClean="0"/>
+              <a:t>16</a:t>
+            </a:fld>
+            <a:endParaRPr lang="en-US"/>
+          </a:p>
+        </p:txBody>
+      </p:sp>
+    </p:spTree>
+    <p:extLst>
+      <p:ext uri="{BB962C8B-B14F-4D97-AF65-F5344CB8AC3E}">
+        <p14:creationId xmlns:p14="http://schemas.microsoft.com/office/powerpoint/2010/main" val="981338467"/>
+      </p:ext>
+    </p:extLst>
+  </p:cSld>
+  <p:clrMapOvr>
+    <a:masterClrMapping/>
+  </p:clrMapOvr>
+</p:notes>
+</file>
+
+<file path=ppt/notesSlides/notesSlide6.xml><?xml version="1.0" encoding="utf-8"?>
+<p:notes xmlns:a="http://schemas.openxmlformats.org/drawingml/2006/main" xmlns:r="http://schemas.openxmlformats.org/officeDocument/2006/relationships" xmlns:p="http://schemas.openxmlformats.org/presentationml/2006/main">
+  <p:cSld>
+    <p:spTree>
+      <p:nvGrpSpPr>
+        <p:cNvPr id="1" name=""/>
+        <p:cNvGrpSpPr/>
+        <p:nvPr/>
+      </p:nvGrpSpPr>
+      <p:grpSpPr>
+        <a:xfrm>
+          <a:off x="0" y="0"/>
+          <a:ext cx="0" cy="0"/>
+          <a:chOff x="0" y="0"/>
+          <a:chExt cx="0" cy="0"/>
+        </a:xfrm>
+      </p:grpSpPr>
+      <p:sp>
+        <p:nvSpPr>
+          <p:cNvPr id="2" name="Slide Image Placeholder 1"/>
+          <p:cNvSpPr>
+            <a:spLocks noGrp="1" noRot="1" noChangeAspect="1"/>
+          </p:cNvSpPr>
+          <p:nvPr>
+            <p:ph type="sldImg"/>
+          </p:nvPr>
+        </p:nvSpPr>
+        <p:spPr/>
+      </p:sp>
+      <p:sp>
+        <p:nvSpPr>
+          <p:cNvPr id="3" name="Notes Placeholder 2"/>
+          <p:cNvSpPr>
+            <a:spLocks noGrp="1"/>
+          </p:cNvSpPr>
+          <p:nvPr>
+            <p:ph type="body" idx="1"/>
+          </p:nvPr>
+        </p:nvSpPr>
+        <p:spPr/>
+        <p:txBody>
+          <a:bodyPr/>
+          <a:lstStyle/>
+          <a:p>
+            <a:r>
+              <a:rPr lang="en-US" dirty="0" smtClean="0"/>
+              <a:t>We don’t want our test data to leak into the</a:t>
+            </a:r>
+            <a:r>
+              <a:rPr lang="en-US" baseline="0" dirty="0" smtClean="0"/>
+              <a:t> model.</a:t>
+            </a:r>
+            <a:endParaRPr lang="en-US" dirty="0"/>
+          </a:p>
+        </p:txBody>
+      </p:sp>
+      <p:sp>
+        <p:nvSpPr>
+          <p:cNvPr id="4" name="Slide Number Placeholder 3"/>
+          <p:cNvSpPr>
+            <a:spLocks noGrp="1"/>
+          </p:cNvSpPr>
+          <p:nvPr>
+            <p:ph type="sldNum" sz="quarter" idx="10"/>
+          </p:nvPr>
+        </p:nvSpPr>
+        <p:spPr/>
+        <p:txBody>
+          <a:bodyPr/>
+          <a:lstStyle/>
+          <a:p>
+            <a:fld id="{8C25A203-B80B-7647-846D-203E4F34DEC8}" type="slidenum">
+              <a:rPr lang="en-US" smtClean="0"/>
+              <a:t>31</a:t>
+            </a:fld>
+            <a:endParaRPr lang="en-US"/>
+          </a:p>
+        </p:txBody>
+      </p:sp>
+    </p:spTree>
+    <p:extLst>
+      <p:ext uri="{BB962C8B-B14F-4D97-AF65-F5344CB8AC3E}">
+        <p14:creationId xmlns:p14="http://schemas.microsoft.com/office/powerpoint/2010/main" val="2268642343"/>
+      </p:ext>
+    </p:extLst>
+  </p:cSld>
+  <p:clrMapOvr>
+    <a:masterClrMapping/>
+  </p:clrMapOvr>
+</p:notes>
+</file>
+
+<file path=ppt/notesSlides/notesSlide7.xml><?xml version="1.0" encoding="utf-8"?>
+<p:notes xmlns:a="http://schemas.openxmlformats.org/drawingml/2006/main" xmlns:r="http://schemas.openxmlformats.org/officeDocument/2006/relationships" xmlns:p="http://schemas.openxmlformats.org/presentationml/2006/main">
+  <p:cSld>
+    <p:spTree>
+      <p:nvGrpSpPr>
+        <p:cNvPr id="1" name=""/>
+        <p:cNvGrpSpPr/>
+        <p:nvPr/>
+      </p:nvGrpSpPr>
+      <p:grpSpPr>
+        <a:xfrm>
+          <a:off x="0" y="0"/>
+          <a:ext cx="0" cy="0"/>
+          <a:chOff x="0" y="0"/>
+          <a:chExt cx="0" cy="0"/>
+        </a:xfrm>
+      </p:grpSpPr>
+      <p:sp>
+        <p:nvSpPr>
+          <p:cNvPr id="2" name="Slide Image Placeholder 1"/>
+          <p:cNvSpPr>
+            <a:spLocks noGrp="1" noRot="1" noChangeAspect="1"/>
+          </p:cNvSpPr>
+          <p:nvPr>
+            <p:ph type="sldImg"/>
+          </p:nvPr>
+        </p:nvSpPr>
+        <p:spPr/>
+      </p:sp>
+      <p:sp>
+        <p:nvSpPr>
+          <p:cNvPr id="3" name="Notes Placeholder 2"/>
+          <p:cNvSpPr>
+            <a:spLocks noGrp="1"/>
+          </p:cNvSpPr>
+          <p:nvPr>
+            <p:ph type="body" idx="1"/>
+          </p:nvPr>
+        </p:nvSpPr>
+        <p:spPr/>
+        <p:txBody>
+          <a:bodyPr/>
+          <a:lstStyle/>
+          <a:p>
+            <a:r>
+              <a:rPr lang="en-US" dirty="0" smtClean="0"/>
+              <a:t>We don’t want our test data to leak into the</a:t>
+            </a:r>
+            <a:r>
+              <a:rPr lang="en-US" baseline="0" dirty="0" smtClean="0"/>
+              <a:t> model.</a:t>
+            </a:r>
+            <a:endParaRPr lang="en-US" dirty="0"/>
+          </a:p>
+        </p:txBody>
+      </p:sp>
+      <p:sp>
+        <p:nvSpPr>
+          <p:cNvPr id="4" name="Slide Number Placeholder 3"/>
+          <p:cNvSpPr>
+            <a:spLocks noGrp="1"/>
+          </p:cNvSpPr>
+          <p:nvPr>
+            <p:ph type="sldNum" sz="quarter" idx="10"/>
+          </p:nvPr>
+        </p:nvSpPr>
+        <p:spPr/>
+        <p:txBody>
+          <a:bodyPr/>
+          <a:lstStyle/>
+          <a:p>
+            <a:fld id="{8C25A203-B80B-7647-846D-203E4F34DEC8}" type="slidenum">
+              <a:rPr lang="en-US" smtClean="0"/>
+              <a:t>33</a:t>
             </a:fld>
             <a:endParaRPr lang="en-US"/>
           </a:p>
@@ -6531,7 +6828,7 @@
                             </p:stCondLst>
                             <p:childTnLst>
                               <p:par>
-                                <p:cTn id="5" presetID="1" presetClass="entr" presetSubtype="0" fill="hold" grpId="0" nodeType="clickEffect">
+                                <p:cTn id="5" presetID="1" presetClass="entr" presetSubtype="0" fill="hold" nodeType="clickEffect">
                                   <p:stCondLst>
                                     <p:cond delay="0"/>
                                   </p:stCondLst>
@@ -6544,7 +6841,7 @@
                                           </p:stCondLst>
                                         </p:cTn>
                                         <p:tgtEl>
-                                          <p:spTgt spid="26"/>
+                                          <p:spTgt spid="75"/>
                                         </p:tgtEl>
                                         <p:attrNameLst>
                                           <p:attrName>style.visibility</p:attrName>
@@ -6557,21 +6854,39 @@
                                   </p:childTnLst>
                                 </p:cTn>
                               </p:par>
+                            </p:childTnLst>
+                          </p:cTn>
+                        </p:par>
+                      </p:childTnLst>
+                    </p:cTn>
+                  </p:par>
+                  <p:par>
+                    <p:cTn id="7" fill="hold">
+                      <p:stCondLst>
+                        <p:cond delay="indefinite"/>
+                      </p:stCondLst>
+                      <p:childTnLst>
+                        <p:par>
+                          <p:cTn id="8" fill="hold">
+                            <p:stCondLst>
+                              <p:cond delay="0"/>
+                            </p:stCondLst>
+                            <p:childTnLst>
                               <p:par>
-                                <p:cTn id="7" presetID="1" presetClass="entr" presetSubtype="0" fill="hold" nodeType="withEffect">
+                                <p:cTn id="9" presetID="1" presetClass="entr" presetSubtype="0" fill="hold" grpId="0" nodeType="clickEffect">
                                   <p:stCondLst>
                                     <p:cond delay="0"/>
                                   </p:stCondLst>
                                   <p:childTnLst>
                                     <p:set>
                                       <p:cBhvr>
-                                        <p:cTn id="8" dur="1" fill="hold">
+                                        <p:cTn id="10" dur="1" fill="hold">
                                           <p:stCondLst>
                                             <p:cond delay="0"/>
                                           </p:stCondLst>
                                         </p:cTn>
                                         <p:tgtEl>
-                                          <p:spTgt spid="75"/>
+                                          <p:spTgt spid="26"/>
                                         </p:tgtEl>
                                         <p:attrNameLst>
                                           <p:attrName>style.visibility</p:attrName>
@@ -7685,6 +8000,293 @@
 </file>
 
 <file path=ppt/slides/slide13.xml><?xml version="1.0" encoding="utf-8"?>
+<p:sld xmlns:a="http://schemas.openxmlformats.org/drawingml/2006/main" xmlns:r="http://schemas.openxmlformats.org/officeDocument/2006/relationships" xmlns:p="http://schemas.openxmlformats.org/presentationml/2006/main">
+  <p:cSld>
+    <p:spTree>
+      <p:nvGrpSpPr>
+        <p:cNvPr id="1" name=""/>
+        <p:cNvGrpSpPr/>
+        <p:nvPr/>
+      </p:nvGrpSpPr>
+      <p:grpSpPr>
+        <a:xfrm>
+          <a:off x="0" y="0"/>
+          <a:ext cx="0" cy="0"/>
+          <a:chOff x="0" y="0"/>
+          <a:chExt cx="0" cy="0"/>
+        </a:xfrm>
+      </p:grpSpPr>
+      <p:sp>
+        <p:nvSpPr>
+          <p:cNvPr id="2" name="Title 1"/>
+          <p:cNvSpPr>
+            <a:spLocks noGrp="1"/>
+          </p:cNvSpPr>
+          <p:nvPr>
+            <p:ph type="title"/>
+          </p:nvPr>
+        </p:nvSpPr>
+        <p:spPr/>
+        <p:txBody>
+          <a:bodyPr/>
+          <a:lstStyle/>
+          <a:p>
+            <a:r>
+              <a:rPr lang="en-US" dirty="0" smtClean="0"/>
+              <a:t>Types of Machine Learning</a:t>
+            </a:r>
+            <a:endParaRPr lang="en-US" dirty="0"/>
+          </a:p>
+        </p:txBody>
+      </p:sp>
+      <p:grpSp>
+        <p:nvGrpSpPr>
+          <p:cNvPr id="10" name="Group 9"/>
+          <p:cNvGrpSpPr/>
+          <p:nvPr/>
+        </p:nvGrpSpPr>
+        <p:grpSpPr>
+          <a:xfrm>
+            <a:off x="247485" y="2314055"/>
+            <a:ext cx="8648700" cy="2348689"/>
+            <a:chOff x="247485" y="2314055"/>
+            <a:chExt cx="8648700" cy="2348689"/>
+          </a:xfrm>
+        </p:grpSpPr>
+        <p:pic>
+          <p:nvPicPr>
+            <p:cNvPr id="11" name="Picture 10" descr="types_of_ml.png"/>
+            <p:cNvPicPr>
+              <a:picLocks noChangeAspect="1"/>
+            </p:cNvPicPr>
+            <p:nvPr/>
+          </p:nvPicPr>
+          <p:blipFill rotWithShape="1">
+            <a:blip r:embed="rId2">
+              <a:extLst>
+                <a:ext uri="{28A0092B-C50C-407E-A947-70E740481C1C}">
+                  <a14:useLocalDpi xmlns:a14="http://schemas.microsoft.com/office/drawing/2010/main" val="0"/>
+                </a:ext>
+              </a:extLst>
+            </a:blip>
+            <a:srcRect b="43617"/>
+            <a:stretch/>
+          </p:blipFill>
+          <p:spPr>
+            <a:xfrm>
+              <a:off x="247485" y="2314055"/>
+              <a:ext cx="8648700" cy="2348689"/>
+            </a:xfrm>
+            <a:prstGeom prst="rect">
+              <a:avLst/>
+            </a:prstGeom>
+          </p:spPr>
+        </p:pic>
+        <p:sp>
+          <p:nvSpPr>
+            <p:cNvPr id="12" name="TextBox 11"/>
+            <p:cNvSpPr txBox="1"/>
+            <p:nvPr/>
+          </p:nvSpPr>
+          <p:spPr>
+            <a:xfrm>
+              <a:off x="1042866" y="3969247"/>
+              <a:ext cx="1219480" cy="369332"/>
+            </a:xfrm>
+            <a:prstGeom prst="rect">
+              <a:avLst/>
+            </a:prstGeom>
+            <a:solidFill>
+              <a:schemeClr val="bg1"/>
+            </a:solidFill>
+          </p:spPr>
+          <p:txBody>
+            <a:bodyPr wrap="square" rtlCol="0">
+              <a:spAutoFit/>
+            </a:bodyPr>
+            <a:lstStyle/>
+            <a:p>
+              <a:pPr algn="ctr"/>
+              <a:r>
+                <a:rPr lang="en-US" dirty="0" smtClean="0">
+                  <a:latin typeface="Times New Roman"/>
+                  <a:cs typeface="Times New Roman"/>
+                </a:rPr>
+                <a:t>Regression</a:t>
+              </a:r>
+              <a:endParaRPr lang="en-US" dirty="0">
+                <a:latin typeface="Times New Roman"/>
+                <a:cs typeface="Times New Roman"/>
+              </a:endParaRPr>
+            </a:p>
+          </p:txBody>
+        </p:sp>
+        <p:sp>
+          <p:nvSpPr>
+            <p:cNvPr id="13" name="TextBox 12"/>
+            <p:cNvSpPr txBox="1"/>
+            <p:nvPr/>
+          </p:nvSpPr>
+          <p:spPr>
+            <a:xfrm>
+              <a:off x="2658642" y="3969247"/>
+              <a:ext cx="1336207" cy="338554"/>
+            </a:xfrm>
+            <a:prstGeom prst="rect">
+              <a:avLst/>
+            </a:prstGeom>
+            <a:solidFill>
+              <a:schemeClr val="bg1"/>
+            </a:solidFill>
+          </p:spPr>
+          <p:txBody>
+            <a:bodyPr wrap="square" rtlCol="0">
+              <a:spAutoFit/>
+            </a:bodyPr>
+            <a:lstStyle/>
+            <a:p>
+              <a:pPr algn="ctr"/>
+              <a:r>
+                <a:rPr lang="en-US" sz="1600" dirty="0" smtClean="0">
+                  <a:latin typeface="Times New Roman"/>
+                  <a:cs typeface="Times New Roman"/>
+                </a:rPr>
+                <a:t>Classification</a:t>
+              </a:r>
+              <a:endParaRPr lang="en-US" sz="1600" dirty="0">
+                <a:latin typeface="Times New Roman"/>
+                <a:cs typeface="Times New Roman"/>
+              </a:endParaRPr>
+            </a:p>
+          </p:txBody>
+        </p:sp>
+      </p:grpSp>
+      <p:cxnSp>
+        <p:nvCxnSpPr>
+          <p:cNvPr id="7" name="Straight Arrow Connector 6"/>
+          <p:cNvCxnSpPr/>
+          <p:nvPr/>
+        </p:nvCxnSpPr>
+        <p:spPr>
+          <a:xfrm flipV="1">
+            <a:off x="3298277" y="4352357"/>
+            <a:ext cx="0" cy="700369"/>
+          </a:xfrm>
+          <a:prstGeom prst="straightConnector1">
+            <a:avLst/>
+          </a:prstGeom>
+          <a:ln w="76200" cmpd="sng">
+            <a:solidFill>
+              <a:srgbClr val="FF0000"/>
+            </a:solidFill>
+            <a:tailEnd type="triangle"/>
+          </a:ln>
+          <a:effectLst/>
+        </p:spPr>
+        <p:style>
+          <a:lnRef idx="2">
+            <a:schemeClr val="accent1"/>
+          </a:lnRef>
+          <a:fillRef idx="0">
+            <a:schemeClr val="accent1"/>
+          </a:fillRef>
+          <a:effectRef idx="1">
+            <a:schemeClr val="accent1"/>
+          </a:effectRef>
+          <a:fontRef idx="minor">
+            <a:schemeClr val="tx1"/>
+          </a:fontRef>
+        </p:style>
+      </p:cxnSp>
+    </p:spTree>
+    <p:extLst>
+      <p:ext uri="{BB962C8B-B14F-4D97-AF65-F5344CB8AC3E}">
+        <p14:creationId xmlns:p14="http://schemas.microsoft.com/office/powerpoint/2010/main" val="3471632881"/>
+      </p:ext>
+    </p:extLst>
+  </p:cSld>
+  <p:clrMapOvr>
+    <a:masterClrMapping/>
+  </p:clrMapOvr>
+  <p:timing>
+    <p:tnLst>
+      <p:par>
+        <p:cTn xmlns:p14="http://schemas.microsoft.com/office/powerpoint/2010/main" id="1" dur="indefinite" restart="never" nodeType="tmRoot">
+          <p:childTnLst>
+            <p:seq concurrent="1" nextAc="seek">
+              <p:cTn id="2" dur="indefinite" nodeType="mainSeq">
+                <p:childTnLst>
+                  <p:par>
+                    <p:cTn id="3" fill="hold">
+                      <p:stCondLst>
+                        <p:cond delay="indefinite"/>
+                      </p:stCondLst>
+                      <p:childTnLst>
+                        <p:par>
+                          <p:cTn id="4" fill="hold">
+                            <p:stCondLst>
+                              <p:cond delay="0"/>
+                            </p:stCondLst>
+                            <p:childTnLst>
+                              <p:par>
+                                <p:cTn id="5" presetID="1" presetClass="entr" presetSubtype="0" fill="hold" nodeType="clickEffect">
+                                  <p:stCondLst>
+                                    <p:cond delay="0"/>
+                                  </p:stCondLst>
+                                  <p:childTnLst>
+                                    <p:set>
+                                      <p:cBhvr>
+                                        <p:cTn id="6" dur="1" fill="hold">
+                                          <p:stCondLst>
+                                            <p:cond delay="0"/>
+                                          </p:stCondLst>
+                                        </p:cTn>
+                                        <p:tgtEl>
+                                          <p:spTgt spid="7"/>
+                                        </p:tgtEl>
+                                        <p:attrNameLst>
+                                          <p:attrName>style.visibility</p:attrName>
+                                        </p:attrNameLst>
+                                      </p:cBhvr>
+                                      <p:to>
+                                        <p:strVal val="visible"/>
+                                      </p:to>
+                                    </p:set>
+                                  </p:childTnLst>
+                                </p:cTn>
+                              </p:par>
+                            </p:childTnLst>
+                          </p:cTn>
+                        </p:par>
+                      </p:childTnLst>
+                    </p:cTn>
+                  </p:par>
+                </p:childTnLst>
+              </p:cTn>
+              <p:prevCondLst>
+                <p:cond evt="onPrev" delay="0">
+                  <p:tgtEl>
+                    <p:sldTgt/>
+                  </p:tgtEl>
+                </p:cond>
+              </p:prevCondLst>
+              <p:nextCondLst>
+                <p:cond evt="onNext" delay="0">
+                  <p:tgtEl>
+                    <p:sldTgt/>
+                  </p:tgtEl>
+                </p:cond>
+              </p:nextCondLst>
+            </p:seq>
+          </p:childTnLst>
+        </p:cTn>
+      </p:par>
+    </p:tnLst>
+  </p:timing>
+</p:sld>
+</file>
+
+<file path=ppt/slides/slide14.xml><?xml version="1.0" encoding="utf-8"?>
 <p:sld xmlns:a="http://schemas.openxmlformats.org/drawingml/2006/main" xmlns:r="http://schemas.openxmlformats.org/officeDocument/2006/relationships" xmlns:p="http://schemas.openxmlformats.org/presentationml/2006/main">
   <p:cSld>
     <p:spTree>
@@ -8269,7 +8871,7 @@
 </p:sld>
 </file>
 
-<file path=ppt/slides/slide14.xml><?xml version="1.0" encoding="utf-8"?>
+<file path=ppt/slides/slide15.xml><?xml version="1.0" encoding="utf-8"?>
 <p:sld xmlns:a="http://schemas.openxmlformats.org/drawingml/2006/main" xmlns:r="http://schemas.openxmlformats.org/officeDocument/2006/relationships" xmlns:p="http://schemas.openxmlformats.org/presentationml/2006/main">
   <p:cSld>
     <p:spTree>
@@ -10045,7 +10647,7 @@
 </p:sld>
 </file>
 
-<file path=ppt/slides/slide15.xml><?xml version="1.0" encoding="utf-8"?>
+<file path=ppt/slides/slide16.xml><?xml version="1.0" encoding="utf-8"?>
 <p:sld xmlns:a="http://schemas.openxmlformats.org/drawingml/2006/main" xmlns:r="http://schemas.openxmlformats.org/officeDocument/2006/relationships" xmlns:p="http://schemas.openxmlformats.org/presentationml/2006/main">
   <p:cSld>
     <p:spTree>
@@ -11240,8 +11842,12 @@
                 <a:latin typeface="Arial"/>
                 <a:cs typeface="Arial"/>
               </a:rPr>
-              <a:t>Labeling house view as good view</a:t>
+              <a:t>Identifying “Good view” houses</a:t>
             </a:r>
+            <a:endParaRPr lang="en-US" sz="2400" dirty="0" smtClean="0">
+              <a:latin typeface="Arial"/>
+              <a:cs typeface="Arial"/>
+            </a:endParaRPr>
           </a:p>
         </p:txBody>
       </p:sp>
@@ -11918,56 +12524,6 @@
       </p:grpSp>
       <p:sp>
         <p:nvSpPr>
-          <p:cNvPr id="68" name="TextBox 67"/>
-          <p:cNvSpPr txBox="1"/>
-          <p:nvPr/>
-        </p:nvSpPr>
-        <p:spPr>
-          <a:xfrm>
-            <a:off x="3094052" y="1362740"/>
-            <a:ext cx="1645132" cy="830997"/>
-          </a:xfrm>
-          <a:prstGeom prst="rect">
-            <a:avLst/>
-          </a:prstGeom>
-          <a:noFill/>
-        </p:spPr>
-        <p:txBody>
-          <a:bodyPr wrap="square" rtlCol="0">
-            <a:spAutoFit/>
-          </a:bodyPr>
-          <a:lstStyle/>
-          <a:p>
-            <a:r>
-              <a:rPr lang="en-US" sz="2400" dirty="0" smtClean="0">
-                <a:latin typeface="Arial"/>
-                <a:cs typeface="Arial"/>
-              </a:rPr>
-              <a:t>Predicted </a:t>
-            </a:r>
-            <a:r>
-              <a:rPr lang="en-US" sz="2400" dirty="0" smtClean="0">
-                <a:latin typeface="Arial"/>
-                <a:cs typeface="Arial"/>
-              </a:rPr>
-              <a:t>good </a:t>
-            </a:r>
-            <a:r>
-              <a:rPr lang="en-US" sz="2400" dirty="0" smtClean="0">
-                <a:latin typeface="Arial"/>
-                <a:cs typeface="Arial"/>
-              </a:rPr>
-              <a:t>view</a:t>
-            </a:r>
-            <a:endParaRPr lang="en-US" sz="2400" dirty="0">
-              <a:latin typeface="Arial"/>
-              <a:cs typeface="Arial"/>
-            </a:endParaRPr>
-          </a:p>
-        </p:txBody>
-      </p:sp>
-      <p:sp>
-        <p:nvSpPr>
           <p:cNvPr id="69" name="TextBox 68"/>
           <p:cNvSpPr txBox="1"/>
           <p:nvPr/>
@@ -11994,6 +12550,49 @@
                 <a:cs typeface="Arial"/>
               </a:rPr>
               <a:t>Predicted bad view</a:t>
+            </a:r>
+            <a:endParaRPr lang="en-US" sz="2400" dirty="0">
+              <a:latin typeface="Arial"/>
+              <a:cs typeface="Arial"/>
+            </a:endParaRPr>
+          </a:p>
+        </p:txBody>
+      </p:sp>
+      <p:sp>
+        <p:nvSpPr>
+          <p:cNvPr id="55" name="TextBox 54"/>
+          <p:cNvSpPr txBox="1"/>
+          <p:nvPr/>
+        </p:nvSpPr>
+        <p:spPr>
+          <a:xfrm>
+            <a:off x="3101544" y="1362740"/>
+            <a:ext cx="1645132" cy="830997"/>
+          </a:xfrm>
+          <a:prstGeom prst="rect">
+            <a:avLst/>
+          </a:prstGeom>
+          <a:noFill/>
+        </p:spPr>
+        <p:txBody>
+          <a:bodyPr wrap="square" rtlCol="0">
+            <a:spAutoFit/>
+          </a:bodyPr>
+          <a:lstStyle/>
+          <a:p>
+            <a:r>
+              <a:rPr lang="en-US" sz="2400" dirty="0" smtClean="0">
+                <a:latin typeface="Arial"/>
+                <a:cs typeface="Arial"/>
+              </a:rPr>
+              <a:t>Predicted good </a:t>
+            </a:r>
+            <a:r>
+              <a:rPr lang="en-US" sz="2400" dirty="0" smtClean="0">
+                <a:latin typeface="Arial"/>
+                <a:cs typeface="Arial"/>
+              </a:rPr>
+              <a:t>view</a:t>
             </a:r>
             <a:endParaRPr lang="en-US" sz="2400" dirty="0">
               <a:latin typeface="Arial"/>
@@ -12578,7 +13177,7 @@
 </p:sld>
 </file>
 
-<file path=ppt/slides/slide16.xml><?xml version="1.0" encoding="utf-8"?>
+<file path=ppt/slides/slide17.xml><?xml version="1.0" encoding="utf-8"?>
 <p:sld xmlns:a="http://schemas.openxmlformats.org/drawingml/2006/main" xmlns:r="http://schemas.openxmlformats.org/officeDocument/2006/relationships" xmlns:p="http://schemas.openxmlformats.org/presentationml/2006/main">
   <p:cSld>
     <p:spTree>
@@ -14128,7 +14727,7 @@
 </p:sld>
 </file>
 
-<file path=ppt/slides/slide17.xml><?xml version="1.0" encoding="utf-8"?>
+<file path=ppt/slides/slide18.xml><?xml version="1.0" encoding="utf-8"?>
 <p:sld xmlns:a="http://schemas.openxmlformats.org/drawingml/2006/main" xmlns:r="http://schemas.openxmlformats.org/officeDocument/2006/relationships" xmlns:p="http://schemas.openxmlformats.org/presentationml/2006/main">
   <p:cSld>
     <p:spTree>
@@ -15340,8 +15939,19 @@
                 <a:latin typeface="Arial"/>
                 <a:cs typeface="Arial"/>
               </a:rPr>
-              <a:t>7 right / 9 good view houses = 77%</a:t>
+              <a:t>7 right / 9 good view houses = </a:t>
             </a:r>
+            <a:r>
+              <a:rPr lang="en-US" sz="2400" dirty="0" smtClean="0">
+                <a:latin typeface="Arial"/>
+                <a:cs typeface="Arial"/>
+              </a:rPr>
+              <a:t>78%</a:t>
+            </a:r>
+            <a:endParaRPr lang="en-US" sz="2400" dirty="0" smtClean="0">
+              <a:latin typeface="Arial"/>
+              <a:cs typeface="Arial"/>
+            </a:endParaRPr>
           </a:p>
         </p:txBody>
       </p:sp>
@@ -15633,7 +16243,7 @@
 </p:sld>
 </file>
 
-<file path=ppt/slides/slide18.xml><?xml version="1.0" encoding="utf-8"?>
+<file path=ppt/slides/slide19.xml><?xml version="1.0" encoding="utf-8"?>
 <p:sld xmlns:a="http://schemas.openxmlformats.org/drawingml/2006/main" xmlns:r="http://schemas.openxmlformats.org/officeDocument/2006/relationships" xmlns:p="http://schemas.openxmlformats.org/presentationml/2006/main">
   <p:cSld>
     <p:spTree>
@@ -16807,15 +17417,12 @@
                 <a:latin typeface="Arial"/>
                 <a:cs typeface="Arial"/>
               </a:rPr>
-              <a:t>” = </a:t>
+              <a:t>” = 88%</a:t>
             </a:r>
-            <a:r>
-              <a:rPr lang="en-US" sz="2400" dirty="0" smtClean="0">
-                <a:latin typeface="Arial"/>
-                <a:cs typeface="Arial"/>
-              </a:rPr>
-              <a:t>87.5%</a:t>
-            </a:r>
+            <a:endParaRPr lang="en-US" sz="2400" dirty="0" smtClean="0">
+              <a:latin typeface="Arial"/>
+              <a:cs typeface="Arial"/>
+            </a:endParaRPr>
           </a:p>
         </p:txBody>
       </p:sp>
@@ -17107,137 +17714,6 @@
 </p:sld>
 </file>
 
-<file path=ppt/slides/slide19.xml><?xml version="1.0" encoding="utf-8"?>
-<p:sld xmlns:a="http://schemas.openxmlformats.org/drawingml/2006/main" xmlns:r="http://schemas.openxmlformats.org/officeDocument/2006/relationships" xmlns:p="http://schemas.openxmlformats.org/presentationml/2006/main">
-  <p:cSld>
-    <p:spTree>
-      <p:nvGrpSpPr>
-        <p:cNvPr id="1" name=""/>
-        <p:cNvGrpSpPr/>
-        <p:nvPr/>
-      </p:nvGrpSpPr>
-      <p:grpSpPr>
-        <a:xfrm>
-          <a:off x="0" y="0"/>
-          <a:ext cx="0" cy="0"/>
-          <a:chOff x="0" y="0"/>
-          <a:chExt cx="0" cy="0"/>
-        </a:xfrm>
-      </p:grpSpPr>
-      <p:sp>
-        <p:nvSpPr>
-          <p:cNvPr id="2" name="Title 1"/>
-          <p:cNvSpPr>
-            <a:spLocks noGrp="1"/>
-          </p:cNvSpPr>
-          <p:nvPr>
-            <p:ph type="title"/>
-          </p:nvPr>
-        </p:nvSpPr>
-        <p:spPr/>
-        <p:txBody>
-          <a:bodyPr/>
-          <a:lstStyle/>
-          <a:p>
-            <a:r>
-              <a:rPr lang="en-US" dirty="0" smtClean="0"/>
-              <a:t>Many Types of Models</a:t>
-            </a:r>
-            <a:endParaRPr lang="en-US" dirty="0"/>
-          </a:p>
-        </p:txBody>
-      </p:sp>
-      <p:sp>
-        <p:nvSpPr>
-          <p:cNvPr id="3" name="Content Placeholder 2"/>
-          <p:cNvSpPr>
-            <a:spLocks noGrp="1"/>
-          </p:cNvSpPr>
-          <p:nvPr>
-            <p:ph idx="1"/>
-          </p:nvPr>
-        </p:nvSpPr>
-        <p:spPr/>
-        <p:txBody>
-          <a:bodyPr/>
-          <a:lstStyle/>
-          <a:p>
-            <a:pPr marL="0" indent="0" algn="ctr">
-              <a:buNone/>
-            </a:pPr>
-            <a:r>
-              <a:rPr lang="en-US" dirty="0" smtClean="0"/>
-              <a:t>Decision trees</a:t>
-            </a:r>
-          </a:p>
-          <a:p>
-            <a:pPr marL="0" indent="0" algn="ctr">
-              <a:buNone/>
-            </a:pPr>
-            <a:r>
-              <a:rPr lang="en-US" dirty="0" smtClean="0"/>
-              <a:t>Random Forest</a:t>
-            </a:r>
-          </a:p>
-          <a:p>
-            <a:pPr marL="0" indent="0" algn="ctr">
-              <a:buNone/>
-            </a:pPr>
-            <a:r>
-              <a:rPr lang="en-US" dirty="0" smtClean="0"/>
-              <a:t>Support Vector Machine</a:t>
-            </a:r>
-          </a:p>
-          <a:p>
-            <a:pPr marL="0" indent="0" algn="ctr">
-              <a:buNone/>
-            </a:pPr>
-            <a:r>
-              <a:rPr lang="en-US" dirty="0" smtClean="0"/>
-              <a:t>Neural Nets</a:t>
-            </a:r>
-          </a:p>
-          <a:p>
-            <a:pPr marL="0" indent="0" algn="ctr">
-              <a:buNone/>
-            </a:pPr>
-            <a:r>
-              <a:rPr lang="en-US" dirty="0" smtClean="0"/>
-              <a:t>K Nearest Neighbors</a:t>
-            </a:r>
-          </a:p>
-          <a:p>
-            <a:pPr marL="0" indent="0" algn="ctr">
-              <a:buNone/>
-            </a:pPr>
-            <a:r>
-              <a:rPr lang="en-US" dirty="0" smtClean="0"/>
-              <a:t>…</a:t>
-            </a:r>
-            <a:endParaRPr lang="en-US" dirty="0"/>
-          </a:p>
-        </p:txBody>
-      </p:sp>
-    </p:spTree>
-    <p:extLst>
-      <p:ext uri="{BB962C8B-B14F-4D97-AF65-F5344CB8AC3E}">
-        <p14:creationId xmlns:p14="http://schemas.microsoft.com/office/powerpoint/2010/main" val="4137183448"/>
-      </p:ext>
-    </p:extLst>
-  </p:cSld>
-  <p:clrMapOvr>
-    <a:masterClrMapping/>
-  </p:clrMapOvr>
-  <p:timing>
-    <p:tnLst>
-      <p:par>
-        <p:cTn xmlns:p14="http://schemas.microsoft.com/office/powerpoint/2010/main" id="1" dur="indefinite" restart="never" nodeType="tmRoot"/>
-      </p:par>
-    </p:tnLst>
-  </p:timing>
-</p:sld>
-</file>
-
 <file path=ppt/slides/slide2.xml><?xml version="1.0" encoding="utf-8"?>
 <p:sld xmlns:a="http://schemas.openxmlformats.org/drawingml/2006/main" xmlns:r="http://schemas.openxmlformats.org/officeDocument/2006/relationships" xmlns:p="http://schemas.openxmlformats.org/presentationml/2006/main" show="0">
   <p:cSld>
@@ -17420,6 +17896,137 @@
           <a:p>
             <a:r>
               <a:rPr lang="en-US" dirty="0" smtClean="0"/>
+              <a:t>Many Types of Models</a:t>
+            </a:r>
+            <a:endParaRPr lang="en-US" dirty="0"/>
+          </a:p>
+        </p:txBody>
+      </p:sp>
+      <p:sp>
+        <p:nvSpPr>
+          <p:cNvPr id="3" name="Content Placeholder 2"/>
+          <p:cNvSpPr>
+            <a:spLocks noGrp="1"/>
+          </p:cNvSpPr>
+          <p:nvPr>
+            <p:ph idx="1"/>
+          </p:nvPr>
+        </p:nvSpPr>
+        <p:spPr/>
+        <p:txBody>
+          <a:bodyPr/>
+          <a:lstStyle/>
+          <a:p>
+            <a:pPr marL="0" indent="0" algn="ctr">
+              <a:buNone/>
+            </a:pPr>
+            <a:r>
+              <a:rPr lang="en-US" dirty="0" smtClean="0"/>
+              <a:t>Decision trees</a:t>
+            </a:r>
+          </a:p>
+          <a:p>
+            <a:pPr marL="0" indent="0" algn="ctr">
+              <a:buNone/>
+            </a:pPr>
+            <a:r>
+              <a:rPr lang="en-US" dirty="0" smtClean="0"/>
+              <a:t>Random Forest</a:t>
+            </a:r>
+          </a:p>
+          <a:p>
+            <a:pPr marL="0" indent="0" algn="ctr">
+              <a:buNone/>
+            </a:pPr>
+            <a:r>
+              <a:rPr lang="en-US" dirty="0" smtClean="0"/>
+              <a:t>Support Vector Machine</a:t>
+            </a:r>
+          </a:p>
+          <a:p>
+            <a:pPr marL="0" indent="0" algn="ctr">
+              <a:buNone/>
+            </a:pPr>
+            <a:r>
+              <a:rPr lang="en-US" dirty="0" smtClean="0"/>
+              <a:t>Neural Nets</a:t>
+            </a:r>
+          </a:p>
+          <a:p>
+            <a:pPr marL="0" indent="0" algn="ctr">
+              <a:buNone/>
+            </a:pPr>
+            <a:r>
+              <a:rPr lang="en-US" dirty="0" smtClean="0"/>
+              <a:t>K Nearest Neighbors</a:t>
+            </a:r>
+          </a:p>
+          <a:p>
+            <a:pPr marL="0" indent="0" algn="ctr">
+              <a:buNone/>
+            </a:pPr>
+            <a:r>
+              <a:rPr lang="en-US" dirty="0" smtClean="0"/>
+              <a:t>…</a:t>
+            </a:r>
+            <a:endParaRPr lang="en-US" dirty="0"/>
+          </a:p>
+        </p:txBody>
+      </p:sp>
+    </p:spTree>
+    <p:extLst>
+      <p:ext uri="{BB962C8B-B14F-4D97-AF65-F5344CB8AC3E}">
+        <p14:creationId xmlns:p14="http://schemas.microsoft.com/office/powerpoint/2010/main" val="4137183448"/>
+      </p:ext>
+    </p:extLst>
+  </p:cSld>
+  <p:clrMapOvr>
+    <a:masterClrMapping/>
+  </p:clrMapOvr>
+  <p:timing>
+    <p:tnLst>
+      <p:par>
+        <p:cTn xmlns:p14="http://schemas.microsoft.com/office/powerpoint/2010/main" id="1" dur="indefinite" restart="never" nodeType="tmRoot"/>
+      </p:par>
+    </p:tnLst>
+  </p:timing>
+</p:sld>
+</file>
+
+<file path=ppt/slides/slide21.xml><?xml version="1.0" encoding="utf-8"?>
+<p:sld xmlns:a="http://schemas.openxmlformats.org/drawingml/2006/main" xmlns:r="http://schemas.openxmlformats.org/officeDocument/2006/relationships" xmlns:p="http://schemas.openxmlformats.org/presentationml/2006/main">
+  <p:cSld>
+    <p:spTree>
+      <p:nvGrpSpPr>
+        <p:cNvPr id="1" name=""/>
+        <p:cNvGrpSpPr/>
+        <p:nvPr/>
+      </p:nvGrpSpPr>
+      <p:grpSpPr>
+        <a:xfrm>
+          <a:off x="0" y="0"/>
+          <a:ext cx="0" cy="0"/>
+          <a:chOff x="0" y="0"/>
+          <a:chExt cx="0" cy="0"/>
+        </a:xfrm>
+      </p:grpSpPr>
+      <p:sp>
+        <p:nvSpPr>
+          <p:cNvPr id="2" name="Title 1"/>
+          <p:cNvSpPr>
+            <a:spLocks noGrp="1"/>
+          </p:cNvSpPr>
+          <p:nvPr>
+            <p:ph type="title"/>
+          </p:nvPr>
+        </p:nvSpPr>
+        <p:spPr/>
+        <p:txBody>
+          <a:bodyPr/>
+          <a:lstStyle/>
+          <a:p>
+            <a:r>
+              <a:rPr lang="en-US" dirty="0" smtClean="0"/>
               <a:t>Decision Tree</a:t>
             </a:r>
             <a:endParaRPr lang="en-US" dirty="0"/>
@@ -18243,7 +18850,7 @@
 </p:sld>
 </file>
 
-<file path=ppt/slides/slide21.xml><?xml version="1.0" encoding="utf-8"?>
+<file path=ppt/slides/slide22.xml><?xml version="1.0" encoding="utf-8"?>
 <p:sld xmlns:a="http://schemas.openxmlformats.org/drawingml/2006/main" xmlns:r="http://schemas.openxmlformats.org/officeDocument/2006/relationships" xmlns:p="http://schemas.openxmlformats.org/presentationml/2006/main">
   <p:cSld>
     <p:spTree>
@@ -19786,7 +20393,7 @@
 </p:sld>
 </file>
 
-<file path=ppt/slides/slide22.xml><?xml version="1.0" encoding="utf-8"?>
+<file path=ppt/slides/slide23.xml><?xml version="1.0" encoding="utf-8"?>
 <p:sld xmlns:a="http://schemas.openxmlformats.org/drawingml/2006/main" xmlns:r="http://schemas.openxmlformats.org/officeDocument/2006/relationships" xmlns:p="http://schemas.openxmlformats.org/presentationml/2006/main">
   <p:cSld>
     <p:spTree>
@@ -23165,7 +23772,7 @@
 </p:sld>
 </file>
 
-<file path=ppt/slides/slide23.xml><?xml version="1.0" encoding="utf-8"?>
+<file path=ppt/slides/slide24.xml><?xml version="1.0" encoding="utf-8"?>
 <p:sld xmlns:a="http://schemas.openxmlformats.org/drawingml/2006/main" xmlns:r="http://schemas.openxmlformats.org/officeDocument/2006/relationships" xmlns:p="http://schemas.openxmlformats.org/presentationml/2006/main">
   <p:cSld>
     <p:spTree>
@@ -24680,7 +25287,7 @@
 </p:sld>
 </file>
 
-<file path=ppt/slides/slide24.xml><?xml version="1.0" encoding="utf-8"?>
+<file path=ppt/slides/slide25.xml><?xml version="1.0" encoding="utf-8"?>
 <p:sld xmlns:a="http://schemas.openxmlformats.org/drawingml/2006/main" xmlns:r="http://schemas.openxmlformats.org/officeDocument/2006/relationships" xmlns:p="http://schemas.openxmlformats.org/presentationml/2006/main">
   <p:cSld>
     <p:spTree>
@@ -26293,7 +26900,7 @@
 </p:sld>
 </file>
 
-<file path=ppt/slides/slide25.xml><?xml version="1.0" encoding="utf-8"?>
+<file path=ppt/slides/slide26.xml><?xml version="1.0" encoding="utf-8"?>
 <p:sld xmlns:a="http://schemas.openxmlformats.org/drawingml/2006/main" xmlns:r="http://schemas.openxmlformats.org/officeDocument/2006/relationships" xmlns:p="http://schemas.openxmlformats.org/presentationml/2006/main" show="0">
   <p:cSld>
     <p:spTree>
@@ -26395,7 +27002,7 @@
 </p:sld>
 </file>
 
-<file path=ppt/slides/slide26.xml><?xml version="1.0" encoding="utf-8"?>
+<file path=ppt/slides/slide27.xml><?xml version="1.0" encoding="utf-8"?>
 <p:sld xmlns:a="http://schemas.openxmlformats.org/drawingml/2006/main" xmlns:r="http://schemas.openxmlformats.org/officeDocument/2006/relationships" xmlns:p="http://schemas.openxmlformats.org/presentationml/2006/main">
   <p:cSld>
     <p:spTree>
@@ -27041,7 +27648,7 @@
 </p:sld>
 </file>
 
-<file path=ppt/slides/slide27.xml><?xml version="1.0" encoding="utf-8"?>
+<file path=ppt/slides/slide28.xml><?xml version="1.0" encoding="utf-8"?>
 <p:sld xmlns:a="http://schemas.openxmlformats.org/drawingml/2006/main" xmlns:r="http://schemas.openxmlformats.org/officeDocument/2006/relationships" xmlns:p="http://schemas.openxmlformats.org/presentationml/2006/main">
   <p:cSld>
     <p:spTree>
@@ -29249,7 +29856,7 @@
 </p:sld>
 </file>
 
-<file path=ppt/slides/slide28.xml><?xml version="1.0" encoding="utf-8"?>
+<file path=ppt/slides/slide29.xml><?xml version="1.0" encoding="utf-8"?>
 <p:sld xmlns:a="http://schemas.openxmlformats.org/drawingml/2006/main" xmlns:r="http://schemas.openxmlformats.org/officeDocument/2006/relationships" xmlns:p="http://schemas.openxmlformats.org/presentationml/2006/main" show="0">
   <p:cSld>
     <p:spTree>
@@ -31331,7 +31938,336 @@
 </p:sld>
 </file>
 
-<file path=ppt/slides/slide29.xml><?xml version="1.0" encoding="utf-8"?>
+<file path=ppt/slides/slide3.xml><?xml version="1.0" encoding="utf-8"?>
+<p:sld xmlns:a="http://schemas.openxmlformats.org/drawingml/2006/main" xmlns:r="http://schemas.openxmlformats.org/officeDocument/2006/relationships" xmlns:p="http://schemas.openxmlformats.org/presentationml/2006/main">
+  <p:cSld>
+    <p:spTree>
+      <p:nvGrpSpPr>
+        <p:cNvPr id="1" name=""/>
+        <p:cNvGrpSpPr/>
+        <p:nvPr/>
+      </p:nvGrpSpPr>
+      <p:grpSpPr>
+        <a:xfrm>
+          <a:off x="0" y="0"/>
+          <a:ext cx="0" cy="0"/>
+          <a:chOff x="0" y="0"/>
+          <a:chExt cx="0" cy="0"/>
+        </a:xfrm>
+      </p:grpSpPr>
+      <p:sp>
+        <p:nvSpPr>
+          <p:cNvPr id="2" name="Title 1"/>
+          <p:cNvSpPr>
+            <a:spLocks noGrp="1"/>
+          </p:cNvSpPr>
+          <p:nvPr>
+            <p:ph type="title"/>
+          </p:nvPr>
+        </p:nvSpPr>
+        <p:spPr/>
+        <p:txBody>
+          <a:bodyPr>
+            <a:normAutofit/>
+          </a:bodyPr>
+          <a:lstStyle/>
+          <a:p>
+            <a:r>
+              <a:rPr lang="en-US" sz="3600" dirty="0" smtClean="0"/>
+              <a:t>Machine Learning in Our Everyday Lives</a:t>
+            </a:r>
+            <a:endParaRPr lang="en-US" sz="3600" dirty="0"/>
+          </a:p>
+        </p:txBody>
+      </p:sp>
+      <p:sp>
+        <p:nvSpPr>
+          <p:cNvPr id="3" name="Content Placeholder 2"/>
+          <p:cNvSpPr>
+            <a:spLocks noGrp="1"/>
+          </p:cNvSpPr>
+          <p:nvPr>
+            <p:ph idx="1"/>
+          </p:nvPr>
+        </p:nvSpPr>
+        <p:spPr/>
+        <p:txBody>
+          <a:bodyPr/>
+          <a:lstStyle/>
+          <a:p>
+            <a:endParaRPr lang="en-US" dirty="0"/>
+          </a:p>
+        </p:txBody>
+      </p:sp>
+      <p:pic>
+        <p:nvPicPr>
+          <p:cNvPr id="4" name="Picture 3" descr="facebook_newsfeed.jpg"/>
+          <p:cNvPicPr>
+            <a:picLocks noChangeAspect="1"/>
+          </p:cNvPicPr>
+          <p:nvPr/>
+        </p:nvPicPr>
+        <p:blipFill>
+          <a:blip r:embed="rId3">
+            <a:extLst>
+              <a:ext uri="{28A0092B-C50C-407E-A947-70E740481C1C}">
+                <a14:useLocalDpi xmlns:a14="http://schemas.microsoft.com/office/drawing/2010/main" val="0"/>
+              </a:ext>
+            </a:extLst>
+          </a:blip>
+          <a:stretch>
+            <a:fillRect/>
+          </a:stretch>
+        </p:blipFill>
+        <p:spPr>
+          <a:xfrm>
+            <a:off x="257054" y="1252988"/>
+            <a:ext cx="3848709" cy="2799952"/>
+          </a:xfrm>
+          <a:prstGeom prst="rect">
+            <a:avLst/>
+          </a:prstGeom>
+        </p:spPr>
+      </p:pic>
+      <p:pic>
+        <p:nvPicPr>
+          <p:cNvPr id="5" name="Picture 4" descr="netflix_recs.png"/>
+          <p:cNvPicPr>
+            <a:picLocks noChangeAspect="1"/>
+          </p:cNvPicPr>
+          <p:nvPr/>
+        </p:nvPicPr>
+        <p:blipFill>
+          <a:blip r:embed="rId4">
+            <a:extLst>
+              <a:ext uri="{28A0092B-C50C-407E-A947-70E740481C1C}">
+                <a14:useLocalDpi xmlns:a14="http://schemas.microsoft.com/office/drawing/2010/main" val="0"/>
+              </a:ext>
+            </a:extLst>
+          </a:blip>
+          <a:stretch>
+            <a:fillRect/>
+          </a:stretch>
+        </p:blipFill>
+        <p:spPr>
+          <a:xfrm>
+            <a:off x="4257464" y="1264586"/>
+            <a:ext cx="4429336" cy="2788354"/>
+          </a:xfrm>
+          <a:prstGeom prst="rect">
+            <a:avLst/>
+          </a:prstGeom>
+        </p:spPr>
+      </p:pic>
+      <p:pic>
+        <p:nvPicPr>
+          <p:cNvPr id="6" name="Picture 5" descr="siri.jpg"/>
+          <p:cNvPicPr>
+            <a:picLocks noChangeAspect="1"/>
+          </p:cNvPicPr>
+          <p:nvPr/>
+        </p:nvPicPr>
+        <p:blipFill>
+          <a:blip r:embed="rId5">
+            <a:extLst>
+              <a:ext uri="{28A0092B-C50C-407E-A947-70E740481C1C}">
+                <a14:useLocalDpi xmlns:a14="http://schemas.microsoft.com/office/drawing/2010/main" val="0"/>
+              </a:ext>
+            </a:extLst>
+          </a:blip>
+          <a:stretch>
+            <a:fillRect/>
+          </a:stretch>
+        </p:blipFill>
+        <p:spPr>
+          <a:xfrm>
+            <a:off x="3314737" y="4187614"/>
+            <a:ext cx="2536159" cy="2536159"/>
+          </a:xfrm>
+          <a:prstGeom prst="rect">
+            <a:avLst/>
+          </a:prstGeom>
+        </p:spPr>
+      </p:pic>
+    </p:spTree>
+    <p:extLst>
+      <p:ext uri="{BB962C8B-B14F-4D97-AF65-F5344CB8AC3E}">
+        <p14:creationId xmlns:p14="http://schemas.microsoft.com/office/powerpoint/2010/main" val="402097278"/>
+      </p:ext>
+    </p:extLst>
+  </p:cSld>
+  <p:clrMapOvr>
+    <a:masterClrMapping/>
+  </p:clrMapOvr>
+  <p:timing>
+    <p:tnLst>
+      <p:par>
+        <p:cTn xmlns:p14="http://schemas.microsoft.com/office/powerpoint/2010/main" id="1" dur="indefinite" restart="never" nodeType="tmRoot">
+          <p:childTnLst>
+            <p:seq concurrent="1" nextAc="seek">
+              <p:cTn id="2" dur="indefinite" nodeType="mainSeq">
+                <p:childTnLst>
+                  <p:par>
+                    <p:cTn id="3" fill="hold">
+                      <p:stCondLst>
+                        <p:cond delay="indefinite"/>
+                      </p:stCondLst>
+                      <p:childTnLst>
+                        <p:par>
+                          <p:cTn id="4" fill="hold">
+                            <p:stCondLst>
+                              <p:cond delay="0"/>
+                            </p:stCondLst>
+                            <p:childTnLst>
+                              <p:par>
+                                <p:cTn id="5" presetID="1" presetClass="entr" presetSubtype="0" fill="hold" nodeType="clickEffect">
+                                  <p:stCondLst>
+                                    <p:cond delay="0"/>
+                                  </p:stCondLst>
+                                  <p:childTnLst>
+                                    <p:set>
+                                      <p:cBhvr>
+                                        <p:cTn id="6" dur="1" fill="hold">
+                                          <p:stCondLst>
+                                            <p:cond delay="0"/>
+                                          </p:stCondLst>
+                                        </p:cTn>
+                                        <p:tgtEl>
+                                          <p:spTgt spid="4"/>
+                                        </p:tgtEl>
+                                        <p:attrNameLst>
+                                          <p:attrName>style.visibility</p:attrName>
+                                        </p:attrNameLst>
+                                      </p:cBhvr>
+                                      <p:to>
+                                        <p:strVal val="visible"/>
+                                      </p:to>
+                                    </p:set>
+                                  </p:childTnLst>
+                                </p:cTn>
+                              </p:par>
+                            </p:childTnLst>
+                          </p:cTn>
+                        </p:par>
+                      </p:childTnLst>
+                    </p:cTn>
+                  </p:par>
+                  <p:par>
+                    <p:cTn id="7" fill="hold">
+                      <p:stCondLst>
+                        <p:cond delay="indefinite"/>
+                      </p:stCondLst>
+                      <p:childTnLst>
+                        <p:par>
+                          <p:cTn id="8" fill="hold">
+                            <p:stCondLst>
+                              <p:cond delay="0"/>
+                            </p:stCondLst>
+                            <p:childTnLst>
+                              <p:par>
+                                <p:cTn id="9" presetID="1" presetClass="entr" presetSubtype="0" fill="hold" nodeType="clickEffect">
+                                  <p:stCondLst>
+                                    <p:cond delay="0"/>
+                                  </p:stCondLst>
+                                  <p:childTnLst>
+                                    <p:set>
+                                      <p:cBhvr>
+                                        <p:cTn id="10" dur="1" fill="hold">
+                                          <p:stCondLst>
+                                            <p:cond delay="0"/>
+                                          </p:stCondLst>
+                                        </p:cTn>
+                                        <p:tgtEl>
+                                          <p:spTgt spid="5"/>
+                                        </p:tgtEl>
+                                        <p:attrNameLst>
+                                          <p:attrName>style.visibility</p:attrName>
+                                        </p:attrNameLst>
+                                      </p:cBhvr>
+                                      <p:to>
+                                        <p:strVal val="visible"/>
+                                      </p:to>
+                                    </p:set>
+                                  </p:childTnLst>
+                                </p:cTn>
+                              </p:par>
+                            </p:childTnLst>
+                          </p:cTn>
+                        </p:par>
+                      </p:childTnLst>
+                    </p:cTn>
+                  </p:par>
+                  <p:par>
+                    <p:cTn id="11" fill="hold">
+                      <p:stCondLst>
+                        <p:cond delay="indefinite"/>
+                      </p:stCondLst>
+                      <p:childTnLst>
+                        <p:par>
+                          <p:cTn id="12" fill="hold">
+                            <p:stCondLst>
+                              <p:cond delay="0"/>
+                            </p:stCondLst>
+                            <p:childTnLst>
+                              <p:par>
+                                <p:cTn id="13" presetID="1" presetClass="entr" presetSubtype="0" fill="hold" nodeType="clickEffect">
+                                  <p:stCondLst>
+                                    <p:cond delay="0"/>
+                                  </p:stCondLst>
+                                  <p:childTnLst>
+                                    <p:set>
+                                      <p:cBhvr>
+                                        <p:cTn id="14" dur="1" fill="hold">
+                                          <p:stCondLst>
+                                            <p:cond delay="0"/>
+                                          </p:stCondLst>
+                                        </p:cTn>
+                                        <p:tgtEl>
+                                          <p:spTgt spid="6"/>
+                                        </p:tgtEl>
+                                        <p:attrNameLst>
+                                          <p:attrName>style.visibility</p:attrName>
+                                        </p:attrNameLst>
+                                      </p:cBhvr>
+                                      <p:to>
+                                        <p:strVal val="visible"/>
+                                      </p:to>
+                                    </p:set>
+                                  </p:childTnLst>
+                                </p:cTn>
+                              </p:par>
+                            </p:childTnLst>
+                          </p:cTn>
+                        </p:par>
+                      </p:childTnLst>
+                    </p:cTn>
+                  </p:par>
+                </p:childTnLst>
+              </p:cTn>
+              <p:prevCondLst>
+                <p:cond evt="onPrev" delay="0">
+                  <p:tgtEl>
+                    <p:sldTgt/>
+                  </p:tgtEl>
+                </p:cond>
+              </p:prevCondLst>
+              <p:nextCondLst>
+                <p:cond evt="onNext" delay="0">
+                  <p:tgtEl>
+                    <p:sldTgt/>
+                  </p:tgtEl>
+                </p:cond>
+              </p:nextCondLst>
+            </p:seq>
+          </p:childTnLst>
+        </p:cTn>
+      </p:par>
+    </p:tnLst>
+  </p:timing>
+</p:sld>
+</file>
+
+<file path=ppt/slides/slide30.xml><?xml version="1.0" encoding="utf-8"?>
 <p:sld xmlns:a="http://schemas.openxmlformats.org/drawingml/2006/main" xmlns:r="http://schemas.openxmlformats.org/officeDocument/2006/relationships" xmlns:p="http://schemas.openxmlformats.org/presentationml/2006/main">
   <p:cSld>
     <p:spTree>
@@ -33858,336 +34794,7 @@
 </p:sld>
 </file>
 
-<file path=ppt/slides/slide3.xml><?xml version="1.0" encoding="utf-8"?>
-<p:sld xmlns:a="http://schemas.openxmlformats.org/drawingml/2006/main" xmlns:r="http://schemas.openxmlformats.org/officeDocument/2006/relationships" xmlns:p="http://schemas.openxmlformats.org/presentationml/2006/main">
-  <p:cSld>
-    <p:spTree>
-      <p:nvGrpSpPr>
-        <p:cNvPr id="1" name=""/>
-        <p:cNvGrpSpPr/>
-        <p:nvPr/>
-      </p:nvGrpSpPr>
-      <p:grpSpPr>
-        <a:xfrm>
-          <a:off x="0" y="0"/>
-          <a:ext cx="0" cy="0"/>
-          <a:chOff x="0" y="0"/>
-          <a:chExt cx="0" cy="0"/>
-        </a:xfrm>
-      </p:grpSpPr>
-      <p:sp>
-        <p:nvSpPr>
-          <p:cNvPr id="2" name="Title 1"/>
-          <p:cNvSpPr>
-            <a:spLocks noGrp="1"/>
-          </p:cNvSpPr>
-          <p:nvPr>
-            <p:ph type="title"/>
-          </p:nvPr>
-        </p:nvSpPr>
-        <p:spPr/>
-        <p:txBody>
-          <a:bodyPr>
-            <a:normAutofit/>
-          </a:bodyPr>
-          <a:lstStyle/>
-          <a:p>
-            <a:r>
-              <a:rPr lang="en-US" sz="3600" dirty="0" smtClean="0"/>
-              <a:t>Machine Learning in Our Everyday Lives</a:t>
-            </a:r>
-            <a:endParaRPr lang="en-US" sz="3600" dirty="0"/>
-          </a:p>
-        </p:txBody>
-      </p:sp>
-      <p:sp>
-        <p:nvSpPr>
-          <p:cNvPr id="3" name="Content Placeholder 2"/>
-          <p:cNvSpPr>
-            <a:spLocks noGrp="1"/>
-          </p:cNvSpPr>
-          <p:nvPr>
-            <p:ph idx="1"/>
-          </p:nvPr>
-        </p:nvSpPr>
-        <p:spPr/>
-        <p:txBody>
-          <a:bodyPr/>
-          <a:lstStyle/>
-          <a:p>
-            <a:endParaRPr lang="en-US" dirty="0"/>
-          </a:p>
-        </p:txBody>
-      </p:sp>
-      <p:pic>
-        <p:nvPicPr>
-          <p:cNvPr id="4" name="Picture 3" descr="facebook_newsfeed.jpg"/>
-          <p:cNvPicPr>
-            <a:picLocks noChangeAspect="1"/>
-          </p:cNvPicPr>
-          <p:nvPr/>
-        </p:nvPicPr>
-        <p:blipFill>
-          <a:blip r:embed="rId2">
-            <a:extLst>
-              <a:ext uri="{28A0092B-C50C-407E-A947-70E740481C1C}">
-                <a14:useLocalDpi xmlns:a14="http://schemas.microsoft.com/office/drawing/2010/main" val="0"/>
-              </a:ext>
-            </a:extLst>
-          </a:blip>
-          <a:stretch>
-            <a:fillRect/>
-          </a:stretch>
-        </p:blipFill>
-        <p:spPr>
-          <a:xfrm>
-            <a:off x="257054" y="1252988"/>
-            <a:ext cx="3848709" cy="2799952"/>
-          </a:xfrm>
-          <a:prstGeom prst="rect">
-            <a:avLst/>
-          </a:prstGeom>
-        </p:spPr>
-      </p:pic>
-      <p:pic>
-        <p:nvPicPr>
-          <p:cNvPr id="5" name="Picture 4" descr="netflix_recs.png"/>
-          <p:cNvPicPr>
-            <a:picLocks noChangeAspect="1"/>
-          </p:cNvPicPr>
-          <p:nvPr/>
-        </p:nvPicPr>
-        <p:blipFill>
-          <a:blip r:embed="rId3">
-            <a:extLst>
-              <a:ext uri="{28A0092B-C50C-407E-A947-70E740481C1C}">
-                <a14:useLocalDpi xmlns:a14="http://schemas.microsoft.com/office/drawing/2010/main" val="0"/>
-              </a:ext>
-            </a:extLst>
-          </a:blip>
-          <a:stretch>
-            <a:fillRect/>
-          </a:stretch>
-        </p:blipFill>
-        <p:spPr>
-          <a:xfrm>
-            <a:off x="4257464" y="1264586"/>
-            <a:ext cx="4429336" cy="2788354"/>
-          </a:xfrm>
-          <a:prstGeom prst="rect">
-            <a:avLst/>
-          </a:prstGeom>
-        </p:spPr>
-      </p:pic>
-      <p:pic>
-        <p:nvPicPr>
-          <p:cNvPr id="6" name="Picture 5" descr="siri.jpg"/>
-          <p:cNvPicPr>
-            <a:picLocks noChangeAspect="1"/>
-          </p:cNvPicPr>
-          <p:nvPr/>
-        </p:nvPicPr>
-        <p:blipFill>
-          <a:blip r:embed="rId4">
-            <a:extLst>
-              <a:ext uri="{28A0092B-C50C-407E-A947-70E740481C1C}">
-                <a14:useLocalDpi xmlns:a14="http://schemas.microsoft.com/office/drawing/2010/main" val="0"/>
-              </a:ext>
-            </a:extLst>
-          </a:blip>
-          <a:stretch>
-            <a:fillRect/>
-          </a:stretch>
-        </p:blipFill>
-        <p:spPr>
-          <a:xfrm>
-            <a:off x="3314737" y="4187614"/>
-            <a:ext cx="2536159" cy="2536159"/>
-          </a:xfrm>
-          <a:prstGeom prst="rect">
-            <a:avLst/>
-          </a:prstGeom>
-        </p:spPr>
-      </p:pic>
-    </p:spTree>
-    <p:extLst>
-      <p:ext uri="{BB962C8B-B14F-4D97-AF65-F5344CB8AC3E}">
-        <p14:creationId xmlns:p14="http://schemas.microsoft.com/office/powerpoint/2010/main" val="402097278"/>
-      </p:ext>
-    </p:extLst>
-  </p:cSld>
-  <p:clrMapOvr>
-    <a:masterClrMapping/>
-  </p:clrMapOvr>
-  <p:timing>
-    <p:tnLst>
-      <p:par>
-        <p:cTn xmlns:p14="http://schemas.microsoft.com/office/powerpoint/2010/main" id="1" dur="indefinite" restart="never" nodeType="tmRoot">
-          <p:childTnLst>
-            <p:seq concurrent="1" nextAc="seek">
-              <p:cTn id="2" dur="indefinite" nodeType="mainSeq">
-                <p:childTnLst>
-                  <p:par>
-                    <p:cTn id="3" fill="hold">
-                      <p:stCondLst>
-                        <p:cond delay="indefinite"/>
-                      </p:stCondLst>
-                      <p:childTnLst>
-                        <p:par>
-                          <p:cTn id="4" fill="hold">
-                            <p:stCondLst>
-                              <p:cond delay="0"/>
-                            </p:stCondLst>
-                            <p:childTnLst>
-                              <p:par>
-                                <p:cTn id="5" presetID="1" presetClass="entr" presetSubtype="0" fill="hold" nodeType="clickEffect">
-                                  <p:stCondLst>
-                                    <p:cond delay="0"/>
-                                  </p:stCondLst>
-                                  <p:childTnLst>
-                                    <p:set>
-                                      <p:cBhvr>
-                                        <p:cTn id="6" dur="1" fill="hold">
-                                          <p:stCondLst>
-                                            <p:cond delay="0"/>
-                                          </p:stCondLst>
-                                        </p:cTn>
-                                        <p:tgtEl>
-                                          <p:spTgt spid="4"/>
-                                        </p:tgtEl>
-                                        <p:attrNameLst>
-                                          <p:attrName>style.visibility</p:attrName>
-                                        </p:attrNameLst>
-                                      </p:cBhvr>
-                                      <p:to>
-                                        <p:strVal val="visible"/>
-                                      </p:to>
-                                    </p:set>
-                                  </p:childTnLst>
-                                </p:cTn>
-                              </p:par>
-                            </p:childTnLst>
-                          </p:cTn>
-                        </p:par>
-                      </p:childTnLst>
-                    </p:cTn>
-                  </p:par>
-                  <p:par>
-                    <p:cTn id="7" fill="hold">
-                      <p:stCondLst>
-                        <p:cond delay="indefinite"/>
-                      </p:stCondLst>
-                      <p:childTnLst>
-                        <p:par>
-                          <p:cTn id="8" fill="hold">
-                            <p:stCondLst>
-                              <p:cond delay="0"/>
-                            </p:stCondLst>
-                            <p:childTnLst>
-                              <p:par>
-                                <p:cTn id="9" presetID="1" presetClass="entr" presetSubtype="0" fill="hold" nodeType="clickEffect">
-                                  <p:stCondLst>
-                                    <p:cond delay="0"/>
-                                  </p:stCondLst>
-                                  <p:childTnLst>
-                                    <p:set>
-                                      <p:cBhvr>
-                                        <p:cTn id="10" dur="1" fill="hold">
-                                          <p:stCondLst>
-                                            <p:cond delay="0"/>
-                                          </p:stCondLst>
-                                        </p:cTn>
-                                        <p:tgtEl>
-                                          <p:spTgt spid="5"/>
-                                        </p:tgtEl>
-                                        <p:attrNameLst>
-                                          <p:attrName>style.visibility</p:attrName>
-                                        </p:attrNameLst>
-                                      </p:cBhvr>
-                                      <p:to>
-                                        <p:strVal val="visible"/>
-                                      </p:to>
-                                    </p:set>
-                                  </p:childTnLst>
-                                </p:cTn>
-                              </p:par>
-                            </p:childTnLst>
-                          </p:cTn>
-                        </p:par>
-                      </p:childTnLst>
-                    </p:cTn>
-                  </p:par>
-                  <p:par>
-                    <p:cTn id="11" fill="hold">
-                      <p:stCondLst>
-                        <p:cond delay="indefinite"/>
-                      </p:stCondLst>
-                      <p:childTnLst>
-                        <p:par>
-                          <p:cTn id="12" fill="hold">
-                            <p:stCondLst>
-                              <p:cond delay="0"/>
-                            </p:stCondLst>
-                            <p:childTnLst>
-                              <p:par>
-                                <p:cTn id="13" presetID="1" presetClass="entr" presetSubtype="0" fill="hold" nodeType="clickEffect">
-                                  <p:stCondLst>
-                                    <p:cond delay="0"/>
-                                  </p:stCondLst>
-                                  <p:childTnLst>
-                                    <p:set>
-                                      <p:cBhvr>
-                                        <p:cTn id="14" dur="1" fill="hold">
-                                          <p:stCondLst>
-                                            <p:cond delay="0"/>
-                                          </p:stCondLst>
-                                        </p:cTn>
-                                        <p:tgtEl>
-                                          <p:spTgt spid="6"/>
-                                        </p:tgtEl>
-                                        <p:attrNameLst>
-                                          <p:attrName>style.visibility</p:attrName>
-                                        </p:attrNameLst>
-                                      </p:cBhvr>
-                                      <p:to>
-                                        <p:strVal val="visible"/>
-                                      </p:to>
-                                    </p:set>
-                                  </p:childTnLst>
-                                </p:cTn>
-                              </p:par>
-                            </p:childTnLst>
-                          </p:cTn>
-                        </p:par>
-                      </p:childTnLst>
-                    </p:cTn>
-                  </p:par>
-                </p:childTnLst>
-              </p:cTn>
-              <p:prevCondLst>
-                <p:cond evt="onPrev" delay="0">
-                  <p:tgtEl>
-                    <p:sldTgt/>
-                  </p:tgtEl>
-                </p:cond>
-              </p:prevCondLst>
-              <p:nextCondLst>
-                <p:cond evt="onNext" delay="0">
-                  <p:tgtEl>
-                    <p:sldTgt/>
-                  </p:tgtEl>
-                </p:cond>
-              </p:nextCondLst>
-            </p:seq>
-          </p:childTnLst>
-        </p:cTn>
-      </p:par>
-    </p:tnLst>
-  </p:timing>
-</p:sld>
-</file>
-
-<file path=ppt/slides/slide30.xml><?xml version="1.0" encoding="utf-8"?>
+<file path=ppt/slides/slide31.xml><?xml version="1.0" encoding="utf-8"?>
 <p:sld xmlns:a="http://schemas.openxmlformats.org/drawingml/2006/main" xmlns:r="http://schemas.openxmlformats.org/officeDocument/2006/relationships" xmlns:p="http://schemas.openxmlformats.org/presentationml/2006/main">
   <p:cSld>
     <p:spTree>
@@ -34276,7 +34883,7 @@
 </p:sld>
 </file>
 
-<file path=ppt/slides/slide31.xml><?xml version="1.0" encoding="utf-8"?>
+<file path=ppt/slides/slide32.xml><?xml version="1.0" encoding="utf-8"?>
 <p:sld xmlns:a="http://schemas.openxmlformats.org/drawingml/2006/main" xmlns:r="http://schemas.openxmlformats.org/officeDocument/2006/relationships" xmlns:p="http://schemas.openxmlformats.org/presentationml/2006/main">
   <p:cSld>
     <p:spTree>
@@ -35481,7 +36088,7 @@
 </p:sld>
 </file>
 
-<file path=ppt/slides/slide32.xml><?xml version="1.0" encoding="utf-8"?>
+<file path=ppt/slides/slide33.xml><?xml version="1.0" encoding="utf-8"?>
 <p:sld xmlns:a="http://schemas.openxmlformats.org/drawingml/2006/main" xmlns:r="http://schemas.openxmlformats.org/officeDocument/2006/relationships" xmlns:p="http://schemas.openxmlformats.org/presentationml/2006/main" show="0">
   <p:cSld>
     <p:spTree>
@@ -35590,7 +36197,7 @@
 </p:sld>
 </file>
 
-<file path=ppt/slides/slide33.xml><?xml version="1.0" encoding="utf-8"?>
+<file path=ppt/slides/slide34.xml><?xml version="1.0" encoding="utf-8"?>
 <p:sld xmlns:a="http://schemas.openxmlformats.org/drawingml/2006/main" xmlns:r="http://schemas.openxmlformats.org/officeDocument/2006/relationships" xmlns:p="http://schemas.openxmlformats.org/presentationml/2006/main" show="0">
   <p:cSld>
     <p:spTree>
@@ -36479,7 +37086,7 @@
 </p:sld>
 </file>
 
-<file path=ppt/slides/slide34.xml><?xml version="1.0" encoding="utf-8"?>
+<file path=ppt/slides/slide35.xml><?xml version="1.0" encoding="utf-8"?>
 <p:sld xmlns:a="http://schemas.openxmlformats.org/drawingml/2006/main" xmlns:r="http://schemas.openxmlformats.org/officeDocument/2006/relationships" xmlns:p="http://schemas.openxmlformats.org/presentationml/2006/main">
   <p:cSld>
     <p:spTree>
@@ -36581,7 +37188,7 @@
 </p:sld>
 </file>
 
-<file path=ppt/slides/slide35.xml><?xml version="1.0" encoding="utf-8"?>
+<file path=ppt/slides/slide36.xml><?xml version="1.0" encoding="utf-8"?>
 <p:sld xmlns:a="http://schemas.openxmlformats.org/drawingml/2006/main" xmlns:r="http://schemas.openxmlformats.org/officeDocument/2006/relationships" xmlns:p="http://schemas.openxmlformats.org/presentationml/2006/main">
   <p:cSld>
     <p:spTree>
@@ -36820,7 +37427,7 @@
 </p:sld>
 </file>
 
-<file path=ppt/slides/slide36.xml><?xml version="1.0" encoding="utf-8"?>
+<file path=ppt/slides/slide37.xml><?xml version="1.0" encoding="utf-8"?>
 <p:sld xmlns:a="http://schemas.openxmlformats.org/drawingml/2006/main" xmlns:r="http://schemas.openxmlformats.org/officeDocument/2006/relationships" xmlns:p="http://schemas.openxmlformats.org/presentationml/2006/main">
   <p:cSld>
     <p:spTree>
@@ -38354,7 +38961,7 @@
 </p:sld>
 </file>
 
-<file path=ppt/slides/slide37.xml><?xml version="1.0" encoding="utf-8"?>
+<file path=ppt/slides/slide38.xml><?xml version="1.0" encoding="utf-8"?>
 <p:sld xmlns:a="http://schemas.openxmlformats.org/drawingml/2006/main" xmlns:r="http://schemas.openxmlformats.org/officeDocument/2006/relationships" xmlns:p="http://schemas.openxmlformats.org/presentationml/2006/main">
   <p:cSld>
     <p:spTree>
@@ -39346,7 +39953,7 @@
 </p:sld>
 </file>
 
-<file path=ppt/slides/slide38.xml><?xml version="1.0" encoding="utf-8"?>
+<file path=ppt/slides/slide39.xml><?xml version="1.0" encoding="utf-8"?>
 <p:sld xmlns:a="http://schemas.openxmlformats.org/drawingml/2006/main" xmlns:r="http://schemas.openxmlformats.org/officeDocument/2006/relationships" xmlns:p="http://schemas.openxmlformats.org/presentationml/2006/main">
   <p:cSld>
     <p:spTree>
@@ -39461,133 +40068,6 @@
   <p:clrMapOvr>
     <a:masterClrMapping/>
   </p:clrMapOvr>
-  <p:timing>
-    <p:tnLst>
-      <p:par>
-        <p:cTn xmlns:p14="http://schemas.microsoft.com/office/powerpoint/2010/main" id="1" dur="indefinite" restart="never" nodeType="tmRoot"/>
-      </p:par>
-    </p:tnLst>
-  </p:timing>
-</p:sld>
-</file>
-
-<file path=ppt/slides/slide39.xml><?xml version="1.0" encoding="utf-8"?>
-<p:sld xmlns:a="http://schemas.openxmlformats.org/drawingml/2006/main" xmlns:r="http://schemas.openxmlformats.org/officeDocument/2006/relationships" xmlns:p="http://schemas.openxmlformats.org/presentationml/2006/main" show="0">
-  <p:cSld>
-    <p:spTree>
-      <p:nvGrpSpPr>
-        <p:cNvPr id="1" name=""/>
-        <p:cNvGrpSpPr/>
-        <p:nvPr/>
-      </p:nvGrpSpPr>
-      <p:grpSpPr>
-        <a:xfrm>
-          <a:off x="0" y="0"/>
-          <a:ext cx="0" cy="0"/>
-          <a:chOff x="0" y="0"/>
-          <a:chExt cx="0" cy="0"/>
-        </a:xfrm>
-      </p:grpSpPr>
-      <p:sp>
-        <p:nvSpPr>
-          <p:cNvPr id="2" name="Title 1"/>
-          <p:cNvSpPr>
-            <a:spLocks noGrp="1"/>
-          </p:cNvSpPr>
-          <p:nvPr>
-            <p:ph type="title"/>
-          </p:nvPr>
-        </p:nvSpPr>
-        <p:spPr/>
-        <p:txBody>
-          <a:bodyPr/>
-          <a:lstStyle/>
-          <a:p>
-            <a:r>
-              <a:rPr lang="en-US" dirty="0" smtClean="0"/>
-              <a:t>Hands-on Examples</a:t>
-            </a:r>
-            <a:endParaRPr lang="en-US" dirty="0"/>
-          </a:p>
-        </p:txBody>
-      </p:sp>
-      <p:sp>
-        <p:nvSpPr>
-          <p:cNvPr id="3" name="Content Placeholder 2"/>
-          <p:cNvSpPr>
-            <a:spLocks noGrp="1"/>
-          </p:cNvSpPr>
-          <p:nvPr>
-            <p:ph idx="1"/>
-          </p:nvPr>
-        </p:nvSpPr>
-        <p:spPr/>
-        <p:txBody>
-          <a:bodyPr/>
-          <a:lstStyle/>
-          <a:p>
-            <a:pPr marL="0" indent="0">
-              <a:buNone/>
-            </a:pPr>
-            <a:r>
-              <a:rPr lang="en-US" b="1" dirty="0" smtClean="0"/>
-              <a:t>Medical Data Classification</a:t>
-            </a:r>
-          </a:p>
-          <a:p>
-            <a:pPr marL="0" indent="0">
-              <a:buNone/>
-            </a:pPr>
-            <a:r>
-              <a:rPr lang="en-US" dirty="0" smtClean="0"/>
-              <a:t>TODO: include link</a:t>
-            </a:r>
-            <a:endParaRPr lang="en-US" dirty="0"/>
-          </a:p>
-          <a:p>
-            <a:pPr marL="0" indent="0">
-              <a:buNone/>
-            </a:pPr>
-            <a:endParaRPr lang="en-US" dirty="0" smtClean="0"/>
-          </a:p>
-          <a:p>
-            <a:pPr marL="0" indent="0">
-              <a:buNone/>
-            </a:pPr>
-            <a:r>
-              <a:rPr lang="en-US" b="1" dirty="0" smtClean="0"/>
-              <a:t>Boston Housing Data Regression</a:t>
-            </a:r>
-          </a:p>
-          <a:p>
-            <a:pPr marL="0" indent="0">
-              <a:buNone/>
-            </a:pPr>
-            <a:r>
-              <a:rPr lang="en-US" dirty="0" smtClean="0"/>
-              <a:t>TODO: include link</a:t>
-            </a:r>
-          </a:p>
-        </p:txBody>
-      </p:sp>
-    </p:spTree>
-    <p:extLst>
-      <p:ext uri="{BB962C8B-B14F-4D97-AF65-F5344CB8AC3E}">
-        <p14:creationId xmlns:p14="http://schemas.microsoft.com/office/powerpoint/2010/main" val="666435960"/>
-      </p:ext>
-    </p:extLst>
-  </p:cSld>
-  <p:clrMapOvr>
-    <a:masterClrMapping/>
-  </p:clrMapOvr>
-  <mc:AlternateContent xmlns:mc="http://schemas.openxmlformats.org/markup-compatibility/2006">
-    <mc:Choice xmlns:p14="http://schemas.microsoft.com/office/powerpoint/2010/main" Requires="p14">
-      <p:transition spd="slow" p14:dur="2000"/>
-    </mc:Choice>
-    <mc:Fallback>
-      <p:transition xmlns:p14="http://schemas.microsoft.com/office/powerpoint/2010/main" spd="slow"/>
-    </mc:Fallback>
-  </mc:AlternateContent>
   <p:timing>
     <p:tnLst>
       <p:par>
@@ -39707,6 +40187,133 @@
 </file>
 
 <file path=ppt/slides/slide40.xml><?xml version="1.0" encoding="utf-8"?>
+<p:sld xmlns:a="http://schemas.openxmlformats.org/drawingml/2006/main" xmlns:r="http://schemas.openxmlformats.org/officeDocument/2006/relationships" xmlns:p="http://schemas.openxmlformats.org/presentationml/2006/main" show="0">
+  <p:cSld>
+    <p:spTree>
+      <p:nvGrpSpPr>
+        <p:cNvPr id="1" name=""/>
+        <p:cNvGrpSpPr/>
+        <p:nvPr/>
+      </p:nvGrpSpPr>
+      <p:grpSpPr>
+        <a:xfrm>
+          <a:off x="0" y="0"/>
+          <a:ext cx="0" cy="0"/>
+          <a:chOff x="0" y="0"/>
+          <a:chExt cx="0" cy="0"/>
+        </a:xfrm>
+      </p:grpSpPr>
+      <p:sp>
+        <p:nvSpPr>
+          <p:cNvPr id="2" name="Title 1"/>
+          <p:cNvSpPr>
+            <a:spLocks noGrp="1"/>
+          </p:cNvSpPr>
+          <p:nvPr>
+            <p:ph type="title"/>
+          </p:nvPr>
+        </p:nvSpPr>
+        <p:spPr/>
+        <p:txBody>
+          <a:bodyPr/>
+          <a:lstStyle/>
+          <a:p>
+            <a:r>
+              <a:rPr lang="en-US" dirty="0" smtClean="0"/>
+              <a:t>Hands-on Examples</a:t>
+            </a:r>
+            <a:endParaRPr lang="en-US" dirty="0"/>
+          </a:p>
+        </p:txBody>
+      </p:sp>
+      <p:sp>
+        <p:nvSpPr>
+          <p:cNvPr id="3" name="Content Placeholder 2"/>
+          <p:cNvSpPr>
+            <a:spLocks noGrp="1"/>
+          </p:cNvSpPr>
+          <p:nvPr>
+            <p:ph idx="1"/>
+          </p:nvPr>
+        </p:nvSpPr>
+        <p:spPr/>
+        <p:txBody>
+          <a:bodyPr/>
+          <a:lstStyle/>
+          <a:p>
+            <a:pPr marL="0" indent="0">
+              <a:buNone/>
+            </a:pPr>
+            <a:r>
+              <a:rPr lang="en-US" b="1" dirty="0" smtClean="0"/>
+              <a:t>Medical Data Classification</a:t>
+            </a:r>
+          </a:p>
+          <a:p>
+            <a:pPr marL="0" indent="0">
+              <a:buNone/>
+            </a:pPr>
+            <a:r>
+              <a:rPr lang="en-US" dirty="0" smtClean="0"/>
+              <a:t>TODO: include link</a:t>
+            </a:r>
+            <a:endParaRPr lang="en-US" dirty="0"/>
+          </a:p>
+          <a:p>
+            <a:pPr marL="0" indent="0">
+              <a:buNone/>
+            </a:pPr>
+            <a:endParaRPr lang="en-US" dirty="0" smtClean="0"/>
+          </a:p>
+          <a:p>
+            <a:pPr marL="0" indent="0">
+              <a:buNone/>
+            </a:pPr>
+            <a:r>
+              <a:rPr lang="en-US" b="1" dirty="0" smtClean="0"/>
+              <a:t>Boston Housing Data Regression</a:t>
+            </a:r>
+          </a:p>
+          <a:p>
+            <a:pPr marL="0" indent="0">
+              <a:buNone/>
+            </a:pPr>
+            <a:r>
+              <a:rPr lang="en-US" dirty="0" smtClean="0"/>
+              <a:t>TODO: include link</a:t>
+            </a:r>
+          </a:p>
+        </p:txBody>
+      </p:sp>
+    </p:spTree>
+    <p:extLst>
+      <p:ext uri="{BB962C8B-B14F-4D97-AF65-F5344CB8AC3E}">
+        <p14:creationId xmlns:p14="http://schemas.microsoft.com/office/powerpoint/2010/main" val="666435960"/>
+      </p:ext>
+    </p:extLst>
+  </p:cSld>
+  <p:clrMapOvr>
+    <a:masterClrMapping/>
+  </p:clrMapOvr>
+  <mc:AlternateContent xmlns:mc="http://schemas.openxmlformats.org/markup-compatibility/2006">
+    <mc:Choice xmlns:p14="http://schemas.microsoft.com/office/powerpoint/2010/main" Requires="p14">
+      <p:transition spd="slow" p14:dur="2000"/>
+    </mc:Choice>
+    <mc:Fallback>
+      <p:transition xmlns:p14="http://schemas.microsoft.com/office/powerpoint/2010/main" spd="slow"/>
+    </mc:Fallback>
+  </mc:AlternateContent>
+  <p:timing>
+    <p:tnLst>
+      <p:par>
+        <p:cTn xmlns:p14="http://schemas.microsoft.com/office/powerpoint/2010/main" id="1" dur="indefinite" restart="never" nodeType="tmRoot"/>
+      </p:par>
+    </p:tnLst>
+  </p:timing>
+</p:sld>
+</file>
+
+<file path=ppt/slides/slide41.xml><?xml version="1.0" encoding="utf-8"?>
 <p:sld xmlns:a="http://schemas.openxmlformats.org/drawingml/2006/main" xmlns:r="http://schemas.openxmlformats.org/officeDocument/2006/relationships" xmlns:p="http://schemas.openxmlformats.org/presentationml/2006/main">
   <p:cSld>
     <p:spTree>
@@ -39928,117 +40535,6 @@
   <p:clrMapOvr>
     <a:masterClrMapping/>
   </p:clrMapOvr>
-  <p:timing>
-    <p:tnLst>
-      <p:par>
-        <p:cTn xmlns:p14="http://schemas.microsoft.com/office/powerpoint/2010/main" id="1" dur="indefinite" restart="never" nodeType="tmRoot"/>
-      </p:par>
-    </p:tnLst>
-  </p:timing>
-</p:sld>
-</file>
-
-<file path=ppt/slides/slide41.xml><?xml version="1.0" encoding="utf-8"?>
-<p:sld xmlns:a="http://schemas.openxmlformats.org/drawingml/2006/main" xmlns:r="http://schemas.openxmlformats.org/officeDocument/2006/relationships" xmlns:p="http://schemas.openxmlformats.org/presentationml/2006/main" show="0">
-  <p:cSld>
-    <p:spTree>
-      <p:nvGrpSpPr>
-        <p:cNvPr id="1" name=""/>
-        <p:cNvGrpSpPr/>
-        <p:nvPr/>
-      </p:nvGrpSpPr>
-      <p:grpSpPr>
-        <a:xfrm>
-          <a:off x="0" y="0"/>
-          <a:ext cx="0" cy="0"/>
-          <a:chOff x="0" y="0"/>
-          <a:chExt cx="0" cy="0"/>
-        </a:xfrm>
-      </p:grpSpPr>
-      <p:sp>
-        <p:nvSpPr>
-          <p:cNvPr id="2" name="Title 1"/>
-          <p:cNvSpPr>
-            <a:spLocks noGrp="1"/>
-          </p:cNvSpPr>
-          <p:nvPr>
-            <p:ph type="title"/>
-          </p:nvPr>
-        </p:nvSpPr>
-        <p:spPr/>
-        <p:txBody>
-          <a:bodyPr/>
-          <a:lstStyle/>
-          <a:p>
-            <a:r>
-              <a:rPr lang="en-US" dirty="0" smtClean="0"/>
-              <a:t>What We Didn’t Teach You</a:t>
-            </a:r>
-            <a:endParaRPr lang="en-US" dirty="0"/>
-          </a:p>
-        </p:txBody>
-      </p:sp>
-      <p:sp>
-        <p:nvSpPr>
-          <p:cNvPr id="3" name="Content Placeholder 2"/>
-          <p:cNvSpPr>
-            <a:spLocks noGrp="1"/>
-          </p:cNvSpPr>
-          <p:nvPr>
-            <p:ph idx="1"/>
-          </p:nvPr>
-        </p:nvSpPr>
-        <p:spPr/>
-        <p:txBody>
-          <a:bodyPr/>
-          <a:lstStyle/>
-          <a:p>
-            <a:r>
-              <a:rPr lang="en-US" dirty="0" smtClean="0"/>
-              <a:t>TODO</a:t>
-            </a:r>
-          </a:p>
-          <a:p>
-            <a:endParaRPr lang="en-US" dirty="0"/>
-          </a:p>
-          <a:p>
-            <a:r>
-              <a:rPr lang="en-US" dirty="0" smtClean="0"/>
-              <a:t>How a model actually works (The math behind how you train and use a model)</a:t>
-            </a:r>
-          </a:p>
-          <a:p>
-            <a:r>
-              <a:rPr lang="en-US" dirty="0" smtClean="0"/>
-              <a:t>There are lots of different models out there, and they all have flaws.</a:t>
-            </a:r>
-          </a:p>
-          <a:p>
-            <a:endParaRPr lang="en-US" dirty="0"/>
-          </a:p>
-          <a:p>
-            <a:endParaRPr lang="en-US" dirty="0"/>
-          </a:p>
-        </p:txBody>
-      </p:sp>
-    </p:spTree>
-    <p:extLst>
-      <p:ext uri="{BB962C8B-B14F-4D97-AF65-F5344CB8AC3E}">
-        <p14:creationId xmlns:p14="http://schemas.microsoft.com/office/powerpoint/2010/main" val="275283733"/>
-      </p:ext>
-    </p:extLst>
-  </p:cSld>
-  <p:clrMapOvr>
-    <a:masterClrMapping/>
-  </p:clrMapOvr>
-  <mc:AlternateContent xmlns:mc="http://schemas.openxmlformats.org/markup-compatibility/2006">
-    <mc:Choice xmlns:p14="http://schemas.microsoft.com/office/powerpoint/2010/main" Requires="p14">
-      <p:transition spd="slow" p14:dur="2000"/>
-    </mc:Choice>
-    <mc:Fallback>
-      <p:transition xmlns:p14="http://schemas.microsoft.com/office/powerpoint/2010/main" spd="slow"/>
-    </mc:Fallback>
-  </mc:AlternateContent>
   <p:timing>
     <p:tnLst>
       <p:par>
@@ -40083,6 +40579,117 @@
           <a:p>
             <a:r>
               <a:rPr lang="en-US" dirty="0" smtClean="0"/>
+              <a:t>What We Didn’t Teach You</a:t>
+            </a:r>
+            <a:endParaRPr lang="en-US" dirty="0"/>
+          </a:p>
+        </p:txBody>
+      </p:sp>
+      <p:sp>
+        <p:nvSpPr>
+          <p:cNvPr id="3" name="Content Placeholder 2"/>
+          <p:cNvSpPr>
+            <a:spLocks noGrp="1"/>
+          </p:cNvSpPr>
+          <p:nvPr>
+            <p:ph idx="1"/>
+          </p:nvPr>
+        </p:nvSpPr>
+        <p:spPr/>
+        <p:txBody>
+          <a:bodyPr/>
+          <a:lstStyle/>
+          <a:p>
+            <a:r>
+              <a:rPr lang="en-US" dirty="0" smtClean="0"/>
+              <a:t>TODO</a:t>
+            </a:r>
+          </a:p>
+          <a:p>
+            <a:endParaRPr lang="en-US" dirty="0"/>
+          </a:p>
+          <a:p>
+            <a:r>
+              <a:rPr lang="en-US" dirty="0" smtClean="0"/>
+              <a:t>How a model actually works (The math behind how you train and use a model)</a:t>
+            </a:r>
+          </a:p>
+          <a:p>
+            <a:r>
+              <a:rPr lang="en-US" dirty="0" smtClean="0"/>
+              <a:t>There are lots of different models out there, and they all have flaws.</a:t>
+            </a:r>
+          </a:p>
+          <a:p>
+            <a:endParaRPr lang="en-US" dirty="0"/>
+          </a:p>
+          <a:p>
+            <a:endParaRPr lang="en-US" dirty="0"/>
+          </a:p>
+        </p:txBody>
+      </p:sp>
+    </p:spTree>
+    <p:extLst>
+      <p:ext uri="{BB962C8B-B14F-4D97-AF65-F5344CB8AC3E}">
+        <p14:creationId xmlns:p14="http://schemas.microsoft.com/office/powerpoint/2010/main" val="275283733"/>
+      </p:ext>
+    </p:extLst>
+  </p:cSld>
+  <p:clrMapOvr>
+    <a:masterClrMapping/>
+  </p:clrMapOvr>
+  <mc:AlternateContent xmlns:mc="http://schemas.openxmlformats.org/markup-compatibility/2006">
+    <mc:Choice xmlns:p14="http://schemas.microsoft.com/office/powerpoint/2010/main" Requires="p14">
+      <p:transition spd="slow" p14:dur="2000"/>
+    </mc:Choice>
+    <mc:Fallback>
+      <p:transition xmlns:p14="http://schemas.microsoft.com/office/powerpoint/2010/main" spd="slow"/>
+    </mc:Fallback>
+  </mc:AlternateContent>
+  <p:timing>
+    <p:tnLst>
+      <p:par>
+        <p:cTn xmlns:p14="http://schemas.microsoft.com/office/powerpoint/2010/main" id="1" dur="indefinite" restart="never" nodeType="tmRoot"/>
+      </p:par>
+    </p:tnLst>
+  </p:timing>
+</p:sld>
+</file>
+
+<file path=ppt/slides/slide43.xml><?xml version="1.0" encoding="utf-8"?>
+<p:sld xmlns:a="http://schemas.openxmlformats.org/drawingml/2006/main" xmlns:r="http://schemas.openxmlformats.org/officeDocument/2006/relationships" xmlns:p="http://schemas.openxmlformats.org/presentationml/2006/main" show="0">
+  <p:cSld>
+    <p:spTree>
+      <p:nvGrpSpPr>
+        <p:cNvPr id="1" name=""/>
+        <p:cNvGrpSpPr/>
+        <p:nvPr/>
+      </p:nvGrpSpPr>
+      <p:grpSpPr>
+        <a:xfrm>
+          <a:off x="0" y="0"/>
+          <a:ext cx="0" cy="0"/>
+          <a:chOff x="0" y="0"/>
+          <a:chExt cx="0" cy="0"/>
+        </a:xfrm>
+      </p:grpSpPr>
+      <p:sp>
+        <p:nvSpPr>
+          <p:cNvPr id="2" name="Title 1"/>
+          <p:cNvSpPr>
+            <a:spLocks noGrp="1"/>
+          </p:cNvSpPr>
+          <p:nvPr>
+            <p:ph type="title"/>
+          </p:nvPr>
+        </p:nvSpPr>
+        <p:spPr/>
+        <p:txBody>
+          <a:bodyPr/>
+          <a:lstStyle/>
+          <a:p>
+            <a:r>
+              <a:rPr lang="en-US" dirty="0" smtClean="0"/>
               <a:t>Want to Learn More?</a:t>
             </a:r>
             <a:endParaRPr lang="en-US" dirty="0"/>
@@ -40232,7 +40839,7 @@
 </p:sld>
 </file>
 
-<file path=ppt/slides/slide43.xml><?xml version="1.0" encoding="utf-8"?>
+<file path=ppt/slides/slide44.xml><?xml version="1.0" encoding="utf-8"?>
 <p:sld xmlns:a="http://schemas.openxmlformats.org/drawingml/2006/main" xmlns:r="http://schemas.openxmlformats.org/officeDocument/2006/relationships" xmlns:p="http://schemas.openxmlformats.org/presentationml/2006/main">
   <p:cSld>
     <p:spTree>
@@ -40602,7 +41209,7 @@
             <p:nvPr/>
           </p:nvPicPr>
           <p:blipFill rotWithShape="1">
-            <a:blip r:embed="rId2">
+            <a:blip r:embed="rId3">
               <a:extLst>
                 <a:ext uri="{28A0092B-C50C-407E-A947-70E740481C1C}">
                   <a14:useLocalDpi xmlns:a14="http://schemas.microsoft.com/office/drawing/2010/main" val="0"/>
@@ -40866,25 +41473,6 @@
           </a:p>
         </p:txBody>
       </p:sp>
-      <p:sp>
-        <p:nvSpPr>
-          <p:cNvPr id="3" name="Content Placeholder 2"/>
-          <p:cNvSpPr>
-            <a:spLocks noGrp="1"/>
-          </p:cNvSpPr>
-          <p:nvPr>
-            <p:ph idx="1"/>
-          </p:nvPr>
-        </p:nvSpPr>
-        <p:spPr/>
-        <p:txBody>
-          <a:bodyPr/>
-          <a:lstStyle/>
-          <a:p>
-            <a:endParaRPr lang="en-US"/>
-          </a:p>
-        </p:txBody>
-      </p:sp>
       <p:pic>
         <p:nvPicPr>
           <p:cNvPr id="5" name="Picture 4" descr="supervised learning v2.png"/>
@@ -40907,8 +41495,8 @@
         </p:blipFill>
         <p:spPr>
           <a:xfrm>
-            <a:off x="1914071" y="2827382"/>
-            <a:ext cx="5442857" cy="1378857"/>
+            <a:off x="927954" y="2498676"/>
+            <a:ext cx="7299498" cy="1849206"/>
           </a:xfrm>
           <a:prstGeom prst="rect">
             <a:avLst/>
@@ -41104,46 +41692,9 @@
           <p:nvPr/>
         </p:nvCxnSpPr>
         <p:spPr>
-          <a:xfrm flipH="1" flipV="1">
-            <a:off x="2191324" y="4352357"/>
-            <a:ext cx="631902" cy="636965"/>
-          </a:xfrm>
-          <a:prstGeom prst="straightConnector1">
-            <a:avLst/>
-          </a:prstGeom>
-          <a:ln w="76200" cmpd="sng">
-            <a:solidFill>
-              <a:srgbClr val="FF0000"/>
-            </a:solidFill>
-            <a:tailEnd type="triangle"/>
-          </a:ln>
-          <a:effectLst/>
-        </p:spPr>
-        <p:style>
-          <a:lnRef idx="2">
-            <a:schemeClr val="accent1"/>
-          </a:lnRef>
-          <a:fillRef idx="0">
-            <a:schemeClr val="accent1"/>
-          </a:fillRef>
-          <a:effectRef idx="1">
-            <a:schemeClr val="accent1"/>
-          </a:effectRef>
-          <a:fontRef idx="minor">
-            <a:schemeClr val="tx1"/>
-          </a:fontRef>
-        </p:style>
-      </p:cxnSp>
-      <p:cxnSp>
-        <p:nvCxnSpPr>
-          <p:cNvPr id="7" name="Straight Arrow Connector 6"/>
-          <p:cNvCxnSpPr/>
-          <p:nvPr/>
-        </p:nvCxnSpPr>
-        <p:spPr>
           <a:xfrm flipV="1">
-            <a:off x="3298277" y="4352357"/>
-            <a:ext cx="0" cy="700369"/>
+            <a:off x="1529540" y="4341058"/>
+            <a:ext cx="0" cy="711668"/>
           </a:xfrm>
           <a:prstGeom prst="straightConnector1">
             <a:avLst/>
@@ -41216,51 +41767,6 @@
                                         </p:cTn>
                                         <p:tgtEl>
                                           <p:spTgt spid="6"/>
-                                        </p:tgtEl>
-                                        <p:attrNameLst>
-                                          <p:attrName>style.visibility</p:attrName>
-                                        </p:attrNameLst>
-                                      </p:cBhvr>
-                                      <p:to>
-                                        <p:strVal val="visible"/>
-                                      </p:to>
-                                    </p:set>
-                                  </p:childTnLst>
-                                </p:cTn>
-                              </p:par>
-                            </p:childTnLst>
-                          </p:cTn>
-                        </p:par>
-                      </p:childTnLst>
-                    </p:cTn>
-                  </p:par>
-                  <p:par>
-                    <p:cTn id="7" fill="hold">
-                      <p:stCondLst>
-                        <p:cond delay="indefinite"/>
-                      </p:stCondLst>
-                      <p:childTnLst>
-                        <p:par>
-                          <p:cTn id="8" fill="hold">
-                            <p:stCondLst>
-                              <p:cond delay="0"/>
-                            </p:stCondLst>
-                            <p:childTnLst>
-                              <p:par>
-                                <p:cTn id="9" presetID="1" presetClass="entr" presetSubtype="0" fill="hold" nodeType="clickEffect">
-                                  <p:stCondLst>
-                                    <p:cond delay="0"/>
-                                  </p:stCondLst>
-                                  <p:childTnLst>
-                                    <p:set>
-                                      <p:cBhvr>
-                                        <p:cTn id="10" dur="1" fill="hold">
-                                          <p:stCondLst>
-                                            <p:cond delay="0"/>
-                                          </p:stCondLst>
-                                        </p:cTn>
-                                        <p:tgtEl>
-                                          <p:spTgt spid="7"/>
                                         </p:tgtEl>
                                         <p:attrNameLst>
                                           <p:attrName>style.visibility</p:attrName>
@@ -42194,674 +42700,659 @@
           </a:p>
         </p:txBody>
       </p:sp>
+      <p:cxnSp>
+        <p:nvCxnSpPr>
+          <p:cNvPr id="5" name="Straight Arrow Connector 4"/>
+          <p:cNvCxnSpPr/>
+          <p:nvPr/>
+        </p:nvCxnSpPr>
+        <p:spPr>
+          <a:xfrm>
+            <a:off x="2734458" y="1593573"/>
+            <a:ext cx="0" cy="2928471"/>
+          </a:xfrm>
+          <a:prstGeom prst="straightConnector1">
+            <a:avLst/>
+          </a:prstGeom>
+          <a:ln>
+            <a:solidFill>
+              <a:schemeClr val="tx1"/>
+            </a:solidFill>
+            <a:headEnd type="triangle"/>
+            <a:tailEnd type="none"/>
+          </a:ln>
+          <a:effectLst/>
+        </p:spPr>
+        <p:style>
+          <a:lnRef idx="2">
+            <a:schemeClr val="accent1"/>
+          </a:lnRef>
+          <a:fillRef idx="0">
+            <a:schemeClr val="accent1"/>
+          </a:fillRef>
+          <a:effectRef idx="1">
+            <a:schemeClr val="accent1"/>
+          </a:effectRef>
+          <a:fontRef idx="minor">
+            <a:schemeClr val="tx1"/>
+          </a:fontRef>
+        </p:style>
+      </p:cxnSp>
+      <p:cxnSp>
+        <p:nvCxnSpPr>
+          <p:cNvPr id="7" name="Straight Arrow Connector 6"/>
+          <p:cNvCxnSpPr/>
+          <p:nvPr/>
+        </p:nvCxnSpPr>
+        <p:spPr>
+          <a:xfrm flipV="1">
+            <a:off x="2734458" y="4507102"/>
+            <a:ext cx="3824941" cy="18655"/>
+          </a:xfrm>
+          <a:prstGeom prst="straightConnector1">
+            <a:avLst/>
+          </a:prstGeom>
+          <a:ln>
+            <a:solidFill>
+              <a:schemeClr val="tx1"/>
+            </a:solidFill>
+            <a:tailEnd type="arrow"/>
+          </a:ln>
+          <a:effectLst/>
+        </p:spPr>
+        <p:style>
+          <a:lnRef idx="2">
+            <a:schemeClr val="accent1"/>
+          </a:lnRef>
+          <a:fillRef idx="0">
+            <a:schemeClr val="accent1"/>
+          </a:fillRef>
+          <a:effectRef idx="1">
+            <a:schemeClr val="accent1"/>
+          </a:effectRef>
+          <a:fontRef idx="minor">
+            <a:schemeClr val="tx1"/>
+          </a:fontRef>
+        </p:style>
+      </p:cxnSp>
       <p:grpSp>
         <p:nvGrpSpPr>
-          <p:cNvPr id="3" name="Group 2"/>
+          <p:cNvPr id="70" name="Group 69"/>
           <p:cNvGrpSpPr/>
           <p:nvPr/>
         </p:nvGrpSpPr>
         <p:grpSpPr>
           <a:xfrm>
-            <a:off x="2734458" y="1593573"/>
-            <a:ext cx="3824941" cy="2932184"/>
-            <a:chOff x="2734458" y="1593573"/>
-            <a:chExt cx="3824941" cy="2932184"/>
+            <a:off x="3176180" y="1667019"/>
+            <a:ext cx="2708676" cy="2460762"/>
+            <a:chOff x="3176180" y="1667019"/>
+            <a:chExt cx="2708676" cy="2460762"/>
           </a:xfrm>
         </p:grpSpPr>
-        <p:cxnSp>
-          <p:nvCxnSpPr>
-            <p:cNvPr id="5" name="Straight Arrow Connector 4"/>
-            <p:cNvCxnSpPr/>
+        <p:sp>
+          <p:nvSpPr>
+            <p:cNvPr id="10" name="Oval 9"/>
+            <p:cNvSpPr>
+              <a:spLocks/>
+            </p:cNvSpPr>
             <p:nvPr/>
-          </p:nvCxnSpPr>
+          </p:nvSpPr>
           <p:spPr>
             <a:xfrm>
-              <a:off x="2734458" y="1593573"/>
-              <a:ext cx="0" cy="2928471"/>
+              <a:off x="4000680" y="2307849"/>
+              <a:ext cx="230904" cy="228600"/>
             </a:xfrm>
-            <a:prstGeom prst="straightConnector1">
+            <a:prstGeom prst="ellipse">
               <a:avLst/>
             </a:prstGeom>
+            <a:solidFill>
+              <a:schemeClr val="accent3"/>
+            </a:solidFill>
             <a:ln>
-              <a:solidFill>
-                <a:schemeClr val="tx1"/>
-              </a:solidFill>
-              <a:headEnd type="triangle"/>
-              <a:tailEnd type="none"/>
+              <a:noFill/>
             </a:ln>
             <a:effectLst/>
           </p:spPr>
           <p:style>
-            <a:lnRef idx="2">
+            <a:lnRef idx="1">
               <a:schemeClr val="accent1"/>
             </a:lnRef>
-            <a:fillRef idx="0">
+            <a:fillRef idx="3">
               <a:schemeClr val="accent1"/>
             </a:fillRef>
-            <a:effectRef idx="1">
+            <a:effectRef idx="2">
               <a:schemeClr val="accent1"/>
             </a:effectRef>
             <a:fontRef idx="minor">
-              <a:schemeClr val="tx1"/>
+              <a:schemeClr val="lt1"/>
             </a:fontRef>
           </p:style>
-        </p:cxnSp>
-        <p:cxnSp>
-          <p:nvCxnSpPr>
-            <p:cNvPr id="7" name="Straight Arrow Connector 6"/>
-            <p:cNvCxnSpPr/>
+          <p:txBody>
+            <a:bodyPr rtlCol="0" anchor="ctr"/>
+            <a:lstStyle/>
+            <a:p>
+              <a:pPr algn="ctr"/>
+              <a:endParaRPr lang="en-US"/>
+            </a:p>
+          </p:txBody>
+        </p:sp>
+        <p:sp>
+          <p:nvSpPr>
+            <p:cNvPr id="12" name="Oval 11"/>
+            <p:cNvSpPr>
+              <a:spLocks/>
+            </p:cNvSpPr>
             <p:nvPr/>
-          </p:nvCxnSpPr>
+          </p:nvSpPr>
           <p:spPr>
-            <a:xfrm flipV="1">
-              <a:off x="2734458" y="4507102"/>
-              <a:ext cx="3824941" cy="18655"/>
+            <a:xfrm>
+              <a:off x="4515772" y="3289581"/>
+              <a:ext cx="230904" cy="228600"/>
             </a:xfrm>
-            <a:prstGeom prst="straightConnector1">
+            <a:prstGeom prst="ellipse">
               <a:avLst/>
             </a:prstGeom>
+            <a:solidFill>
+              <a:schemeClr val="accent3"/>
+            </a:solidFill>
             <a:ln>
-              <a:solidFill>
-                <a:schemeClr val="tx1"/>
-              </a:solidFill>
-              <a:tailEnd type="arrow"/>
+              <a:noFill/>
             </a:ln>
             <a:effectLst/>
           </p:spPr>
           <p:style>
-            <a:lnRef idx="2">
+            <a:lnRef idx="1">
               <a:schemeClr val="accent1"/>
             </a:lnRef>
-            <a:fillRef idx="0">
+            <a:fillRef idx="3">
               <a:schemeClr val="accent1"/>
             </a:fillRef>
-            <a:effectRef idx="1">
+            <a:effectRef idx="2">
               <a:schemeClr val="accent1"/>
             </a:effectRef>
             <a:fontRef idx="minor">
-              <a:schemeClr val="tx1"/>
+              <a:schemeClr val="lt1"/>
             </a:fontRef>
           </p:style>
-        </p:cxnSp>
-        <p:grpSp>
-          <p:nvGrpSpPr>
-            <p:cNvPr id="70" name="Group 69"/>
-            <p:cNvGrpSpPr/>
+          <p:txBody>
+            <a:bodyPr rtlCol="0" anchor="ctr"/>
+            <a:lstStyle/>
+            <a:p>
+              <a:pPr algn="ctr"/>
+              <a:endParaRPr lang="en-US"/>
+            </a:p>
+          </p:txBody>
+        </p:sp>
+        <p:sp>
+          <p:nvSpPr>
+            <p:cNvPr id="13" name="Oval 12"/>
+            <p:cNvSpPr>
+              <a:spLocks/>
+            </p:cNvSpPr>
             <p:nvPr/>
-          </p:nvGrpSpPr>
-          <p:grpSpPr>
+          </p:nvSpPr>
+          <p:spPr>
             <a:xfrm>
-              <a:off x="3176180" y="1667019"/>
-              <a:ext cx="2708676" cy="2460762"/>
-              <a:chOff x="3176180" y="1667019"/>
-              <a:chExt cx="2708676" cy="2460762"/>
+              <a:off x="4794156" y="2887331"/>
+              <a:ext cx="230904" cy="228600"/>
             </a:xfrm>
-          </p:grpSpPr>
-          <p:sp>
-            <p:nvSpPr>
-              <p:cNvPr id="10" name="Oval 9"/>
-              <p:cNvSpPr>
-                <a:spLocks/>
-              </p:cNvSpPr>
-              <p:nvPr/>
-            </p:nvSpPr>
-            <p:spPr>
-              <a:xfrm>
-                <a:off x="4000680" y="2307849"/>
-                <a:ext cx="230904" cy="228600"/>
-              </a:xfrm>
-              <a:prstGeom prst="ellipse">
-                <a:avLst/>
-              </a:prstGeom>
-              <a:solidFill>
-                <a:schemeClr val="accent3"/>
-              </a:solidFill>
-              <a:ln>
-                <a:noFill/>
-              </a:ln>
-              <a:effectLst/>
-            </p:spPr>
-            <p:style>
-              <a:lnRef idx="1">
-                <a:schemeClr val="accent1"/>
-              </a:lnRef>
-              <a:fillRef idx="3">
-                <a:schemeClr val="accent1"/>
-              </a:fillRef>
-              <a:effectRef idx="2">
-                <a:schemeClr val="accent1"/>
-              </a:effectRef>
-              <a:fontRef idx="minor">
-                <a:schemeClr val="lt1"/>
-              </a:fontRef>
-            </p:style>
-            <p:txBody>
-              <a:bodyPr rtlCol="0" anchor="ctr"/>
-              <a:lstStyle/>
-              <a:p>
-                <a:pPr algn="ctr"/>
-                <a:endParaRPr lang="en-US"/>
-              </a:p>
-            </p:txBody>
-          </p:sp>
-          <p:sp>
-            <p:nvSpPr>
-              <p:cNvPr id="12" name="Oval 11"/>
-              <p:cNvSpPr>
-                <a:spLocks/>
-              </p:cNvSpPr>
-              <p:nvPr/>
-            </p:nvSpPr>
-            <p:spPr>
-              <a:xfrm>
-                <a:off x="4515772" y="3289581"/>
-                <a:ext cx="230904" cy="228600"/>
-              </a:xfrm>
-              <a:prstGeom prst="ellipse">
-                <a:avLst/>
-              </a:prstGeom>
-              <a:solidFill>
-                <a:schemeClr val="accent3"/>
-              </a:solidFill>
-              <a:ln>
-                <a:noFill/>
-              </a:ln>
-              <a:effectLst/>
-            </p:spPr>
-            <p:style>
-              <a:lnRef idx="1">
-                <a:schemeClr val="accent1"/>
-              </a:lnRef>
-              <a:fillRef idx="3">
-                <a:schemeClr val="accent1"/>
-              </a:fillRef>
-              <a:effectRef idx="2">
-                <a:schemeClr val="accent1"/>
-              </a:effectRef>
-              <a:fontRef idx="minor">
-                <a:schemeClr val="lt1"/>
-              </a:fontRef>
-            </p:style>
-            <p:txBody>
-              <a:bodyPr rtlCol="0" anchor="ctr"/>
-              <a:lstStyle/>
-              <a:p>
-                <a:pPr algn="ctr"/>
-                <a:endParaRPr lang="en-US"/>
-              </a:p>
-            </p:txBody>
-          </p:sp>
-          <p:sp>
-            <p:nvSpPr>
-              <p:cNvPr id="13" name="Oval 12"/>
-              <p:cNvSpPr>
-                <a:spLocks/>
-              </p:cNvSpPr>
-              <p:nvPr/>
-            </p:nvSpPr>
-            <p:spPr>
-              <a:xfrm>
-                <a:off x="4794156" y="2887331"/>
-                <a:ext cx="230904" cy="228600"/>
-              </a:xfrm>
-              <a:prstGeom prst="ellipse">
-                <a:avLst/>
-              </a:prstGeom>
-              <a:solidFill>
-                <a:schemeClr val="accent3"/>
-              </a:solidFill>
-              <a:ln>
-                <a:noFill/>
-              </a:ln>
-              <a:effectLst/>
-            </p:spPr>
-            <p:style>
-              <a:lnRef idx="1">
-                <a:schemeClr val="accent1"/>
-              </a:lnRef>
-              <a:fillRef idx="3">
-                <a:schemeClr val="accent1"/>
-              </a:fillRef>
-              <a:effectRef idx="2">
-                <a:schemeClr val="accent1"/>
-              </a:effectRef>
-              <a:fontRef idx="minor">
-                <a:schemeClr val="lt1"/>
-              </a:fontRef>
-            </p:style>
-            <p:txBody>
-              <a:bodyPr rtlCol="0" anchor="ctr"/>
-              <a:lstStyle/>
-              <a:p>
-                <a:pPr algn="ctr"/>
-                <a:endParaRPr lang="en-US"/>
-              </a:p>
-            </p:txBody>
-          </p:sp>
-          <p:sp>
-            <p:nvSpPr>
-              <p:cNvPr id="14" name="Oval 13"/>
-              <p:cNvSpPr>
-                <a:spLocks/>
-              </p:cNvSpPr>
-              <p:nvPr/>
-            </p:nvSpPr>
-            <p:spPr>
-              <a:xfrm>
-                <a:off x="3407084" y="2977615"/>
-                <a:ext cx="230904" cy="228600"/>
-              </a:xfrm>
-              <a:prstGeom prst="ellipse">
-                <a:avLst/>
-              </a:prstGeom>
-              <a:solidFill>
-                <a:schemeClr val="accent3"/>
-              </a:solidFill>
-              <a:ln>
-                <a:noFill/>
-              </a:ln>
-              <a:effectLst/>
-            </p:spPr>
-            <p:style>
-              <a:lnRef idx="1">
-                <a:schemeClr val="accent1"/>
-              </a:lnRef>
-              <a:fillRef idx="3">
-                <a:schemeClr val="accent1"/>
-              </a:fillRef>
-              <a:effectRef idx="2">
-                <a:schemeClr val="accent1"/>
-              </a:effectRef>
-              <a:fontRef idx="minor">
-                <a:schemeClr val="lt1"/>
-              </a:fontRef>
-            </p:style>
-            <p:txBody>
-              <a:bodyPr rtlCol="0" anchor="ctr"/>
-              <a:lstStyle/>
-              <a:p>
-                <a:pPr algn="ctr"/>
-                <a:endParaRPr lang="en-US"/>
-              </a:p>
-            </p:txBody>
-          </p:sp>
-          <p:sp>
-            <p:nvSpPr>
-              <p:cNvPr id="16" name="Oval 15"/>
-              <p:cNvSpPr>
-                <a:spLocks/>
-              </p:cNvSpPr>
-              <p:nvPr/>
-            </p:nvSpPr>
-            <p:spPr>
-              <a:xfrm>
-                <a:off x="4094075" y="2792838"/>
-                <a:ext cx="230904" cy="228600"/>
-              </a:xfrm>
-              <a:prstGeom prst="ellipse">
-                <a:avLst/>
-              </a:prstGeom>
-              <a:solidFill>
-                <a:schemeClr val="accent3"/>
-              </a:solidFill>
-              <a:ln>
-                <a:noFill/>
-              </a:ln>
-              <a:effectLst/>
-            </p:spPr>
-            <p:style>
-              <a:lnRef idx="1">
-                <a:schemeClr val="accent1"/>
-              </a:lnRef>
-              <a:fillRef idx="3">
-                <a:schemeClr val="accent1"/>
-              </a:fillRef>
-              <a:effectRef idx="2">
-                <a:schemeClr val="accent1"/>
-              </a:effectRef>
-              <a:fontRef idx="minor">
-                <a:schemeClr val="lt1"/>
-              </a:fontRef>
-            </p:style>
-            <p:txBody>
-              <a:bodyPr rtlCol="0" anchor="ctr"/>
-              <a:lstStyle/>
-              <a:p>
-                <a:pPr algn="ctr"/>
-                <a:endParaRPr lang="en-US"/>
-              </a:p>
-            </p:txBody>
-          </p:sp>
-          <p:sp>
-            <p:nvSpPr>
-              <p:cNvPr id="17" name="Oval 16"/>
-              <p:cNvSpPr>
-                <a:spLocks/>
-              </p:cNvSpPr>
-              <p:nvPr/>
-            </p:nvSpPr>
-            <p:spPr>
-              <a:xfrm>
-                <a:off x="3176180" y="3899181"/>
-                <a:ext cx="230904" cy="228600"/>
-              </a:xfrm>
-              <a:prstGeom prst="ellipse">
-                <a:avLst/>
-              </a:prstGeom>
-              <a:solidFill>
-                <a:schemeClr val="accent3"/>
-              </a:solidFill>
-              <a:ln>
-                <a:noFill/>
-              </a:ln>
-              <a:effectLst/>
-            </p:spPr>
-            <p:style>
-              <a:lnRef idx="1">
-                <a:schemeClr val="accent1"/>
-              </a:lnRef>
-              <a:fillRef idx="3">
-                <a:schemeClr val="accent1"/>
-              </a:fillRef>
-              <a:effectRef idx="2">
-                <a:schemeClr val="accent1"/>
-              </a:effectRef>
-              <a:fontRef idx="minor">
-                <a:schemeClr val="lt1"/>
-              </a:fontRef>
-            </p:style>
-            <p:txBody>
-              <a:bodyPr rtlCol="0" anchor="ctr"/>
-              <a:lstStyle/>
-              <a:p>
-                <a:pPr algn="ctr"/>
-                <a:endParaRPr lang="en-US"/>
-              </a:p>
-            </p:txBody>
-          </p:sp>
-          <p:sp>
-            <p:nvSpPr>
-              <p:cNvPr id="18" name="Oval 17"/>
-              <p:cNvSpPr>
-                <a:spLocks/>
-              </p:cNvSpPr>
-              <p:nvPr/>
-            </p:nvSpPr>
-            <p:spPr>
-              <a:xfrm>
-                <a:off x="5171202" y="2678538"/>
-                <a:ext cx="230904" cy="228600"/>
-              </a:xfrm>
-              <a:prstGeom prst="ellipse">
-                <a:avLst/>
-              </a:prstGeom>
-              <a:solidFill>
-                <a:schemeClr val="accent3"/>
-              </a:solidFill>
-              <a:ln>
-                <a:noFill/>
-              </a:ln>
-              <a:effectLst/>
-            </p:spPr>
-            <p:style>
-              <a:lnRef idx="1">
-                <a:schemeClr val="accent1"/>
-              </a:lnRef>
-              <a:fillRef idx="3">
-                <a:schemeClr val="accent1"/>
-              </a:fillRef>
-              <a:effectRef idx="2">
-                <a:schemeClr val="accent1"/>
-              </a:effectRef>
-              <a:fontRef idx="minor">
-                <a:schemeClr val="lt1"/>
-              </a:fontRef>
-            </p:style>
-            <p:txBody>
-              <a:bodyPr rtlCol="0" anchor="ctr"/>
-              <a:lstStyle/>
-              <a:p>
-                <a:pPr algn="ctr"/>
-                <a:endParaRPr lang="en-US"/>
-              </a:p>
-            </p:txBody>
-          </p:sp>
-          <p:sp>
-            <p:nvSpPr>
-              <p:cNvPr id="19" name="Oval 18"/>
-              <p:cNvSpPr>
-                <a:spLocks/>
-              </p:cNvSpPr>
-              <p:nvPr/>
-            </p:nvSpPr>
-            <p:spPr>
-              <a:xfrm>
-                <a:off x="5653952" y="2307849"/>
-                <a:ext cx="230904" cy="228600"/>
-              </a:xfrm>
-              <a:prstGeom prst="ellipse">
-                <a:avLst/>
-              </a:prstGeom>
-              <a:solidFill>
-                <a:schemeClr val="accent3"/>
-              </a:solidFill>
-              <a:ln>
-                <a:noFill/>
-              </a:ln>
-              <a:effectLst/>
-            </p:spPr>
-            <p:style>
-              <a:lnRef idx="1">
-                <a:schemeClr val="accent1"/>
-              </a:lnRef>
-              <a:fillRef idx="3">
-                <a:schemeClr val="accent1"/>
-              </a:fillRef>
-              <a:effectRef idx="2">
-                <a:schemeClr val="accent1"/>
-              </a:effectRef>
-              <a:fontRef idx="minor">
-                <a:schemeClr val="lt1"/>
-              </a:fontRef>
-            </p:style>
-            <p:txBody>
-              <a:bodyPr rtlCol="0" anchor="ctr"/>
-              <a:lstStyle/>
-              <a:p>
-                <a:pPr algn="ctr"/>
-                <a:endParaRPr lang="en-US"/>
-              </a:p>
-            </p:txBody>
-          </p:sp>
-          <p:sp>
-            <p:nvSpPr>
-              <p:cNvPr id="20" name="Oval 19"/>
-              <p:cNvSpPr>
-                <a:spLocks/>
-              </p:cNvSpPr>
-              <p:nvPr/>
-            </p:nvSpPr>
-            <p:spPr>
-              <a:xfrm>
-                <a:off x="5393484" y="1667019"/>
-                <a:ext cx="230904" cy="228600"/>
-              </a:xfrm>
-              <a:prstGeom prst="ellipse">
-                <a:avLst/>
-              </a:prstGeom>
-              <a:solidFill>
-                <a:schemeClr val="accent3"/>
-              </a:solidFill>
-              <a:ln>
-                <a:noFill/>
-              </a:ln>
-              <a:effectLst/>
-            </p:spPr>
-            <p:style>
-              <a:lnRef idx="1">
-                <a:schemeClr val="accent1"/>
-              </a:lnRef>
-              <a:fillRef idx="3">
-                <a:schemeClr val="accent1"/>
-              </a:fillRef>
-              <a:effectRef idx="2">
-                <a:schemeClr val="accent1"/>
-              </a:effectRef>
-              <a:fontRef idx="minor">
-                <a:schemeClr val="lt1"/>
-              </a:fontRef>
-            </p:style>
-            <p:txBody>
-              <a:bodyPr rtlCol="0" anchor="ctr"/>
-              <a:lstStyle/>
-              <a:p>
-                <a:pPr algn="ctr"/>
-                <a:endParaRPr lang="en-US"/>
-              </a:p>
-            </p:txBody>
-          </p:sp>
-          <p:sp>
-            <p:nvSpPr>
-              <p:cNvPr id="21" name="Oval 20"/>
-              <p:cNvSpPr>
-                <a:spLocks/>
-              </p:cNvSpPr>
-              <p:nvPr/>
-            </p:nvSpPr>
-            <p:spPr>
-              <a:xfrm>
-                <a:off x="5286654" y="3289581"/>
-                <a:ext cx="230904" cy="228600"/>
-              </a:xfrm>
-              <a:prstGeom prst="ellipse">
-                <a:avLst/>
-              </a:prstGeom>
-              <a:solidFill>
-                <a:schemeClr val="accent3"/>
-              </a:solidFill>
-              <a:ln>
-                <a:noFill/>
-              </a:ln>
-              <a:effectLst/>
-            </p:spPr>
-            <p:style>
-              <a:lnRef idx="1">
-                <a:schemeClr val="accent1"/>
-              </a:lnRef>
-              <a:fillRef idx="3">
-                <a:schemeClr val="accent1"/>
-              </a:fillRef>
-              <a:effectRef idx="2">
-                <a:schemeClr val="accent1"/>
-              </a:effectRef>
-              <a:fontRef idx="minor">
-                <a:schemeClr val="lt1"/>
-              </a:fontRef>
-            </p:style>
-            <p:txBody>
-              <a:bodyPr rtlCol="0" anchor="ctr"/>
-              <a:lstStyle/>
-              <a:p>
-                <a:pPr algn="ctr"/>
-                <a:endParaRPr lang="en-US"/>
-              </a:p>
-            </p:txBody>
-          </p:sp>
-          <p:sp>
-            <p:nvSpPr>
-              <p:cNvPr id="11" name="Oval 10"/>
-              <p:cNvSpPr>
-                <a:spLocks/>
-              </p:cNvSpPr>
-              <p:nvPr/>
-            </p:nvSpPr>
-            <p:spPr>
-              <a:xfrm>
-                <a:off x="4627976" y="2079249"/>
-                <a:ext cx="230904" cy="228600"/>
-              </a:xfrm>
-              <a:prstGeom prst="ellipse">
-                <a:avLst/>
-              </a:prstGeom>
-              <a:solidFill>
-                <a:schemeClr val="accent3"/>
-              </a:solidFill>
-              <a:ln>
-                <a:noFill/>
-              </a:ln>
-              <a:effectLst/>
-            </p:spPr>
-            <p:style>
-              <a:lnRef idx="1">
-                <a:schemeClr val="accent1"/>
-              </a:lnRef>
-              <a:fillRef idx="3">
-                <a:schemeClr val="accent1"/>
-              </a:fillRef>
-              <a:effectRef idx="2">
-                <a:schemeClr val="accent1"/>
-              </a:effectRef>
-              <a:fontRef idx="minor">
-                <a:schemeClr val="lt1"/>
-              </a:fontRef>
-            </p:style>
-            <p:txBody>
-              <a:bodyPr rtlCol="0" anchor="ctr"/>
-              <a:lstStyle/>
-              <a:p>
-                <a:pPr algn="ctr"/>
-                <a:endParaRPr lang="en-US"/>
-              </a:p>
-            </p:txBody>
-          </p:sp>
-          <p:sp>
-            <p:nvSpPr>
-              <p:cNvPr id="15" name="Oval 14"/>
-              <p:cNvSpPr>
-                <a:spLocks/>
-              </p:cNvSpPr>
-              <p:nvPr/>
-            </p:nvSpPr>
-            <p:spPr>
-              <a:xfrm>
-                <a:off x="3769776" y="3708681"/>
-                <a:ext cx="230904" cy="228600"/>
-              </a:xfrm>
-              <a:prstGeom prst="ellipse">
-                <a:avLst/>
-              </a:prstGeom>
-              <a:solidFill>
-                <a:schemeClr val="accent3"/>
-              </a:solidFill>
-              <a:ln>
-                <a:noFill/>
-              </a:ln>
-              <a:effectLst/>
-            </p:spPr>
-            <p:style>
-              <a:lnRef idx="1">
-                <a:schemeClr val="accent1"/>
-              </a:lnRef>
-              <a:fillRef idx="3">
-                <a:schemeClr val="accent1"/>
-              </a:fillRef>
-              <a:effectRef idx="2">
-                <a:schemeClr val="accent1"/>
-              </a:effectRef>
-              <a:fontRef idx="minor">
-                <a:schemeClr val="lt1"/>
-              </a:fontRef>
-            </p:style>
-            <p:txBody>
-              <a:bodyPr rtlCol="0" anchor="ctr"/>
-              <a:lstStyle/>
-              <a:p>
-                <a:pPr algn="ctr"/>
-                <a:endParaRPr lang="en-US"/>
-              </a:p>
-            </p:txBody>
-          </p:sp>
-        </p:grpSp>
+            <a:prstGeom prst="ellipse">
+              <a:avLst/>
+            </a:prstGeom>
+            <a:solidFill>
+              <a:schemeClr val="accent3"/>
+            </a:solidFill>
+            <a:ln>
+              <a:noFill/>
+            </a:ln>
+            <a:effectLst/>
+          </p:spPr>
+          <p:style>
+            <a:lnRef idx="1">
+              <a:schemeClr val="accent1"/>
+            </a:lnRef>
+            <a:fillRef idx="3">
+              <a:schemeClr val="accent1"/>
+            </a:fillRef>
+            <a:effectRef idx="2">
+              <a:schemeClr val="accent1"/>
+            </a:effectRef>
+            <a:fontRef idx="minor">
+              <a:schemeClr val="lt1"/>
+            </a:fontRef>
+          </p:style>
+          <p:txBody>
+            <a:bodyPr rtlCol="0" anchor="ctr"/>
+            <a:lstStyle/>
+            <a:p>
+              <a:pPr algn="ctr"/>
+              <a:endParaRPr lang="en-US"/>
+            </a:p>
+          </p:txBody>
+        </p:sp>
+        <p:sp>
+          <p:nvSpPr>
+            <p:cNvPr id="14" name="Oval 13"/>
+            <p:cNvSpPr>
+              <a:spLocks/>
+            </p:cNvSpPr>
+            <p:nvPr/>
+          </p:nvSpPr>
+          <p:spPr>
+            <a:xfrm>
+              <a:off x="3407084" y="2977615"/>
+              <a:ext cx="230904" cy="228600"/>
+            </a:xfrm>
+            <a:prstGeom prst="ellipse">
+              <a:avLst/>
+            </a:prstGeom>
+            <a:solidFill>
+              <a:schemeClr val="accent3"/>
+            </a:solidFill>
+            <a:ln>
+              <a:noFill/>
+            </a:ln>
+            <a:effectLst/>
+          </p:spPr>
+          <p:style>
+            <a:lnRef idx="1">
+              <a:schemeClr val="accent1"/>
+            </a:lnRef>
+            <a:fillRef idx="3">
+              <a:schemeClr val="accent1"/>
+            </a:fillRef>
+            <a:effectRef idx="2">
+              <a:schemeClr val="accent1"/>
+            </a:effectRef>
+            <a:fontRef idx="minor">
+              <a:schemeClr val="lt1"/>
+            </a:fontRef>
+          </p:style>
+          <p:txBody>
+            <a:bodyPr rtlCol="0" anchor="ctr"/>
+            <a:lstStyle/>
+            <a:p>
+              <a:pPr algn="ctr"/>
+              <a:endParaRPr lang="en-US"/>
+            </a:p>
+          </p:txBody>
+        </p:sp>
+        <p:sp>
+          <p:nvSpPr>
+            <p:cNvPr id="16" name="Oval 15"/>
+            <p:cNvSpPr>
+              <a:spLocks/>
+            </p:cNvSpPr>
+            <p:nvPr/>
+          </p:nvSpPr>
+          <p:spPr>
+            <a:xfrm>
+              <a:off x="4094075" y="2792838"/>
+              <a:ext cx="230904" cy="228600"/>
+            </a:xfrm>
+            <a:prstGeom prst="ellipse">
+              <a:avLst/>
+            </a:prstGeom>
+            <a:solidFill>
+              <a:schemeClr val="accent3"/>
+            </a:solidFill>
+            <a:ln>
+              <a:noFill/>
+            </a:ln>
+            <a:effectLst/>
+          </p:spPr>
+          <p:style>
+            <a:lnRef idx="1">
+              <a:schemeClr val="accent1"/>
+            </a:lnRef>
+            <a:fillRef idx="3">
+              <a:schemeClr val="accent1"/>
+            </a:fillRef>
+            <a:effectRef idx="2">
+              <a:schemeClr val="accent1"/>
+            </a:effectRef>
+            <a:fontRef idx="minor">
+              <a:schemeClr val="lt1"/>
+            </a:fontRef>
+          </p:style>
+          <p:txBody>
+            <a:bodyPr rtlCol="0" anchor="ctr"/>
+            <a:lstStyle/>
+            <a:p>
+              <a:pPr algn="ctr"/>
+              <a:endParaRPr lang="en-US"/>
+            </a:p>
+          </p:txBody>
+        </p:sp>
+        <p:sp>
+          <p:nvSpPr>
+            <p:cNvPr id="17" name="Oval 16"/>
+            <p:cNvSpPr>
+              <a:spLocks/>
+            </p:cNvSpPr>
+            <p:nvPr/>
+          </p:nvSpPr>
+          <p:spPr>
+            <a:xfrm>
+              <a:off x="3176180" y="3899181"/>
+              <a:ext cx="230904" cy="228600"/>
+            </a:xfrm>
+            <a:prstGeom prst="ellipse">
+              <a:avLst/>
+            </a:prstGeom>
+            <a:solidFill>
+              <a:schemeClr val="accent3"/>
+            </a:solidFill>
+            <a:ln>
+              <a:noFill/>
+            </a:ln>
+            <a:effectLst/>
+          </p:spPr>
+          <p:style>
+            <a:lnRef idx="1">
+              <a:schemeClr val="accent1"/>
+            </a:lnRef>
+            <a:fillRef idx="3">
+              <a:schemeClr val="accent1"/>
+            </a:fillRef>
+            <a:effectRef idx="2">
+              <a:schemeClr val="accent1"/>
+            </a:effectRef>
+            <a:fontRef idx="minor">
+              <a:schemeClr val="lt1"/>
+            </a:fontRef>
+          </p:style>
+          <p:txBody>
+            <a:bodyPr rtlCol="0" anchor="ctr"/>
+            <a:lstStyle/>
+            <a:p>
+              <a:pPr algn="ctr"/>
+              <a:endParaRPr lang="en-US"/>
+            </a:p>
+          </p:txBody>
+        </p:sp>
+        <p:sp>
+          <p:nvSpPr>
+            <p:cNvPr id="18" name="Oval 17"/>
+            <p:cNvSpPr>
+              <a:spLocks/>
+            </p:cNvSpPr>
+            <p:nvPr/>
+          </p:nvSpPr>
+          <p:spPr>
+            <a:xfrm>
+              <a:off x="5171202" y="2678538"/>
+              <a:ext cx="230904" cy="228600"/>
+            </a:xfrm>
+            <a:prstGeom prst="ellipse">
+              <a:avLst/>
+            </a:prstGeom>
+            <a:solidFill>
+              <a:schemeClr val="accent3"/>
+            </a:solidFill>
+            <a:ln>
+              <a:noFill/>
+            </a:ln>
+            <a:effectLst/>
+          </p:spPr>
+          <p:style>
+            <a:lnRef idx="1">
+              <a:schemeClr val="accent1"/>
+            </a:lnRef>
+            <a:fillRef idx="3">
+              <a:schemeClr val="accent1"/>
+            </a:fillRef>
+            <a:effectRef idx="2">
+              <a:schemeClr val="accent1"/>
+            </a:effectRef>
+            <a:fontRef idx="minor">
+              <a:schemeClr val="lt1"/>
+            </a:fontRef>
+          </p:style>
+          <p:txBody>
+            <a:bodyPr rtlCol="0" anchor="ctr"/>
+            <a:lstStyle/>
+            <a:p>
+              <a:pPr algn="ctr"/>
+              <a:endParaRPr lang="en-US"/>
+            </a:p>
+          </p:txBody>
+        </p:sp>
+        <p:sp>
+          <p:nvSpPr>
+            <p:cNvPr id="19" name="Oval 18"/>
+            <p:cNvSpPr>
+              <a:spLocks/>
+            </p:cNvSpPr>
+            <p:nvPr/>
+          </p:nvSpPr>
+          <p:spPr>
+            <a:xfrm>
+              <a:off x="5653952" y="2307849"/>
+              <a:ext cx="230904" cy="228600"/>
+            </a:xfrm>
+            <a:prstGeom prst="ellipse">
+              <a:avLst/>
+            </a:prstGeom>
+            <a:solidFill>
+              <a:schemeClr val="accent3"/>
+            </a:solidFill>
+            <a:ln>
+              <a:noFill/>
+            </a:ln>
+            <a:effectLst/>
+          </p:spPr>
+          <p:style>
+            <a:lnRef idx="1">
+              <a:schemeClr val="accent1"/>
+            </a:lnRef>
+            <a:fillRef idx="3">
+              <a:schemeClr val="accent1"/>
+            </a:fillRef>
+            <a:effectRef idx="2">
+              <a:schemeClr val="accent1"/>
+            </a:effectRef>
+            <a:fontRef idx="minor">
+              <a:schemeClr val="lt1"/>
+            </a:fontRef>
+          </p:style>
+          <p:txBody>
+            <a:bodyPr rtlCol="0" anchor="ctr"/>
+            <a:lstStyle/>
+            <a:p>
+              <a:pPr algn="ctr"/>
+              <a:endParaRPr lang="en-US"/>
+            </a:p>
+          </p:txBody>
+        </p:sp>
+        <p:sp>
+          <p:nvSpPr>
+            <p:cNvPr id="20" name="Oval 19"/>
+            <p:cNvSpPr>
+              <a:spLocks/>
+            </p:cNvSpPr>
+            <p:nvPr/>
+          </p:nvSpPr>
+          <p:spPr>
+            <a:xfrm>
+              <a:off x="5393484" y="1667019"/>
+              <a:ext cx="230904" cy="228600"/>
+            </a:xfrm>
+            <a:prstGeom prst="ellipse">
+              <a:avLst/>
+            </a:prstGeom>
+            <a:solidFill>
+              <a:schemeClr val="accent3"/>
+            </a:solidFill>
+            <a:ln>
+              <a:noFill/>
+            </a:ln>
+            <a:effectLst/>
+          </p:spPr>
+          <p:style>
+            <a:lnRef idx="1">
+              <a:schemeClr val="accent1"/>
+            </a:lnRef>
+            <a:fillRef idx="3">
+              <a:schemeClr val="accent1"/>
+            </a:fillRef>
+            <a:effectRef idx="2">
+              <a:schemeClr val="accent1"/>
+            </a:effectRef>
+            <a:fontRef idx="minor">
+              <a:schemeClr val="lt1"/>
+            </a:fontRef>
+          </p:style>
+          <p:txBody>
+            <a:bodyPr rtlCol="0" anchor="ctr"/>
+            <a:lstStyle/>
+            <a:p>
+              <a:pPr algn="ctr"/>
+              <a:endParaRPr lang="en-US"/>
+            </a:p>
+          </p:txBody>
+        </p:sp>
+        <p:sp>
+          <p:nvSpPr>
+            <p:cNvPr id="21" name="Oval 20"/>
+            <p:cNvSpPr>
+              <a:spLocks/>
+            </p:cNvSpPr>
+            <p:nvPr/>
+          </p:nvSpPr>
+          <p:spPr>
+            <a:xfrm>
+              <a:off x="5286654" y="3289581"/>
+              <a:ext cx="230904" cy="228600"/>
+            </a:xfrm>
+            <a:prstGeom prst="ellipse">
+              <a:avLst/>
+            </a:prstGeom>
+            <a:solidFill>
+              <a:schemeClr val="accent3"/>
+            </a:solidFill>
+            <a:ln>
+              <a:noFill/>
+            </a:ln>
+            <a:effectLst/>
+          </p:spPr>
+          <p:style>
+            <a:lnRef idx="1">
+              <a:schemeClr val="accent1"/>
+            </a:lnRef>
+            <a:fillRef idx="3">
+              <a:schemeClr val="accent1"/>
+            </a:fillRef>
+            <a:effectRef idx="2">
+              <a:schemeClr val="accent1"/>
+            </a:effectRef>
+            <a:fontRef idx="minor">
+              <a:schemeClr val="lt1"/>
+            </a:fontRef>
+          </p:style>
+          <p:txBody>
+            <a:bodyPr rtlCol="0" anchor="ctr"/>
+            <a:lstStyle/>
+            <a:p>
+              <a:pPr algn="ctr"/>
+              <a:endParaRPr lang="en-US"/>
+            </a:p>
+          </p:txBody>
+        </p:sp>
+        <p:sp>
+          <p:nvSpPr>
+            <p:cNvPr id="11" name="Oval 10"/>
+            <p:cNvSpPr>
+              <a:spLocks/>
+            </p:cNvSpPr>
+            <p:nvPr/>
+          </p:nvSpPr>
+          <p:spPr>
+            <a:xfrm>
+              <a:off x="4627976" y="2079249"/>
+              <a:ext cx="230904" cy="228600"/>
+            </a:xfrm>
+            <a:prstGeom prst="ellipse">
+              <a:avLst/>
+            </a:prstGeom>
+            <a:solidFill>
+              <a:schemeClr val="accent3"/>
+            </a:solidFill>
+            <a:ln>
+              <a:noFill/>
+            </a:ln>
+            <a:effectLst/>
+          </p:spPr>
+          <p:style>
+            <a:lnRef idx="1">
+              <a:schemeClr val="accent1"/>
+            </a:lnRef>
+            <a:fillRef idx="3">
+              <a:schemeClr val="accent1"/>
+            </a:fillRef>
+            <a:effectRef idx="2">
+              <a:schemeClr val="accent1"/>
+            </a:effectRef>
+            <a:fontRef idx="minor">
+              <a:schemeClr val="lt1"/>
+            </a:fontRef>
+          </p:style>
+          <p:txBody>
+            <a:bodyPr rtlCol="0" anchor="ctr"/>
+            <a:lstStyle/>
+            <a:p>
+              <a:pPr algn="ctr"/>
+              <a:endParaRPr lang="en-US"/>
+            </a:p>
+          </p:txBody>
+        </p:sp>
+        <p:sp>
+          <p:nvSpPr>
+            <p:cNvPr id="15" name="Oval 14"/>
+            <p:cNvSpPr>
+              <a:spLocks/>
+            </p:cNvSpPr>
+            <p:nvPr/>
+          </p:nvSpPr>
+          <p:spPr>
+            <a:xfrm>
+              <a:off x="3769776" y="3708681"/>
+              <a:ext cx="230904" cy="228600"/>
+            </a:xfrm>
+            <a:prstGeom prst="ellipse">
+              <a:avLst/>
+            </a:prstGeom>
+            <a:solidFill>
+              <a:schemeClr val="accent3"/>
+            </a:solidFill>
+            <a:ln>
+              <a:noFill/>
+            </a:ln>
+            <a:effectLst/>
+          </p:spPr>
+          <p:style>
+            <a:lnRef idx="1">
+              <a:schemeClr val="accent1"/>
+            </a:lnRef>
+            <a:fillRef idx="3">
+              <a:schemeClr val="accent1"/>
+            </a:fillRef>
+            <a:effectRef idx="2">
+              <a:schemeClr val="accent1"/>
+            </a:effectRef>
+            <a:fontRef idx="minor">
+              <a:schemeClr val="lt1"/>
+            </a:fontRef>
+          </p:style>
+          <p:txBody>
+            <a:bodyPr rtlCol="0" anchor="ctr"/>
+            <a:lstStyle/>
+            <a:p>
+              <a:pPr algn="ctr"/>
+              <a:endParaRPr lang="en-US"/>
+            </a:p>
+          </p:txBody>
+        </p:sp>
       </p:grpSp>
     </p:spTree>
     <p:extLst>
@@ -42907,7 +43398,7 @@
                                           </p:stCondLst>
                                         </p:cTn>
                                         <p:tgtEl>
-                                          <p:spTgt spid="24"/>
+                                          <p:spTgt spid="70"/>
                                         </p:tgtEl>
                                         <p:attrNameLst>
                                           <p:attrName>style.visibility</p:attrName>
@@ -42952,6 +43443,51 @@
                                           </p:stCondLst>
                                         </p:cTn>
                                         <p:tgtEl>
+                                          <p:spTgt spid="24"/>
+                                        </p:tgtEl>
+                                        <p:attrNameLst>
+                                          <p:attrName>style.visibility</p:attrName>
+                                        </p:attrNameLst>
+                                      </p:cBhvr>
+                                      <p:to>
+                                        <p:strVal val="visible"/>
+                                      </p:to>
+                                    </p:set>
+                                  </p:childTnLst>
+                                </p:cTn>
+                              </p:par>
+                            </p:childTnLst>
+                          </p:cTn>
+                        </p:par>
+                      </p:childTnLst>
+                    </p:cTn>
+                  </p:par>
+                  <p:par>
+                    <p:cTn id="11" fill="hold">
+                      <p:stCondLst>
+                        <p:cond delay="indefinite"/>
+                      </p:stCondLst>
+                      <p:childTnLst>
+                        <p:par>
+                          <p:cTn id="12" fill="hold">
+                            <p:stCondLst>
+                              <p:cond delay="0"/>
+                            </p:stCondLst>
+                            <p:childTnLst>
+                              <p:par>
+                                <p:cTn id="13" presetID="1" presetClass="entr" presetSubtype="0" fill="hold" nodeType="clickEffect">
+                                  <p:stCondLst>
+                                    <p:cond delay="0"/>
+                                  </p:stCondLst>
+                                  <p:childTnLst>
+                                    <p:set>
+                                      <p:cBhvr>
+                                        <p:cTn id="14" dur="1" fill="hold">
+                                          <p:stCondLst>
+                                            <p:cond delay="0"/>
+                                          </p:stCondLst>
+                                        </p:cTn>
+                                        <p:tgtEl>
                                           <p:spTgt spid="44"/>
                                         </p:tgtEl>
                                         <p:attrNameLst>
@@ -42966,14 +43502,14 @@
                                 </p:cTn>
                               </p:par>
                               <p:par>
-                                <p:cTn id="11" presetID="1" presetClass="entr" presetSubtype="0" fill="hold" nodeType="withEffect">
+                                <p:cTn id="15" presetID="1" presetClass="entr" presetSubtype="0" fill="hold" nodeType="withEffect">
                                   <p:stCondLst>
                                     <p:cond delay="0"/>
                                   </p:stCondLst>
                                   <p:childTnLst>
                                     <p:set>
                                       <p:cBhvr>
-                                        <p:cTn id="12" dur="1" fill="hold">
+                                        <p:cTn id="16" dur="1" fill="hold">
                                           <p:stCondLst>
                                             <p:cond delay="0"/>
                                           </p:stCondLst>
@@ -43003,26 +43539,26 @@
                     </p:cTn>
                   </p:par>
                   <p:par>
-                    <p:cTn id="13" fill="hold">
+                    <p:cTn id="17" fill="hold">
                       <p:stCondLst>
                         <p:cond delay="indefinite"/>
                       </p:stCondLst>
                       <p:childTnLst>
                         <p:par>
-                          <p:cTn id="14" fill="hold">
+                          <p:cTn id="18" fill="hold">
                             <p:stCondLst>
                               <p:cond delay="0"/>
                             </p:stCondLst>
                             <p:childTnLst>
                               <p:par>
-                                <p:cTn id="15" presetID="1" presetClass="entr" presetSubtype="0" fill="hold" nodeType="clickEffect">
+                                <p:cTn id="19" presetID="1" presetClass="entr" presetSubtype="0" fill="hold" nodeType="clickEffect">
                                   <p:stCondLst>
                                     <p:cond delay="0"/>
                                   </p:stCondLst>
                                   <p:childTnLst>
                                     <p:set>
                                       <p:cBhvr>
-                                        <p:cTn id="16" dur="1" fill="hold">
+                                        <p:cTn id="20" dur="1" fill="hold">
                                           <p:stCondLst>
                                             <p:cond delay="0"/>
                                           </p:stCondLst>
@@ -43042,14 +43578,14 @@
                                 </p:cTn>
                               </p:par>
                               <p:par>
-                                <p:cTn id="17" presetID="1" presetClass="entr" presetSubtype="0" fill="hold" grpId="0" nodeType="withEffect">
+                                <p:cTn id="21" presetID="1" presetClass="entr" presetSubtype="0" fill="hold" grpId="0" nodeType="withEffect">
                                   <p:stCondLst>
                                     <p:cond delay="0"/>
                                   </p:stCondLst>
                                   <p:childTnLst>
                                     <p:set>
                                       <p:cBhvr>
-                                        <p:cTn id="18" dur="1" fill="hold">
+                                        <p:cTn id="22" dur="1" fill="hold">
                                           <p:stCondLst>
                                             <p:cond delay="0"/>
                                           </p:stCondLst>

</xml_diff>

<commit_message>
more comments to first half of presentation
</commit_message>
<xml_diff>
--- a/Techfest_ML.pptx
+++ b/Techfest_ML.pptx
@@ -595,6 +595,98 @@
 </p:notes>
 </file>
 
+<file path=ppt/notesSlides/notesSlide10.xml><?xml version="1.0" encoding="utf-8"?>
+<p:notes xmlns:a="http://schemas.openxmlformats.org/drawingml/2006/main" xmlns:r="http://schemas.openxmlformats.org/officeDocument/2006/relationships" xmlns:p="http://schemas.openxmlformats.org/presentationml/2006/main">
+  <p:cSld>
+    <p:spTree>
+      <p:nvGrpSpPr>
+        <p:cNvPr id="1" name=""/>
+        <p:cNvGrpSpPr/>
+        <p:nvPr/>
+      </p:nvGrpSpPr>
+      <p:grpSpPr>
+        <a:xfrm>
+          <a:off x="0" y="0"/>
+          <a:ext cx="0" cy="0"/>
+          <a:chOff x="0" y="0"/>
+          <a:chExt cx="0" cy="0"/>
+        </a:xfrm>
+      </p:grpSpPr>
+      <p:sp>
+        <p:nvSpPr>
+          <p:cNvPr id="2" name="Slide Image Placeholder 1"/>
+          <p:cNvSpPr>
+            <a:spLocks noGrp="1" noRot="1" noChangeAspect="1"/>
+          </p:cNvSpPr>
+          <p:nvPr>
+            <p:ph type="sldImg"/>
+          </p:nvPr>
+        </p:nvSpPr>
+        <p:spPr/>
+      </p:sp>
+      <p:sp>
+        <p:nvSpPr>
+          <p:cNvPr id="3" name="Notes Placeholder 2"/>
+          <p:cNvSpPr>
+            <a:spLocks noGrp="1"/>
+          </p:cNvSpPr>
+          <p:nvPr>
+            <p:ph type="body" idx="1"/>
+          </p:nvPr>
+        </p:nvSpPr>
+        <p:spPr/>
+        <p:txBody>
+          <a:bodyPr/>
+          <a:lstStyle/>
+          <a:p>
+            <a:r>
+              <a:rPr lang="en-US" dirty="0" smtClean="0"/>
+              <a:t>We don’t want our test data to leak into the</a:t>
+            </a:r>
+            <a:r>
+              <a:rPr lang="en-US" baseline="0" dirty="0" smtClean="0"/>
+              <a:t> model.</a:t>
+            </a:r>
+            <a:endParaRPr lang="en-US" dirty="0"/>
+          </a:p>
+        </p:txBody>
+      </p:sp>
+      <p:sp>
+        <p:nvSpPr>
+          <p:cNvPr id="4" name="Slide Number Placeholder 3"/>
+          <p:cNvSpPr>
+            <a:spLocks noGrp="1"/>
+          </p:cNvSpPr>
+          <p:nvPr>
+            <p:ph type="sldNum" sz="quarter" idx="10"/>
+          </p:nvPr>
+        </p:nvSpPr>
+        <p:spPr/>
+        <p:txBody>
+          <a:bodyPr/>
+          <a:lstStyle/>
+          <a:p>
+            <a:fld id="{8C25A203-B80B-7647-846D-203E4F34DEC8}" type="slidenum">
+              <a:rPr lang="en-US" smtClean="0"/>
+              <a:t>33</a:t>
+            </a:fld>
+            <a:endParaRPr lang="en-US"/>
+          </a:p>
+        </p:txBody>
+      </p:sp>
+    </p:spTree>
+    <p:extLst>
+      <p:ext uri="{BB962C8B-B14F-4D97-AF65-F5344CB8AC3E}">
+        <p14:creationId xmlns:p14="http://schemas.microsoft.com/office/powerpoint/2010/main" val="2268642343"/>
+      </p:ext>
+    </p:extLst>
+  </p:cSld>
+  <p:clrMapOvr>
+    <a:masterClrMapping/>
+  </p:clrMapOvr>
+</p:notes>
+</file>
+
 <file path=ppt/notesSlides/notesSlide2.xml><?xml version="1.0" encoding="utf-8"?>
 <p:notes xmlns:a="http://schemas.openxmlformats.org/drawingml/2006/main" xmlns:r="http://schemas.openxmlformats.org/officeDocument/2006/relationships" xmlns:p="http://schemas.openxmlformats.org/presentationml/2006/main">
   <p:cSld>
@@ -1019,14 +1111,6 @@
           <a:bodyPr/>
           <a:lstStyle/>
           <a:p>
-            <a:r>
-              <a:rPr lang="en-US" dirty="0" smtClean="0"/>
-              <a:t>We don’t want our test data to leak into the</a:t>
-            </a:r>
-            <a:r>
-              <a:rPr lang="en-US" baseline="0" dirty="0" smtClean="0"/>
-              <a:t> model.</a:t>
-            </a:r>
             <a:endParaRPr lang="en-US" dirty="0"/>
           </a:p>
         </p:txBody>
@@ -1048,7 +1132,7 @@
           <a:p>
             <a:fld id="{8C25A203-B80B-7647-846D-203E4F34DEC8}" type="slidenum">
               <a:rPr lang="en-US" smtClean="0"/>
-              <a:t>31</a:t>
+              <a:t>17</a:t>
             </a:fld>
             <a:endParaRPr lang="en-US"/>
           </a:p>
@@ -1057,7 +1141,7 @@
     </p:spTree>
     <p:extLst>
       <p:ext uri="{BB962C8B-B14F-4D97-AF65-F5344CB8AC3E}">
-        <p14:creationId xmlns:p14="http://schemas.microsoft.com/office/powerpoint/2010/main" val="2268642343"/>
+        <p14:creationId xmlns:p14="http://schemas.microsoft.com/office/powerpoint/2010/main" val="2364335774"/>
       </p:ext>
     </p:extLst>
   </p:cSld>
@@ -1113,11 +1197,19 @@
           <a:p>
             <a:r>
               <a:rPr lang="en-US" dirty="0" smtClean="0"/>
-              <a:t>We don’t want our test data to leak into the</a:t>
+              <a:t>If we care</a:t>
             </a:r>
             <a:r>
               <a:rPr lang="en-US" baseline="0" dirty="0" smtClean="0"/>
-              <a:t> model.</a:t>
+              <a:t> more</a:t>
+            </a:r>
+            <a:r>
+              <a:rPr lang="en-US" dirty="0" smtClean="0"/>
+              <a:t> about correctly</a:t>
+            </a:r>
+            <a:r>
+              <a:rPr lang="en-US" baseline="0" dirty="0" smtClean="0"/>
+              <a:t> labeling all the instances of one class, then we use recall. For ex, screening for malignant tumors. TSA bag check</a:t>
             </a:r>
             <a:endParaRPr lang="en-US" dirty="0"/>
           </a:p>
@@ -1140,7 +1232,199 @@
           <a:p>
             <a:fld id="{8C25A203-B80B-7647-846D-203E4F34DEC8}" type="slidenum">
               <a:rPr lang="en-US" smtClean="0"/>
-              <a:t>33</a:t>
+              <a:t>18</a:t>
+            </a:fld>
+            <a:endParaRPr lang="en-US"/>
+          </a:p>
+        </p:txBody>
+      </p:sp>
+    </p:spTree>
+    <p:extLst>
+      <p:ext uri="{BB962C8B-B14F-4D97-AF65-F5344CB8AC3E}">
+        <p14:creationId xmlns:p14="http://schemas.microsoft.com/office/powerpoint/2010/main" val="633410924"/>
+      </p:ext>
+    </p:extLst>
+  </p:cSld>
+  <p:clrMapOvr>
+    <a:masterClrMapping/>
+  </p:clrMapOvr>
+</p:notes>
+</file>
+
+<file path=ppt/notesSlides/notesSlide8.xml><?xml version="1.0" encoding="utf-8"?>
+<p:notes xmlns:a="http://schemas.openxmlformats.org/drawingml/2006/main" xmlns:r="http://schemas.openxmlformats.org/officeDocument/2006/relationships" xmlns:p="http://schemas.openxmlformats.org/presentationml/2006/main">
+  <p:cSld>
+    <p:spTree>
+      <p:nvGrpSpPr>
+        <p:cNvPr id="1" name=""/>
+        <p:cNvGrpSpPr/>
+        <p:nvPr/>
+      </p:nvGrpSpPr>
+      <p:grpSpPr>
+        <a:xfrm>
+          <a:off x="0" y="0"/>
+          <a:ext cx="0" cy="0"/>
+          <a:chOff x="0" y="0"/>
+          <a:chExt cx="0" cy="0"/>
+        </a:xfrm>
+      </p:grpSpPr>
+      <p:sp>
+        <p:nvSpPr>
+          <p:cNvPr id="2" name="Slide Image Placeholder 1"/>
+          <p:cNvSpPr>
+            <a:spLocks noGrp="1" noRot="1" noChangeAspect="1"/>
+          </p:cNvSpPr>
+          <p:nvPr>
+            <p:ph type="sldImg"/>
+          </p:nvPr>
+        </p:nvSpPr>
+        <p:spPr/>
+      </p:sp>
+      <p:sp>
+        <p:nvSpPr>
+          <p:cNvPr id="3" name="Notes Placeholder 2"/>
+          <p:cNvSpPr>
+            <a:spLocks noGrp="1"/>
+          </p:cNvSpPr>
+          <p:nvPr>
+            <p:ph type="body" idx="1"/>
+          </p:nvPr>
+        </p:nvSpPr>
+        <p:spPr/>
+        <p:txBody>
+          <a:bodyPr/>
+          <a:lstStyle/>
+          <a:p>
+            <a:r>
+              <a:rPr lang="en-US" dirty="0" smtClean="0"/>
+              <a:t>On the other hand, we</a:t>
+            </a:r>
+            <a:r>
+              <a:rPr lang="en-US" baseline="0" dirty="0" smtClean="0"/>
+              <a:t> might care more about how accurate our labels are for one class. Auto-tag people on </a:t>
+            </a:r>
+            <a:r>
+              <a:rPr lang="en-US" baseline="0" dirty="0" err="1" smtClean="0"/>
+              <a:t>facebook</a:t>
+            </a:r>
+            <a:r>
+              <a:rPr lang="en-US" baseline="0" smtClean="0"/>
+              <a:t>.</a:t>
+            </a:r>
+            <a:endParaRPr lang="en-US" dirty="0"/>
+          </a:p>
+        </p:txBody>
+      </p:sp>
+      <p:sp>
+        <p:nvSpPr>
+          <p:cNvPr id="4" name="Slide Number Placeholder 3"/>
+          <p:cNvSpPr>
+            <a:spLocks noGrp="1"/>
+          </p:cNvSpPr>
+          <p:nvPr>
+            <p:ph type="sldNum" sz="quarter" idx="10"/>
+          </p:nvPr>
+        </p:nvSpPr>
+        <p:spPr/>
+        <p:txBody>
+          <a:bodyPr/>
+          <a:lstStyle/>
+          <a:p>
+            <a:fld id="{8C25A203-B80B-7647-846D-203E4F34DEC8}" type="slidenum">
+              <a:rPr lang="en-US" smtClean="0"/>
+              <a:t>19</a:t>
+            </a:fld>
+            <a:endParaRPr lang="en-US"/>
+          </a:p>
+        </p:txBody>
+      </p:sp>
+    </p:spTree>
+    <p:extLst>
+      <p:ext uri="{BB962C8B-B14F-4D97-AF65-F5344CB8AC3E}">
+        <p14:creationId xmlns:p14="http://schemas.microsoft.com/office/powerpoint/2010/main" val="133665021"/>
+      </p:ext>
+    </p:extLst>
+  </p:cSld>
+  <p:clrMapOvr>
+    <a:masterClrMapping/>
+  </p:clrMapOvr>
+</p:notes>
+</file>
+
+<file path=ppt/notesSlides/notesSlide9.xml><?xml version="1.0" encoding="utf-8"?>
+<p:notes xmlns:a="http://schemas.openxmlformats.org/drawingml/2006/main" xmlns:r="http://schemas.openxmlformats.org/officeDocument/2006/relationships" xmlns:p="http://schemas.openxmlformats.org/presentationml/2006/main">
+  <p:cSld>
+    <p:spTree>
+      <p:nvGrpSpPr>
+        <p:cNvPr id="1" name=""/>
+        <p:cNvGrpSpPr/>
+        <p:nvPr/>
+      </p:nvGrpSpPr>
+      <p:grpSpPr>
+        <a:xfrm>
+          <a:off x="0" y="0"/>
+          <a:ext cx="0" cy="0"/>
+          <a:chOff x="0" y="0"/>
+          <a:chExt cx="0" cy="0"/>
+        </a:xfrm>
+      </p:grpSpPr>
+      <p:sp>
+        <p:nvSpPr>
+          <p:cNvPr id="2" name="Slide Image Placeholder 1"/>
+          <p:cNvSpPr>
+            <a:spLocks noGrp="1" noRot="1" noChangeAspect="1"/>
+          </p:cNvSpPr>
+          <p:nvPr>
+            <p:ph type="sldImg"/>
+          </p:nvPr>
+        </p:nvSpPr>
+        <p:spPr/>
+      </p:sp>
+      <p:sp>
+        <p:nvSpPr>
+          <p:cNvPr id="3" name="Notes Placeholder 2"/>
+          <p:cNvSpPr>
+            <a:spLocks noGrp="1"/>
+          </p:cNvSpPr>
+          <p:nvPr>
+            <p:ph type="body" idx="1"/>
+          </p:nvPr>
+        </p:nvSpPr>
+        <p:spPr/>
+        <p:txBody>
+          <a:bodyPr/>
+          <a:lstStyle/>
+          <a:p>
+            <a:r>
+              <a:rPr lang="en-US" dirty="0" smtClean="0"/>
+              <a:t>We don’t want our test data to leak into the</a:t>
+            </a:r>
+            <a:r>
+              <a:rPr lang="en-US" baseline="0" dirty="0" smtClean="0"/>
+              <a:t> model.</a:t>
+            </a:r>
+            <a:endParaRPr lang="en-US" dirty="0"/>
+          </a:p>
+        </p:txBody>
+      </p:sp>
+      <p:sp>
+        <p:nvSpPr>
+          <p:cNvPr id="4" name="Slide Number Placeholder 3"/>
+          <p:cNvSpPr>
+            <a:spLocks noGrp="1"/>
+          </p:cNvSpPr>
+          <p:nvPr>
+            <p:ph type="sldNum" sz="quarter" idx="10"/>
+          </p:nvPr>
+        </p:nvSpPr>
+        <p:spPr/>
+        <p:txBody>
+          <a:bodyPr/>
+          <a:lstStyle/>
+          <a:p>
+            <a:fld id="{8C25A203-B80B-7647-846D-203E4F34DEC8}" type="slidenum">
+              <a:rPr lang="en-US" smtClean="0"/>
+              <a:t>31</a:t>
             </a:fld>
             <a:endParaRPr lang="en-US"/>
           </a:p>

</xml_diff>

<commit_message>
Some edits to presentation from runthrough comments
</commit_message>
<xml_diff>
--- a/Techfest_ML.pptx
+++ b/Techfest_ML.pptx
@@ -5,7 +5,7 @@
     <p:sldMasterId id="2147483648" r:id="rId1"/>
   </p:sldMasterIdLst>
   <p:notesMasterIdLst>
-    <p:notesMasterId r:id="rId46"/>
+    <p:notesMasterId r:id="rId48"/>
   </p:notesMasterIdLst>
   <p:sldIdLst>
     <p:sldId id="293" r:id="rId2"/>
@@ -42,16 +42,18 @@
     <p:sldId id="303" r:id="rId33"/>
     <p:sldId id="299" r:id="rId34"/>
     <p:sldId id="272" r:id="rId35"/>
-    <p:sldId id="280" r:id="rId36"/>
-    <p:sldId id="300" r:id="rId37"/>
-    <p:sldId id="267" r:id="rId38"/>
-    <p:sldId id="283" r:id="rId39"/>
-    <p:sldId id="292" r:id="rId40"/>
-    <p:sldId id="291" r:id="rId41"/>
-    <p:sldId id="296" r:id="rId42"/>
-    <p:sldId id="295" r:id="rId43"/>
-    <p:sldId id="294" r:id="rId44"/>
-    <p:sldId id="297" r:id="rId45"/>
+    <p:sldId id="309" r:id="rId36"/>
+    <p:sldId id="280" r:id="rId37"/>
+    <p:sldId id="300" r:id="rId38"/>
+    <p:sldId id="267" r:id="rId39"/>
+    <p:sldId id="283" r:id="rId40"/>
+    <p:sldId id="292" r:id="rId41"/>
+    <p:sldId id="291" r:id="rId42"/>
+    <p:sldId id="296" r:id="rId43"/>
+    <p:sldId id="310" r:id="rId44"/>
+    <p:sldId id="295" r:id="rId45"/>
+    <p:sldId id="294" r:id="rId46"/>
+    <p:sldId id="297" r:id="rId47"/>
   </p:sldIdLst>
   <p:sldSz cx="9144000" cy="6858000" type="screen4x3"/>
   <p:notesSz cx="6858000" cy="9144000"/>
@@ -235,7 +237,7 @@
           <a:p>
             <a:fld id="{33E144C1-CEA6-4D4D-9670-300AA03EA9ED}" type="datetimeFigureOut">
               <a:rPr lang="en-US" smtClean="0"/>
-              <a:t>5/15/15</a:t>
+              <a:t>5/18/15</a:t>
             </a:fld>
             <a:endParaRPr lang="en-US"/>
           </a:p>
@@ -687,6 +689,90 @@
 </p:notes>
 </file>
 
+<file path=ppt/notesSlides/notesSlide11.xml><?xml version="1.0" encoding="utf-8"?>
+<p:notes xmlns:a="http://schemas.openxmlformats.org/drawingml/2006/main" xmlns:r="http://schemas.openxmlformats.org/officeDocument/2006/relationships" xmlns:p="http://schemas.openxmlformats.org/presentationml/2006/main">
+  <p:cSld>
+    <p:spTree>
+      <p:nvGrpSpPr>
+        <p:cNvPr id="1" name=""/>
+        <p:cNvGrpSpPr/>
+        <p:nvPr/>
+      </p:nvGrpSpPr>
+      <p:grpSpPr>
+        <a:xfrm>
+          <a:off x="0" y="0"/>
+          <a:ext cx="0" cy="0"/>
+          <a:chOff x="0" y="0"/>
+          <a:chExt cx="0" cy="0"/>
+        </a:xfrm>
+      </p:grpSpPr>
+      <p:sp>
+        <p:nvSpPr>
+          <p:cNvPr id="2" name="Slide Image Placeholder 1"/>
+          <p:cNvSpPr>
+            <a:spLocks noGrp="1" noRot="1" noChangeAspect="1"/>
+          </p:cNvSpPr>
+          <p:nvPr>
+            <p:ph type="sldImg"/>
+          </p:nvPr>
+        </p:nvSpPr>
+        <p:spPr/>
+      </p:sp>
+      <p:sp>
+        <p:nvSpPr>
+          <p:cNvPr id="3" name="Notes Placeholder 2"/>
+          <p:cNvSpPr>
+            <a:spLocks noGrp="1"/>
+          </p:cNvSpPr>
+          <p:nvPr>
+            <p:ph type="body" idx="1"/>
+          </p:nvPr>
+        </p:nvSpPr>
+        <p:spPr/>
+        <p:txBody>
+          <a:bodyPr/>
+          <a:lstStyle/>
+          <a:p>
+            <a:endParaRPr lang="en-US"/>
+          </a:p>
+        </p:txBody>
+      </p:sp>
+      <p:sp>
+        <p:nvSpPr>
+          <p:cNvPr id="4" name="Slide Number Placeholder 3"/>
+          <p:cNvSpPr>
+            <a:spLocks noGrp="1"/>
+          </p:cNvSpPr>
+          <p:nvPr>
+            <p:ph type="sldNum" sz="quarter" idx="10"/>
+          </p:nvPr>
+        </p:nvSpPr>
+        <p:spPr/>
+        <p:txBody>
+          <a:bodyPr/>
+          <a:lstStyle/>
+          <a:p>
+            <a:fld id="{8C25A203-B80B-7647-846D-203E4F34DEC8}" type="slidenum">
+              <a:rPr lang="en-US" smtClean="0"/>
+              <a:t>35</a:t>
+            </a:fld>
+            <a:endParaRPr lang="en-US"/>
+          </a:p>
+        </p:txBody>
+      </p:sp>
+    </p:spTree>
+    <p:extLst>
+      <p:ext uri="{BB962C8B-B14F-4D97-AF65-F5344CB8AC3E}">
+        <p14:creationId xmlns:p14="http://schemas.microsoft.com/office/powerpoint/2010/main" val="2015303103"/>
+      </p:ext>
+    </p:extLst>
+  </p:cSld>
+  <p:clrMapOvr>
+    <a:masterClrMapping/>
+  </p:clrMapOvr>
+</p:notes>
+</file>
+
 <file path=ppt/notesSlides/notesSlide2.xml><?xml version="1.0" encoding="utf-8"?>
 <p:notes xmlns:a="http://schemas.openxmlformats.org/drawingml/2006/main" xmlns:r="http://schemas.openxmlformats.org/officeDocument/2006/relationships" xmlns:p="http://schemas.openxmlformats.org/presentationml/2006/main">
   <p:cSld>
@@ -1624,7 +1710,7 @@
           <a:p>
             <a:fld id="{E31BDE11-21A5-024B-AC15-C770EC7EF040}" type="datetimeFigureOut">
               <a:rPr lang="en-US" smtClean="0"/>
-              <a:t>5/15/15</a:t>
+              <a:t>5/18/15</a:t>
             </a:fld>
             <a:endParaRPr lang="en-US"/>
           </a:p>
@@ -1794,7 +1880,7 @@
           <a:p>
             <a:fld id="{E31BDE11-21A5-024B-AC15-C770EC7EF040}" type="datetimeFigureOut">
               <a:rPr lang="en-US" smtClean="0"/>
-              <a:t>5/15/15</a:t>
+              <a:t>5/18/15</a:t>
             </a:fld>
             <a:endParaRPr lang="en-US"/>
           </a:p>
@@ -1974,7 +2060,7 @@
           <a:p>
             <a:fld id="{E31BDE11-21A5-024B-AC15-C770EC7EF040}" type="datetimeFigureOut">
               <a:rPr lang="en-US" smtClean="0"/>
-              <a:t>5/15/15</a:t>
+              <a:t>5/18/15</a:t>
             </a:fld>
             <a:endParaRPr lang="en-US"/>
           </a:p>
@@ -2233,7 +2319,7 @@
           <a:p>
             <a:fld id="{E31BDE11-21A5-024B-AC15-C770EC7EF040}" type="datetimeFigureOut">
               <a:rPr lang="en-US" smtClean="0"/>
-              <a:t>5/15/15</a:t>
+              <a:t>5/18/15</a:t>
             </a:fld>
             <a:endParaRPr lang="en-US"/>
           </a:p>
@@ -2479,7 +2565,7 @@
           <a:p>
             <a:fld id="{E31BDE11-21A5-024B-AC15-C770EC7EF040}" type="datetimeFigureOut">
               <a:rPr lang="en-US" smtClean="0"/>
-              <a:t>5/15/15</a:t>
+              <a:t>5/18/15</a:t>
             </a:fld>
             <a:endParaRPr lang="en-US"/>
           </a:p>
@@ -2767,7 +2853,7 @@
           <a:p>
             <a:fld id="{E31BDE11-21A5-024B-AC15-C770EC7EF040}" type="datetimeFigureOut">
               <a:rPr lang="en-US" smtClean="0"/>
-              <a:t>5/15/15</a:t>
+              <a:t>5/18/15</a:t>
             </a:fld>
             <a:endParaRPr lang="en-US"/>
           </a:p>
@@ -3189,7 +3275,7 @@
           <a:p>
             <a:fld id="{E31BDE11-21A5-024B-AC15-C770EC7EF040}" type="datetimeFigureOut">
               <a:rPr lang="en-US" smtClean="0"/>
-              <a:t>5/15/15</a:t>
+              <a:t>5/18/15</a:t>
             </a:fld>
             <a:endParaRPr lang="en-US"/>
           </a:p>
@@ -3307,7 +3393,7 @@
           <a:p>
             <a:fld id="{E31BDE11-21A5-024B-AC15-C770EC7EF040}" type="datetimeFigureOut">
               <a:rPr lang="en-US" smtClean="0"/>
-              <a:t>5/15/15</a:t>
+              <a:t>5/18/15</a:t>
             </a:fld>
             <a:endParaRPr lang="en-US"/>
           </a:p>
@@ -3402,7 +3488,7 @@
           <a:p>
             <a:fld id="{E31BDE11-21A5-024B-AC15-C770EC7EF040}" type="datetimeFigureOut">
               <a:rPr lang="en-US" smtClean="0"/>
-              <a:t>5/15/15</a:t>
+              <a:t>5/18/15</a:t>
             </a:fld>
             <a:endParaRPr lang="en-US"/>
           </a:p>
@@ -3679,7 +3765,7 @@
           <a:p>
             <a:fld id="{E31BDE11-21A5-024B-AC15-C770EC7EF040}" type="datetimeFigureOut">
               <a:rPr lang="en-US" smtClean="0"/>
-              <a:t>5/15/15</a:t>
+              <a:t>5/18/15</a:t>
             </a:fld>
             <a:endParaRPr lang="en-US"/>
           </a:p>
@@ -3932,7 +4018,7 @@
           <a:p>
             <a:fld id="{E31BDE11-21A5-024B-AC15-C770EC7EF040}" type="datetimeFigureOut">
               <a:rPr lang="en-US" smtClean="0"/>
-              <a:t>5/15/15</a:t>
+              <a:t>5/18/15</a:t>
             </a:fld>
             <a:endParaRPr lang="en-US"/>
           </a:p>
@@ -4145,7 +4231,7 @@
           <a:p>
             <a:fld id="{E31BDE11-21A5-024B-AC15-C770EC7EF040}" type="datetimeFigureOut">
               <a:rPr lang="en-US" smtClean="0"/>
-              <a:t>5/15/15</a:t>
+              <a:t>5/18/15</a:t>
             </a:fld>
             <a:endParaRPr lang="en-US"/>
           </a:p>
@@ -6622,14 +6708,21 @@
                 <a:latin typeface="Arial"/>
                 <a:cs typeface="Arial"/>
               </a:rPr>
-              <a:t>R squared</a:t>
+              <a:t>minimize</a:t>
             </a:r>
             <a:r>
               <a:rPr lang="en-US" sz="2400" dirty="0" smtClean="0">
                 <a:latin typeface="Arial"/>
                 <a:cs typeface="Arial"/>
               </a:rPr>
-              <a:t>: sum of squares of difference between prediction and actual value.</a:t>
+              <a:t> </a:t>
+            </a:r>
+            <a:r>
+              <a:rPr lang="en-US" sz="2400" dirty="0" smtClean="0">
+                <a:latin typeface="Arial"/>
+                <a:cs typeface="Arial"/>
+              </a:rPr>
+              <a:t>sum of squares of difference between prediction and actual value.</a:t>
             </a:r>
           </a:p>
         </p:txBody>
@@ -10546,14 +10639,7 @@
                 <a:latin typeface="Arial"/>
                 <a:cs typeface="Arial"/>
               </a:rPr>
-              <a:t>Predicted good </a:t>
-            </a:r>
-            <a:r>
-              <a:rPr lang="en-US" sz="2400" dirty="0" smtClean="0">
-                <a:latin typeface="Arial"/>
-                <a:cs typeface="Arial"/>
-              </a:rPr>
-              <a:t>view</a:t>
+              <a:t>Predicted good view</a:t>
             </a:r>
             <a:endParaRPr lang="en-US" sz="2400" dirty="0">
               <a:latin typeface="Arial"/>
@@ -10589,14 +10675,7 @@
                 <a:latin typeface="Arial"/>
                 <a:cs typeface="Arial"/>
               </a:rPr>
-              <a:t>Predicted bad </a:t>
-            </a:r>
-            <a:r>
-              <a:rPr lang="en-US" sz="2400" dirty="0" smtClean="0">
-                <a:latin typeface="Arial"/>
-                <a:cs typeface="Arial"/>
-              </a:rPr>
-              <a:t>view</a:t>
+              <a:t>Predicted bad view</a:t>
             </a:r>
             <a:endParaRPr lang="en-US" sz="2400" dirty="0">
               <a:latin typeface="Arial"/>
@@ -12128,10 +12207,6 @@
               </a:rPr>
               <a:t>Identifying “Good view” houses</a:t>
             </a:r>
-            <a:endParaRPr lang="en-US" sz="2400" dirty="0" smtClean="0">
-              <a:latin typeface="Arial"/>
-              <a:cs typeface="Arial"/>
-            </a:endParaRPr>
           </a:p>
         </p:txBody>
       </p:sp>
@@ -12869,14 +12944,7 @@
                 <a:latin typeface="Arial"/>
                 <a:cs typeface="Arial"/>
               </a:rPr>
-              <a:t>Predicted good </a:t>
-            </a:r>
-            <a:r>
-              <a:rPr lang="en-US" sz="2400" dirty="0" smtClean="0">
-                <a:latin typeface="Arial"/>
-                <a:cs typeface="Arial"/>
-              </a:rPr>
-              <a:t>view</a:t>
+              <a:t>Predicted good view</a:t>
             </a:r>
             <a:endParaRPr lang="en-US" sz="2400" dirty="0">
               <a:latin typeface="Arial"/>
@@ -16223,19 +16291,8 @@
                 <a:latin typeface="Arial"/>
                 <a:cs typeface="Arial"/>
               </a:rPr>
-              <a:t>7 right / 9 good view houses = </a:t>
+              <a:t>7 right / 9 good view houses = 78%</a:t>
             </a:r>
-            <a:r>
-              <a:rPr lang="en-US" sz="2400" dirty="0" smtClean="0">
-                <a:latin typeface="Arial"/>
-                <a:cs typeface="Arial"/>
-              </a:rPr>
-              <a:t>78%</a:t>
-            </a:r>
-            <a:endParaRPr lang="en-US" sz="2400" dirty="0" smtClean="0">
-              <a:latin typeface="Arial"/>
-              <a:cs typeface="Arial"/>
-            </a:endParaRPr>
           </a:p>
         </p:txBody>
       </p:sp>
@@ -17694,19 +17751,8 @@
                 <a:latin typeface="Arial"/>
                 <a:cs typeface="Arial"/>
               </a:rPr>
-              <a:t>7 right / 8 labeled “Good view</a:t>
+              <a:t>7 right / 8 labeled “Good view” = 88%</a:t>
             </a:r>
-            <a:r>
-              <a:rPr lang="en-US" sz="2400" dirty="0" smtClean="0">
-                <a:latin typeface="Arial"/>
-                <a:cs typeface="Arial"/>
-              </a:rPr>
-              <a:t>” = 88%</a:t>
-            </a:r>
-            <a:endParaRPr lang="en-US" sz="2400" dirty="0" smtClean="0">
-              <a:latin typeface="Arial"/>
-              <a:cs typeface="Arial"/>
-            </a:endParaRPr>
           </a:p>
         </p:txBody>
       </p:sp>
@@ -18768,17 +18814,7 @@
                 <a:latin typeface="Arial"/>
                 <a:cs typeface="Arial"/>
               </a:rPr>
-              <a:t>Bad </a:t>
-            </a:r>
-            <a:r>
-              <a:rPr lang="en-US" sz="2400" dirty="0" smtClean="0">
-                <a:solidFill>
-                  <a:schemeClr val="accent1"/>
-                </a:solidFill>
-                <a:latin typeface="Arial"/>
-                <a:cs typeface="Arial"/>
-              </a:rPr>
-              <a:t>View</a:t>
+              <a:t>Bad View</a:t>
             </a:r>
             <a:endParaRPr lang="en-US" sz="2400" dirty="0">
               <a:solidFill>
@@ -19010,27 +19046,7 @@
                 <a:latin typeface="Arial"/>
                 <a:cs typeface="Arial"/>
               </a:rPr>
-              <a:t>Bad</a:t>
-            </a:r>
-            <a:r>
-              <a:rPr lang="en-US" sz="2400" dirty="0" smtClean="0">
-                <a:solidFill>
-                  <a:srgbClr val="4F81BD"/>
-                </a:solidFill>
-                <a:latin typeface="Arial"/>
-                <a:cs typeface="Arial"/>
-              </a:rPr>
-              <a:t> </a:t>
-            </a:r>
-            <a:r>
-              <a:rPr lang="en-US" sz="2400" dirty="0" smtClean="0">
-                <a:solidFill>
-                  <a:srgbClr val="4F81BD"/>
-                </a:solidFill>
-                <a:latin typeface="Arial"/>
-                <a:cs typeface="Arial"/>
-              </a:rPr>
-              <a:t>View</a:t>
+              <a:t>Bad View</a:t>
             </a:r>
             <a:endParaRPr lang="en-US" sz="2400" dirty="0">
               <a:solidFill>
@@ -19281,16 +19297,7 @@
                 </a:solidFill>
                 <a:latin typeface="Arial"/>
               </a:rPr>
-              <a:t>Size &lt; </a:t>
-            </a:r>
-            <a:r>
-              <a:rPr lang="en-US" sz="2400" dirty="0" smtClean="0">
-                <a:solidFill>
-                  <a:srgbClr val="000000"/>
-                </a:solidFill>
-                <a:latin typeface="Arial"/>
-              </a:rPr>
-              <a:t>500</a:t>
+              <a:t>Size &lt; 500</a:t>
             </a:r>
             <a:endParaRPr lang="en-US" sz="2400" dirty="0">
               <a:solidFill>
@@ -19576,16 +19583,7 @@
                 </a:solidFill>
                 <a:latin typeface="Arial"/>
               </a:rPr>
-              <a:t>Size </a:t>
-            </a:r>
-            <a:r>
-              <a:rPr lang="en-US" sz="2400" dirty="0" smtClean="0">
-                <a:solidFill>
-                  <a:srgbClr val="000000"/>
-                </a:solidFill>
-                <a:latin typeface="Arial"/>
-              </a:rPr>
-              <a:t>&lt; </a:t>
+              <a:t>Size &lt; </a:t>
             </a:r>
             <a:r>
               <a:rPr lang="en-US" sz="2400" dirty="0">
@@ -19688,27 +19686,7 @@
                 <a:latin typeface="Arial"/>
                 <a:cs typeface="Arial"/>
               </a:rPr>
-              <a:t>Bad</a:t>
-            </a:r>
-            <a:r>
-              <a:rPr lang="en-US" sz="2400" dirty="0" smtClean="0">
-                <a:solidFill>
-                  <a:schemeClr val="accent1"/>
-                </a:solidFill>
-                <a:latin typeface="Arial"/>
-                <a:cs typeface="Arial"/>
-              </a:rPr>
-              <a:t> </a:t>
-            </a:r>
-            <a:r>
-              <a:rPr lang="en-US" sz="2400" dirty="0" smtClean="0">
-                <a:solidFill>
-                  <a:schemeClr val="accent1"/>
-                </a:solidFill>
-                <a:latin typeface="Arial"/>
-                <a:cs typeface="Arial"/>
-              </a:rPr>
-              <a:t>View</a:t>
+              <a:t>Bad View</a:t>
             </a:r>
             <a:endParaRPr lang="en-US" sz="2400" dirty="0">
               <a:solidFill>
@@ -19940,27 +19918,7 @@
                 <a:latin typeface="Arial"/>
                 <a:cs typeface="Arial"/>
               </a:rPr>
-              <a:t>Bad</a:t>
-            </a:r>
-            <a:r>
-              <a:rPr lang="en-US" sz="2400" dirty="0" smtClean="0">
-                <a:solidFill>
-                  <a:srgbClr val="4F81BD"/>
-                </a:solidFill>
-                <a:latin typeface="Arial"/>
-                <a:cs typeface="Arial"/>
-              </a:rPr>
-              <a:t> </a:t>
-            </a:r>
-            <a:r>
-              <a:rPr lang="en-US" sz="2400" dirty="0" smtClean="0">
-                <a:solidFill>
-                  <a:srgbClr val="4F81BD"/>
-                </a:solidFill>
-                <a:latin typeface="Arial"/>
-                <a:cs typeface="Arial"/>
-              </a:rPr>
-              <a:t>View</a:t>
+              <a:t>Bad View</a:t>
             </a:r>
             <a:endParaRPr lang="en-US" sz="2400" dirty="0">
               <a:solidFill>
@@ -20752,14 +20710,7 @@
                 <a:latin typeface="Arial"/>
                 <a:cs typeface="Arial"/>
               </a:rPr>
-              <a:t>many</a:t>
-            </a:r>
-            <a:r>
-              <a:rPr lang="en-US" sz="2400" dirty="0" smtClean="0">
-                <a:latin typeface="Arial"/>
-                <a:cs typeface="Arial"/>
-              </a:rPr>
-              <a:t> </a:t>
+              <a:t>many </a:t>
             </a:r>
             <a:r>
               <a:rPr lang="en-US" sz="2400" b="1" dirty="0" smtClean="0">
@@ -24057,7 +24008,7 @@
 </file>
 
 <file path=ppt/slides/slide24.xml><?xml version="1.0" encoding="utf-8"?>
-<p:sld xmlns:a="http://schemas.openxmlformats.org/drawingml/2006/main" xmlns:r="http://schemas.openxmlformats.org/officeDocument/2006/relationships" xmlns:p="http://schemas.openxmlformats.org/presentationml/2006/main">
+<p:sld xmlns:a="http://schemas.openxmlformats.org/drawingml/2006/main" xmlns:r="http://schemas.openxmlformats.org/officeDocument/2006/relationships" xmlns:p="http://schemas.openxmlformats.org/presentationml/2006/main" show="0">
   <p:cSld>
     <p:spTree>
       <p:nvGrpSpPr>
@@ -25417,6 +25368,14 @@
   <p:clrMapOvr>
     <a:masterClrMapping/>
   </p:clrMapOvr>
+  <mc:AlternateContent xmlns:mc="http://schemas.openxmlformats.org/markup-compatibility/2006">
+    <mc:Choice xmlns:p14="http://schemas.microsoft.com/office/powerpoint/2010/main" Requires="p14">
+      <p:transition spd="slow" p14:dur="2000"/>
+    </mc:Choice>
+    <mc:Fallback>
+      <p:transition xmlns:p14="http://schemas.microsoft.com/office/powerpoint/2010/main" spd="slow"/>
+    </mc:Fallback>
+  </mc:AlternateContent>
   <p:timing>
     <p:tnLst>
       <p:par>
@@ -25572,7 +25531,7 @@
 </file>
 
 <file path=ppt/slides/slide25.xml><?xml version="1.0" encoding="utf-8"?>
-<p:sld xmlns:a="http://schemas.openxmlformats.org/drawingml/2006/main" xmlns:r="http://schemas.openxmlformats.org/officeDocument/2006/relationships" xmlns:p="http://schemas.openxmlformats.org/presentationml/2006/main">
+<p:sld xmlns:a="http://schemas.openxmlformats.org/drawingml/2006/main" xmlns:r="http://schemas.openxmlformats.org/officeDocument/2006/relationships" xmlns:p="http://schemas.openxmlformats.org/presentationml/2006/main" show="0">
   <p:cSld>
     <p:spTree>
       <p:nvGrpSpPr>
@@ -27021,6 +26980,14 @@
   <p:clrMapOvr>
     <a:masterClrMapping/>
   </p:clrMapOvr>
+  <mc:AlternateContent xmlns:mc="http://schemas.openxmlformats.org/markup-compatibility/2006">
+    <mc:Choice xmlns:p14="http://schemas.microsoft.com/office/powerpoint/2010/main" Requires="p14">
+      <p:transition spd="slow" p14:dur="2000"/>
+    </mc:Choice>
+    <mc:Fallback>
+      <p:transition xmlns:p14="http://schemas.microsoft.com/office/powerpoint/2010/main" spd="slow"/>
+    </mc:Fallback>
+  </mc:AlternateContent>
   <p:timing>
     <p:tnLst>
       <p:par>
@@ -34847,6 +34814,51 @@
           </a:p>
         </p:txBody>
       </p:sp>
+      <p:sp>
+        <p:nvSpPr>
+          <p:cNvPr id="43" name="Oval 42"/>
+          <p:cNvSpPr/>
+          <p:nvPr/>
+        </p:nvSpPr>
+        <p:spPr>
+          <a:xfrm>
+            <a:off x="4278222" y="2546628"/>
+            <a:ext cx="393192" cy="395233"/>
+          </a:xfrm>
+          <a:prstGeom prst="ellipse">
+            <a:avLst/>
+          </a:prstGeom>
+          <a:noFill/>
+          <a:ln w="38100" cmpd="sng">
+            <a:solidFill>
+              <a:srgbClr val="FF0000"/>
+            </a:solidFill>
+          </a:ln>
+          <a:effectLst/>
+        </p:spPr>
+        <p:style>
+          <a:lnRef idx="1">
+            <a:schemeClr val="accent1"/>
+          </a:lnRef>
+          <a:fillRef idx="3">
+            <a:schemeClr val="accent1"/>
+          </a:fillRef>
+          <a:effectRef idx="2">
+            <a:schemeClr val="accent1"/>
+          </a:effectRef>
+          <a:fontRef idx="minor">
+            <a:schemeClr val="lt1"/>
+          </a:fontRef>
+        </p:style>
+        <p:txBody>
+          <a:bodyPr rtlCol="0" anchor="ctr"/>
+          <a:lstStyle/>
+          <a:p>
+            <a:pPr algn="ctr"/>
+            <a:endParaRPr lang="en-US" dirty="0"/>
+          </a:p>
+        </p:txBody>
+      </p:sp>
     </p:spTree>
     <p:extLst>
       <p:ext uri="{BB962C8B-B14F-4D97-AF65-F5344CB8AC3E}">
@@ -35039,6 +35051,60 @@
                                   </p:childTnLst>
                                 </p:cTn>
                               </p:par>
+                              <p:par>
+                                <p:cTn id="17" presetID="1" presetClass="entr" presetSubtype="0" fill="hold" grpId="0" nodeType="withEffect">
+                                  <p:stCondLst>
+                                    <p:cond delay="0"/>
+                                  </p:stCondLst>
+                                  <p:childTnLst>
+                                    <p:set>
+                                      <p:cBhvr>
+                                        <p:cTn id="18" dur="1" fill="hold">
+                                          <p:stCondLst>
+                                            <p:cond delay="0"/>
+                                          </p:stCondLst>
+                                        </p:cTn>
+                                        <p:tgtEl>
+                                          <p:spTgt spid="43"/>
+                                        </p:tgtEl>
+                                        <p:attrNameLst>
+                                          <p:attrName>style.visibility</p:attrName>
+                                        </p:attrNameLst>
+                                      </p:cBhvr>
+                                      <p:to>
+                                        <p:strVal val="visible"/>
+                                      </p:to>
+                                    </p:set>
+                                  </p:childTnLst>
+                                </p:cTn>
+                              </p:par>
+                              <p:par>
+                                <p:cTn id="19" presetID="1" presetClass="entr" presetSubtype="0" fill="hold" grpId="1" nodeType="withEffect">
+                                  <p:stCondLst>
+                                    <p:cond delay="0"/>
+                                  </p:stCondLst>
+                                  <p:childTnLst>
+                                    <p:set>
+                                      <p:cBhvr>
+                                        <p:cTn id="20" dur="1" fill="hold">
+                                          <p:stCondLst>
+                                            <p:cond delay="0"/>
+                                          </p:stCondLst>
+                                        </p:cTn>
+                                        <p:tgtEl>
+                                          <p:spTgt spid="43"/>
+                                        </p:tgtEl>
+                                        <p:attrNameLst>
+                                          <p:attrName>style.visibility</p:attrName>
+                                        </p:attrNameLst>
+                                      </p:cBhvr>
+                                      <p:to>
+                                        <p:strVal val="visible"/>
+                                      </p:to>
+                                    </p:set>
+                                  </p:childTnLst>
+                                </p:cTn>
+                              </p:par>
                             </p:childTnLst>
                           </p:cTn>
                         </p:par>
@@ -35073,6 +35139,8 @@
       <p:bldP spid="41" grpId="0" animBg="1"/>
       <p:bldP spid="42" grpId="0" animBg="1"/>
       <p:bldP spid="44" grpId="0"/>
+      <p:bldP spid="43" grpId="0" animBg="1"/>
+      <p:bldP spid="43" grpId="1" animBg="1"/>
     </p:bldLst>
   </p:timing>
 </p:sld>
@@ -37404,7 +37472,7 @@
           <a:p>
             <a:r>
               <a:rPr lang="en-US" dirty="0" smtClean="0"/>
-              <a:t>Tutorial</a:t>
+              <a:t>Overview</a:t>
             </a:r>
             <a:endParaRPr lang="en-US" dirty="0"/>
           </a:p>
@@ -37422,40 +37490,41 @@
         </p:nvSpPr>
         <p:spPr/>
         <p:txBody>
-          <a:bodyPr/>
+          <a:bodyPr>
+            <a:normAutofit/>
+          </a:bodyPr>
           <a:lstStyle/>
+          <a:p>
+            <a:endParaRPr lang="en-US" dirty="0"/>
+          </a:p>
           <a:p>
             <a:r>
               <a:rPr lang="en-US" dirty="0" smtClean="0"/>
-              <a:t>Using Python machine learning library called </a:t>
+              <a:t>Machine learning concepts</a:t>
             </a:r>
+          </a:p>
+          <a:p>
             <a:r>
               <a:rPr lang="en-US" dirty="0" err="1" smtClean="0"/>
-              <a:t>sci</a:t>
+              <a:t>Scikit</a:t>
             </a:r>
             <a:r>
               <a:rPr lang="en-US" dirty="0" smtClean="0"/>
-              <a:t>-kit learn.</a:t>
+              <a:t>-learn: a Python machine learning library</a:t>
             </a:r>
-            <a:endParaRPr lang="en-US" dirty="0"/>
-          </a:p>
-          <a:p>
-            <a:r>
-              <a:rPr lang="en-US" dirty="0" err="1" smtClean="0"/>
-              <a:t>Sci</a:t>
-            </a:r>
+          </a:p>
+          <a:p>
             <a:r>
               <a:rPr lang="en-US" dirty="0" smtClean="0"/>
-              <a:t>-kit learn has a simple API for training and using models</a:t>
+              <a:t>2 hands-on tutorial examples</a:t>
             </a:r>
-            <a:endParaRPr lang="en-US" dirty="0"/>
           </a:p>
         </p:txBody>
       </p:sp>
     </p:spTree>
     <p:extLst>
       <p:ext uri="{BB962C8B-B14F-4D97-AF65-F5344CB8AC3E}">
-        <p14:creationId xmlns:p14="http://schemas.microsoft.com/office/powerpoint/2010/main" val="615557430"/>
+        <p14:creationId xmlns:p14="http://schemas.microsoft.com/office/powerpoint/2010/main" val="2434490937"/>
       </p:ext>
     </p:extLst>
   </p:cSld>
@@ -37501,14 +37570,12 @@
         </p:nvSpPr>
         <p:spPr/>
         <p:txBody>
-          <a:bodyPr>
-            <a:normAutofit/>
-          </a:bodyPr>
+          <a:bodyPr/>
           <a:lstStyle/>
           <a:p>
             <a:r>
               <a:rPr lang="en-US" dirty="0" smtClean="0"/>
-              <a:t>Feature Engineering</a:t>
+              <a:t>Tutorial</a:t>
             </a:r>
             <a:endParaRPr lang="en-US" dirty="0"/>
           </a:p>
@@ -37529,6 +37596,110 @@
           <a:bodyPr/>
           <a:lstStyle/>
           <a:p>
+            <a:r>
+              <a:rPr lang="en-US" dirty="0" smtClean="0"/>
+              <a:t>Using Python machine learning library called </a:t>
+            </a:r>
+            <a:r>
+              <a:rPr lang="en-US" dirty="0" err="1" smtClean="0"/>
+              <a:t>sci</a:t>
+            </a:r>
+            <a:r>
+              <a:rPr lang="en-US" dirty="0" smtClean="0"/>
+              <a:t>-kit learn.</a:t>
+            </a:r>
+            <a:endParaRPr lang="en-US" dirty="0"/>
+          </a:p>
+          <a:p>
+            <a:r>
+              <a:rPr lang="en-US" dirty="0" err="1" smtClean="0"/>
+              <a:t>Sci</a:t>
+            </a:r>
+            <a:r>
+              <a:rPr lang="en-US" dirty="0" smtClean="0"/>
+              <a:t>-kit learn has a simple API for training and using models</a:t>
+            </a:r>
+            <a:endParaRPr lang="en-US" dirty="0"/>
+          </a:p>
+        </p:txBody>
+      </p:sp>
+    </p:spTree>
+    <p:extLst>
+      <p:ext uri="{BB962C8B-B14F-4D97-AF65-F5344CB8AC3E}">
+        <p14:creationId xmlns:p14="http://schemas.microsoft.com/office/powerpoint/2010/main" val="615557430"/>
+      </p:ext>
+    </p:extLst>
+  </p:cSld>
+  <p:clrMapOvr>
+    <a:masterClrMapping/>
+  </p:clrMapOvr>
+  <p:timing>
+    <p:tnLst>
+      <p:par>
+        <p:cTn xmlns:p14="http://schemas.microsoft.com/office/powerpoint/2010/main" id="1" dur="indefinite" restart="never" nodeType="tmRoot"/>
+      </p:par>
+    </p:tnLst>
+  </p:timing>
+</p:sld>
+</file>
+
+<file path=ppt/slides/slide37.xml><?xml version="1.0" encoding="utf-8"?>
+<p:sld xmlns:a="http://schemas.openxmlformats.org/drawingml/2006/main" xmlns:r="http://schemas.openxmlformats.org/officeDocument/2006/relationships" xmlns:p="http://schemas.openxmlformats.org/presentationml/2006/main" show="0">
+  <p:cSld>
+    <p:spTree>
+      <p:nvGrpSpPr>
+        <p:cNvPr id="1" name=""/>
+        <p:cNvGrpSpPr/>
+        <p:nvPr/>
+      </p:nvGrpSpPr>
+      <p:grpSpPr>
+        <a:xfrm>
+          <a:off x="0" y="0"/>
+          <a:ext cx="0" cy="0"/>
+          <a:chOff x="0" y="0"/>
+          <a:chExt cx="0" cy="0"/>
+        </a:xfrm>
+      </p:grpSpPr>
+      <p:sp>
+        <p:nvSpPr>
+          <p:cNvPr id="2" name="Title 1"/>
+          <p:cNvSpPr>
+            <a:spLocks noGrp="1"/>
+          </p:cNvSpPr>
+          <p:nvPr>
+            <p:ph type="title"/>
+          </p:nvPr>
+        </p:nvSpPr>
+        <p:spPr/>
+        <p:txBody>
+          <a:bodyPr>
+            <a:normAutofit/>
+          </a:bodyPr>
+          <a:lstStyle/>
+          <a:p>
+            <a:r>
+              <a:rPr lang="en-US" dirty="0" smtClean="0"/>
+              <a:t>Feature Engineering</a:t>
+            </a:r>
+            <a:endParaRPr lang="en-US" dirty="0"/>
+          </a:p>
+        </p:txBody>
+      </p:sp>
+      <p:sp>
+        <p:nvSpPr>
+          <p:cNvPr id="3" name="Content Placeholder 2"/>
+          <p:cNvSpPr>
+            <a:spLocks noGrp="1"/>
+          </p:cNvSpPr>
+          <p:nvPr>
+            <p:ph idx="1"/>
+          </p:nvPr>
+        </p:nvSpPr>
+        <p:spPr/>
+        <p:txBody>
+          <a:bodyPr/>
+          <a:lstStyle/>
+          <a:p>
             <a:pPr marL="457200" lvl="1" indent="0">
               <a:buNone/>
             </a:pPr>
@@ -37598,6 +37769,14 @@
   <p:clrMapOvr>
     <a:masterClrMapping/>
   </p:clrMapOvr>
+  <mc:AlternateContent xmlns:mc="http://schemas.openxmlformats.org/markup-compatibility/2006">
+    <mc:Choice xmlns:p14="http://schemas.microsoft.com/office/powerpoint/2010/main" Requires="p14">
+      <p:transition spd="slow" p14:dur="2000"/>
+    </mc:Choice>
+    <mc:Fallback>
+      <p:transition xmlns:p14="http://schemas.microsoft.com/office/powerpoint/2010/main" spd="slow"/>
+    </mc:Fallback>
+  </mc:AlternateContent>
   <p:timing>
     <p:tnLst>
       <p:par>
@@ -37711,7 +37890,7 @@
 </p:sld>
 </file>
 
-<file path=ppt/slides/slide37.xml><?xml version="1.0" encoding="utf-8"?>
+<file path=ppt/slides/slide38.xml><?xml version="1.0" encoding="utf-8"?>
 <p:sld xmlns:a="http://schemas.openxmlformats.org/drawingml/2006/main" xmlns:r="http://schemas.openxmlformats.org/officeDocument/2006/relationships" xmlns:p="http://schemas.openxmlformats.org/presentationml/2006/main">
   <p:cSld>
     <p:spTree>
@@ -39245,7 +39424,7 @@
 </p:sld>
 </file>
 
-<file path=ppt/slides/slide38.xml><?xml version="1.0" encoding="utf-8"?>
+<file path=ppt/slides/slide39.xml><?xml version="1.0" encoding="utf-8"?>
 <p:sld xmlns:a="http://schemas.openxmlformats.org/drawingml/2006/main" xmlns:r="http://schemas.openxmlformats.org/officeDocument/2006/relationships" xmlns:p="http://schemas.openxmlformats.org/presentationml/2006/main">
   <p:cSld>
     <p:spTree>
@@ -40237,131 +40416,6 @@
 </p:sld>
 </file>
 
-<file path=ppt/slides/slide39.xml><?xml version="1.0" encoding="utf-8"?>
-<p:sld xmlns:a="http://schemas.openxmlformats.org/drawingml/2006/main" xmlns:r="http://schemas.openxmlformats.org/officeDocument/2006/relationships" xmlns:p="http://schemas.openxmlformats.org/presentationml/2006/main">
-  <p:cSld>
-    <p:spTree>
-      <p:nvGrpSpPr>
-        <p:cNvPr id="1" name=""/>
-        <p:cNvGrpSpPr/>
-        <p:nvPr/>
-      </p:nvGrpSpPr>
-      <p:grpSpPr>
-        <a:xfrm>
-          <a:off x="0" y="0"/>
-          <a:ext cx="0" cy="0"/>
-          <a:chOff x="0" y="0"/>
-          <a:chExt cx="0" cy="0"/>
-        </a:xfrm>
-      </p:grpSpPr>
-      <p:sp>
-        <p:nvSpPr>
-          <p:cNvPr id="2" name="Title 1"/>
-          <p:cNvSpPr>
-            <a:spLocks noGrp="1"/>
-          </p:cNvSpPr>
-          <p:nvPr>
-            <p:ph type="title"/>
-          </p:nvPr>
-        </p:nvSpPr>
-        <p:spPr/>
-        <p:txBody>
-          <a:bodyPr/>
-          <a:lstStyle/>
-          <a:p>
-            <a:r>
-              <a:rPr lang="en-US" dirty="0" smtClean="0"/>
-              <a:t>Recap</a:t>
-            </a:r>
-            <a:endParaRPr lang="en-US" dirty="0"/>
-          </a:p>
-        </p:txBody>
-      </p:sp>
-      <p:sp>
-        <p:nvSpPr>
-          <p:cNvPr id="3" name="Content Placeholder 2"/>
-          <p:cNvSpPr>
-            <a:spLocks noGrp="1"/>
-          </p:cNvSpPr>
-          <p:nvPr>
-            <p:ph idx="1"/>
-          </p:nvPr>
-        </p:nvSpPr>
-        <p:spPr/>
-        <p:txBody>
-          <a:bodyPr>
-            <a:normAutofit/>
-          </a:bodyPr>
-          <a:lstStyle/>
-          <a:p>
-            <a:r>
-              <a:rPr lang="en-US" dirty="0" smtClean="0"/>
-              <a:t>Supervised learning</a:t>
-            </a:r>
-          </a:p>
-          <a:p>
-            <a:r>
-              <a:rPr lang="en-US" dirty="0" smtClean="0"/>
-              <a:t>Regression</a:t>
-            </a:r>
-          </a:p>
-          <a:p>
-            <a:r>
-              <a:rPr lang="en-US" dirty="0" smtClean="0"/>
-              <a:t>Classification</a:t>
-            </a:r>
-          </a:p>
-          <a:p>
-            <a:r>
-              <a:rPr lang="en-US" dirty="0" err="1" smtClean="0"/>
-              <a:t>Overfitting</a:t>
-            </a:r>
-            <a:endParaRPr lang="en-US" dirty="0" smtClean="0"/>
-          </a:p>
-          <a:p>
-            <a:r>
-              <a:rPr lang="en-US" dirty="0" smtClean="0"/>
-              <a:t>Model selection</a:t>
-            </a:r>
-          </a:p>
-          <a:p>
-            <a:r>
-              <a:rPr lang="en-US" dirty="0" smtClean="0"/>
-              <a:t>Train, test sets</a:t>
-            </a:r>
-          </a:p>
-          <a:p>
-            <a:r>
-              <a:rPr lang="en-US" dirty="0" err="1" smtClean="0"/>
-              <a:t>Sci</a:t>
-            </a:r>
-            <a:r>
-              <a:rPr lang="en-US" dirty="0" smtClean="0"/>
-              <a:t>-kit Learn library</a:t>
-            </a:r>
-          </a:p>
-        </p:txBody>
-      </p:sp>
-    </p:spTree>
-    <p:extLst>
-      <p:ext uri="{BB962C8B-B14F-4D97-AF65-F5344CB8AC3E}">
-        <p14:creationId xmlns:p14="http://schemas.microsoft.com/office/powerpoint/2010/main" val="3033054681"/>
-      </p:ext>
-    </p:extLst>
-  </p:cSld>
-  <p:clrMapOvr>
-    <a:masterClrMapping/>
-  </p:clrMapOvr>
-  <p:timing>
-    <p:tnLst>
-      <p:par>
-        <p:cTn xmlns:p14="http://schemas.microsoft.com/office/powerpoint/2010/main" id="1" dur="indefinite" restart="never" nodeType="tmRoot"/>
-      </p:par>
-    </p:tnLst>
-  </p:timing>
-</p:sld>
-</file>
-
 <file path=ppt/slides/slide4.xml><?xml version="1.0" encoding="utf-8"?>
 <p:sld xmlns:a="http://schemas.openxmlformats.org/drawingml/2006/main" xmlns:r="http://schemas.openxmlformats.org/officeDocument/2006/relationships" xmlns:p="http://schemas.openxmlformats.org/presentationml/2006/main">
   <p:cSld>
@@ -40424,11 +40478,7 @@
           <a:p>
             <a:r>
               <a:rPr lang="en-US" dirty="0" smtClean="0"/>
-              <a:t>M</a:t>
-            </a:r>
-            <a:r>
-              <a:rPr lang="en-US" dirty="0" smtClean="0"/>
-              <a:t>achine learning concepts</a:t>
+              <a:t>Machine learning concepts</a:t>
             </a:r>
           </a:p>
           <a:p>
@@ -40446,7 +40496,6 @@
               <a:rPr lang="en-US" dirty="0" smtClean="0"/>
               <a:t>2 hands-on tutorial examples</a:t>
             </a:r>
-            <a:endParaRPr lang="en-US" dirty="0" smtClean="0"/>
           </a:p>
         </p:txBody>
       </p:sp>
@@ -40471,6 +40520,131 @@
 </file>
 
 <file path=ppt/slides/slide40.xml><?xml version="1.0" encoding="utf-8"?>
+<p:sld xmlns:a="http://schemas.openxmlformats.org/drawingml/2006/main" xmlns:r="http://schemas.openxmlformats.org/officeDocument/2006/relationships" xmlns:p="http://schemas.openxmlformats.org/presentationml/2006/main">
+  <p:cSld>
+    <p:spTree>
+      <p:nvGrpSpPr>
+        <p:cNvPr id="1" name=""/>
+        <p:cNvGrpSpPr/>
+        <p:nvPr/>
+      </p:nvGrpSpPr>
+      <p:grpSpPr>
+        <a:xfrm>
+          <a:off x="0" y="0"/>
+          <a:ext cx="0" cy="0"/>
+          <a:chOff x="0" y="0"/>
+          <a:chExt cx="0" cy="0"/>
+        </a:xfrm>
+      </p:grpSpPr>
+      <p:sp>
+        <p:nvSpPr>
+          <p:cNvPr id="2" name="Title 1"/>
+          <p:cNvSpPr>
+            <a:spLocks noGrp="1"/>
+          </p:cNvSpPr>
+          <p:nvPr>
+            <p:ph type="title"/>
+          </p:nvPr>
+        </p:nvSpPr>
+        <p:spPr/>
+        <p:txBody>
+          <a:bodyPr/>
+          <a:lstStyle/>
+          <a:p>
+            <a:r>
+              <a:rPr lang="en-US" dirty="0" smtClean="0"/>
+              <a:t>Recap</a:t>
+            </a:r>
+            <a:endParaRPr lang="en-US" dirty="0"/>
+          </a:p>
+        </p:txBody>
+      </p:sp>
+      <p:sp>
+        <p:nvSpPr>
+          <p:cNvPr id="3" name="Content Placeholder 2"/>
+          <p:cNvSpPr>
+            <a:spLocks noGrp="1"/>
+          </p:cNvSpPr>
+          <p:nvPr>
+            <p:ph idx="1"/>
+          </p:nvPr>
+        </p:nvSpPr>
+        <p:spPr/>
+        <p:txBody>
+          <a:bodyPr>
+            <a:normAutofit/>
+          </a:bodyPr>
+          <a:lstStyle/>
+          <a:p>
+            <a:r>
+              <a:rPr lang="en-US" dirty="0" smtClean="0"/>
+              <a:t>Supervised learning</a:t>
+            </a:r>
+          </a:p>
+          <a:p>
+            <a:r>
+              <a:rPr lang="en-US" dirty="0" smtClean="0"/>
+              <a:t>Regression</a:t>
+            </a:r>
+          </a:p>
+          <a:p>
+            <a:r>
+              <a:rPr lang="en-US" dirty="0" smtClean="0"/>
+              <a:t>Classification</a:t>
+            </a:r>
+          </a:p>
+          <a:p>
+            <a:r>
+              <a:rPr lang="en-US" dirty="0" err="1" smtClean="0"/>
+              <a:t>Overfitting</a:t>
+            </a:r>
+            <a:endParaRPr lang="en-US" dirty="0" smtClean="0"/>
+          </a:p>
+          <a:p>
+            <a:r>
+              <a:rPr lang="en-US" dirty="0" smtClean="0"/>
+              <a:t>Model selection</a:t>
+            </a:r>
+          </a:p>
+          <a:p>
+            <a:r>
+              <a:rPr lang="en-US" dirty="0" smtClean="0"/>
+              <a:t>Train, test sets</a:t>
+            </a:r>
+          </a:p>
+          <a:p>
+            <a:r>
+              <a:rPr lang="en-US" dirty="0" err="1" smtClean="0"/>
+              <a:t>Sci</a:t>
+            </a:r>
+            <a:r>
+              <a:rPr lang="en-US" dirty="0" smtClean="0"/>
+              <a:t>-kit Learn library</a:t>
+            </a:r>
+          </a:p>
+        </p:txBody>
+      </p:sp>
+    </p:spTree>
+    <p:extLst>
+      <p:ext uri="{BB962C8B-B14F-4D97-AF65-F5344CB8AC3E}">
+        <p14:creationId xmlns:p14="http://schemas.microsoft.com/office/powerpoint/2010/main" val="3033054681"/>
+      </p:ext>
+    </p:extLst>
+  </p:cSld>
+  <p:clrMapOvr>
+    <a:masterClrMapping/>
+  </p:clrMapOvr>
+  <p:timing>
+    <p:tnLst>
+      <p:par>
+        <p:cTn xmlns:p14="http://schemas.microsoft.com/office/powerpoint/2010/main" id="1" dur="indefinite" restart="never" nodeType="tmRoot"/>
+      </p:par>
+    </p:tnLst>
+  </p:timing>
+</p:sld>
+</file>
+
+<file path=ppt/slides/slide41.xml><?xml version="1.0" encoding="utf-8"?>
 <p:sld xmlns:a="http://schemas.openxmlformats.org/drawingml/2006/main" xmlns:r="http://schemas.openxmlformats.org/officeDocument/2006/relationships" xmlns:p="http://schemas.openxmlformats.org/presentationml/2006/main" show="0">
   <p:cSld>
     <p:spTree>
@@ -40597,7 +40771,7 @@
 </p:sld>
 </file>
 
-<file path=ppt/slides/slide41.xml><?xml version="1.0" encoding="utf-8"?>
+<file path=ppt/slides/slide42.xml><?xml version="1.0" encoding="utf-8"?>
 <p:sld xmlns:a="http://schemas.openxmlformats.org/drawingml/2006/main" xmlns:r="http://schemas.openxmlformats.org/officeDocument/2006/relationships" xmlns:p="http://schemas.openxmlformats.org/presentationml/2006/main">
   <p:cSld>
     <p:spTree>
@@ -40696,7 +40870,59 @@
                 <a:latin typeface="GT Walsheim Regular"/>
                 <a:cs typeface="GT Walsheim Regular"/>
               </a:rPr>
-              <a:t>Medical Data </a:t>
+              <a:t>Boston Housing Data Regression</a:t>
+            </a:r>
+          </a:p>
+          <a:p>
+            <a:pPr marL="0" indent="0">
+              <a:buNone/>
+            </a:pPr>
+            <a:r>
+              <a:rPr lang="en-US" sz="2800" dirty="0">
+                <a:solidFill>
+                  <a:srgbClr val="000000"/>
+                </a:solidFill>
+                <a:latin typeface="GT Walsheim Regular"/>
+                <a:cs typeface="GT Walsheim Regular"/>
+              </a:rPr>
+              <a:t>TODO: include link</a:t>
+            </a:r>
+          </a:p>
+          <a:p>
+            <a:pPr marL="0" indent="0">
+              <a:buNone/>
+            </a:pPr>
+            <a:endParaRPr lang="en-US" sz="2800" b="1" dirty="0" smtClean="0">
+              <a:solidFill>
+                <a:srgbClr val="000000"/>
+              </a:solidFill>
+              <a:latin typeface="GT Walsheim Regular"/>
+              <a:cs typeface="GT Walsheim Regular"/>
+            </a:endParaRPr>
+          </a:p>
+          <a:p>
+            <a:pPr marL="0" indent="0">
+              <a:buNone/>
+            </a:pPr>
+            <a:r>
+              <a:rPr lang="en-US" sz="2800" b="1" dirty="0" smtClean="0">
+                <a:solidFill>
+                  <a:srgbClr val="000000"/>
+                </a:solidFill>
+                <a:latin typeface="GT Walsheim Regular"/>
+                <a:cs typeface="GT Walsheim Regular"/>
+              </a:rPr>
+              <a:t>Medical </a:t>
+            </a:r>
+            <a:r>
+              <a:rPr lang="en-US" sz="2800" b="1" dirty="0">
+                <a:solidFill>
+                  <a:srgbClr val="000000"/>
+                </a:solidFill>
+                <a:latin typeface="GT Walsheim Regular"/>
+                <a:cs typeface="GT Walsheim Regular"/>
+              </a:rPr>
+              <a:t>Data </a:t>
             </a:r>
             <a:r>
               <a:rPr lang="en-US" sz="2800" b="1" dirty="0" smtClean="0">
@@ -40732,73 +40958,6 @@
             </a:r>
           </a:p>
           <a:p>
-            <a:endParaRPr lang="en-US" sz="2800" dirty="0">
-              <a:solidFill>
-                <a:srgbClr val="000000"/>
-              </a:solidFill>
-              <a:latin typeface="GT Walsheim Regular"/>
-              <a:cs typeface="GT Walsheim Regular"/>
-            </a:endParaRPr>
-          </a:p>
-          <a:p>
-            <a:pPr marL="0" indent="0">
-              <a:buNone/>
-            </a:pPr>
-            <a:r>
-              <a:rPr lang="en-US" sz="2800" b="1" dirty="0" smtClean="0">
-                <a:solidFill>
-                  <a:srgbClr val="000000"/>
-                </a:solidFill>
-                <a:latin typeface="GT Walsheim Regular"/>
-                <a:cs typeface="GT Walsheim Regular"/>
-              </a:rPr>
-              <a:t>Boston </a:t>
-            </a:r>
-            <a:r>
-              <a:rPr lang="en-US" sz="2800" b="1" dirty="0">
-                <a:solidFill>
-                  <a:srgbClr val="000000"/>
-                </a:solidFill>
-                <a:latin typeface="GT Walsheim Regular"/>
-                <a:cs typeface="GT Walsheim Regular"/>
-              </a:rPr>
-              <a:t>Housing Data Regression</a:t>
-            </a:r>
-          </a:p>
-          <a:p>
-            <a:pPr marL="0" indent="0">
-              <a:buNone/>
-            </a:pPr>
-            <a:r>
-              <a:rPr lang="en-US" sz="2800" dirty="0" smtClean="0">
-                <a:solidFill>
-                  <a:srgbClr val="000000"/>
-                </a:solidFill>
-                <a:latin typeface="GT Walsheim Regular"/>
-                <a:cs typeface="GT Walsheim Regular"/>
-              </a:rPr>
-              <a:t>TODO</a:t>
-            </a:r>
-            <a:r>
-              <a:rPr lang="en-US" sz="2800" dirty="0">
-                <a:solidFill>
-                  <a:srgbClr val="000000"/>
-                </a:solidFill>
-                <a:latin typeface="GT Walsheim Regular"/>
-                <a:cs typeface="GT Walsheim Regular"/>
-              </a:rPr>
-              <a:t>: include </a:t>
-            </a:r>
-            <a:r>
-              <a:rPr lang="en-US" sz="2800" dirty="0" smtClean="0">
-                <a:solidFill>
-                  <a:srgbClr val="000000"/>
-                </a:solidFill>
-                <a:latin typeface="GT Walsheim Regular"/>
-                <a:cs typeface="GT Walsheim Regular"/>
-              </a:rPr>
-              <a:t>link</a:t>
-            </a:r>
             <a:endParaRPr lang="en-US" sz="2800" dirty="0">
               <a:solidFill>
                 <a:srgbClr val="000000"/>
@@ -40829,7 +40988,67 @@
 </p:sld>
 </file>
 
-<file path=ppt/slides/slide42.xml><?xml version="1.0" encoding="utf-8"?>
+<file path=ppt/slides/slide43.xml><?xml version="1.0" encoding="utf-8"?>
+<p:sld xmlns:a="http://schemas.openxmlformats.org/drawingml/2006/main" xmlns:r="http://schemas.openxmlformats.org/officeDocument/2006/relationships" xmlns:p="http://schemas.openxmlformats.org/presentationml/2006/main">
+  <p:cSld>
+    <p:spTree>
+      <p:nvGrpSpPr>
+        <p:cNvPr id="1" name=""/>
+        <p:cNvGrpSpPr/>
+        <p:nvPr/>
+      </p:nvGrpSpPr>
+      <p:grpSpPr>
+        <a:xfrm>
+          <a:off x="0" y="0"/>
+          <a:ext cx="0" cy="0"/>
+          <a:chOff x="0" y="0"/>
+          <a:chExt cx="0" cy="0"/>
+        </a:xfrm>
+      </p:grpSpPr>
+      <p:sp>
+        <p:nvSpPr>
+          <p:cNvPr id="2" name="TextBox 1"/>
+          <p:cNvSpPr txBox="1"/>
+          <p:nvPr/>
+        </p:nvSpPr>
+        <p:spPr>
+          <a:xfrm>
+            <a:off x="2207013" y="702752"/>
+            <a:ext cx="1088046" cy="369332"/>
+          </a:xfrm>
+          <a:prstGeom prst="rect">
+            <a:avLst/>
+          </a:prstGeom>
+          <a:noFill/>
+        </p:spPr>
+        <p:txBody>
+          <a:bodyPr wrap="none" rtlCol="0">
+            <a:spAutoFit/>
+          </a:bodyPr>
+          <a:lstStyle/>
+          <a:p>
+            <a:r>
+              <a:rPr lang="en-US" dirty="0" smtClean="0"/>
+              <a:t>Glossary?</a:t>
+            </a:r>
+            <a:endParaRPr lang="en-US" dirty="0"/>
+          </a:p>
+        </p:txBody>
+      </p:sp>
+    </p:spTree>
+    <p:extLst>
+      <p:ext uri="{BB962C8B-B14F-4D97-AF65-F5344CB8AC3E}">
+        <p14:creationId xmlns:p14="http://schemas.microsoft.com/office/powerpoint/2010/main" val="1190229087"/>
+      </p:ext>
+    </p:extLst>
+  </p:cSld>
+  <p:clrMapOvr>
+    <a:masterClrMapping/>
+  </p:clrMapOvr>
+</p:sld>
+</file>
+
+<file path=ppt/slides/slide44.xml><?xml version="1.0" encoding="utf-8"?>
 <p:sld xmlns:a="http://schemas.openxmlformats.org/drawingml/2006/main" xmlns:r="http://schemas.openxmlformats.org/officeDocument/2006/relationships" xmlns:p="http://schemas.openxmlformats.org/presentationml/2006/main" show="0">
   <p:cSld>
     <p:spTree>
@@ -40940,7 +41159,7 @@
 </p:sld>
 </file>
 
-<file path=ppt/slides/slide43.xml><?xml version="1.0" encoding="utf-8"?>
+<file path=ppt/slides/slide45.xml><?xml version="1.0" encoding="utf-8"?>
 <p:sld xmlns:a="http://schemas.openxmlformats.org/drawingml/2006/main" xmlns:r="http://schemas.openxmlformats.org/officeDocument/2006/relationships" xmlns:p="http://schemas.openxmlformats.org/presentationml/2006/main" show="0">
   <p:cSld>
     <p:spTree>
@@ -41123,7 +41342,7 @@
 </p:sld>
 </file>
 
-<file path=ppt/slides/slide44.xml><?xml version="1.0" encoding="utf-8"?>
+<file path=ppt/slides/slide46.xml><?xml version="1.0" encoding="utf-8"?>
 <p:sld xmlns:a="http://schemas.openxmlformats.org/drawingml/2006/main" xmlns:r="http://schemas.openxmlformats.org/officeDocument/2006/relationships" xmlns:p="http://schemas.openxmlformats.org/presentationml/2006/main">
   <p:cSld>
     <p:spTree>
@@ -41260,14 +41479,34 @@
               <a:t>Nathan Howell, </a:t>
             </a:r>
             <a:r>
-              <a:rPr lang="en-US" sz="2800" dirty="0" err="1">
+              <a:rPr lang="en-US" sz="2800" dirty="0" smtClean="0">
                 <a:solidFill>
                   <a:srgbClr val="000000"/>
                 </a:solidFill>
                 <a:latin typeface="GT Walsheim Regular"/>
                 <a:cs typeface="GT Walsheim Regular"/>
               </a:rPr>
-              <a:t>Zhixian</a:t>
+              <a:t>Jason </a:t>
+            </a:r>
+            <a:r>
+              <a:rPr lang="en-US" sz="2800" dirty="0" err="1" smtClean="0">
+                <a:solidFill>
+                  <a:srgbClr val="000000"/>
+                </a:solidFill>
+                <a:latin typeface="GT Walsheim Regular"/>
+                <a:cs typeface="GT Walsheim Regular"/>
+              </a:rPr>
+              <a:t>Ansel</a:t>
+            </a:r>
+            <a:r>
+              <a:rPr lang="en-US" sz="2800" dirty="0" smtClean="0">
+                <a:solidFill>
+                  <a:srgbClr val="000000"/>
+                </a:solidFill>
+                <a:latin typeface="GT Walsheim Regular"/>
+                <a:cs typeface="GT Walsheim Regular"/>
+              </a:rPr>
+              <a:t>, </a:t>
             </a:r>
             <a:r>
               <a:rPr lang="en-US" sz="2800" dirty="0">
@@ -41277,7 +41516,7 @@
                 <a:latin typeface="GT Walsheim Regular"/>
                 <a:cs typeface="GT Walsheim Regular"/>
               </a:rPr>
-              <a:t> Yan, Jeffrey </a:t>
+              <a:t>Jeffrey </a:t>
             </a:r>
             <a:r>
               <a:rPr lang="en-US" sz="2800" dirty="0" err="1">

</xml_diff>

<commit_message>
Working on first half of presentation
</commit_message>
<xml_diff>
--- a/Techfest_ML.pptx
+++ b/Techfest_ML.pptx
@@ -555,7 +555,31 @@
             </a:r>
             <a:r>
               <a:rPr lang="en-US" baseline="0" dirty="0" smtClean="0"/>
-              <a:t> ourselves and what we’ll be talking about!</a:t>
+              <a:t> ourselves and what we’ll be talking about</a:t>
+            </a:r>
+            <a:r>
+              <a:rPr lang="en-US" baseline="0" dirty="0" smtClean="0"/>
+              <a:t>!</a:t>
+            </a:r>
+          </a:p>
+          <a:p>
+            <a:r>
+              <a:rPr lang="en-US" baseline="0" dirty="0" smtClean="0"/>
+              <a:t>Arsen and I are engineers on the </a:t>
+            </a:r>
+            <a:r>
+              <a:rPr lang="en-US" baseline="0" dirty="0" err="1" smtClean="0"/>
+              <a:t>Locu</a:t>
+            </a:r>
+            <a:r>
+              <a:rPr lang="en-US" baseline="0" dirty="0" smtClean="0"/>
+              <a:t> team. Arsen works on our API and I work on our crowd platform for gathering structured data.</a:t>
+            </a:r>
+          </a:p>
+          <a:p>
+            <a:r>
+              <a:rPr lang="en-US" baseline="0" dirty="0" smtClean="0"/>
+              <a:t>David is a data scientist on the domains team.</a:t>
             </a:r>
             <a:endParaRPr lang="en-US" dirty="0"/>
           </a:p>
@@ -8738,7 +8762,15 @@
           <a:p>
             <a:r>
               <a:rPr lang="en-US" dirty="0" smtClean="0"/>
-              <a:t>Does this house have a good view?</a:t>
+              <a:t>Does this house have a </a:t>
+            </a:r>
+            <a:r>
+              <a:rPr lang="en-US" dirty="0" smtClean="0"/>
+              <a:t>view</a:t>
+            </a:r>
+            <a:r>
+              <a:rPr lang="en-US" dirty="0" smtClean="0"/>
+              <a:t>?</a:t>
             </a:r>
           </a:p>
         </p:txBody>
@@ -8766,20 +8798,45 @@
           <a:lstStyle/>
           <a:p>
             <a:r>
-              <a:rPr lang="en-US" sz="4000" dirty="0" smtClean="0">
+              <a:rPr lang="en-US" sz="4000" dirty="0">
                 <a:latin typeface="Arial"/>
                 <a:cs typeface="Arial"/>
               </a:rPr>
-              <a:t>Good view</a:t>
+              <a:t>V</a:t>
             </a:r>
-          </a:p>
-          <a:p>
             <a:r>
               <a:rPr lang="en-US" sz="4000" dirty="0" smtClean="0">
                 <a:latin typeface="Arial"/>
                 <a:cs typeface="Arial"/>
               </a:rPr>
-              <a:t>Bad view</a:t>
+              <a:t>iew</a:t>
+            </a:r>
+            <a:endParaRPr lang="en-US" sz="4000" dirty="0" smtClean="0">
+              <a:latin typeface="Arial"/>
+              <a:cs typeface="Arial"/>
+            </a:endParaRPr>
+          </a:p>
+          <a:p>
+            <a:r>
+              <a:rPr lang="en-US" sz="4000" dirty="0" smtClean="0">
+                <a:latin typeface="Arial"/>
+                <a:cs typeface="Arial"/>
+              </a:rPr>
+              <a:t>No </a:t>
+            </a:r>
+            <a:r>
+              <a:rPr lang="en-US" sz="4000" dirty="0">
+                <a:latin typeface="Arial"/>
+                <a:cs typeface="Arial"/>
+              </a:rPr>
+              <a:t>V</a:t>
+            </a:r>
+            <a:r>
+              <a:rPr lang="en-US" sz="4000" dirty="0" smtClean="0">
+                <a:latin typeface="Arial"/>
+                <a:cs typeface="Arial"/>
+              </a:rPr>
+              <a:t>iew</a:t>
             </a:r>
             <a:endParaRPr lang="en-US" sz="4000" dirty="0">
               <a:latin typeface="Arial"/>
@@ -9532,7 +9589,14 @@
                   <a:latin typeface="Arial"/>
                   <a:cs typeface="Arial"/>
                 </a:rPr>
-                <a:t>Bad view</a:t>
+                <a:t>No Vi</a:t>
+              </a:r>
+              <a:r>
+                <a:rPr lang="en-US" sz="2400" dirty="0" smtClean="0">
+                  <a:latin typeface="Arial"/>
+                  <a:cs typeface="Arial"/>
+                </a:rPr>
+                <a:t>ew</a:t>
               </a:r>
               <a:endParaRPr lang="en-US" sz="2400" dirty="0">
                 <a:latin typeface="Arial"/>
@@ -9564,11 +9628,18 @@
             <a:lstStyle/>
             <a:p>
               <a:r>
+                <a:rPr lang="en-US" sz="2400" dirty="0">
+                  <a:latin typeface="Arial"/>
+                  <a:cs typeface="Arial"/>
+                </a:rPr>
+                <a:t>V</a:t>
+              </a:r>
+              <a:r>
                 <a:rPr lang="en-US" sz="2400" dirty="0" smtClean="0">
                   <a:latin typeface="Arial"/>
                   <a:cs typeface="Arial"/>
                 </a:rPr>
-                <a:t>Good view</a:t>
+                <a:t>iew</a:t>
               </a:r>
               <a:endParaRPr lang="en-US" sz="2400" dirty="0">
                 <a:latin typeface="Arial"/>
@@ -10639,7 +10710,14 @@
                 <a:latin typeface="Arial"/>
                 <a:cs typeface="Arial"/>
               </a:rPr>
-              <a:t>Predicted good view</a:t>
+              <a:t>Predicted </a:t>
+            </a:r>
+            <a:r>
+              <a:rPr lang="en-US" sz="2400" dirty="0" smtClean="0">
+                <a:latin typeface="Arial"/>
+                <a:cs typeface="Arial"/>
+              </a:rPr>
+              <a:t>view</a:t>
             </a:r>
             <a:endParaRPr lang="en-US" sz="2400" dirty="0">
               <a:latin typeface="Arial"/>
@@ -10675,7 +10753,21 @@
                 <a:latin typeface="Arial"/>
                 <a:cs typeface="Arial"/>
               </a:rPr>
-              <a:t>Predicted bad view</a:t>
+              <a:t>Predicted </a:t>
+            </a:r>
+            <a:r>
+              <a:rPr lang="en-US" sz="2400" dirty="0" smtClean="0">
+                <a:latin typeface="Arial"/>
+                <a:cs typeface="Arial"/>
+              </a:rPr>
+              <a:t>no </a:t>
+            </a:r>
+            <a:r>
+              <a:rPr lang="en-US" sz="2400" dirty="0" smtClean="0">
+                <a:latin typeface="Arial"/>
+                <a:cs typeface="Arial"/>
+              </a:rPr>
+              <a:t>view</a:t>
             </a:r>
             <a:endParaRPr lang="en-US" sz="2400" dirty="0">
               <a:latin typeface="Arial"/>
@@ -12205,8 +12297,12 @@
                 <a:latin typeface="Arial"/>
                 <a:cs typeface="Arial"/>
               </a:rPr>
-              <a:t>Identifying “Good view” houses</a:t>
+              <a:t>Outcome</a:t>
             </a:r>
+            <a:endParaRPr lang="en-US" sz="2400" dirty="0" smtClean="0">
+              <a:latin typeface="Arial"/>
+              <a:cs typeface="Arial"/>
+            </a:endParaRPr>
           </a:p>
         </p:txBody>
       </p:sp>
@@ -12788,7 +12884,14 @@
                   <a:latin typeface="Arial"/>
                   <a:cs typeface="Arial"/>
                 </a:rPr>
-                <a:t>Bad view</a:t>
+                <a:t>No Vi</a:t>
+              </a:r>
+              <a:r>
+                <a:rPr lang="en-US" sz="2400" dirty="0" smtClean="0">
+                  <a:latin typeface="Arial"/>
+                  <a:cs typeface="Arial"/>
+                </a:rPr>
+                <a:t>ew</a:t>
               </a:r>
               <a:endParaRPr lang="en-US" sz="2400" dirty="0">
                 <a:latin typeface="Arial"/>
@@ -12820,11 +12923,18 @@
             <a:lstStyle/>
             <a:p>
               <a:r>
+                <a:rPr lang="en-US" sz="2400" dirty="0">
+                  <a:latin typeface="Arial"/>
+                  <a:cs typeface="Arial"/>
+                </a:rPr>
+                <a:t>V</a:t>
+              </a:r>
+              <a:r>
                 <a:rPr lang="en-US" sz="2400" dirty="0" smtClean="0">
                   <a:latin typeface="Arial"/>
                   <a:cs typeface="Arial"/>
                 </a:rPr>
-                <a:t>Good view</a:t>
+                <a:t>iew</a:t>
               </a:r>
               <a:endParaRPr lang="en-US" sz="2400" dirty="0">
                 <a:latin typeface="Arial"/>
@@ -12908,7 +13018,28 @@
                 <a:latin typeface="Arial"/>
                 <a:cs typeface="Arial"/>
               </a:rPr>
-              <a:t>Predicted bad view</a:t>
+              <a:t>Predicted </a:t>
+            </a:r>
+            <a:r>
+              <a:rPr lang="en-US" sz="2400" dirty="0" smtClean="0">
+                <a:latin typeface="Arial"/>
+                <a:cs typeface="Arial"/>
+              </a:rPr>
+              <a:t>no</a:t>
+            </a:r>
+            <a:r>
+              <a:rPr lang="en-US" sz="2400" dirty="0" smtClean="0">
+                <a:latin typeface="Arial"/>
+                <a:cs typeface="Arial"/>
+              </a:rPr>
+              <a:t> </a:t>
+            </a:r>
+            <a:r>
+              <a:rPr lang="en-US" sz="2400" dirty="0" smtClean="0">
+                <a:latin typeface="Arial"/>
+                <a:cs typeface="Arial"/>
+              </a:rPr>
+              <a:t>view</a:t>
             </a:r>
             <a:endParaRPr lang="en-US" sz="2400" dirty="0">
               <a:latin typeface="Arial"/>
@@ -12944,7 +13075,14 @@
                 <a:latin typeface="Arial"/>
                 <a:cs typeface="Arial"/>
               </a:rPr>
-              <a:t>Predicted good view</a:t>
+              <a:t>Predicted </a:t>
+            </a:r>
+            <a:r>
+              <a:rPr lang="en-US" sz="2400" dirty="0" smtClean="0">
+                <a:latin typeface="Arial"/>
+                <a:cs typeface="Arial"/>
+              </a:rPr>
+              <a:t>view</a:t>
             </a:r>
             <a:endParaRPr lang="en-US" sz="2400" dirty="0">
               <a:latin typeface="Arial"/>
@@ -14879,7 +15017,14 @@
                   <a:latin typeface="Arial"/>
                   <a:cs typeface="Arial"/>
                 </a:rPr>
-                <a:t>Bad view</a:t>
+                <a:t>No V</a:t>
+              </a:r>
+              <a:r>
+                <a:rPr lang="en-US" sz="2400" dirty="0" smtClean="0">
+                  <a:latin typeface="Arial"/>
+                  <a:cs typeface="Arial"/>
+                </a:rPr>
+                <a:t>iew</a:t>
               </a:r>
               <a:endParaRPr lang="en-US" sz="2400" dirty="0">
                 <a:latin typeface="Arial"/>
@@ -14915,7 +15060,7 @@
                   <a:latin typeface="Arial"/>
                   <a:cs typeface="Arial"/>
                 </a:rPr>
-                <a:t>Good view</a:t>
+                <a:t>View</a:t>
               </a:r>
               <a:endParaRPr lang="en-US" sz="2400" dirty="0">
                 <a:latin typeface="Arial"/>
@@ -15013,7 +15158,14 @@
                   <a:latin typeface="Arial"/>
                   <a:cs typeface="Arial"/>
                 </a:rPr>
-                <a:t>Predicted good view</a:t>
+                <a:t>Predicted </a:t>
+              </a:r>
+              <a:r>
+                <a:rPr lang="en-US" sz="2400" dirty="0" smtClean="0">
+                  <a:latin typeface="Arial"/>
+                  <a:cs typeface="Arial"/>
+                </a:rPr>
+                <a:t>view</a:t>
               </a:r>
               <a:endParaRPr lang="en-US" sz="2400" dirty="0">
                 <a:latin typeface="Arial"/>
@@ -15049,7 +15201,21 @@
                   <a:latin typeface="Arial"/>
                   <a:cs typeface="Arial"/>
                 </a:rPr>
-                <a:t>Predicted bad view</a:t>
+                <a:t>Predicted </a:t>
+              </a:r>
+              <a:r>
+                <a:rPr lang="en-US" sz="2400" dirty="0" smtClean="0">
+                  <a:latin typeface="Arial"/>
+                  <a:cs typeface="Arial"/>
+                </a:rPr>
+                <a:t>no </a:t>
+              </a:r>
+              <a:r>
+                <a:rPr lang="en-US" sz="2400" dirty="0" smtClean="0">
+                  <a:latin typeface="Arial"/>
+                  <a:cs typeface="Arial"/>
+                </a:rPr>
+                <a:t>view</a:t>
               </a:r>
               <a:endParaRPr lang="en-US" sz="2400" dirty="0">
                 <a:latin typeface="Arial"/>
@@ -16384,7 +16550,14 @@
                   <a:latin typeface="Arial"/>
                   <a:cs typeface="Arial"/>
                 </a:rPr>
-                <a:t>Bad view</a:t>
+                <a:t>No V</a:t>
+              </a:r>
+              <a:r>
+                <a:rPr lang="en-US" sz="2400" dirty="0" smtClean="0">
+                  <a:latin typeface="Arial"/>
+                  <a:cs typeface="Arial"/>
+                </a:rPr>
+                <a:t>iew</a:t>
               </a:r>
               <a:endParaRPr lang="en-US" sz="2400" dirty="0">
                 <a:latin typeface="Arial"/>
@@ -16416,11 +16589,18 @@
             <a:lstStyle/>
             <a:p>
               <a:r>
+                <a:rPr lang="en-US" sz="2400" dirty="0">
+                  <a:latin typeface="Arial"/>
+                  <a:cs typeface="Arial"/>
+                </a:rPr>
+                <a:t>V</a:t>
+              </a:r>
+              <a:r>
                 <a:rPr lang="en-US" sz="2400" dirty="0" smtClean="0">
                   <a:latin typeface="Arial"/>
                   <a:cs typeface="Arial"/>
                 </a:rPr>
-                <a:t>Good view</a:t>
+                <a:t>iew</a:t>
               </a:r>
               <a:endParaRPr lang="en-US" sz="2400" dirty="0">
                 <a:latin typeface="Arial"/>
@@ -16518,7 +16698,14 @@
                   <a:latin typeface="Arial"/>
                   <a:cs typeface="Arial"/>
                 </a:rPr>
-                <a:t>Predicted good view</a:t>
+                <a:t>Predicted </a:t>
+              </a:r>
+              <a:r>
+                <a:rPr lang="en-US" sz="2400" dirty="0" smtClean="0">
+                  <a:latin typeface="Arial"/>
+                  <a:cs typeface="Arial"/>
+                </a:rPr>
+                <a:t>view</a:t>
               </a:r>
               <a:endParaRPr lang="en-US" sz="2400" dirty="0">
                 <a:latin typeface="Arial"/>
@@ -16554,7 +16741,21 @@
                   <a:latin typeface="Arial"/>
                   <a:cs typeface="Arial"/>
                 </a:rPr>
-                <a:t>Predicted bad view</a:t>
+                <a:t>Predicted </a:t>
+              </a:r>
+              <a:r>
+                <a:rPr lang="en-US" sz="2400" dirty="0" smtClean="0">
+                  <a:latin typeface="Arial"/>
+                  <a:cs typeface="Arial"/>
+                </a:rPr>
+                <a:t>no v</a:t>
+              </a:r>
+              <a:r>
+                <a:rPr lang="en-US" sz="2400" dirty="0" smtClean="0">
+                  <a:latin typeface="Arial"/>
+                  <a:cs typeface="Arial"/>
+                </a:rPr>
+                <a:t>iew</a:t>
               </a:r>
               <a:endParaRPr lang="en-US" sz="2400" dirty="0">
                 <a:latin typeface="Arial"/>
@@ -17734,14 +17935,21 @@
                 <a:latin typeface="Arial"/>
                 <a:cs typeface="Arial"/>
               </a:rPr>
-              <a:t>Precision (for “Good view” label)</a:t>
+              <a:t>Precision</a:t>
             </a:r>
             <a:r>
               <a:rPr lang="en-US" sz="2400" dirty="0" smtClean="0">
                 <a:latin typeface="Arial"/>
                 <a:cs typeface="Arial"/>
               </a:rPr>
-              <a:t>: of points we labeled as positive, how many did we get right?</a:t>
+              <a:t>: </a:t>
+            </a:r>
+            <a:r>
+              <a:rPr lang="en-US" sz="2400" dirty="0" smtClean="0">
+                <a:latin typeface="Arial"/>
+                <a:cs typeface="Arial"/>
+              </a:rPr>
+              <a:t>of points we labeled as positive, how many did we get right?</a:t>
             </a:r>
           </a:p>
           <a:p>
@@ -17797,7 +18005,14 @@
                   <a:latin typeface="Arial"/>
                   <a:cs typeface="Arial"/>
                 </a:rPr>
-                <a:t>Predicted good view</a:t>
+                <a:t>Predicted </a:t>
+              </a:r>
+              <a:r>
+                <a:rPr lang="en-US" sz="2400" dirty="0" smtClean="0">
+                  <a:latin typeface="Arial"/>
+                  <a:cs typeface="Arial"/>
+                </a:rPr>
+                <a:t>view</a:t>
               </a:r>
               <a:endParaRPr lang="en-US" sz="2400" dirty="0">
                 <a:latin typeface="Arial"/>
@@ -17833,7 +18048,14 @@
                   <a:latin typeface="Arial"/>
                   <a:cs typeface="Arial"/>
                 </a:rPr>
-                <a:t>Predicted bad view</a:t>
+                <a:t>Predicted </a:t>
+              </a:r>
+              <a:r>
+                <a:rPr lang="en-US" sz="2400" dirty="0" smtClean="0">
+                  <a:latin typeface="Arial"/>
+                  <a:cs typeface="Arial"/>
+                </a:rPr>
+                <a:t>no view</a:t>
               </a:r>
               <a:endParaRPr lang="en-US" sz="2400" dirty="0">
                 <a:latin typeface="Arial"/>
@@ -17931,7 +18153,21 @@
                   <a:latin typeface="Arial"/>
                   <a:cs typeface="Arial"/>
                 </a:rPr>
-                <a:t>Bad view</a:t>
+                <a:t>No </a:t>
+              </a:r>
+              <a:r>
+                <a:rPr lang="en-US" sz="2400" dirty="0">
+                  <a:latin typeface="Arial"/>
+                  <a:cs typeface="Arial"/>
+                </a:rPr>
+                <a:t>V</a:t>
+              </a:r>
+              <a:r>
+                <a:rPr lang="en-US" sz="2400" dirty="0" smtClean="0">
+                  <a:latin typeface="Arial"/>
+                  <a:cs typeface="Arial"/>
+                </a:rPr>
+                <a:t>iew</a:t>
               </a:r>
               <a:endParaRPr lang="en-US" sz="2400" dirty="0">
                 <a:latin typeface="Arial"/>
@@ -17967,7 +18203,7 @@
                   <a:latin typeface="Arial"/>
                   <a:cs typeface="Arial"/>
                 </a:rPr>
-                <a:t>Good view</a:t>
+                <a:t>View</a:t>
               </a:r>
               <a:endParaRPr lang="en-US" sz="2400" dirty="0">
                 <a:latin typeface="Arial"/>

</xml_diff>

<commit_message>
Updates to view/no view
</commit_message>
<xml_diff>
--- a/Techfest_ML.pptx
+++ b/Techfest_ML.pptx
@@ -237,7 +237,7 @@
           <a:p>
             <a:fld id="{33E144C1-CEA6-4D4D-9670-300AA03EA9ED}" type="datetimeFigureOut">
               <a:rPr lang="en-US" smtClean="0"/>
-              <a:t>5/18/15</a:t>
+              <a:t>19/05/15</a:t>
             </a:fld>
             <a:endParaRPr lang="en-US"/>
           </a:p>
@@ -555,11 +555,7 @@
             </a:r>
             <a:r>
               <a:rPr lang="en-US" baseline="0" dirty="0" smtClean="0"/>
-              <a:t> ourselves and what we’ll be talking about</a:t>
-            </a:r>
-            <a:r>
-              <a:rPr lang="en-US" baseline="0" dirty="0" smtClean="0"/>
-              <a:t>!</a:t>
+              <a:t> ourselves and what we’ll be talking about!</a:t>
             </a:r>
           </a:p>
           <a:p>
@@ -1734,7 +1730,7 @@
           <a:p>
             <a:fld id="{E31BDE11-21A5-024B-AC15-C770EC7EF040}" type="datetimeFigureOut">
               <a:rPr lang="en-US" smtClean="0"/>
-              <a:t>5/18/15</a:t>
+              <a:t>19/05/15</a:t>
             </a:fld>
             <a:endParaRPr lang="en-US"/>
           </a:p>
@@ -1904,7 +1900,7 @@
           <a:p>
             <a:fld id="{E31BDE11-21A5-024B-AC15-C770EC7EF040}" type="datetimeFigureOut">
               <a:rPr lang="en-US" smtClean="0"/>
-              <a:t>5/18/15</a:t>
+              <a:t>19/05/15</a:t>
             </a:fld>
             <a:endParaRPr lang="en-US"/>
           </a:p>
@@ -2084,7 +2080,7 @@
           <a:p>
             <a:fld id="{E31BDE11-21A5-024B-AC15-C770EC7EF040}" type="datetimeFigureOut">
               <a:rPr lang="en-US" smtClean="0"/>
-              <a:t>5/18/15</a:t>
+              <a:t>19/05/15</a:t>
             </a:fld>
             <a:endParaRPr lang="en-US"/>
           </a:p>
@@ -2343,7 +2339,7 @@
           <a:p>
             <a:fld id="{E31BDE11-21A5-024B-AC15-C770EC7EF040}" type="datetimeFigureOut">
               <a:rPr lang="en-US" smtClean="0"/>
-              <a:t>5/18/15</a:t>
+              <a:t>19/05/15</a:t>
             </a:fld>
             <a:endParaRPr lang="en-US"/>
           </a:p>
@@ -2589,7 +2585,7 @@
           <a:p>
             <a:fld id="{E31BDE11-21A5-024B-AC15-C770EC7EF040}" type="datetimeFigureOut">
               <a:rPr lang="en-US" smtClean="0"/>
-              <a:t>5/18/15</a:t>
+              <a:t>19/05/15</a:t>
             </a:fld>
             <a:endParaRPr lang="en-US"/>
           </a:p>
@@ -2877,7 +2873,7 @@
           <a:p>
             <a:fld id="{E31BDE11-21A5-024B-AC15-C770EC7EF040}" type="datetimeFigureOut">
               <a:rPr lang="en-US" smtClean="0"/>
-              <a:t>5/18/15</a:t>
+              <a:t>19/05/15</a:t>
             </a:fld>
             <a:endParaRPr lang="en-US"/>
           </a:p>
@@ -3299,7 +3295,7 @@
           <a:p>
             <a:fld id="{E31BDE11-21A5-024B-AC15-C770EC7EF040}" type="datetimeFigureOut">
               <a:rPr lang="en-US" smtClean="0"/>
-              <a:t>5/18/15</a:t>
+              <a:t>19/05/15</a:t>
             </a:fld>
             <a:endParaRPr lang="en-US"/>
           </a:p>
@@ -3417,7 +3413,7 @@
           <a:p>
             <a:fld id="{E31BDE11-21A5-024B-AC15-C770EC7EF040}" type="datetimeFigureOut">
               <a:rPr lang="en-US" smtClean="0"/>
-              <a:t>5/18/15</a:t>
+              <a:t>19/05/15</a:t>
             </a:fld>
             <a:endParaRPr lang="en-US"/>
           </a:p>
@@ -3512,7 +3508,7 @@
           <a:p>
             <a:fld id="{E31BDE11-21A5-024B-AC15-C770EC7EF040}" type="datetimeFigureOut">
               <a:rPr lang="en-US" smtClean="0"/>
-              <a:t>5/18/15</a:t>
+              <a:t>19/05/15</a:t>
             </a:fld>
             <a:endParaRPr lang="en-US"/>
           </a:p>
@@ -3789,7 +3785,7 @@
           <a:p>
             <a:fld id="{E31BDE11-21A5-024B-AC15-C770EC7EF040}" type="datetimeFigureOut">
               <a:rPr lang="en-US" smtClean="0"/>
-              <a:t>5/18/15</a:t>
+              <a:t>19/05/15</a:t>
             </a:fld>
             <a:endParaRPr lang="en-US"/>
           </a:p>
@@ -4042,7 +4038,7 @@
           <a:p>
             <a:fld id="{E31BDE11-21A5-024B-AC15-C770EC7EF040}" type="datetimeFigureOut">
               <a:rPr lang="en-US" smtClean="0"/>
-              <a:t>5/18/15</a:t>
+              <a:t>19/05/15</a:t>
             </a:fld>
             <a:endParaRPr lang="en-US"/>
           </a:p>
@@ -4255,7 +4251,7 @@
           <a:p>
             <a:fld id="{E31BDE11-21A5-024B-AC15-C770EC7EF040}" type="datetimeFigureOut">
               <a:rPr lang="en-US" smtClean="0"/>
-              <a:t>5/18/15</a:t>
+              <a:t>19/05/15</a:t>
             </a:fld>
             <a:endParaRPr lang="en-US"/>
           </a:p>
@@ -6740,28 +6736,7 @@
                 <a:latin typeface="Arial"/>
                 <a:cs typeface="Arial"/>
               </a:rPr>
-              <a:t> </a:t>
-            </a:r>
-            <a:r>
-              <a:rPr lang="en-US" sz="2400" dirty="0" smtClean="0">
-                <a:latin typeface="Arial"/>
-                <a:cs typeface="Arial"/>
-              </a:rPr>
-              <a:t>sum of squares of difference between </a:t>
-            </a:r>
-            <a:r>
-              <a:rPr lang="en-US" sz="2400" dirty="0" smtClean="0">
-                <a:latin typeface="Arial"/>
-                <a:cs typeface="Arial"/>
-              </a:rPr>
-              <a:t>predicted </a:t>
-            </a:r>
-            <a:r>
-              <a:rPr lang="en-US" sz="2400" dirty="0" smtClean="0">
-                <a:latin typeface="Arial"/>
-                <a:cs typeface="Arial"/>
-              </a:rPr>
-              <a:t>and actual value.</a:t>
+              <a:t> sum of squares of difference between predicted and actual value.</a:t>
             </a:r>
           </a:p>
         </p:txBody>
@@ -8783,19 +8758,7 @@
             </a:pPr>
             <a:r>
               <a:rPr lang="en-US" dirty="0" smtClean="0"/>
-              <a:t>Example: Does </a:t>
-            </a:r>
-            <a:r>
-              <a:rPr lang="en-US" dirty="0" smtClean="0"/>
-              <a:t>this house have a </a:t>
-            </a:r>
-            <a:r>
-              <a:rPr lang="en-US" dirty="0" smtClean="0"/>
-              <a:t>view</a:t>
-            </a:r>
-            <a:r>
-              <a:rPr lang="en-US" dirty="0" smtClean="0"/>
-              <a:t>?</a:t>
+              <a:t>Example: Does this house have a view?</a:t>
             </a:r>
           </a:p>
         </p:txBody>
@@ -8836,10 +8799,6 @@
               </a:rPr>
               <a:t>iew</a:t>
             </a:r>
-            <a:endParaRPr lang="en-US" sz="4000" dirty="0" smtClean="0">
-              <a:latin typeface="Arial"/>
-              <a:cs typeface="Arial"/>
-            </a:endParaRPr>
           </a:p>
           <a:p>
             <a:r>
@@ -9614,14 +9573,7 @@
                   <a:latin typeface="Arial"/>
                   <a:cs typeface="Arial"/>
                 </a:rPr>
-                <a:t>No Vi</a:t>
-              </a:r>
-              <a:r>
-                <a:rPr lang="en-US" sz="2400" dirty="0" smtClean="0">
-                  <a:latin typeface="Arial"/>
-                  <a:cs typeface="Arial"/>
-                </a:rPr>
-                <a:t>ew</a:t>
+                <a:t>No View</a:t>
               </a:r>
               <a:endParaRPr lang="en-US" sz="2400" dirty="0">
                 <a:latin typeface="Arial"/>
@@ -10735,14 +10687,7 @@
                 <a:latin typeface="Arial"/>
                 <a:cs typeface="Arial"/>
               </a:rPr>
-              <a:t>Predicted </a:t>
-            </a:r>
-            <a:r>
-              <a:rPr lang="en-US" sz="2400" dirty="0" smtClean="0">
-                <a:latin typeface="Arial"/>
-                <a:cs typeface="Arial"/>
-              </a:rPr>
-              <a:t>view</a:t>
+              <a:t>Predicted view</a:t>
             </a:r>
             <a:endParaRPr lang="en-US" sz="2400" dirty="0">
               <a:latin typeface="Arial"/>
@@ -10778,21 +10723,7 @@
                 <a:latin typeface="Arial"/>
                 <a:cs typeface="Arial"/>
               </a:rPr>
-              <a:t>Predicted </a:t>
-            </a:r>
-            <a:r>
-              <a:rPr lang="en-US" sz="2400" dirty="0" smtClean="0">
-                <a:latin typeface="Arial"/>
-                <a:cs typeface="Arial"/>
-              </a:rPr>
-              <a:t>no </a:t>
-            </a:r>
-            <a:r>
-              <a:rPr lang="en-US" sz="2400" dirty="0" smtClean="0">
-                <a:latin typeface="Arial"/>
-                <a:cs typeface="Arial"/>
-              </a:rPr>
-              <a:t>view</a:t>
+              <a:t>Predicted no view</a:t>
             </a:r>
             <a:endParaRPr lang="en-US" sz="2400" dirty="0">
               <a:latin typeface="Arial"/>
@@ -12380,10 +12311,6 @@
               </a:rPr>
               <a:t> - No View</a:t>
             </a:r>
-            <a:endParaRPr lang="en-US" sz="2800" dirty="0" smtClean="0">
-              <a:latin typeface="Arial"/>
-              <a:cs typeface="Arial"/>
-            </a:endParaRPr>
           </a:p>
         </p:txBody>
       </p:sp>
@@ -12965,14 +12892,7 @@
                   <a:latin typeface="Arial"/>
                   <a:cs typeface="Arial"/>
                 </a:rPr>
-                <a:t>No Vi</a:t>
-              </a:r>
-              <a:r>
-                <a:rPr lang="en-US" sz="2400" dirty="0" smtClean="0">
-                  <a:latin typeface="Arial"/>
-                  <a:cs typeface="Arial"/>
-                </a:rPr>
-                <a:t>ew</a:t>
+                <a:t>No View</a:t>
               </a:r>
               <a:endParaRPr lang="en-US" sz="2400" dirty="0">
                 <a:latin typeface="Arial"/>
@@ -13099,28 +13019,7 @@
                 <a:latin typeface="Arial"/>
                 <a:cs typeface="Arial"/>
               </a:rPr>
-              <a:t>Predicted </a:t>
-            </a:r>
-            <a:r>
-              <a:rPr lang="en-US" sz="2400" dirty="0" smtClean="0">
-                <a:latin typeface="Arial"/>
-                <a:cs typeface="Arial"/>
-              </a:rPr>
-              <a:t>no</a:t>
-            </a:r>
-            <a:r>
-              <a:rPr lang="en-US" sz="2400" dirty="0" smtClean="0">
-                <a:latin typeface="Arial"/>
-                <a:cs typeface="Arial"/>
-              </a:rPr>
-              <a:t> </a:t>
-            </a:r>
-            <a:r>
-              <a:rPr lang="en-US" sz="2400" dirty="0" smtClean="0">
-                <a:latin typeface="Arial"/>
-                <a:cs typeface="Arial"/>
-              </a:rPr>
-              <a:t>view</a:t>
+              <a:t>Predicted no view</a:t>
             </a:r>
             <a:endParaRPr lang="en-US" sz="2400" dirty="0">
               <a:latin typeface="Arial"/>
@@ -13156,14 +13055,7 @@
                 <a:latin typeface="Arial"/>
                 <a:cs typeface="Arial"/>
               </a:rPr>
-              <a:t>Predicted </a:t>
-            </a:r>
-            <a:r>
-              <a:rPr lang="en-US" sz="2400" dirty="0" smtClean="0">
-                <a:latin typeface="Arial"/>
-                <a:cs typeface="Arial"/>
-              </a:rPr>
-              <a:t>view</a:t>
+              <a:t>Predicted view</a:t>
             </a:r>
             <a:endParaRPr lang="en-US" sz="2400" dirty="0">
               <a:latin typeface="Arial"/>
@@ -13202,10 +13094,6 @@
               </a:rPr>
               <a:t>Outcome can be:</a:t>
             </a:r>
-            <a:endParaRPr lang="en-US" sz="2400" dirty="0" smtClean="0">
-              <a:latin typeface="Arial"/>
-              <a:cs typeface="Arial"/>
-            </a:endParaRPr>
           </a:p>
         </p:txBody>
       </p:sp>
@@ -14987,19 +14875,8 @@
                 <a:latin typeface="Arial"/>
                 <a:cs typeface="Arial"/>
               </a:rPr>
-              <a:t>: </a:t>
+              <a:t>: how many points did we get right?</a:t>
             </a:r>
-            <a:r>
-              <a:rPr lang="en-US" sz="2400" dirty="0" smtClean="0">
-                <a:latin typeface="Arial"/>
-                <a:cs typeface="Arial"/>
-              </a:rPr>
-              <a:t>how many points did we get right?</a:t>
-            </a:r>
-            <a:endParaRPr lang="en-US" sz="2400" dirty="0" smtClean="0">
-              <a:latin typeface="Arial"/>
-              <a:cs typeface="Arial"/>
-            </a:endParaRPr>
           </a:p>
           <a:p>
             <a:pPr algn="ctr"/>
@@ -15008,42 +14885,7 @@
                 <a:latin typeface="Arial"/>
                 <a:cs typeface="Arial"/>
               </a:rPr>
-              <a:t>15 </a:t>
-            </a:r>
-            <a:r>
-              <a:rPr lang="en-US" sz="2400" dirty="0" smtClean="0">
-                <a:latin typeface="Arial"/>
-                <a:cs typeface="Arial"/>
-              </a:rPr>
-              <a:t>correct</a:t>
-            </a:r>
-            <a:r>
-              <a:rPr lang="en-US" sz="2400" dirty="0" smtClean="0">
-                <a:latin typeface="Arial"/>
-                <a:cs typeface="Arial"/>
-              </a:rPr>
-              <a:t> </a:t>
-            </a:r>
-            <a:r>
-              <a:rPr lang="en-US" sz="2400" dirty="0" smtClean="0">
-                <a:latin typeface="Arial"/>
-                <a:cs typeface="Arial"/>
-              </a:rPr>
-              <a:t>/ </a:t>
-            </a:r>
-            <a:r>
-              <a:rPr lang="en-US" sz="2400" dirty="0" smtClean="0">
-                <a:latin typeface="Arial"/>
-                <a:cs typeface="Arial"/>
-              </a:rPr>
-              <a:t>18 total </a:t>
-            </a:r>
-            <a:r>
-              <a:rPr lang="en-US" sz="2400" dirty="0" smtClean="0">
-                <a:latin typeface="Arial"/>
-                <a:cs typeface="Arial"/>
-              </a:rPr>
-              <a:t>= 83%</a:t>
+              <a:t>15 correct / 18 total = 83%</a:t>
             </a:r>
           </a:p>
         </p:txBody>
@@ -15181,14 +15023,7 @@
                   <a:latin typeface="Arial"/>
                   <a:cs typeface="Arial"/>
                 </a:rPr>
-                <a:t>No V</a:t>
-              </a:r>
-              <a:r>
-                <a:rPr lang="en-US" sz="2400" dirty="0" smtClean="0">
-                  <a:latin typeface="Arial"/>
-                  <a:cs typeface="Arial"/>
-                </a:rPr>
-                <a:t>iew</a:t>
+                <a:t>No View</a:t>
               </a:r>
               <a:endParaRPr lang="en-US" sz="2400" dirty="0">
                 <a:latin typeface="Arial"/>
@@ -15322,14 +15157,7 @@
                   <a:latin typeface="Arial"/>
                   <a:cs typeface="Arial"/>
                 </a:rPr>
-                <a:t>Predicted </a:t>
-              </a:r>
-              <a:r>
-                <a:rPr lang="en-US" sz="2400" dirty="0" smtClean="0">
-                  <a:latin typeface="Arial"/>
-                  <a:cs typeface="Arial"/>
-                </a:rPr>
-                <a:t>view</a:t>
+                <a:t>Predicted view</a:t>
               </a:r>
               <a:endParaRPr lang="en-US" sz="2400" dirty="0">
                 <a:latin typeface="Arial"/>
@@ -15365,21 +15193,7 @@
                   <a:latin typeface="Arial"/>
                   <a:cs typeface="Arial"/>
                 </a:rPr>
-                <a:t>Predicted </a:t>
-              </a:r>
-              <a:r>
-                <a:rPr lang="en-US" sz="2400" dirty="0" smtClean="0">
-                  <a:latin typeface="Arial"/>
-                  <a:cs typeface="Arial"/>
-                </a:rPr>
-                <a:t>no </a:t>
-              </a:r>
-              <a:r>
-                <a:rPr lang="en-US" sz="2400" dirty="0" smtClean="0">
-                  <a:latin typeface="Arial"/>
-                  <a:cs typeface="Arial"/>
-                </a:rPr>
-                <a:t>view</a:t>
+                <a:t>Predicted no view</a:t>
               </a:r>
               <a:endParaRPr lang="en-US" sz="2400" dirty="0">
                 <a:latin typeface="Arial"/>
@@ -16613,10 +16427,6 @@
               </a:rPr>
               <a:t>: What % of houses with views did we predict correctly?</a:t>
             </a:r>
-            <a:endParaRPr lang="en-US" sz="2400" dirty="0" smtClean="0">
-              <a:latin typeface="Arial"/>
-              <a:cs typeface="Arial"/>
-            </a:endParaRPr>
           </a:p>
           <a:p>
             <a:pPr algn="ctr"/>
@@ -16625,49 +16435,7 @@
                 <a:latin typeface="Arial"/>
                 <a:cs typeface="Arial"/>
               </a:rPr>
-              <a:t>7 </a:t>
-            </a:r>
-            <a:r>
-              <a:rPr lang="en-US" sz="2400" dirty="0" smtClean="0">
-                <a:latin typeface="Arial"/>
-                <a:cs typeface="Arial"/>
-              </a:rPr>
-              <a:t>correct</a:t>
-            </a:r>
-            <a:r>
-              <a:rPr lang="en-US" sz="2400" dirty="0" smtClean="0">
-                <a:latin typeface="Arial"/>
-                <a:cs typeface="Arial"/>
-              </a:rPr>
-              <a:t> </a:t>
-            </a:r>
-            <a:r>
-              <a:rPr lang="en-US" sz="2400" dirty="0" smtClean="0">
-                <a:latin typeface="Arial"/>
-                <a:cs typeface="Arial"/>
-              </a:rPr>
-              <a:t>/ 9 </a:t>
-            </a:r>
-            <a:r>
-              <a:rPr lang="en-US" sz="2400" dirty="0" smtClean="0">
-                <a:latin typeface="Arial"/>
-                <a:cs typeface="Arial"/>
-              </a:rPr>
-              <a:t>positives</a:t>
-            </a:r>
-            <a:r>
-              <a:rPr lang="en-US" sz="2400" dirty="0" smtClean="0">
-                <a:latin typeface="Arial"/>
-                <a:cs typeface="Arial"/>
-              </a:rPr>
-              <a:t> = </a:t>
-            </a:r>
-            <a:r>
-              <a:rPr lang="en-US" sz="2400" dirty="0" smtClean="0">
-                <a:latin typeface="Arial"/>
-                <a:cs typeface="Arial"/>
-              </a:rPr>
-              <a:t>78%</a:t>
+              <a:t>7 correct / 9 positives = 78%</a:t>
             </a:r>
           </a:p>
         </p:txBody>
@@ -16760,14 +16528,7 @@
                   <a:latin typeface="Arial"/>
                   <a:cs typeface="Arial"/>
                 </a:rPr>
-                <a:t>No V</a:t>
-              </a:r>
-              <a:r>
-                <a:rPr lang="en-US" sz="2400" dirty="0" smtClean="0">
-                  <a:latin typeface="Arial"/>
-                  <a:cs typeface="Arial"/>
-                </a:rPr>
-                <a:t>iew</a:t>
+                <a:t>No View</a:t>
               </a:r>
               <a:endParaRPr lang="en-US" sz="2400" dirty="0">
                 <a:latin typeface="Arial"/>
@@ -16908,14 +16669,7 @@
                   <a:latin typeface="Arial"/>
                   <a:cs typeface="Arial"/>
                 </a:rPr>
-                <a:t>Predicted </a:t>
-              </a:r>
-              <a:r>
-                <a:rPr lang="en-US" sz="2400" dirty="0" smtClean="0">
-                  <a:latin typeface="Arial"/>
-                  <a:cs typeface="Arial"/>
-                </a:rPr>
-                <a:t>view</a:t>
+                <a:t>Predicted view</a:t>
               </a:r>
               <a:endParaRPr lang="en-US" sz="2400" dirty="0">
                 <a:latin typeface="Arial"/>
@@ -16951,21 +16705,7 @@
                   <a:latin typeface="Arial"/>
                   <a:cs typeface="Arial"/>
                 </a:rPr>
-                <a:t>Predicted </a:t>
-              </a:r>
-              <a:r>
-                <a:rPr lang="en-US" sz="2400" dirty="0" smtClean="0">
-                  <a:latin typeface="Arial"/>
-                  <a:cs typeface="Arial"/>
-                </a:rPr>
-                <a:t>no v</a:t>
-              </a:r>
-              <a:r>
-                <a:rPr lang="en-US" sz="2400" dirty="0" smtClean="0">
-                  <a:latin typeface="Arial"/>
-                  <a:cs typeface="Arial"/>
-                </a:rPr>
-                <a:t>iew</a:t>
+                <a:t>Predicted no view</a:t>
               </a:r>
               <a:endParaRPr lang="en-US" sz="2400" dirty="0">
                 <a:latin typeface="Arial"/>
@@ -18152,28 +17892,7 @@
                 <a:latin typeface="Arial"/>
                 <a:cs typeface="Arial"/>
               </a:rPr>
-              <a:t>: </a:t>
-            </a:r>
-            <a:r>
-              <a:rPr lang="en-US" sz="2400" dirty="0" smtClean="0">
-                <a:latin typeface="Arial"/>
-                <a:cs typeface="Arial"/>
-              </a:rPr>
-              <a:t>of </a:t>
-            </a:r>
-            <a:r>
-              <a:rPr lang="en-US" sz="2400" dirty="0" smtClean="0">
-                <a:latin typeface="Arial"/>
-                <a:cs typeface="Arial"/>
-              </a:rPr>
-              <a:t>houses we predicted “View”, </a:t>
-            </a:r>
-            <a:r>
-              <a:rPr lang="en-US" sz="2400" dirty="0" smtClean="0">
-                <a:latin typeface="Arial"/>
-                <a:cs typeface="Arial"/>
-              </a:rPr>
-              <a:t>how many did we get right?</a:t>
+              <a:t>: of houses we predicted “View”, how many did we get right?</a:t>
             </a:r>
           </a:p>
           <a:p>
@@ -18183,42 +17902,7 @@
                 <a:latin typeface="Arial"/>
                 <a:cs typeface="Arial"/>
               </a:rPr>
-              <a:t>7 </a:t>
-            </a:r>
-            <a:r>
-              <a:rPr lang="en-US" sz="2400" dirty="0" smtClean="0">
-                <a:latin typeface="Arial"/>
-                <a:cs typeface="Arial"/>
-              </a:rPr>
-              <a:t>correct</a:t>
-            </a:r>
-            <a:r>
-              <a:rPr lang="en-US" sz="2400" dirty="0" smtClean="0">
-                <a:latin typeface="Arial"/>
-                <a:cs typeface="Arial"/>
-              </a:rPr>
-              <a:t> </a:t>
-            </a:r>
-            <a:r>
-              <a:rPr lang="en-US" sz="2400" dirty="0" smtClean="0">
-                <a:latin typeface="Arial"/>
-                <a:cs typeface="Arial"/>
-              </a:rPr>
-              <a:t>/ 8 </a:t>
-            </a:r>
-            <a:r>
-              <a:rPr lang="en-US" sz="2400" dirty="0" smtClean="0">
-                <a:latin typeface="Arial"/>
-                <a:cs typeface="Arial"/>
-              </a:rPr>
-              <a:t>predicted positive = </a:t>
-            </a:r>
-            <a:r>
-              <a:rPr lang="en-US" sz="2400" dirty="0" smtClean="0">
-                <a:latin typeface="Arial"/>
-                <a:cs typeface="Arial"/>
-              </a:rPr>
-              <a:t>88%</a:t>
+              <a:t>7 correct / 8 predicted positive = 88%</a:t>
             </a:r>
           </a:p>
         </p:txBody>
@@ -18264,14 +17948,7 @@
                   <a:latin typeface="Arial"/>
                   <a:cs typeface="Arial"/>
                 </a:rPr>
-                <a:t>Predicted </a:t>
-              </a:r>
-              <a:r>
-                <a:rPr lang="en-US" sz="2400" dirty="0" smtClean="0">
-                  <a:latin typeface="Arial"/>
-                  <a:cs typeface="Arial"/>
-                </a:rPr>
-                <a:t>view</a:t>
+                <a:t>Predicted view</a:t>
               </a:r>
               <a:endParaRPr lang="en-US" sz="2400" dirty="0">
                 <a:latin typeface="Arial"/>
@@ -18307,14 +17984,7 @@
                   <a:latin typeface="Arial"/>
                   <a:cs typeface="Arial"/>
                 </a:rPr>
-                <a:t>Predicted </a:t>
-              </a:r>
-              <a:r>
-                <a:rPr lang="en-US" sz="2400" dirty="0" smtClean="0">
-                  <a:latin typeface="Arial"/>
-                  <a:cs typeface="Arial"/>
-                </a:rPr>
-                <a:t>no view</a:t>
+                <a:t>Predicted no view</a:t>
               </a:r>
               <a:endParaRPr lang="en-US" sz="2400" dirty="0">
                 <a:latin typeface="Arial"/>
@@ -19244,7 +18914,7 @@
         <p:spPr>
           <a:xfrm>
             <a:off x="2048115" y="4654314"/>
-            <a:ext cx="1078255" cy="830997"/>
+            <a:ext cx="1078255" cy="461665"/>
           </a:xfrm>
           <a:prstGeom prst="rect">
             <a:avLst/>
@@ -19266,7 +18936,7 @@
                 <a:latin typeface="Arial"/>
                 <a:cs typeface="Arial"/>
               </a:rPr>
-              <a:t>Good View</a:t>
+              <a:t>View</a:t>
             </a:r>
             <a:endParaRPr lang="en-US" sz="2400" dirty="0">
               <a:solidFill>
@@ -19309,7 +18979,7 @@
                 <a:latin typeface="Arial"/>
                 <a:cs typeface="Arial"/>
               </a:rPr>
-              <a:t>Bad View</a:t>
+              <a:t>No View</a:t>
             </a:r>
             <a:endParaRPr lang="en-US" sz="2400" dirty="0">
               <a:solidFill>
@@ -19476,7 +19146,7 @@
         <p:spPr>
           <a:xfrm>
             <a:off x="4772509" y="4661359"/>
-            <a:ext cx="1078255" cy="830997"/>
+            <a:ext cx="1078255" cy="461665"/>
           </a:xfrm>
           <a:prstGeom prst="rect">
             <a:avLst/>
@@ -19498,7 +19168,7 @@
                 <a:latin typeface="Arial"/>
                 <a:cs typeface="Arial"/>
               </a:rPr>
-              <a:t>Good View</a:t>
+              <a:t>View</a:t>
             </a:r>
             <a:endParaRPr lang="en-US" sz="2400" dirty="0">
               <a:solidFill>
@@ -19541,7 +19211,7 @@
                 <a:latin typeface="Arial"/>
                 <a:cs typeface="Arial"/>
               </a:rPr>
-              <a:t>Bad View</a:t>
+              <a:t>No View</a:t>
             </a:r>
             <a:endParaRPr lang="en-US" sz="2400" dirty="0">
               <a:solidFill>
@@ -20116,7 +19786,7 @@
         <p:spPr>
           <a:xfrm>
             <a:off x="2048115" y="4654314"/>
-            <a:ext cx="1078255" cy="830997"/>
+            <a:ext cx="1078255" cy="461665"/>
           </a:xfrm>
           <a:prstGeom prst="rect">
             <a:avLst/>
@@ -20138,7 +19808,7 @@
                 <a:latin typeface="Arial"/>
                 <a:cs typeface="Arial"/>
               </a:rPr>
-              <a:t>Good View</a:t>
+              <a:t>View</a:t>
             </a:r>
             <a:endParaRPr lang="en-US" sz="2400" dirty="0">
               <a:solidFill>
@@ -20181,7 +19851,7 @@
                 <a:latin typeface="Arial"/>
                 <a:cs typeface="Arial"/>
               </a:rPr>
-              <a:t>Bad View</a:t>
+              <a:t>No View</a:t>
             </a:r>
             <a:endParaRPr lang="en-US" sz="2400" dirty="0">
               <a:solidFill>
@@ -20348,7 +20018,7 @@
         <p:spPr>
           <a:xfrm>
             <a:off x="4772509" y="4661359"/>
-            <a:ext cx="1078255" cy="830997"/>
+            <a:ext cx="1078255" cy="461665"/>
           </a:xfrm>
           <a:prstGeom prst="rect">
             <a:avLst/>
@@ -20370,7 +20040,7 @@
                 <a:latin typeface="Arial"/>
                 <a:cs typeface="Arial"/>
               </a:rPr>
-              <a:t>Good View</a:t>
+              <a:t>View</a:t>
             </a:r>
             <a:endParaRPr lang="en-US" sz="2400" dirty="0">
               <a:solidFill>
@@ -20413,7 +20083,7 @@
                 <a:latin typeface="Arial"/>
                 <a:cs typeface="Arial"/>
               </a:rPr>
-              <a:t>Bad View</a:t>
+              <a:t>No View</a:t>
             </a:r>
             <a:endParaRPr lang="en-US" sz="2400" dirty="0">
               <a:solidFill>
@@ -33319,7 +32989,7 @@
                 <a:latin typeface="Arial"/>
                 <a:cs typeface="Arial"/>
               </a:rPr>
-              <a:t>Good view</a:t>
+              <a:t>View</a:t>
             </a:r>
             <a:endParaRPr lang="en-US" sz="2400" dirty="0">
               <a:latin typeface="Arial"/>
@@ -34230,7 +33900,7 @@
         <p:spPr>
           <a:xfrm>
             <a:off x="2947210" y="1749467"/>
-            <a:ext cx="1645132" cy="461665"/>
+            <a:ext cx="1645132" cy="830997"/>
           </a:xfrm>
           <a:prstGeom prst="rect">
             <a:avLst/>
@@ -34248,7 +33918,7 @@
                 <a:latin typeface="Arial"/>
                 <a:cs typeface="Arial"/>
               </a:rPr>
-              <a:t>Good view</a:t>
+              <a:t>Predicted View</a:t>
             </a:r>
             <a:endParaRPr lang="en-US" sz="2400" dirty="0">
               <a:latin typeface="Arial"/>
@@ -34266,7 +33936,7 @@
         <p:spPr>
           <a:xfrm>
             <a:off x="4797324" y="3748914"/>
-            <a:ext cx="1363917" cy="461665"/>
+            <a:ext cx="1657649" cy="830997"/>
           </a:xfrm>
           <a:prstGeom prst="rect">
             <a:avLst/>
@@ -34284,7 +33954,14 @@
                 <a:latin typeface="Arial"/>
                 <a:cs typeface="Arial"/>
               </a:rPr>
-              <a:t>No view</a:t>
+              <a:t>Predicted No </a:t>
+            </a:r>
+            <a:r>
+              <a:rPr lang="en-US" sz="2400" dirty="0" smtClean="0">
+                <a:latin typeface="Arial"/>
+                <a:cs typeface="Arial"/>
+              </a:rPr>
+              <a:t>view</a:t>
             </a:r>
             <a:endParaRPr lang="en-US" sz="2400" dirty="0">
               <a:latin typeface="Arial"/>
@@ -38484,8 +38161,8 @@
           </p:nvSpPr>
           <p:spPr>
             <a:xfrm>
-              <a:off x="2403412" y="1679030"/>
-              <a:ext cx="1484926" cy="3539430"/>
+              <a:off x="2235203" y="1679030"/>
+              <a:ext cx="1753694" cy="3539430"/>
             </a:xfrm>
             <a:prstGeom prst="rect">
               <a:avLst/>
@@ -38504,6 +38181,10 @@
               </a:r>
               <a:r>
                 <a:rPr lang="en-US" sz="3200" dirty="0" err="1" smtClean="0"/>
+                <a:t>sq</a:t>
+              </a:r>
+              <a:r>
+                <a:rPr lang="en-US" sz="3200" dirty="0" err="1" smtClean="0"/>
                 <a:t>ft</a:t>
               </a:r>
               <a:endParaRPr lang="en-US" sz="3200" dirty="0" smtClean="0"/>
@@ -38515,38 +38196,68 @@
               </a:r>
               <a:r>
                 <a:rPr lang="en-US" sz="3200" dirty="0" smtClean="0"/>
-                <a:t>00 ft</a:t>
+                <a:t>00 </a:t>
               </a:r>
+              <a:r>
+                <a:rPr lang="en-US" sz="3200" dirty="0" err="1" smtClean="0"/>
+                <a:t>sqft</a:t>
+              </a:r>
+              <a:endParaRPr lang="en-US" sz="3200" dirty="0" smtClean="0"/>
             </a:p>
             <a:p>
               <a:r>
                 <a:rPr lang="en-US" sz="3200" dirty="0" smtClean="0"/>
-                <a:t>1600 ft</a:t>
+                <a:t>1600 </a:t>
               </a:r>
+              <a:r>
+                <a:rPr lang="en-US" sz="3200" dirty="0" err="1" smtClean="0"/>
+                <a:t>sqft</a:t>
+              </a:r>
+              <a:endParaRPr lang="en-US" sz="3200" dirty="0" smtClean="0"/>
             </a:p>
             <a:p>
               <a:r>
                 <a:rPr lang="en-US" sz="3200" dirty="0" smtClean="0"/>
-                <a:t>800 ft</a:t>
+                <a:t>800 </a:t>
               </a:r>
+              <a:r>
+                <a:rPr lang="en-US" sz="3200" dirty="0" err="1" smtClean="0"/>
+                <a:t>sqft</a:t>
+              </a:r>
+              <a:endParaRPr lang="en-US" sz="3200" dirty="0" smtClean="0"/>
             </a:p>
             <a:p>
               <a:r>
                 <a:rPr lang="en-US" sz="3200" dirty="0" smtClean="0"/>
-                <a:t>300 ft</a:t>
+                <a:t>300 </a:t>
               </a:r>
+              <a:r>
+                <a:rPr lang="en-US" sz="3200" dirty="0" err="1" smtClean="0"/>
+                <a:t>sqft</a:t>
+              </a:r>
+              <a:endParaRPr lang="en-US" sz="3200" dirty="0" smtClean="0"/>
             </a:p>
             <a:p>
               <a:r>
                 <a:rPr lang="en-US" sz="3200" dirty="0" smtClean="0"/>
-                <a:t>1000 ft</a:t>
+                <a:t>1000 </a:t>
               </a:r>
+              <a:r>
+                <a:rPr lang="en-US" sz="3200" dirty="0" err="1" smtClean="0"/>
+                <a:t>sqft</a:t>
+              </a:r>
+              <a:endParaRPr lang="en-US" sz="3200" dirty="0" smtClean="0"/>
             </a:p>
             <a:p>
               <a:r>
                 <a:rPr lang="en-US" sz="3200" dirty="0" smtClean="0"/>
-                <a:t>700 ft</a:t>
+                <a:t>700 </a:t>
               </a:r>
+              <a:r>
+                <a:rPr lang="en-US" sz="3200" dirty="0" err="1" smtClean="0"/>
+                <a:t>sqft</a:t>
+              </a:r>
+              <a:endParaRPr lang="en-US" sz="3200" dirty="0" smtClean="0"/>
             </a:p>
           </p:txBody>
         </p:sp>
@@ -39209,7 +38920,7 @@
         <p:spPr>
           <a:xfrm>
             <a:off x="7715204" y="1453080"/>
-            <a:ext cx="1222563" cy="1077218"/>
+            <a:ext cx="1222563" cy="584776"/>
           </a:xfrm>
           <a:prstGeom prst="rect">
             <a:avLst/>
@@ -39231,8 +38942,15 @@
                 <a:latin typeface="Arial"/>
                 <a:cs typeface="Arial"/>
               </a:rPr>
-              <a:t>Good View</a:t>
+              <a:t>View</a:t>
             </a:r>
+            <a:endParaRPr lang="en-US" sz="3200" dirty="0" smtClean="0">
+              <a:solidFill>
+                <a:srgbClr val="FF0000"/>
+              </a:solidFill>
+              <a:latin typeface="Arial"/>
+              <a:cs typeface="Arial"/>
+            </a:endParaRPr>
           </a:p>
         </p:txBody>
       </p:sp>
@@ -39267,8 +38985,15 @@
                 <a:latin typeface="Arial"/>
                 <a:cs typeface="Arial"/>
               </a:rPr>
-              <a:t>Bad View</a:t>
+              <a:t>No View</a:t>
             </a:r>
+            <a:endParaRPr lang="en-US" sz="3200" dirty="0" smtClean="0">
+              <a:solidFill>
+                <a:srgbClr val="FF0000"/>
+              </a:solidFill>
+              <a:latin typeface="Arial"/>
+              <a:cs typeface="Arial"/>
+            </a:endParaRPr>
           </a:p>
         </p:txBody>
       </p:sp>
@@ -39282,8 +39007,8 @@
         </p:nvCxnSpPr>
         <p:spPr>
           <a:xfrm flipH="1">
-            <a:off x="6830750" y="1991689"/>
-            <a:ext cx="884454" cy="37382"/>
+            <a:off x="6830750" y="1745468"/>
+            <a:ext cx="884454" cy="283603"/>
           </a:xfrm>
           <a:prstGeom prst="straightConnector1">
             <a:avLst/>
@@ -39321,8 +39046,8 @@
         </p:nvCxnSpPr>
         <p:spPr>
           <a:xfrm flipH="1">
-            <a:off x="6849628" y="1991689"/>
-            <a:ext cx="865576" cy="473385"/>
+            <a:off x="6849628" y="1745468"/>
+            <a:ext cx="865576" cy="719606"/>
           </a:xfrm>
           <a:prstGeom prst="straightConnector1">
             <a:avLst/>
@@ -39437,9 +39162,9 @@
         <p:grpSpPr>
           <a:xfrm>
             <a:off x="106827" y="1598733"/>
-            <a:ext cx="5050016" cy="1077218"/>
+            <a:ext cx="4984551" cy="1077218"/>
             <a:chOff x="106827" y="1598733"/>
-            <a:chExt cx="5050016" cy="1077218"/>
+            <a:chExt cx="4984551" cy="1077218"/>
           </a:xfrm>
         </p:grpSpPr>
         <p:sp>
@@ -39450,8 +39175,8 @@
           </p:nvSpPr>
           <p:spPr>
             <a:xfrm>
-              <a:off x="2403412" y="1716457"/>
-              <a:ext cx="2753431" cy="562619"/>
+              <a:off x="2282221" y="1716457"/>
+              <a:ext cx="2809157" cy="562619"/>
             </a:xfrm>
             <a:prstGeom prst="rect">
               <a:avLst/>
@@ -39536,7 +39261,7 @@
         <p:spPr>
           <a:xfrm flipV="1">
             <a:off x="1804171" y="1997767"/>
-            <a:ext cx="599241" cy="139575"/>
+            <a:ext cx="478050" cy="139575"/>
           </a:xfrm>
           <a:prstGeom prst="straightConnector1">
             <a:avLst/>
@@ -40135,154 +39860,6 @@
           </a:p>
         </p:txBody>
       </p:sp>
-      <p:sp>
-        <p:nvSpPr>
-          <p:cNvPr id="42" name="TextBox 41"/>
-          <p:cNvSpPr txBox="1"/>
-          <p:nvPr/>
-        </p:nvSpPr>
-        <p:spPr>
-          <a:xfrm>
-            <a:off x="3544870" y="1848133"/>
-            <a:ext cx="1484926" cy="3539430"/>
-          </a:xfrm>
-          <a:prstGeom prst="rect">
-            <a:avLst/>
-          </a:prstGeom>
-          <a:noFill/>
-        </p:spPr>
-        <p:txBody>
-          <a:bodyPr wrap="square" rtlCol="0">
-            <a:spAutoFit/>
-          </a:bodyPr>
-          <a:lstStyle/>
-          <a:p>
-            <a:r>
-              <a:rPr lang="en-US" sz="3200" dirty="0" smtClean="0"/>
-              <a:t>400 </a:t>
-            </a:r>
-            <a:r>
-              <a:rPr lang="en-US" sz="3200" dirty="0" err="1" smtClean="0"/>
-              <a:t>ft</a:t>
-            </a:r>
-            <a:endParaRPr lang="en-US" sz="3200" dirty="0" smtClean="0"/>
-          </a:p>
-          <a:p>
-            <a:r>
-              <a:rPr lang="en-US" sz="3200" dirty="0"/>
-              <a:t>6</a:t>
-            </a:r>
-            <a:r>
-              <a:rPr lang="en-US" sz="3200" dirty="0" smtClean="0"/>
-              <a:t>00 ft</a:t>
-            </a:r>
-          </a:p>
-          <a:p>
-            <a:r>
-              <a:rPr lang="en-US" sz="3200" dirty="0" smtClean="0"/>
-              <a:t>1600 ft</a:t>
-            </a:r>
-          </a:p>
-          <a:p>
-            <a:r>
-              <a:rPr lang="en-US" sz="3200" dirty="0" smtClean="0"/>
-              <a:t>800 </a:t>
-            </a:r>
-            <a:r>
-              <a:rPr lang="en-US" sz="3200" dirty="0" err="1" smtClean="0"/>
-              <a:t>ft</a:t>
-            </a:r>
-            <a:r>
-              <a:rPr lang="en-US" sz="3200" dirty="0" smtClean="0"/>
-              <a:t> </a:t>
-            </a:r>
-          </a:p>
-          <a:p>
-            <a:r>
-              <a:rPr lang="en-US" sz="3200" dirty="0" smtClean="0"/>
-              <a:t>300 ft</a:t>
-            </a:r>
-          </a:p>
-          <a:p>
-            <a:r>
-              <a:rPr lang="en-US" sz="3200" dirty="0" smtClean="0"/>
-              <a:t>1000 ft</a:t>
-            </a:r>
-          </a:p>
-          <a:p>
-            <a:r>
-              <a:rPr lang="en-US" sz="3200" dirty="0" smtClean="0"/>
-              <a:t>700 ft</a:t>
-            </a:r>
-          </a:p>
-        </p:txBody>
-      </p:sp>
-      <p:sp>
-        <p:nvSpPr>
-          <p:cNvPr id="43" name="TextBox 42"/>
-          <p:cNvSpPr txBox="1"/>
-          <p:nvPr/>
-        </p:nvSpPr>
-        <p:spPr>
-          <a:xfrm>
-            <a:off x="5130355" y="1842899"/>
-            <a:ext cx="1678214" cy="3539430"/>
-          </a:xfrm>
-          <a:prstGeom prst="rect">
-            <a:avLst/>
-          </a:prstGeom>
-          <a:noFill/>
-        </p:spPr>
-        <p:txBody>
-          <a:bodyPr wrap="square" rtlCol="0">
-            <a:spAutoFit/>
-          </a:bodyPr>
-          <a:lstStyle/>
-          <a:p>
-            <a:r>
-              <a:rPr lang="en-US" sz="3200" dirty="0" smtClean="0"/>
-              <a:t>$800</a:t>
-            </a:r>
-          </a:p>
-          <a:p>
-            <a:r>
-              <a:rPr lang="en-US" sz="3200" dirty="0" smtClean="0"/>
-              <a:t>$1200</a:t>
-            </a:r>
-          </a:p>
-          <a:p>
-            <a:r>
-              <a:rPr lang="en-US" sz="3200" dirty="0" smtClean="0"/>
-              <a:t>$2600</a:t>
-            </a:r>
-          </a:p>
-          <a:p>
-            <a:r>
-              <a:rPr lang="en-US" sz="3200" dirty="0" smtClean="0"/>
-              <a:t>$1300</a:t>
-            </a:r>
-          </a:p>
-          <a:p>
-            <a:r>
-              <a:rPr lang="en-US" sz="3200" dirty="0" smtClean="0"/>
-              <a:t>$600</a:t>
-            </a:r>
-          </a:p>
-          <a:p>
-            <a:r>
-              <a:rPr lang="en-US" sz="3200" dirty="0" smtClean="0"/>
-              <a:t>$2000</a:t>
-            </a:r>
-          </a:p>
-          <a:p>
-            <a:r>
-              <a:rPr lang="en-US" sz="3200" dirty="0" smtClean="0"/>
-              <a:t>$1100</a:t>
-            </a:r>
-            <a:endParaRPr lang="en-US" sz="3200" dirty="0"/>
-          </a:p>
-        </p:txBody>
-      </p:sp>
       <p:grpSp>
         <p:nvGrpSpPr>
           <p:cNvPr id="44" name="Group 43"/>
@@ -40774,6 +40351,381 @@
           </a:fontRef>
         </p:style>
       </p:cxnSp>
+      <p:grpSp>
+        <p:nvGrpSpPr>
+          <p:cNvPr id="37" name="Group 36"/>
+          <p:cNvGrpSpPr/>
+          <p:nvPr/>
+        </p:nvGrpSpPr>
+        <p:grpSpPr>
+          <a:xfrm>
+            <a:off x="3376660" y="1774176"/>
+            <a:ext cx="3431909" cy="3634325"/>
+            <a:chOff x="2235202" y="1632852"/>
+            <a:chExt cx="3431909" cy="3634325"/>
+          </a:xfrm>
+        </p:grpSpPr>
+        <p:sp>
+          <p:nvSpPr>
+            <p:cNvPr id="38" name="TextBox 37"/>
+            <p:cNvSpPr txBox="1"/>
+            <p:nvPr/>
+          </p:nvSpPr>
+          <p:spPr>
+            <a:xfrm>
+              <a:off x="2235203" y="1679030"/>
+              <a:ext cx="1753694" cy="3539430"/>
+            </a:xfrm>
+            <a:prstGeom prst="rect">
+              <a:avLst/>
+            </a:prstGeom>
+            <a:noFill/>
+          </p:spPr>
+          <p:txBody>
+            <a:bodyPr wrap="square" rtlCol="0">
+              <a:spAutoFit/>
+            </a:bodyPr>
+            <a:lstStyle/>
+            <a:p>
+              <a:r>
+                <a:rPr lang="en-US" sz="3200" dirty="0" smtClean="0"/>
+                <a:t>400 </a:t>
+              </a:r>
+              <a:r>
+                <a:rPr lang="en-US" sz="3200" dirty="0" err="1" smtClean="0"/>
+                <a:t>sq</a:t>
+              </a:r>
+              <a:r>
+                <a:rPr lang="en-US" sz="3200" dirty="0" err="1" smtClean="0"/>
+                <a:t>ft</a:t>
+              </a:r>
+              <a:endParaRPr lang="en-US" sz="3200" dirty="0" smtClean="0"/>
+            </a:p>
+            <a:p>
+              <a:r>
+                <a:rPr lang="en-US" sz="3200" dirty="0"/>
+                <a:t>6</a:t>
+              </a:r>
+              <a:r>
+                <a:rPr lang="en-US" sz="3200" dirty="0" smtClean="0"/>
+                <a:t>00 </a:t>
+              </a:r>
+              <a:r>
+                <a:rPr lang="en-US" sz="3200" dirty="0" err="1" smtClean="0"/>
+                <a:t>sqft</a:t>
+              </a:r>
+              <a:endParaRPr lang="en-US" sz="3200" dirty="0" smtClean="0"/>
+            </a:p>
+            <a:p>
+              <a:r>
+                <a:rPr lang="en-US" sz="3200" dirty="0" smtClean="0"/>
+                <a:t>1600 </a:t>
+              </a:r>
+              <a:r>
+                <a:rPr lang="en-US" sz="3200" dirty="0" err="1" smtClean="0"/>
+                <a:t>sqft</a:t>
+              </a:r>
+              <a:endParaRPr lang="en-US" sz="3200" dirty="0" smtClean="0"/>
+            </a:p>
+            <a:p>
+              <a:r>
+                <a:rPr lang="en-US" sz="3200" dirty="0" smtClean="0"/>
+                <a:t>800 </a:t>
+              </a:r>
+              <a:r>
+                <a:rPr lang="en-US" sz="3200" dirty="0" err="1" smtClean="0"/>
+                <a:t>sqft</a:t>
+              </a:r>
+              <a:endParaRPr lang="en-US" sz="3200" dirty="0" smtClean="0"/>
+            </a:p>
+            <a:p>
+              <a:r>
+                <a:rPr lang="en-US" sz="3200" dirty="0" smtClean="0"/>
+                <a:t>300 </a:t>
+              </a:r>
+              <a:r>
+                <a:rPr lang="en-US" sz="3200" dirty="0" err="1" smtClean="0"/>
+                <a:t>sqft</a:t>
+              </a:r>
+              <a:endParaRPr lang="en-US" sz="3200" dirty="0" smtClean="0"/>
+            </a:p>
+            <a:p>
+              <a:r>
+                <a:rPr lang="en-US" sz="3200" dirty="0" smtClean="0"/>
+                <a:t>1000 </a:t>
+              </a:r>
+              <a:r>
+                <a:rPr lang="en-US" sz="3200" dirty="0" err="1" smtClean="0"/>
+                <a:t>sqft</a:t>
+              </a:r>
+              <a:endParaRPr lang="en-US" sz="3200" dirty="0" smtClean="0"/>
+            </a:p>
+            <a:p>
+              <a:r>
+                <a:rPr lang="en-US" sz="3200" dirty="0" smtClean="0"/>
+                <a:t>700 </a:t>
+              </a:r>
+              <a:r>
+                <a:rPr lang="en-US" sz="3200" dirty="0" err="1" smtClean="0"/>
+                <a:t>sqft</a:t>
+              </a:r>
+              <a:endParaRPr lang="en-US" sz="3200" dirty="0" smtClean="0"/>
+            </a:p>
+          </p:txBody>
+        </p:sp>
+        <p:sp>
+          <p:nvSpPr>
+            <p:cNvPr id="39" name="TextBox 38"/>
+            <p:cNvSpPr txBox="1"/>
+            <p:nvPr/>
+          </p:nvSpPr>
+          <p:spPr>
+            <a:xfrm>
+              <a:off x="3988897" y="1673796"/>
+              <a:ext cx="1678214" cy="3539430"/>
+            </a:xfrm>
+            <a:prstGeom prst="rect">
+              <a:avLst/>
+            </a:prstGeom>
+            <a:noFill/>
+          </p:spPr>
+          <p:txBody>
+            <a:bodyPr wrap="square" rtlCol="0">
+              <a:spAutoFit/>
+            </a:bodyPr>
+            <a:lstStyle/>
+            <a:p>
+              <a:r>
+                <a:rPr lang="en-US" sz="3200" dirty="0" smtClean="0"/>
+                <a:t>$800</a:t>
+              </a:r>
+            </a:p>
+            <a:p>
+              <a:r>
+                <a:rPr lang="en-US" sz="3200" dirty="0" smtClean="0"/>
+                <a:t>$1200</a:t>
+              </a:r>
+            </a:p>
+            <a:p>
+              <a:r>
+                <a:rPr lang="en-US" sz="3200" dirty="0" smtClean="0"/>
+                <a:t>$2600</a:t>
+              </a:r>
+            </a:p>
+            <a:p>
+              <a:r>
+                <a:rPr lang="en-US" sz="3200" dirty="0" smtClean="0"/>
+                <a:t>$1300</a:t>
+              </a:r>
+            </a:p>
+            <a:p>
+              <a:r>
+                <a:rPr lang="en-US" sz="3200" dirty="0" smtClean="0"/>
+                <a:t>$600</a:t>
+              </a:r>
+            </a:p>
+            <a:p>
+              <a:r>
+                <a:rPr lang="en-US" sz="3200" dirty="0" smtClean="0"/>
+                <a:t>$2000</a:t>
+              </a:r>
+            </a:p>
+            <a:p>
+              <a:r>
+                <a:rPr lang="en-US" sz="3200" dirty="0" smtClean="0"/>
+                <a:t>$1100</a:t>
+              </a:r>
+              <a:endParaRPr lang="en-US" sz="3200" dirty="0"/>
+            </a:p>
+          </p:txBody>
+        </p:sp>
+        <p:grpSp>
+          <p:nvGrpSpPr>
+            <p:cNvPr id="40" name="Group 39"/>
+            <p:cNvGrpSpPr/>
+            <p:nvPr/>
+          </p:nvGrpSpPr>
+          <p:grpSpPr>
+            <a:xfrm rot="10800000">
+              <a:off x="2235202" y="1635672"/>
+              <a:ext cx="344715" cy="3631505"/>
+              <a:chOff x="7500259" y="1649186"/>
+              <a:chExt cx="344715" cy="3631505"/>
+            </a:xfrm>
+          </p:grpSpPr>
+          <p:cxnSp>
+            <p:nvCxnSpPr>
+              <p:cNvPr id="60" name="Elbow Connector 59"/>
+              <p:cNvCxnSpPr/>
+              <p:nvPr/>
+            </p:nvCxnSpPr>
+            <p:spPr>
+              <a:xfrm rot="16200000" flipH="1">
+                <a:off x="6701972" y="2447473"/>
+                <a:ext cx="1941288" cy="344714"/>
+              </a:xfrm>
+              <a:prstGeom prst="bentConnector3">
+                <a:avLst>
+                  <a:gd name="adj1" fmla="val -1"/>
+                </a:avLst>
+              </a:prstGeom>
+              <a:ln w="76200" cmpd="sng">
+                <a:solidFill>
+                  <a:schemeClr val="tx1"/>
+                </a:solidFill>
+                <a:tailEnd type="none"/>
+              </a:ln>
+              <a:effectLst/>
+            </p:spPr>
+            <p:style>
+              <a:lnRef idx="2">
+                <a:schemeClr val="accent1"/>
+              </a:lnRef>
+              <a:fillRef idx="0">
+                <a:schemeClr val="accent1"/>
+              </a:fillRef>
+              <a:effectRef idx="1">
+                <a:schemeClr val="accent1"/>
+              </a:effectRef>
+              <a:fontRef idx="minor">
+                <a:schemeClr val="tx1"/>
+              </a:fontRef>
+            </p:style>
+          </p:cxnSp>
+          <p:cxnSp>
+            <p:nvCxnSpPr>
+              <p:cNvPr id="61" name="Elbow Connector 60"/>
+              <p:cNvCxnSpPr/>
+              <p:nvPr/>
+            </p:nvCxnSpPr>
+            <p:spPr>
+              <a:xfrm rot="5400000" flipH="1" flipV="1">
+                <a:off x="6820809" y="4256527"/>
+                <a:ext cx="1703615" cy="344714"/>
+              </a:xfrm>
+              <a:prstGeom prst="bentConnector3">
+                <a:avLst>
+                  <a:gd name="adj1" fmla="val 2077"/>
+                </a:avLst>
+              </a:prstGeom>
+              <a:ln w="76200" cmpd="sng">
+                <a:solidFill>
+                  <a:schemeClr val="tx1"/>
+                </a:solidFill>
+                <a:tailEnd type="none"/>
+              </a:ln>
+              <a:effectLst/>
+            </p:spPr>
+            <p:style>
+              <a:lnRef idx="2">
+                <a:schemeClr val="accent1"/>
+              </a:lnRef>
+              <a:fillRef idx="0">
+                <a:schemeClr val="accent1"/>
+              </a:fillRef>
+              <a:effectRef idx="1">
+                <a:schemeClr val="accent1"/>
+              </a:effectRef>
+              <a:fontRef idx="minor">
+                <a:schemeClr val="tx1"/>
+              </a:fontRef>
+            </p:style>
+          </p:cxnSp>
+        </p:grpSp>
+        <p:grpSp>
+          <p:nvGrpSpPr>
+            <p:cNvPr id="41" name="Group 40"/>
+            <p:cNvGrpSpPr/>
+            <p:nvPr/>
+          </p:nvGrpSpPr>
+          <p:grpSpPr>
+            <a:xfrm>
+              <a:off x="4998114" y="1632852"/>
+              <a:ext cx="344715" cy="3631505"/>
+              <a:chOff x="7347859" y="1496786"/>
+              <a:chExt cx="344715" cy="3631505"/>
+            </a:xfrm>
+          </p:grpSpPr>
+          <p:cxnSp>
+            <p:nvCxnSpPr>
+              <p:cNvPr id="50" name="Elbow Connector 49"/>
+              <p:cNvCxnSpPr/>
+              <p:nvPr/>
+            </p:nvCxnSpPr>
+            <p:spPr>
+              <a:xfrm rot="16200000" flipH="1">
+                <a:off x="6549572" y="2295073"/>
+                <a:ext cx="1941288" cy="344714"/>
+              </a:xfrm>
+              <a:prstGeom prst="bentConnector3">
+                <a:avLst>
+                  <a:gd name="adj1" fmla="val -1"/>
+                </a:avLst>
+              </a:prstGeom>
+              <a:ln w="76200" cmpd="sng">
+                <a:solidFill>
+                  <a:schemeClr val="tx1"/>
+                </a:solidFill>
+                <a:tailEnd type="none"/>
+              </a:ln>
+              <a:effectLst/>
+            </p:spPr>
+            <p:style>
+              <a:lnRef idx="2">
+                <a:schemeClr val="accent1"/>
+              </a:lnRef>
+              <a:fillRef idx="0">
+                <a:schemeClr val="accent1"/>
+              </a:fillRef>
+              <a:effectRef idx="1">
+                <a:schemeClr val="accent1"/>
+              </a:effectRef>
+              <a:fontRef idx="minor">
+                <a:schemeClr val="tx1"/>
+              </a:fontRef>
+            </p:style>
+          </p:cxnSp>
+          <p:cxnSp>
+            <p:nvCxnSpPr>
+              <p:cNvPr id="59" name="Elbow Connector 58"/>
+              <p:cNvCxnSpPr/>
+              <p:nvPr/>
+            </p:nvCxnSpPr>
+            <p:spPr>
+              <a:xfrm rot="5400000" flipH="1" flipV="1">
+                <a:off x="6668409" y="4104127"/>
+                <a:ext cx="1703615" cy="344714"/>
+              </a:xfrm>
+              <a:prstGeom prst="bentConnector3">
+                <a:avLst>
+                  <a:gd name="adj1" fmla="val 2077"/>
+                </a:avLst>
+              </a:prstGeom>
+              <a:ln w="76200" cmpd="sng">
+                <a:solidFill>
+                  <a:schemeClr val="tx1"/>
+                </a:solidFill>
+                <a:tailEnd type="none"/>
+              </a:ln>
+              <a:effectLst/>
+            </p:spPr>
+            <p:style>
+              <a:lnRef idx="2">
+                <a:schemeClr val="accent1"/>
+              </a:lnRef>
+              <a:fillRef idx="0">
+                <a:schemeClr val="accent1"/>
+              </a:fillRef>
+              <a:effectRef idx="1">
+                <a:schemeClr val="accent1"/>
+              </a:effectRef>
+              <a:fontRef idx="minor">
+                <a:schemeClr val="tx1"/>
+              </a:fontRef>
+            </p:style>
+          </p:cxnSp>
+        </p:grpSp>
+      </p:grpSp>
     </p:spTree>
     <p:extLst>
       <p:ext uri="{BB962C8B-B14F-4D97-AF65-F5344CB8AC3E}">

</xml_diff>